<commit_message>
more details, R code
</commit_message>
<xml_diff>
--- a/Generating Insights from Clustering Large Donors - BStieber APRA DAS19.pptx
+++ b/Generating Insights from Clustering Large Donors - BStieber APRA DAS19.pptx
@@ -4,10 +4,30 @@
   <p:sldMasterIdLst>
     <p:sldMasterId id="2147483660" r:id="rId1"/>
   </p:sldMasterIdLst>
+  <p:notesMasterIdLst>
+    <p:notesMasterId r:id="rId22"/>
+  </p:notesMasterIdLst>
   <p:sldIdLst>
     <p:sldId id="258" r:id="rId2"/>
     <p:sldId id="260" r:id="rId3"/>
-    <p:sldId id="259" r:id="rId4"/>
+    <p:sldId id="261" r:id="rId4"/>
+    <p:sldId id="262" r:id="rId5"/>
+    <p:sldId id="264" r:id="rId6"/>
+    <p:sldId id="265" r:id="rId7"/>
+    <p:sldId id="266" r:id="rId8"/>
+    <p:sldId id="267" r:id="rId9"/>
+    <p:sldId id="268" r:id="rId10"/>
+    <p:sldId id="271" r:id="rId11"/>
+    <p:sldId id="273" r:id="rId12"/>
+    <p:sldId id="272" r:id="rId13"/>
+    <p:sldId id="270" r:id="rId14"/>
+    <p:sldId id="274" r:id="rId15"/>
+    <p:sldId id="275" r:id="rId16"/>
+    <p:sldId id="276" r:id="rId17"/>
+    <p:sldId id="277" r:id="rId18"/>
+    <p:sldId id="278" r:id="rId19"/>
+    <p:sldId id="279" r:id="rId20"/>
+    <p:sldId id="259" r:id="rId21"/>
   </p:sldIdLst>
   <p:sldSz cx="9144000" cy="5143500" type="screen16x9"/>
   <p:notesSz cx="6858000" cy="9144000"/>
@@ -123,6 +143,630 @@
     </p:ext>
   </p:extLst>
 </p:presentation>
+</file>
+
+<file path=ppt/notesMasters/notesMaster1.xml><?xml version="1.0" encoding="utf-8"?>
+<p:notesMaster xmlns:a="http://schemas.openxmlformats.org/drawingml/2006/main" xmlns:r="http://schemas.openxmlformats.org/officeDocument/2006/relationships" xmlns:p="http://schemas.openxmlformats.org/presentationml/2006/main">
+  <p:cSld>
+    <p:bg>
+      <p:bgRef idx="1001">
+        <a:schemeClr val="bg1"/>
+      </p:bgRef>
+    </p:bg>
+    <p:spTree>
+      <p:nvGrpSpPr>
+        <p:cNvPr id="1" name=""/>
+        <p:cNvGrpSpPr/>
+        <p:nvPr/>
+      </p:nvGrpSpPr>
+      <p:grpSpPr>
+        <a:xfrm>
+          <a:off x="0" y="0"/>
+          <a:ext cx="0" cy="0"/>
+          <a:chOff x="0" y="0"/>
+          <a:chExt cx="0" cy="0"/>
+        </a:xfrm>
+      </p:grpSpPr>
+      <p:sp>
+        <p:nvSpPr>
+          <p:cNvPr id="2" name="Header Placeholder 1"/>
+          <p:cNvSpPr>
+            <a:spLocks noGrp="1"/>
+          </p:cNvSpPr>
+          <p:nvPr>
+            <p:ph type="hdr" sz="quarter"/>
+          </p:nvPr>
+        </p:nvSpPr>
+        <p:spPr>
+          <a:xfrm>
+            <a:off x="0" y="0"/>
+            <a:ext cx="2971800" cy="458788"/>
+          </a:xfrm>
+          <a:prstGeom prst="rect">
+            <a:avLst/>
+          </a:prstGeom>
+        </p:spPr>
+        <p:txBody>
+          <a:bodyPr vert="horz" lIns="91440" tIns="45720" rIns="91440" bIns="45720" rtlCol="0"/>
+          <a:lstStyle>
+            <a:lvl1pPr algn="l">
+              <a:defRPr sz="1200"/>
+            </a:lvl1pPr>
+          </a:lstStyle>
+          <a:p>
+            <a:endParaRPr lang="en-US"/>
+          </a:p>
+        </p:txBody>
+      </p:sp>
+      <p:sp>
+        <p:nvSpPr>
+          <p:cNvPr id="3" name="Date Placeholder 2"/>
+          <p:cNvSpPr>
+            <a:spLocks noGrp="1"/>
+          </p:cNvSpPr>
+          <p:nvPr>
+            <p:ph type="dt" idx="1"/>
+          </p:nvPr>
+        </p:nvSpPr>
+        <p:spPr>
+          <a:xfrm>
+            <a:off x="3884613" y="0"/>
+            <a:ext cx="2971800" cy="458788"/>
+          </a:xfrm>
+          <a:prstGeom prst="rect">
+            <a:avLst/>
+          </a:prstGeom>
+        </p:spPr>
+        <p:txBody>
+          <a:bodyPr vert="horz" lIns="91440" tIns="45720" rIns="91440" bIns="45720" rtlCol="0"/>
+          <a:lstStyle>
+            <a:lvl1pPr algn="r">
+              <a:defRPr sz="1200"/>
+            </a:lvl1pPr>
+          </a:lstStyle>
+          <a:p>
+            <a:fld id="{1DEEC2B6-86D3-4D9F-A8F6-E4F5C06381F6}" type="datetimeFigureOut">
+              <a:rPr lang="en-US" smtClean="0"/>
+              <a:t>5/6/2019</a:t>
+            </a:fld>
+            <a:endParaRPr lang="en-US"/>
+          </a:p>
+        </p:txBody>
+      </p:sp>
+      <p:sp>
+        <p:nvSpPr>
+          <p:cNvPr id="4" name="Slide Image Placeholder 3"/>
+          <p:cNvSpPr>
+            <a:spLocks noGrp="1" noRot="1" noChangeAspect="1"/>
+          </p:cNvSpPr>
+          <p:nvPr>
+            <p:ph type="sldImg" idx="2"/>
+          </p:nvPr>
+        </p:nvSpPr>
+        <p:spPr>
+          <a:xfrm>
+            <a:off x="685800" y="1143000"/>
+            <a:ext cx="5486400" cy="3086100"/>
+          </a:xfrm>
+          <a:prstGeom prst="rect">
+            <a:avLst/>
+          </a:prstGeom>
+          <a:noFill/>
+          <a:ln w="12700">
+            <a:solidFill>
+              <a:prstClr val="black"/>
+            </a:solidFill>
+          </a:ln>
+        </p:spPr>
+        <p:txBody>
+          <a:bodyPr vert="horz" lIns="91440" tIns="45720" rIns="91440" bIns="45720" rtlCol="0" anchor="ctr"/>
+          <a:lstStyle/>
+          <a:p>
+            <a:endParaRPr lang="en-US"/>
+          </a:p>
+        </p:txBody>
+      </p:sp>
+      <p:sp>
+        <p:nvSpPr>
+          <p:cNvPr id="5" name="Notes Placeholder 4"/>
+          <p:cNvSpPr>
+            <a:spLocks noGrp="1"/>
+          </p:cNvSpPr>
+          <p:nvPr>
+            <p:ph type="body" sz="quarter" idx="3"/>
+          </p:nvPr>
+        </p:nvSpPr>
+        <p:spPr>
+          <a:xfrm>
+            <a:off x="685800" y="4400550"/>
+            <a:ext cx="5486400" cy="3600450"/>
+          </a:xfrm>
+          <a:prstGeom prst="rect">
+            <a:avLst/>
+          </a:prstGeom>
+        </p:spPr>
+        <p:txBody>
+          <a:bodyPr vert="horz" lIns="91440" tIns="45720" rIns="91440" bIns="45720" rtlCol="0"/>
+          <a:lstStyle/>
+          <a:p>
+            <a:pPr lvl="0"/>
+            <a:r>
+              <a:rPr lang="en-US" smtClean="0"/>
+              <a:t>Edit Master text styles</a:t>
+            </a:r>
+          </a:p>
+          <a:p>
+            <a:pPr lvl="1"/>
+            <a:r>
+              <a:rPr lang="en-US" smtClean="0"/>
+              <a:t>Second level</a:t>
+            </a:r>
+          </a:p>
+          <a:p>
+            <a:pPr lvl="2"/>
+            <a:r>
+              <a:rPr lang="en-US" smtClean="0"/>
+              <a:t>Third level</a:t>
+            </a:r>
+          </a:p>
+          <a:p>
+            <a:pPr lvl="3"/>
+            <a:r>
+              <a:rPr lang="en-US" smtClean="0"/>
+              <a:t>Fourth level</a:t>
+            </a:r>
+          </a:p>
+          <a:p>
+            <a:pPr lvl="4"/>
+            <a:r>
+              <a:rPr lang="en-US" smtClean="0"/>
+              <a:t>Fifth level</a:t>
+            </a:r>
+            <a:endParaRPr lang="en-US"/>
+          </a:p>
+        </p:txBody>
+      </p:sp>
+      <p:sp>
+        <p:nvSpPr>
+          <p:cNvPr id="6" name="Footer Placeholder 5"/>
+          <p:cNvSpPr>
+            <a:spLocks noGrp="1"/>
+          </p:cNvSpPr>
+          <p:nvPr>
+            <p:ph type="ftr" sz="quarter" idx="4"/>
+          </p:nvPr>
+        </p:nvSpPr>
+        <p:spPr>
+          <a:xfrm>
+            <a:off x="0" y="8685213"/>
+            <a:ext cx="2971800" cy="458787"/>
+          </a:xfrm>
+          <a:prstGeom prst="rect">
+            <a:avLst/>
+          </a:prstGeom>
+        </p:spPr>
+        <p:txBody>
+          <a:bodyPr vert="horz" lIns="91440" tIns="45720" rIns="91440" bIns="45720" rtlCol="0" anchor="b"/>
+          <a:lstStyle>
+            <a:lvl1pPr algn="l">
+              <a:defRPr sz="1200"/>
+            </a:lvl1pPr>
+          </a:lstStyle>
+          <a:p>
+            <a:endParaRPr lang="en-US"/>
+          </a:p>
+        </p:txBody>
+      </p:sp>
+      <p:sp>
+        <p:nvSpPr>
+          <p:cNvPr id="7" name="Slide Number Placeholder 6"/>
+          <p:cNvSpPr>
+            <a:spLocks noGrp="1"/>
+          </p:cNvSpPr>
+          <p:nvPr>
+            <p:ph type="sldNum" sz="quarter" idx="5"/>
+          </p:nvPr>
+        </p:nvSpPr>
+        <p:spPr>
+          <a:xfrm>
+            <a:off x="3884613" y="8685213"/>
+            <a:ext cx="2971800" cy="458787"/>
+          </a:xfrm>
+          <a:prstGeom prst="rect">
+            <a:avLst/>
+          </a:prstGeom>
+        </p:spPr>
+        <p:txBody>
+          <a:bodyPr vert="horz" lIns="91440" tIns="45720" rIns="91440" bIns="45720" rtlCol="0" anchor="b"/>
+          <a:lstStyle>
+            <a:lvl1pPr algn="r">
+              <a:defRPr sz="1200"/>
+            </a:lvl1pPr>
+          </a:lstStyle>
+          <a:p>
+            <a:fld id="{340F17E4-2B4D-4428-9E25-E07F235B5058}" type="slidenum">
+              <a:rPr lang="en-US" smtClean="0"/>
+              <a:t>‹#›</a:t>
+            </a:fld>
+            <a:endParaRPr lang="en-US"/>
+          </a:p>
+        </p:txBody>
+      </p:sp>
+    </p:spTree>
+    <p:extLst>
+      <p:ext uri="{BB962C8B-B14F-4D97-AF65-F5344CB8AC3E}">
+        <p14:creationId xmlns:p14="http://schemas.microsoft.com/office/powerpoint/2010/main" val="1174192828"/>
+      </p:ext>
+    </p:extLst>
+  </p:cSld>
+  <p:clrMap bg1="lt1" tx1="dk1" bg2="lt2" tx2="dk2" accent1="accent1" accent2="accent2" accent3="accent3" accent4="accent4" accent5="accent5" accent6="accent6" hlink="hlink" folHlink="folHlink"/>
+  <p:notesStyle>
+    <a:lvl1pPr marL="0" algn="l" defTabSz="914400" rtl="0" eaLnBrk="1" latinLnBrk="0" hangingPunct="1">
+      <a:defRPr sz="1200" kern="1200">
+        <a:solidFill>
+          <a:schemeClr val="tx1"/>
+        </a:solidFill>
+        <a:latin typeface="+mn-lt"/>
+        <a:ea typeface="+mn-ea"/>
+        <a:cs typeface="+mn-cs"/>
+      </a:defRPr>
+    </a:lvl1pPr>
+    <a:lvl2pPr marL="457200" algn="l" defTabSz="914400" rtl="0" eaLnBrk="1" latinLnBrk="0" hangingPunct="1">
+      <a:defRPr sz="1200" kern="1200">
+        <a:solidFill>
+          <a:schemeClr val="tx1"/>
+        </a:solidFill>
+        <a:latin typeface="+mn-lt"/>
+        <a:ea typeface="+mn-ea"/>
+        <a:cs typeface="+mn-cs"/>
+      </a:defRPr>
+    </a:lvl2pPr>
+    <a:lvl3pPr marL="914400" algn="l" defTabSz="914400" rtl="0" eaLnBrk="1" latinLnBrk="0" hangingPunct="1">
+      <a:defRPr sz="1200" kern="1200">
+        <a:solidFill>
+          <a:schemeClr val="tx1"/>
+        </a:solidFill>
+        <a:latin typeface="+mn-lt"/>
+        <a:ea typeface="+mn-ea"/>
+        <a:cs typeface="+mn-cs"/>
+      </a:defRPr>
+    </a:lvl3pPr>
+    <a:lvl4pPr marL="1371600" algn="l" defTabSz="914400" rtl="0" eaLnBrk="1" latinLnBrk="0" hangingPunct="1">
+      <a:defRPr sz="1200" kern="1200">
+        <a:solidFill>
+          <a:schemeClr val="tx1"/>
+        </a:solidFill>
+        <a:latin typeface="+mn-lt"/>
+        <a:ea typeface="+mn-ea"/>
+        <a:cs typeface="+mn-cs"/>
+      </a:defRPr>
+    </a:lvl4pPr>
+    <a:lvl5pPr marL="1828800" algn="l" defTabSz="914400" rtl="0" eaLnBrk="1" latinLnBrk="0" hangingPunct="1">
+      <a:defRPr sz="1200" kern="1200">
+        <a:solidFill>
+          <a:schemeClr val="tx1"/>
+        </a:solidFill>
+        <a:latin typeface="+mn-lt"/>
+        <a:ea typeface="+mn-ea"/>
+        <a:cs typeface="+mn-cs"/>
+      </a:defRPr>
+    </a:lvl5pPr>
+    <a:lvl6pPr marL="2286000" algn="l" defTabSz="914400" rtl="0" eaLnBrk="1" latinLnBrk="0" hangingPunct="1">
+      <a:defRPr sz="1200" kern="1200">
+        <a:solidFill>
+          <a:schemeClr val="tx1"/>
+        </a:solidFill>
+        <a:latin typeface="+mn-lt"/>
+        <a:ea typeface="+mn-ea"/>
+        <a:cs typeface="+mn-cs"/>
+      </a:defRPr>
+    </a:lvl6pPr>
+    <a:lvl7pPr marL="2743200" algn="l" defTabSz="914400" rtl="0" eaLnBrk="1" latinLnBrk="0" hangingPunct="1">
+      <a:defRPr sz="1200" kern="1200">
+        <a:solidFill>
+          <a:schemeClr val="tx1"/>
+        </a:solidFill>
+        <a:latin typeface="+mn-lt"/>
+        <a:ea typeface="+mn-ea"/>
+        <a:cs typeface="+mn-cs"/>
+      </a:defRPr>
+    </a:lvl7pPr>
+    <a:lvl8pPr marL="3200400" algn="l" defTabSz="914400" rtl="0" eaLnBrk="1" latinLnBrk="0" hangingPunct="1">
+      <a:defRPr sz="1200" kern="1200">
+        <a:solidFill>
+          <a:schemeClr val="tx1"/>
+        </a:solidFill>
+        <a:latin typeface="+mn-lt"/>
+        <a:ea typeface="+mn-ea"/>
+        <a:cs typeface="+mn-cs"/>
+      </a:defRPr>
+    </a:lvl8pPr>
+    <a:lvl9pPr marL="3657600" algn="l" defTabSz="914400" rtl="0" eaLnBrk="1" latinLnBrk="0" hangingPunct="1">
+      <a:defRPr sz="1200" kern="1200">
+        <a:solidFill>
+          <a:schemeClr val="tx1"/>
+        </a:solidFill>
+        <a:latin typeface="+mn-lt"/>
+        <a:ea typeface="+mn-ea"/>
+        <a:cs typeface="+mn-cs"/>
+      </a:defRPr>
+    </a:lvl9pPr>
+  </p:notesStyle>
+</p:notesMaster>
+</file>
+
+<file path=ppt/notesSlides/notesSlide1.xml><?xml version="1.0" encoding="utf-8"?>
+<p:notes xmlns:a="http://schemas.openxmlformats.org/drawingml/2006/main" xmlns:r="http://schemas.openxmlformats.org/officeDocument/2006/relationships" xmlns:p="http://schemas.openxmlformats.org/presentationml/2006/main">
+  <p:cSld>
+    <p:spTree>
+      <p:nvGrpSpPr>
+        <p:cNvPr id="1" name=""/>
+        <p:cNvGrpSpPr/>
+        <p:nvPr/>
+      </p:nvGrpSpPr>
+      <p:grpSpPr>
+        <a:xfrm>
+          <a:off x="0" y="0"/>
+          <a:ext cx="0" cy="0"/>
+          <a:chOff x="0" y="0"/>
+          <a:chExt cx="0" cy="0"/>
+        </a:xfrm>
+      </p:grpSpPr>
+      <p:sp>
+        <p:nvSpPr>
+          <p:cNvPr id="2" name="Slide Image Placeholder 1"/>
+          <p:cNvSpPr>
+            <a:spLocks noGrp="1" noRot="1" noChangeAspect="1"/>
+          </p:cNvSpPr>
+          <p:nvPr>
+            <p:ph type="sldImg"/>
+          </p:nvPr>
+        </p:nvSpPr>
+        <p:spPr/>
+      </p:sp>
+      <p:sp>
+        <p:nvSpPr>
+          <p:cNvPr id="3" name="Notes Placeholder 2"/>
+          <p:cNvSpPr>
+            <a:spLocks noGrp="1"/>
+          </p:cNvSpPr>
+          <p:nvPr>
+            <p:ph type="body" idx="1"/>
+          </p:nvPr>
+        </p:nvSpPr>
+        <p:spPr/>
+        <p:txBody>
+          <a:bodyPr/>
+          <a:lstStyle/>
+          <a:p>
+            <a:endParaRPr lang="en-US" dirty="0"/>
+          </a:p>
+        </p:txBody>
+      </p:sp>
+      <p:sp>
+        <p:nvSpPr>
+          <p:cNvPr id="4" name="Slide Number Placeholder 3"/>
+          <p:cNvSpPr>
+            <a:spLocks noGrp="1"/>
+          </p:cNvSpPr>
+          <p:nvPr>
+            <p:ph type="sldNum" sz="quarter" idx="10"/>
+          </p:nvPr>
+        </p:nvSpPr>
+        <p:spPr/>
+        <p:txBody>
+          <a:bodyPr/>
+          <a:lstStyle/>
+          <a:p>
+            <a:fld id="{340F17E4-2B4D-4428-9E25-E07F235B5058}" type="slidenum">
+              <a:rPr lang="en-US" smtClean="0"/>
+              <a:t>1</a:t>
+            </a:fld>
+            <a:endParaRPr lang="en-US"/>
+          </a:p>
+        </p:txBody>
+      </p:sp>
+    </p:spTree>
+    <p:extLst>
+      <p:ext uri="{BB962C8B-B14F-4D97-AF65-F5344CB8AC3E}">
+        <p14:creationId xmlns:p14="http://schemas.microsoft.com/office/powerpoint/2010/main" val="2274404227"/>
+      </p:ext>
+    </p:extLst>
+  </p:cSld>
+  <p:clrMapOvr>
+    <a:masterClrMapping/>
+  </p:clrMapOvr>
+</p:notes>
+</file>
+
+<file path=ppt/notesSlides/notesSlide2.xml><?xml version="1.0" encoding="utf-8"?>
+<p:notes xmlns:a="http://schemas.openxmlformats.org/drawingml/2006/main" xmlns:r="http://schemas.openxmlformats.org/officeDocument/2006/relationships" xmlns:p="http://schemas.openxmlformats.org/presentationml/2006/main">
+  <p:cSld>
+    <p:spTree>
+      <p:nvGrpSpPr>
+        <p:cNvPr id="1" name=""/>
+        <p:cNvGrpSpPr/>
+        <p:nvPr/>
+      </p:nvGrpSpPr>
+      <p:grpSpPr>
+        <a:xfrm>
+          <a:off x="0" y="0"/>
+          <a:ext cx="0" cy="0"/>
+          <a:chOff x="0" y="0"/>
+          <a:chExt cx="0" cy="0"/>
+        </a:xfrm>
+      </p:grpSpPr>
+      <p:sp>
+        <p:nvSpPr>
+          <p:cNvPr id="2" name="Slide Image Placeholder 1"/>
+          <p:cNvSpPr>
+            <a:spLocks noGrp="1" noRot="1" noChangeAspect="1"/>
+          </p:cNvSpPr>
+          <p:nvPr>
+            <p:ph type="sldImg"/>
+          </p:nvPr>
+        </p:nvSpPr>
+        <p:spPr/>
+      </p:sp>
+      <p:sp>
+        <p:nvSpPr>
+          <p:cNvPr id="3" name="Notes Placeholder 2"/>
+          <p:cNvSpPr>
+            <a:spLocks noGrp="1"/>
+          </p:cNvSpPr>
+          <p:nvPr>
+            <p:ph type="body" idx="1"/>
+          </p:nvPr>
+        </p:nvSpPr>
+        <p:spPr/>
+        <p:txBody>
+          <a:bodyPr/>
+          <a:lstStyle/>
+          <a:p>
+            <a:r>
+              <a:rPr lang="en-US" dirty="0" smtClean="0"/>
+              <a:t>First, provide some information</a:t>
+            </a:r>
+            <a:r>
+              <a:rPr lang="en-US" baseline="0" dirty="0" smtClean="0"/>
+              <a:t> about my background, then lay the foundation for talking about UL, and finally discuss</a:t>
+            </a:r>
+          </a:p>
+          <a:p>
+            <a:r>
+              <a:rPr lang="en-US" baseline="0" dirty="0" smtClean="0"/>
+              <a:t>How we’ve used it at WFAA to cluster our large donors, and why that group is so important</a:t>
+            </a:r>
+            <a:endParaRPr lang="en-US" dirty="0"/>
+          </a:p>
+        </p:txBody>
+      </p:sp>
+      <p:sp>
+        <p:nvSpPr>
+          <p:cNvPr id="4" name="Slide Number Placeholder 3"/>
+          <p:cNvSpPr>
+            <a:spLocks noGrp="1"/>
+          </p:cNvSpPr>
+          <p:nvPr>
+            <p:ph type="sldNum" sz="quarter" idx="10"/>
+          </p:nvPr>
+        </p:nvSpPr>
+        <p:spPr/>
+        <p:txBody>
+          <a:bodyPr/>
+          <a:lstStyle/>
+          <a:p>
+            <a:fld id="{340F17E4-2B4D-4428-9E25-E07F235B5058}" type="slidenum">
+              <a:rPr lang="en-US" smtClean="0"/>
+              <a:t>2</a:t>
+            </a:fld>
+            <a:endParaRPr lang="en-US"/>
+          </a:p>
+        </p:txBody>
+      </p:sp>
+    </p:spTree>
+    <p:extLst>
+      <p:ext uri="{BB962C8B-B14F-4D97-AF65-F5344CB8AC3E}">
+        <p14:creationId xmlns:p14="http://schemas.microsoft.com/office/powerpoint/2010/main" val="2944502700"/>
+      </p:ext>
+    </p:extLst>
+  </p:cSld>
+  <p:clrMapOvr>
+    <a:masterClrMapping/>
+  </p:clrMapOvr>
+</p:notes>
+</file>
+
+<file path=ppt/notesSlides/notesSlide3.xml><?xml version="1.0" encoding="utf-8"?>
+<p:notes xmlns:a="http://schemas.openxmlformats.org/drawingml/2006/main" xmlns:r="http://schemas.openxmlformats.org/officeDocument/2006/relationships" xmlns:p="http://schemas.openxmlformats.org/presentationml/2006/main">
+  <p:cSld>
+    <p:spTree>
+      <p:nvGrpSpPr>
+        <p:cNvPr id="1" name=""/>
+        <p:cNvGrpSpPr/>
+        <p:nvPr/>
+      </p:nvGrpSpPr>
+      <p:grpSpPr>
+        <a:xfrm>
+          <a:off x="0" y="0"/>
+          <a:ext cx="0" cy="0"/>
+          <a:chOff x="0" y="0"/>
+          <a:chExt cx="0" cy="0"/>
+        </a:xfrm>
+      </p:grpSpPr>
+      <p:sp>
+        <p:nvSpPr>
+          <p:cNvPr id="2" name="Slide Image Placeholder 1"/>
+          <p:cNvSpPr>
+            <a:spLocks noGrp="1" noRot="1" noChangeAspect="1"/>
+          </p:cNvSpPr>
+          <p:nvPr>
+            <p:ph type="sldImg"/>
+          </p:nvPr>
+        </p:nvSpPr>
+        <p:spPr/>
+      </p:sp>
+      <p:sp>
+        <p:nvSpPr>
+          <p:cNvPr id="3" name="Notes Placeholder 2"/>
+          <p:cNvSpPr>
+            <a:spLocks noGrp="1"/>
+          </p:cNvSpPr>
+          <p:nvPr>
+            <p:ph type="body" idx="1"/>
+          </p:nvPr>
+        </p:nvSpPr>
+        <p:spPr/>
+        <p:txBody>
+          <a:bodyPr/>
+          <a:lstStyle/>
+          <a:p>
+            <a:r>
+              <a:rPr lang="en-US" dirty="0" smtClean="0"/>
+              <a:t>DBSCAN-Density-based</a:t>
+            </a:r>
+            <a:r>
+              <a:rPr lang="en-US" baseline="0" dirty="0" smtClean="0"/>
+              <a:t> spatial clustering of applications with noise</a:t>
+            </a:r>
+            <a:endParaRPr lang="en-US" dirty="0"/>
+          </a:p>
+        </p:txBody>
+      </p:sp>
+      <p:sp>
+        <p:nvSpPr>
+          <p:cNvPr id="4" name="Slide Number Placeholder 3"/>
+          <p:cNvSpPr>
+            <a:spLocks noGrp="1"/>
+          </p:cNvSpPr>
+          <p:nvPr>
+            <p:ph type="sldNum" sz="quarter" idx="10"/>
+          </p:nvPr>
+        </p:nvSpPr>
+        <p:spPr/>
+        <p:txBody>
+          <a:bodyPr/>
+          <a:lstStyle/>
+          <a:p>
+            <a:fld id="{340F17E4-2B4D-4428-9E25-E07F235B5058}" type="slidenum">
+              <a:rPr lang="en-US" smtClean="0"/>
+              <a:t>7</a:t>
+            </a:fld>
+            <a:endParaRPr lang="en-US"/>
+          </a:p>
+        </p:txBody>
+      </p:sp>
+    </p:spTree>
+    <p:extLst>
+      <p:ext uri="{BB962C8B-B14F-4D97-AF65-F5344CB8AC3E}">
+        <p14:creationId xmlns:p14="http://schemas.microsoft.com/office/powerpoint/2010/main" val="3542213727"/>
+      </p:ext>
+    </p:extLst>
+  </p:cSld>
+  <p:clrMapOvr>
+    <a:masterClrMapping/>
+  </p:clrMapOvr>
+</p:notes>
 </file>
 
 <file path=ppt/slideLayouts/slideLayout1.xml><?xml version="1.0" encoding="utf-8"?>
@@ -1405,15 +2049,10 @@
             <a:spLocks noGrp="1"/>
           </p:cNvSpPr>
           <p:nvPr>
-            <p:ph type="title"/>
-          </p:nvPr>
-        </p:nvSpPr>
-        <p:spPr>
-          <a:xfrm>
-            <a:off x="227000" y="2127786"/>
-            <a:ext cx="8487295" cy="740108"/>
-          </a:xfrm>
-        </p:spPr>
+            <p:ph type="ctrTitle"/>
+          </p:nvPr>
+        </p:nvSpPr>
+        <p:spPr/>
         <p:txBody>
           <a:bodyPr>
             <a:normAutofit fontScale="90000"/>
@@ -1441,37 +2080,59 @@
             <a:spLocks noGrp="1"/>
           </p:cNvSpPr>
           <p:nvPr>
-            <p:ph type="body" idx="1"/>
+            <p:ph type="subTitle" idx="1"/>
           </p:nvPr>
         </p:nvSpPr>
         <p:spPr>
           <a:xfrm>
-            <a:off x="340822" y="2867894"/>
-            <a:ext cx="8478981" cy="1581798"/>
+            <a:off x="336665" y="2320006"/>
+            <a:ext cx="8483140" cy="1125997"/>
           </a:xfrm>
         </p:spPr>
         <p:txBody>
-          <a:bodyPr/>
-          <a:lstStyle/>
-          <a:p>
+          <a:bodyPr>
+            <a:normAutofit/>
+          </a:bodyPr>
+          <a:lstStyle/>
+          <a:p>
+            <a:r>
+              <a:rPr lang="en-US" sz="2200" dirty="0"/>
+              <a:t>Brad Stieber</a:t>
+            </a:r>
+            <a:r>
+              <a:rPr lang="en-US" dirty="0"/>
+              <a:t/>
+            </a:r>
+            <a:br>
+              <a:rPr lang="en-US" dirty="0"/>
+            </a:br>
+            <a:r>
+              <a:rPr lang="en-US" dirty="0"/>
+              <a:t>Data Analyst, Wisconsin Foundation and Alumni Association</a:t>
+            </a:r>
+            <a:br>
+              <a:rPr lang="en-US" dirty="0"/>
+            </a:br>
+            <a:r>
+              <a:rPr lang="en-US" u="sng" dirty="0" smtClean="0"/>
+              <a:t>Brad.Stieber@supportuw.org</a:t>
+            </a:r>
             <a:r>
               <a:rPr lang="en-US" dirty="0" smtClean="0"/>
-              <a:t>Brad Stieber</a:t>
-            </a:r>
-          </a:p>
-          <a:p>
+              <a:t> </a:t>
+            </a:r>
+            <a:r>
+              <a:rPr lang="en-US" sz="2400" dirty="0" smtClean="0"/>
+              <a:t>|</a:t>
+            </a:r>
             <a:r>
               <a:rPr lang="en-US" dirty="0" smtClean="0"/>
-              <a:t>Data Analyst</a:t>
-            </a:r>
-          </a:p>
-          <a:p>
-            <a:r>
-              <a:rPr lang="en-US" dirty="0" smtClean="0"/>
-              <a:t>Wisconsin Foundation and Alumni Association</a:t>
-            </a:r>
-          </a:p>
-          <a:p>
+              <a:t> </a:t>
+            </a:r>
+            <a:r>
+              <a:rPr lang="en-US" u="sng" dirty="0" smtClean="0"/>
+              <a:t>bgstieber.github.io</a:t>
+            </a:r>
             <a:endParaRPr lang="en-US" dirty="0"/>
           </a:p>
         </p:txBody>
@@ -1480,6 +2141,726 @@
     <p:extLst>
       <p:ext uri="{BB962C8B-B14F-4D97-AF65-F5344CB8AC3E}">
         <p14:creationId xmlns:p14="http://schemas.microsoft.com/office/powerpoint/2010/main" val="2813706707"/>
+      </p:ext>
+    </p:extLst>
+  </p:cSld>
+  <p:clrMapOvr>
+    <a:masterClrMapping/>
+  </p:clrMapOvr>
+</p:sld>
+</file>
+
+<file path=ppt/slides/slide10.xml><?xml version="1.0" encoding="utf-8"?>
+<p:sld xmlns:a="http://schemas.openxmlformats.org/drawingml/2006/main" xmlns:r="http://schemas.openxmlformats.org/officeDocument/2006/relationships" xmlns:p="http://schemas.openxmlformats.org/presentationml/2006/main">
+  <p:cSld>
+    <p:spTree>
+      <p:nvGrpSpPr>
+        <p:cNvPr id="1" name=""/>
+        <p:cNvGrpSpPr/>
+        <p:nvPr/>
+      </p:nvGrpSpPr>
+      <p:grpSpPr>
+        <a:xfrm>
+          <a:off x="0" y="0"/>
+          <a:ext cx="0" cy="0"/>
+          <a:chOff x="0" y="0"/>
+          <a:chExt cx="0" cy="0"/>
+        </a:xfrm>
+      </p:grpSpPr>
+      <p:sp>
+        <p:nvSpPr>
+          <p:cNvPr id="2" name="Title 1"/>
+          <p:cNvSpPr>
+            <a:spLocks noGrp="1"/>
+          </p:cNvSpPr>
+          <p:nvPr>
+            <p:ph type="title"/>
+          </p:nvPr>
+        </p:nvSpPr>
+        <p:spPr/>
+        <p:txBody>
+          <a:bodyPr/>
+          <a:lstStyle/>
+          <a:p>
+            <a:r>
+              <a:rPr lang="en-US" dirty="0" smtClean="0"/>
+              <a:t>Example from WFAA – Setup</a:t>
+            </a:r>
+            <a:endParaRPr lang="en-US" dirty="0"/>
+          </a:p>
+        </p:txBody>
+      </p:sp>
+      <p:sp>
+        <p:nvSpPr>
+          <p:cNvPr id="3" name="Content Placeholder 2"/>
+          <p:cNvSpPr>
+            <a:spLocks noGrp="1"/>
+          </p:cNvSpPr>
+          <p:nvPr>
+            <p:ph idx="1"/>
+          </p:nvPr>
+        </p:nvSpPr>
+        <p:spPr/>
+        <p:txBody>
+          <a:bodyPr/>
+          <a:lstStyle/>
+          <a:p>
+            <a:endParaRPr lang="en-US"/>
+          </a:p>
+        </p:txBody>
+      </p:sp>
+    </p:spTree>
+    <p:extLst>
+      <p:ext uri="{BB962C8B-B14F-4D97-AF65-F5344CB8AC3E}">
+        <p14:creationId xmlns:p14="http://schemas.microsoft.com/office/powerpoint/2010/main" val="3684728735"/>
+      </p:ext>
+    </p:extLst>
+  </p:cSld>
+  <p:clrMapOvr>
+    <a:masterClrMapping/>
+  </p:clrMapOvr>
+</p:sld>
+</file>
+
+<file path=ppt/slides/slide11.xml><?xml version="1.0" encoding="utf-8"?>
+<p:sld xmlns:a="http://schemas.openxmlformats.org/drawingml/2006/main" xmlns:r="http://schemas.openxmlformats.org/officeDocument/2006/relationships" xmlns:p="http://schemas.openxmlformats.org/presentationml/2006/main">
+  <p:cSld>
+    <p:spTree>
+      <p:nvGrpSpPr>
+        <p:cNvPr id="1" name=""/>
+        <p:cNvGrpSpPr/>
+        <p:nvPr/>
+      </p:nvGrpSpPr>
+      <p:grpSpPr>
+        <a:xfrm>
+          <a:off x="0" y="0"/>
+          <a:ext cx="0" cy="0"/>
+          <a:chOff x="0" y="0"/>
+          <a:chExt cx="0" cy="0"/>
+        </a:xfrm>
+      </p:grpSpPr>
+      <p:sp>
+        <p:nvSpPr>
+          <p:cNvPr id="2" name="Title 1"/>
+          <p:cNvSpPr>
+            <a:spLocks noGrp="1"/>
+          </p:cNvSpPr>
+          <p:nvPr>
+            <p:ph type="title"/>
+          </p:nvPr>
+        </p:nvSpPr>
+        <p:spPr/>
+        <p:txBody>
+          <a:bodyPr/>
+          <a:lstStyle/>
+          <a:p>
+            <a:r>
+              <a:rPr lang="en-US" dirty="0" smtClean="0"/>
+              <a:t>Example from WFAA – Data/Methods</a:t>
+            </a:r>
+            <a:endParaRPr lang="en-US" dirty="0"/>
+          </a:p>
+        </p:txBody>
+      </p:sp>
+      <p:sp>
+        <p:nvSpPr>
+          <p:cNvPr id="3" name="Content Placeholder 2"/>
+          <p:cNvSpPr>
+            <a:spLocks noGrp="1"/>
+          </p:cNvSpPr>
+          <p:nvPr>
+            <p:ph idx="1"/>
+          </p:nvPr>
+        </p:nvSpPr>
+        <p:spPr/>
+        <p:txBody>
+          <a:bodyPr/>
+          <a:lstStyle/>
+          <a:p>
+            <a:endParaRPr lang="en-US"/>
+          </a:p>
+        </p:txBody>
+      </p:sp>
+    </p:spTree>
+    <p:extLst>
+      <p:ext uri="{BB962C8B-B14F-4D97-AF65-F5344CB8AC3E}">
+        <p14:creationId xmlns:p14="http://schemas.microsoft.com/office/powerpoint/2010/main" val="2105481535"/>
+      </p:ext>
+    </p:extLst>
+  </p:cSld>
+  <p:clrMapOvr>
+    <a:masterClrMapping/>
+  </p:clrMapOvr>
+</p:sld>
+</file>
+
+<file path=ppt/slides/slide12.xml><?xml version="1.0" encoding="utf-8"?>
+<p:sld xmlns:a="http://schemas.openxmlformats.org/drawingml/2006/main" xmlns:r="http://schemas.openxmlformats.org/officeDocument/2006/relationships" xmlns:p="http://schemas.openxmlformats.org/presentationml/2006/main">
+  <p:cSld>
+    <p:spTree>
+      <p:nvGrpSpPr>
+        <p:cNvPr id="1" name=""/>
+        <p:cNvGrpSpPr/>
+        <p:nvPr/>
+      </p:nvGrpSpPr>
+      <p:grpSpPr>
+        <a:xfrm>
+          <a:off x="0" y="0"/>
+          <a:ext cx="0" cy="0"/>
+          <a:chOff x="0" y="0"/>
+          <a:chExt cx="0" cy="0"/>
+        </a:xfrm>
+      </p:grpSpPr>
+      <p:sp>
+        <p:nvSpPr>
+          <p:cNvPr id="2" name="Title 1"/>
+          <p:cNvSpPr>
+            <a:spLocks noGrp="1"/>
+          </p:cNvSpPr>
+          <p:nvPr>
+            <p:ph type="title"/>
+          </p:nvPr>
+        </p:nvSpPr>
+        <p:spPr/>
+        <p:txBody>
+          <a:bodyPr/>
+          <a:lstStyle/>
+          <a:p>
+            <a:r>
+              <a:rPr lang="en-US" dirty="0" smtClean="0"/>
+              <a:t>Example from WFAA – Results</a:t>
+            </a:r>
+            <a:endParaRPr lang="en-US" dirty="0"/>
+          </a:p>
+        </p:txBody>
+      </p:sp>
+      <p:sp>
+        <p:nvSpPr>
+          <p:cNvPr id="3" name="Content Placeholder 2"/>
+          <p:cNvSpPr>
+            <a:spLocks noGrp="1"/>
+          </p:cNvSpPr>
+          <p:nvPr>
+            <p:ph idx="1"/>
+          </p:nvPr>
+        </p:nvSpPr>
+        <p:spPr/>
+        <p:txBody>
+          <a:bodyPr/>
+          <a:lstStyle/>
+          <a:p>
+            <a:endParaRPr lang="en-US"/>
+          </a:p>
+        </p:txBody>
+      </p:sp>
+    </p:spTree>
+    <p:extLst>
+      <p:ext uri="{BB962C8B-B14F-4D97-AF65-F5344CB8AC3E}">
+        <p14:creationId xmlns:p14="http://schemas.microsoft.com/office/powerpoint/2010/main" val="1263122911"/>
+      </p:ext>
+    </p:extLst>
+  </p:cSld>
+  <p:clrMapOvr>
+    <a:masterClrMapping/>
+  </p:clrMapOvr>
+</p:sld>
+</file>
+
+<file path=ppt/slides/slide13.xml><?xml version="1.0" encoding="utf-8"?>
+<p:sld xmlns:a="http://schemas.openxmlformats.org/drawingml/2006/main" xmlns:r="http://schemas.openxmlformats.org/officeDocument/2006/relationships" xmlns:p="http://schemas.openxmlformats.org/presentationml/2006/main">
+  <p:cSld>
+    <p:spTree>
+      <p:nvGrpSpPr>
+        <p:cNvPr id="1" name=""/>
+        <p:cNvGrpSpPr/>
+        <p:nvPr/>
+      </p:nvGrpSpPr>
+      <p:grpSpPr>
+        <a:xfrm>
+          <a:off x="0" y="0"/>
+          <a:ext cx="0" cy="0"/>
+          <a:chOff x="0" y="0"/>
+          <a:chExt cx="0" cy="0"/>
+        </a:xfrm>
+      </p:grpSpPr>
+      <p:sp>
+        <p:nvSpPr>
+          <p:cNvPr id="2" name="Title 1"/>
+          <p:cNvSpPr>
+            <a:spLocks noGrp="1"/>
+          </p:cNvSpPr>
+          <p:nvPr>
+            <p:ph type="title"/>
+          </p:nvPr>
+        </p:nvSpPr>
+        <p:spPr/>
+        <p:txBody>
+          <a:bodyPr/>
+          <a:lstStyle/>
+          <a:p>
+            <a:r>
+              <a:rPr lang="en-US" dirty="0" smtClean="0"/>
+              <a:t>Example from WFAA – Implementation</a:t>
+            </a:r>
+            <a:endParaRPr lang="en-US" dirty="0"/>
+          </a:p>
+        </p:txBody>
+      </p:sp>
+      <p:sp>
+        <p:nvSpPr>
+          <p:cNvPr id="3" name="Content Placeholder 2"/>
+          <p:cNvSpPr>
+            <a:spLocks noGrp="1"/>
+          </p:cNvSpPr>
+          <p:nvPr>
+            <p:ph idx="1"/>
+          </p:nvPr>
+        </p:nvSpPr>
+        <p:spPr/>
+        <p:txBody>
+          <a:bodyPr/>
+          <a:lstStyle/>
+          <a:p>
+            <a:endParaRPr lang="en-US"/>
+          </a:p>
+        </p:txBody>
+      </p:sp>
+    </p:spTree>
+    <p:extLst>
+      <p:ext uri="{BB962C8B-B14F-4D97-AF65-F5344CB8AC3E}">
+        <p14:creationId xmlns:p14="http://schemas.microsoft.com/office/powerpoint/2010/main" val="1621333358"/>
+      </p:ext>
+    </p:extLst>
+  </p:cSld>
+  <p:clrMapOvr>
+    <a:masterClrMapping/>
+  </p:clrMapOvr>
+</p:sld>
+</file>
+
+<file path=ppt/slides/slide14.xml><?xml version="1.0" encoding="utf-8"?>
+<p:sld xmlns:a="http://schemas.openxmlformats.org/drawingml/2006/main" xmlns:r="http://schemas.openxmlformats.org/officeDocument/2006/relationships" xmlns:p="http://schemas.openxmlformats.org/presentationml/2006/main">
+  <p:cSld>
+    <p:spTree>
+      <p:nvGrpSpPr>
+        <p:cNvPr id="1" name=""/>
+        <p:cNvGrpSpPr/>
+        <p:nvPr/>
+      </p:nvGrpSpPr>
+      <p:grpSpPr>
+        <a:xfrm>
+          <a:off x="0" y="0"/>
+          <a:ext cx="0" cy="0"/>
+          <a:chOff x="0" y="0"/>
+          <a:chExt cx="0" cy="0"/>
+        </a:xfrm>
+      </p:grpSpPr>
+      <p:sp>
+        <p:nvSpPr>
+          <p:cNvPr id="2" name="Title 1"/>
+          <p:cNvSpPr>
+            <a:spLocks noGrp="1"/>
+          </p:cNvSpPr>
+          <p:nvPr>
+            <p:ph type="title"/>
+          </p:nvPr>
+        </p:nvSpPr>
+        <p:spPr/>
+        <p:txBody>
+          <a:bodyPr/>
+          <a:lstStyle/>
+          <a:p>
+            <a:r>
+              <a:rPr lang="en-US" dirty="0" smtClean="0"/>
+              <a:t>Large Donor Disruption</a:t>
+            </a:r>
+            <a:endParaRPr lang="en-US" dirty="0"/>
+          </a:p>
+        </p:txBody>
+      </p:sp>
+      <p:sp>
+        <p:nvSpPr>
+          <p:cNvPr id="3" name="Content Placeholder 2"/>
+          <p:cNvSpPr>
+            <a:spLocks noGrp="1"/>
+          </p:cNvSpPr>
+          <p:nvPr>
+            <p:ph idx="1"/>
+          </p:nvPr>
+        </p:nvSpPr>
+        <p:spPr/>
+        <p:txBody>
+          <a:bodyPr/>
+          <a:lstStyle/>
+          <a:p>
+            <a:endParaRPr lang="en-US"/>
+          </a:p>
+        </p:txBody>
+      </p:sp>
+    </p:spTree>
+    <p:extLst>
+      <p:ext uri="{BB962C8B-B14F-4D97-AF65-F5344CB8AC3E}">
+        <p14:creationId xmlns:p14="http://schemas.microsoft.com/office/powerpoint/2010/main" val="1449896529"/>
+      </p:ext>
+    </p:extLst>
+  </p:cSld>
+  <p:clrMapOvr>
+    <a:masterClrMapping/>
+  </p:clrMapOvr>
+</p:sld>
+</file>
+
+<file path=ppt/slides/slide15.xml><?xml version="1.0" encoding="utf-8"?>
+<p:sld xmlns:a="http://schemas.openxmlformats.org/drawingml/2006/main" xmlns:r="http://schemas.openxmlformats.org/officeDocument/2006/relationships" xmlns:p="http://schemas.openxmlformats.org/presentationml/2006/main">
+  <p:cSld>
+    <p:spTree>
+      <p:nvGrpSpPr>
+        <p:cNvPr id="1" name=""/>
+        <p:cNvGrpSpPr/>
+        <p:nvPr/>
+      </p:nvGrpSpPr>
+      <p:grpSpPr>
+        <a:xfrm>
+          <a:off x="0" y="0"/>
+          <a:ext cx="0" cy="0"/>
+          <a:chOff x="0" y="0"/>
+          <a:chExt cx="0" cy="0"/>
+        </a:xfrm>
+      </p:grpSpPr>
+      <p:sp>
+        <p:nvSpPr>
+          <p:cNvPr id="2" name="Title 1"/>
+          <p:cNvSpPr>
+            <a:spLocks noGrp="1"/>
+          </p:cNvSpPr>
+          <p:nvPr>
+            <p:ph type="title"/>
+          </p:nvPr>
+        </p:nvSpPr>
+        <p:spPr/>
+        <p:txBody>
+          <a:bodyPr/>
+          <a:lstStyle/>
+          <a:p>
+            <a:r>
+              <a:rPr lang="en-US" dirty="0" smtClean="0"/>
+              <a:t>Large Donor Disruption</a:t>
+            </a:r>
+            <a:endParaRPr lang="en-US" dirty="0"/>
+          </a:p>
+        </p:txBody>
+      </p:sp>
+      <p:sp>
+        <p:nvSpPr>
+          <p:cNvPr id="3" name="Content Placeholder 2"/>
+          <p:cNvSpPr>
+            <a:spLocks noGrp="1"/>
+          </p:cNvSpPr>
+          <p:nvPr>
+            <p:ph idx="1"/>
+          </p:nvPr>
+        </p:nvSpPr>
+        <p:spPr/>
+        <p:txBody>
+          <a:bodyPr/>
+          <a:lstStyle/>
+          <a:p>
+            <a:endParaRPr lang="en-US"/>
+          </a:p>
+        </p:txBody>
+      </p:sp>
+    </p:spTree>
+    <p:extLst>
+      <p:ext uri="{BB962C8B-B14F-4D97-AF65-F5344CB8AC3E}">
+        <p14:creationId xmlns:p14="http://schemas.microsoft.com/office/powerpoint/2010/main" val="3268452489"/>
+      </p:ext>
+    </p:extLst>
+  </p:cSld>
+  <p:clrMapOvr>
+    <a:masterClrMapping/>
+  </p:clrMapOvr>
+</p:sld>
+</file>
+
+<file path=ppt/slides/slide16.xml><?xml version="1.0" encoding="utf-8"?>
+<p:sld xmlns:a="http://schemas.openxmlformats.org/drawingml/2006/main" xmlns:r="http://schemas.openxmlformats.org/officeDocument/2006/relationships" xmlns:p="http://schemas.openxmlformats.org/presentationml/2006/main">
+  <p:cSld>
+    <p:spTree>
+      <p:nvGrpSpPr>
+        <p:cNvPr id="1" name=""/>
+        <p:cNvGrpSpPr/>
+        <p:nvPr/>
+      </p:nvGrpSpPr>
+      <p:grpSpPr>
+        <a:xfrm>
+          <a:off x="0" y="0"/>
+          <a:ext cx="0" cy="0"/>
+          <a:chOff x="0" y="0"/>
+          <a:chExt cx="0" cy="0"/>
+        </a:xfrm>
+      </p:grpSpPr>
+      <p:sp>
+        <p:nvSpPr>
+          <p:cNvPr id="2" name="Title 1"/>
+          <p:cNvSpPr>
+            <a:spLocks noGrp="1"/>
+          </p:cNvSpPr>
+          <p:nvPr>
+            <p:ph type="title"/>
+          </p:nvPr>
+        </p:nvSpPr>
+        <p:spPr/>
+        <p:txBody>
+          <a:bodyPr/>
+          <a:lstStyle/>
+          <a:p>
+            <a:r>
+              <a:rPr lang="en-US" dirty="0" smtClean="0"/>
+              <a:t>Large Donor Disruption</a:t>
+            </a:r>
+            <a:endParaRPr lang="en-US" dirty="0"/>
+          </a:p>
+        </p:txBody>
+      </p:sp>
+      <p:sp>
+        <p:nvSpPr>
+          <p:cNvPr id="3" name="Content Placeholder 2"/>
+          <p:cNvSpPr>
+            <a:spLocks noGrp="1"/>
+          </p:cNvSpPr>
+          <p:nvPr>
+            <p:ph idx="1"/>
+          </p:nvPr>
+        </p:nvSpPr>
+        <p:spPr/>
+        <p:txBody>
+          <a:bodyPr/>
+          <a:lstStyle/>
+          <a:p>
+            <a:endParaRPr lang="en-US"/>
+          </a:p>
+        </p:txBody>
+      </p:sp>
+    </p:spTree>
+    <p:extLst>
+      <p:ext uri="{BB962C8B-B14F-4D97-AF65-F5344CB8AC3E}">
+        <p14:creationId xmlns:p14="http://schemas.microsoft.com/office/powerpoint/2010/main" val="3479376838"/>
+      </p:ext>
+    </p:extLst>
+  </p:cSld>
+  <p:clrMapOvr>
+    <a:masterClrMapping/>
+  </p:clrMapOvr>
+</p:sld>
+</file>
+
+<file path=ppt/slides/slide17.xml><?xml version="1.0" encoding="utf-8"?>
+<p:sld xmlns:a="http://schemas.openxmlformats.org/drawingml/2006/main" xmlns:r="http://schemas.openxmlformats.org/officeDocument/2006/relationships" xmlns:p="http://schemas.openxmlformats.org/presentationml/2006/main">
+  <p:cSld>
+    <p:spTree>
+      <p:nvGrpSpPr>
+        <p:cNvPr id="1" name=""/>
+        <p:cNvGrpSpPr/>
+        <p:nvPr/>
+      </p:nvGrpSpPr>
+      <p:grpSpPr>
+        <a:xfrm>
+          <a:off x="0" y="0"/>
+          <a:ext cx="0" cy="0"/>
+          <a:chOff x="0" y="0"/>
+          <a:chExt cx="0" cy="0"/>
+        </a:xfrm>
+      </p:grpSpPr>
+      <p:sp>
+        <p:nvSpPr>
+          <p:cNvPr id="2" name="Title 1"/>
+          <p:cNvSpPr>
+            <a:spLocks noGrp="1"/>
+          </p:cNvSpPr>
+          <p:nvPr>
+            <p:ph type="title"/>
+          </p:nvPr>
+        </p:nvSpPr>
+        <p:spPr/>
+        <p:txBody>
+          <a:bodyPr/>
+          <a:lstStyle/>
+          <a:p>
+            <a:r>
+              <a:rPr lang="en-US" dirty="0" smtClean="0"/>
+              <a:t>Wrapping Up</a:t>
+            </a:r>
+            <a:endParaRPr lang="en-US" dirty="0"/>
+          </a:p>
+        </p:txBody>
+      </p:sp>
+      <p:sp>
+        <p:nvSpPr>
+          <p:cNvPr id="3" name="Content Placeholder 2"/>
+          <p:cNvSpPr>
+            <a:spLocks noGrp="1"/>
+          </p:cNvSpPr>
+          <p:nvPr>
+            <p:ph idx="1"/>
+          </p:nvPr>
+        </p:nvSpPr>
+        <p:spPr/>
+        <p:txBody>
+          <a:bodyPr/>
+          <a:lstStyle/>
+          <a:p>
+            <a:endParaRPr lang="en-US"/>
+          </a:p>
+        </p:txBody>
+      </p:sp>
+    </p:spTree>
+    <p:extLst>
+      <p:ext uri="{BB962C8B-B14F-4D97-AF65-F5344CB8AC3E}">
+        <p14:creationId xmlns:p14="http://schemas.microsoft.com/office/powerpoint/2010/main" val="2994578432"/>
+      </p:ext>
+    </p:extLst>
+  </p:cSld>
+  <p:clrMapOvr>
+    <a:masterClrMapping/>
+  </p:clrMapOvr>
+</p:sld>
+</file>
+
+<file path=ppt/slides/slide18.xml><?xml version="1.0" encoding="utf-8"?>
+<p:sld xmlns:a="http://schemas.openxmlformats.org/drawingml/2006/main" xmlns:r="http://schemas.openxmlformats.org/officeDocument/2006/relationships" xmlns:p="http://schemas.openxmlformats.org/presentationml/2006/main">
+  <p:cSld>
+    <p:spTree>
+      <p:nvGrpSpPr>
+        <p:cNvPr id="1" name=""/>
+        <p:cNvGrpSpPr/>
+        <p:nvPr/>
+      </p:nvGrpSpPr>
+      <p:grpSpPr>
+        <a:xfrm>
+          <a:off x="0" y="0"/>
+          <a:ext cx="0" cy="0"/>
+          <a:chOff x="0" y="0"/>
+          <a:chExt cx="0" cy="0"/>
+        </a:xfrm>
+      </p:grpSpPr>
+      <p:sp>
+        <p:nvSpPr>
+          <p:cNvPr id="2" name="Title 1"/>
+          <p:cNvSpPr>
+            <a:spLocks noGrp="1"/>
+          </p:cNvSpPr>
+          <p:nvPr>
+            <p:ph type="title"/>
+          </p:nvPr>
+        </p:nvSpPr>
+        <p:spPr/>
+        <p:txBody>
+          <a:bodyPr/>
+          <a:lstStyle/>
+          <a:p>
+            <a:r>
+              <a:rPr lang="en-US" dirty="0" smtClean="0"/>
+              <a:t>Wrapping Up</a:t>
+            </a:r>
+            <a:endParaRPr lang="en-US" dirty="0"/>
+          </a:p>
+        </p:txBody>
+      </p:sp>
+      <p:sp>
+        <p:nvSpPr>
+          <p:cNvPr id="3" name="Content Placeholder 2"/>
+          <p:cNvSpPr>
+            <a:spLocks noGrp="1"/>
+          </p:cNvSpPr>
+          <p:nvPr>
+            <p:ph idx="1"/>
+          </p:nvPr>
+        </p:nvSpPr>
+        <p:spPr/>
+        <p:txBody>
+          <a:bodyPr/>
+          <a:lstStyle/>
+          <a:p>
+            <a:endParaRPr lang="en-US"/>
+          </a:p>
+        </p:txBody>
+      </p:sp>
+    </p:spTree>
+    <p:extLst>
+      <p:ext uri="{BB962C8B-B14F-4D97-AF65-F5344CB8AC3E}">
+        <p14:creationId xmlns:p14="http://schemas.microsoft.com/office/powerpoint/2010/main" val="1749157500"/>
+      </p:ext>
+    </p:extLst>
+  </p:cSld>
+  <p:clrMapOvr>
+    <a:masterClrMapping/>
+  </p:clrMapOvr>
+</p:sld>
+</file>
+
+<file path=ppt/slides/slide19.xml><?xml version="1.0" encoding="utf-8"?>
+<p:sld xmlns:a="http://schemas.openxmlformats.org/drawingml/2006/main" xmlns:r="http://schemas.openxmlformats.org/officeDocument/2006/relationships" xmlns:p="http://schemas.openxmlformats.org/presentationml/2006/main">
+  <p:cSld>
+    <p:spTree>
+      <p:nvGrpSpPr>
+        <p:cNvPr id="1" name=""/>
+        <p:cNvGrpSpPr/>
+        <p:nvPr/>
+      </p:nvGrpSpPr>
+      <p:grpSpPr>
+        <a:xfrm>
+          <a:off x="0" y="0"/>
+          <a:ext cx="0" cy="0"/>
+          <a:chOff x="0" y="0"/>
+          <a:chExt cx="0" cy="0"/>
+        </a:xfrm>
+      </p:grpSpPr>
+      <p:sp>
+        <p:nvSpPr>
+          <p:cNvPr id="2" name="Title 1"/>
+          <p:cNvSpPr>
+            <a:spLocks noGrp="1"/>
+          </p:cNvSpPr>
+          <p:nvPr>
+            <p:ph type="title"/>
+          </p:nvPr>
+        </p:nvSpPr>
+        <p:spPr/>
+        <p:txBody>
+          <a:bodyPr/>
+          <a:lstStyle/>
+          <a:p>
+            <a:r>
+              <a:rPr lang="en-US" dirty="0" smtClean="0"/>
+              <a:t>Wrapping Up</a:t>
+            </a:r>
+            <a:endParaRPr lang="en-US" dirty="0"/>
+          </a:p>
+        </p:txBody>
+      </p:sp>
+      <p:sp>
+        <p:nvSpPr>
+          <p:cNvPr id="3" name="Content Placeholder 2"/>
+          <p:cNvSpPr>
+            <a:spLocks noGrp="1"/>
+          </p:cNvSpPr>
+          <p:nvPr>
+            <p:ph idx="1"/>
+          </p:nvPr>
+        </p:nvSpPr>
+        <p:spPr/>
+        <p:txBody>
+          <a:bodyPr/>
+          <a:lstStyle/>
+          <a:p>
+            <a:endParaRPr lang="en-US"/>
+          </a:p>
+        </p:txBody>
+      </p:sp>
+    </p:spTree>
+    <p:extLst>
+      <p:ext uri="{BB962C8B-B14F-4D97-AF65-F5344CB8AC3E}">
+        <p14:creationId xmlns:p14="http://schemas.microsoft.com/office/powerpoint/2010/main" val="557220253"/>
       </p:ext>
     </p:extLst>
   </p:cSld>
@@ -1558,8 +2939,19 @@
           <a:p>
             <a:r>
               <a:rPr lang="en-US" dirty="0" smtClean="0"/>
-              <a:t>Three Clustering Algorithms You Should Know</a:t>
-            </a:r>
+              <a:t>Three Clustering Algorithms You Should </a:t>
+            </a:r>
+            <a:r>
+              <a:rPr lang="en-US" dirty="0" smtClean="0"/>
+              <a:t>Know</a:t>
+            </a:r>
+          </a:p>
+          <a:p>
+            <a:r>
+              <a:rPr lang="en-US" dirty="0" smtClean="0"/>
+              <a:t>Using Results from Unsupervised Learning</a:t>
+            </a:r>
+            <a:endParaRPr lang="en-US" dirty="0" smtClean="0"/>
           </a:p>
           <a:p>
             <a:r>
@@ -1570,15 +2962,7 @@
           <a:p>
             <a:r>
               <a:rPr lang="en-US" dirty="0" smtClean="0"/>
-              <a:t>Bonus: </a:t>
-            </a:r>
-            <a:r>
-              <a:rPr lang="en-US" dirty="0" smtClean="0"/>
-              <a:t>Large Donor Disruption </a:t>
-            </a:r>
-            <a:r>
-              <a:rPr lang="en-US" dirty="0" smtClean="0"/>
-              <a:t>in Philanthropy</a:t>
+              <a:t>Bonus: Large Donor Disruption in Philanthropy</a:t>
             </a:r>
           </a:p>
           <a:p>
@@ -1594,6 +2978,106 @@
     <p:extLst>
       <p:ext uri="{BB962C8B-B14F-4D97-AF65-F5344CB8AC3E}">
         <p14:creationId xmlns:p14="http://schemas.microsoft.com/office/powerpoint/2010/main" val="3209324802"/>
+      </p:ext>
+    </p:extLst>
+  </p:cSld>
+  <p:clrMapOvr>
+    <a:masterClrMapping/>
+  </p:clrMapOvr>
+</p:sld>
+</file>
+
+<file path=ppt/slides/slide20.xml><?xml version="1.0" encoding="utf-8"?>
+<p:sld xmlns:a="http://schemas.openxmlformats.org/drawingml/2006/main" xmlns:r="http://schemas.openxmlformats.org/officeDocument/2006/relationships" xmlns:p="http://schemas.openxmlformats.org/presentationml/2006/main">
+  <p:cSld>
+    <p:spTree>
+      <p:nvGrpSpPr>
+        <p:cNvPr id="1" name=""/>
+        <p:cNvGrpSpPr/>
+        <p:nvPr/>
+      </p:nvGrpSpPr>
+      <p:grpSpPr>
+        <a:xfrm>
+          <a:off x="0" y="0"/>
+          <a:ext cx="0" cy="0"/>
+          <a:chOff x="0" y="0"/>
+          <a:chExt cx="0" cy="0"/>
+        </a:xfrm>
+      </p:grpSpPr>
+      <p:sp>
+        <p:nvSpPr>
+          <p:cNvPr id="2" name="Title 1">
+            <a:extLst>
+              <a:ext uri="{FF2B5EF4-FFF2-40B4-BE49-F238E27FC236}">
+                <a16:creationId xmlns:a16="http://schemas.microsoft.com/office/drawing/2014/main" id="{6E6A3869-359E-3B42-BC55-FED776753D89}"/>
+              </a:ext>
+            </a:extLst>
+          </p:cNvPr>
+          <p:cNvSpPr>
+            <a:spLocks noGrp="1"/>
+          </p:cNvSpPr>
+          <p:nvPr>
+            <p:ph type="title"/>
+          </p:nvPr>
+        </p:nvSpPr>
+        <p:spPr/>
+        <p:txBody>
+          <a:bodyPr/>
+          <a:lstStyle/>
+          <a:p>
+            <a:pPr algn="ctr"/>
+            <a:r>
+              <a:rPr lang="en-US" dirty="0" smtClean="0"/>
+              <a:t>Thank You!</a:t>
+            </a:r>
+            <a:endParaRPr lang="en-US" dirty="0"/>
+          </a:p>
+        </p:txBody>
+      </p:sp>
+      <p:sp>
+        <p:nvSpPr>
+          <p:cNvPr id="3" name="Content Placeholder 2">
+            <a:extLst>
+              <a:ext uri="{FF2B5EF4-FFF2-40B4-BE49-F238E27FC236}">
+                <a16:creationId xmlns:a16="http://schemas.microsoft.com/office/drawing/2014/main" id="{2946E71F-25D5-9643-B57A-5AE629695821}"/>
+              </a:ext>
+            </a:extLst>
+          </p:cNvPr>
+          <p:cNvSpPr>
+            <a:spLocks noGrp="1"/>
+          </p:cNvSpPr>
+          <p:nvPr>
+            <p:ph idx="1"/>
+          </p:nvPr>
+        </p:nvSpPr>
+        <p:spPr/>
+        <p:txBody>
+          <a:bodyPr>
+            <a:normAutofit/>
+          </a:bodyPr>
+          <a:lstStyle/>
+          <a:p>
+            <a:pPr marL="0" indent="0" algn="ctr">
+              <a:buNone/>
+            </a:pPr>
+            <a:r>
+              <a:rPr lang="en-US" sz="3300" dirty="0">
+                <a:solidFill>
+                  <a:srgbClr val="4F5054"/>
+                </a:solidFill>
+                <a:latin typeface="+mj-lt"/>
+                <a:ea typeface="+mj-ea"/>
+                <a:cs typeface="+mj-cs"/>
+              </a:rPr>
+              <a:t>Please complete your session evaluations in the mobile app.  </a:t>
+            </a:r>
+          </a:p>
+        </p:txBody>
+      </p:sp>
+    </p:spTree>
+    <p:extLst>
+      <p:ext uri="{BB962C8B-B14F-4D97-AF65-F5344CB8AC3E}">
+        <p14:creationId xmlns:p14="http://schemas.microsoft.com/office/powerpoint/2010/main" val="794496343"/>
       </p:ext>
     </p:extLst>
   </p:cSld>
@@ -1622,13 +3106,7 @@
       </p:grpSpPr>
       <p:sp>
         <p:nvSpPr>
-          <p:cNvPr id="2" name="Title 1">
-            <a:extLst>
-              <a:ext uri="{FF2B5EF4-FFF2-40B4-BE49-F238E27FC236}">
-                <a16:creationId xmlns:a16="http://schemas.microsoft.com/office/drawing/2014/main" id="{6E6A3869-359E-3B42-BC55-FED776753D89}"/>
-              </a:ext>
-            </a:extLst>
-          </p:cNvPr>
+          <p:cNvPr id="2" name="Title 1"/>
           <p:cNvSpPr>
             <a:spLocks noGrp="1"/>
           </p:cNvSpPr>
@@ -1641,10 +3119,9 @@
           <a:bodyPr/>
           <a:lstStyle/>
           <a:p>
-            <a:pPr algn="ctr"/>
             <a:r>
               <a:rPr lang="en-US" dirty="0" smtClean="0"/>
-              <a:t>Thank You!</a:t>
+              <a:t>Who Am I</a:t>
             </a:r>
             <a:endParaRPr lang="en-US" dirty="0"/>
           </a:p>
@@ -1652,13 +3129,7 @@
       </p:sp>
       <p:sp>
         <p:nvSpPr>
-          <p:cNvPr id="3" name="Content Placeholder 2">
-            <a:extLst>
-              <a:ext uri="{FF2B5EF4-FFF2-40B4-BE49-F238E27FC236}">
-                <a16:creationId xmlns:a16="http://schemas.microsoft.com/office/drawing/2014/main" id="{2946E71F-25D5-9643-B57A-5AE629695821}"/>
-              </a:ext>
-            </a:extLst>
-          </p:cNvPr>
+          <p:cNvPr id="3" name="Content Placeholder 2"/>
           <p:cNvSpPr>
             <a:spLocks noGrp="1"/>
           </p:cNvSpPr>
@@ -1668,32 +3139,526 @@
         </p:nvSpPr>
         <p:spPr/>
         <p:txBody>
-          <a:bodyPr>
-            <a:normAutofit/>
-          </a:bodyPr>
-          <a:lstStyle/>
-          <a:p>
-            <a:pPr marL="0" indent="0" algn="ctr">
-              <a:buNone/>
-            </a:pPr>
-            <a:r>
-              <a:rPr lang="en-US" sz="3300" dirty="0">
-                <a:solidFill>
-                  <a:srgbClr val="4F5054"/>
-                </a:solidFill>
-                <a:latin typeface="+mj-lt"/>
-                <a:ea typeface="+mj-ea"/>
-                <a:cs typeface="+mj-cs"/>
-              </a:rPr>
-              <a:t>Please complete your session evaluations in the mobile app.  </a:t>
-            </a:r>
+          <a:bodyPr/>
+          <a:lstStyle/>
+          <a:p>
+            <a:endParaRPr lang="en-US" dirty="0"/>
           </a:p>
         </p:txBody>
       </p:sp>
     </p:spTree>
     <p:extLst>
       <p:ext uri="{BB962C8B-B14F-4D97-AF65-F5344CB8AC3E}">
-        <p14:creationId xmlns:p14="http://schemas.microsoft.com/office/powerpoint/2010/main" val="794496343"/>
+        <p14:creationId xmlns:p14="http://schemas.microsoft.com/office/powerpoint/2010/main" val="2602025334"/>
+      </p:ext>
+    </p:extLst>
+  </p:cSld>
+  <p:clrMapOvr>
+    <a:masterClrMapping/>
+  </p:clrMapOvr>
+</p:sld>
+</file>
+
+<file path=ppt/slides/slide4.xml><?xml version="1.0" encoding="utf-8"?>
+<p:sld xmlns:a="http://schemas.openxmlformats.org/drawingml/2006/main" xmlns:r="http://schemas.openxmlformats.org/officeDocument/2006/relationships" xmlns:p="http://schemas.openxmlformats.org/presentationml/2006/main">
+  <p:cSld>
+    <p:spTree>
+      <p:nvGrpSpPr>
+        <p:cNvPr id="1" name=""/>
+        <p:cNvGrpSpPr/>
+        <p:nvPr/>
+      </p:nvGrpSpPr>
+      <p:grpSpPr>
+        <a:xfrm>
+          <a:off x="0" y="0"/>
+          <a:ext cx="0" cy="0"/>
+          <a:chOff x="0" y="0"/>
+          <a:chExt cx="0" cy="0"/>
+        </a:xfrm>
+      </p:grpSpPr>
+      <p:sp>
+        <p:nvSpPr>
+          <p:cNvPr id="2" name="Title 1"/>
+          <p:cNvSpPr>
+            <a:spLocks noGrp="1"/>
+          </p:cNvSpPr>
+          <p:nvPr>
+            <p:ph type="title"/>
+          </p:nvPr>
+        </p:nvSpPr>
+        <p:spPr/>
+        <p:txBody>
+          <a:bodyPr/>
+          <a:lstStyle/>
+          <a:p>
+            <a:r>
+              <a:rPr lang="en-US" dirty="0" smtClean="0"/>
+              <a:t>What do I do</a:t>
+            </a:r>
+            <a:endParaRPr lang="en-US" dirty="0"/>
+          </a:p>
+        </p:txBody>
+      </p:sp>
+      <p:sp>
+        <p:nvSpPr>
+          <p:cNvPr id="4" name="Content Placeholder 3"/>
+          <p:cNvSpPr>
+            <a:spLocks noGrp="1"/>
+          </p:cNvSpPr>
+          <p:nvPr>
+            <p:ph sz="half" idx="1"/>
+          </p:nvPr>
+        </p:nvSpPr>
+        <p:spPr/>
+        <p:txBody>
+          <a:bodyPr/>
+          <a:lstStyle/>
+          <a:p>
+            <a:endParaRPr lang="en-US" dirty="0"/>
+          </a:p>
+        </p:txBody>
+      </p:sp>
+      <p:pic>
+        <p:nvPicPr>
+          <p:cNvPr id="6" name="Content Placeholder 5"/>
+          <p:cNvPicPr>
+            <a:picLocks noGrp="1" noChangeAspect="1"/>
+          </p:cNvPicPr>
+          <p:nvPr>
+            <p:ph sz="half" idx="2"/>
+          </p:nvPr>
+        </p:nvPicPr>
+        <p:blipFill>
+          <a:blip r:embed="rId2"/>
+          <a:stretch>
+            <a:fillRect/>
+          </a:stretch>
+        </p:blipFill>
+        <p:spPr>
+          <a:xfrm>
+            <a:off x="5154722" y="1161153"/>
+            <a:ext cx="3085083" cy="1966446"/>
+          </a:xfrm>
+          <a:prstGeom prst="rect">
+            <a:avLst/>
+          </a:prstGeom>
+        </p:spPr>
+      </p:pic>
+      <p:pic>
+        <p:nvPicPr>
+          <p:cNvPr id="7" name="Picture 6"/>
+          <p:cNvPicPr>
+            <a:picLocks noChangeAspect="1"/>
+          </p:cNvPicPr>
+          <p:nvPr/>
+        </p:nvPicPr>
+        <p:blipFill>
+          <a:blip r:embed="rId3"/>
+          <a:stretch>
+            <a:fillRect/>
+          </a:stretch>
+        </p:blipFill>
+        <p:spPr>
+          <a:xfrm>
+            <a:off x="5952756" y="3199754"/>
+            <a:ext cx="1489014" cy="1630307"/>
+          </a:xfrm>
+          <a:prstGeom prst="rect">
+            <a:avLst/>
+          </a:prstGeom>
+        </p:spPr>
+      </p:pic>
+    </p:spTree>
+    <p:extLst>
+      <p:ext uri="{BB962C8B-B14F-4D97-AF65-F5344CB8AC3E}">
+        <p14:creationId xmlns:p14="http://schemas.microsoft.com/office/powerpoint/2010/main" val="699896362"/>
+      </p:ext>
+    </p:extLst>
+  </p:cSld>
+  <p:clrMapOvr>
+    <a:masterClrMapping/>
+  </p:clrMapOvr>
+</p:sld>
+</file>
+
+<file path=ppt/slides/slide5.xml><?xml version="1.0" encoding="utf-8"?>
+<p:sld xmlns:a="http://schemas.openxmlformats.org/drawingml/2006/main" xmlns:r="http://schemas.openxmlformats.org/officeDocument/2006/relationships" xmlns:p="http://schemas.openxmlformats.org/presentationml/2006/main">
+  <p:cSld>
+    <p:spTree>
+      <p:nvGrpSpPr>
+        <p:cNvPr id="1" name=""/>
+        <p:cNvGrpSpPr/>
+        <p:nvPr/>
+      </p:nvGrpSpPr>
+      <p:grpSpPr>
+        <a:xfrm>
+          <a:off x="0" y="0"/>
+          <a:ext cx="0" cy="0"/>
+          <a:chOff x="0" y="0"/>
+          <a:chExt cx="0" cy="0"/>
+        </a:xfrm>
+      </p:grpSpPr>
+      <p:sp>
+        <p:nvSpPr>
+          <p:cNvPr id="2" name="Title 1"/>
+          <p:cNvSpPr>
+            <a:spLocks noGrp="1"/>
+          </p:cNvSpPr>
+          <p:nvPr>
+            <p:ph type="title"/>
+          </p:nvPr>
+        </p:nvSpPr>
+        <p:spPr/>
+        <p:txBody>
+          <a:bodyPr/>
+          <a:lstStyle/>
+          <a:p>
+            <a:r>
+              <a:rPr lang="en-US" dirty="0" smtClean="0"/>
+              <a:t>Unsupervised Learning</a:t>
+            </a:r>
+            <a:endParaRPr lang="en-US" dirty="0"/>
+          </a:p>
+        </p:txBody>
+      </p:sp>
+      <p:sp>
+        <p:nvSpPr>
+          <p:cNvPr id="3" name="Content Placeholder 2"/>
+          <p:cNvSpPr>
+            <a:spLocks noGrp="1"/>
+          </p:cNvSpPr>
+          <p:nvPr>
+            <p:ph idx="1"/>
+          </p:nvPr>
+        </p:nvSpPr>
+        <p:spPr/>
+        <p:txBody>
+          <a:bodyPr/>
+          <a:lstStyle/>
+          <a:p>
+            <a:endParaRPr lang="en-US"/>
+          </a:p>
+        </p:txBody>
+      </p:sp>
+    </p:spTree>
+    <p:extLst>
+      <p:ext uri="{BB962C8B-B14F-4D97-AF65-F5344CB8AC3E}">
+        <p14:creationId xmlns:p14="http://schemas.microsoft.com/office/powerpoint/2010/main" val="1485711153"/>
+      </p:ext>
+    </p:extLst>
+  </p:cSld>
+  <p:clrMapOvr>
+    <a:masterClrMapping/>
+  </p:clrMapOvr>
+</p:sld>
+</file>
+
+<file path=ppt/slides/slide6.xml><?xml version="1.0" encoding="utf-8"?>
+<p:sld xmlns:a="http://schemas.openxmlformats.org/drawingml/2006/main" xmlns:r="http://schemas.openxmlformats.org/officeDocument/2006/relationships" xmlns:p="http://schemas.openxmlformats.org/presentationml/2006/main">
+  <p:cSld>
+    <p:spTree>
+      <p:nvGrpSpPr>
+        <p:cNvPr id="1" name=""/>
+        <p:cNvGrpSpPr/>
+        <p:nvPr/>
+      </p:nvGrpSpPr>
+      <p:grpSpPr>
+        <a:xfrm>
+          <a:off x="0" y="0"/>
+          <a:ext cx="0" cy="0"/>
+          <a:chOff x="0" y="0"/>
+          <a:chExt cx="0" cy="0"/>
+        </a:xfrm>
+      </p:grpSpPr>
+      <p:sp>
+        <p:nvSpPr>
+          <p:cNvPr id="2" name="Title 1"/>
+          <p:cNvSpPr>
+            <a:spLocks noGrp="1"/>
+          </p:cNvSpPr>
+          <p:nvPr>
+            <p:ph type="title"/>
+          </p:nvPr>
+        </p:nvSpPr>
+        <p:spPr/>
+        <p:txBody>
+          <a:bodyPr/>
+          <a:lstStyle/>
+          <a:p>
+            <a:r>
+              <a:rPr lang="en-US" dirty="0" smtClean="0"/>
+              <a:t>Using UL: Right and Wrong Times</a:t>
+            </a:r>
+            <a:endParaRPr lang="en-US" dirty="0"/>
+          </a:p>
+        </p:txBody>
+      </p:sp>
+      <p:sp>
+        <p:nvSpPr>
+          <p:cNvPr id="3" name="Content Placeholder 2"/>
+          <p:cNvSpPr>
+            <a:spLocks noGrp="1"/>
+          </p:cNvSpPr>
+          <p:nvPr>
+            <p:ph idx="1"/>
+          </p:nvPr>
+        </p:nvSpPr>
+        <p:spPr/>
+        <p:txBody>
+          <a:bodyPr/>
+          <a:lstStyle/>
+          <a:p>
+            <a:endParaRPr lang="en-US"/>
+          </a:p>
+        </p:txBody>
+      </p:sp>
+    </p:spTree>
+    <p:extLst>
+      <p:ext uri="{BB962C8B-B14F-4D97-AF65-F5344CB8AC3E}">
+        <p14:creationId xmlns:p14="http://schemas.microsoft.com/office/powerpoint/2010/main" val="3051305169"/>
+      </p:ext>
+    </p:extLst>
+  </p:cSld>
+  <p:clrMapOvr>
+    <a:masterClrMapping/>
+  </p:clrMapOvr>
+</p:sld>
+</file>
+
+<file path=ppt/slides/slide7.xml><?xml version="1.0" encoding="utf-8"?>
+<p:sld xmlns:a="http://schemas.openxmlformats.org/drawingml/2006/main" xmlns:r="http://schemas.openxmlformats.org/officeDocument/2006/relationships" xmlns:p="http://schemas.openxmlformats.org/presentationml/2006/main">
+  <p:cSld>
+    <p:spTree>
+      <p:nvGrpSpPr>
+        <p:cNvPr id="1" name=""/>
+        <p:cNvGrpSpPr/>
+        <p:nvPr/>
+      </p:nvGrpSpPr>
+      <p:grpSpPr>
+        <a:xfrm>
+          <a:off x="0" y="0"/>
+          <a:ext cx="0" cy="0"/>
+          <a:chOff x="0" y="0"/>
+          <a:chExt cx="0" cy="0"/>
+        </a:xfrm>
+      </p:grpSpPr>
+      <p:sp>
+        <p:nvSpPr>
+          <p:cNvPr id="2" name="Title 1"/>
+          <p:cNvSpPr>
+            <a:spLocks noGrp="1"/>
+          </p:cNvSpPr>
+          <p:nvPr>
+            <p:ph type="title"/>
+          </p:nvPr>
+        </p:nvSpPr>
+        <p:spPr/>
+        <p:txBody>
+          <a:bodyPr>
+            <a:normAutofit fontScale="90000"/>
+          </a:bodyPr>
+          <a:lstStyle/>
+          <a:p>
+            <a:r>
+              <a:rPr lang="en-US" dirty="0" smtClean="0"/>
+              <a:t>Three Clustering Algorithms You Should Know	</a:t>
+            </a:r>
+            <a:endParaRPr lang="en-US" dirty="0"/>
+          </a:p>
+        </p:txBody>
+      </p:sp>
+      <p:sp>
+        <p:nvSpPr>
+          <p:cNvPr id="3" name="Content Placeholder 2"/>
+          <p:cNvSpPr>
+            <a:spLocks noGrp="1"/>
+          </p:cNvSpPr>
+          <p:nvPr>
+            <p:ph idx="1"/>
+          </p:nvPr>
+        </p:nvSpPr>
+        <p:spPr/>
+        <p:txBody>
+          <a:bodyPr/>
+          <a:lstStyle/>
+          <a:p>
+            <a:r>
+              <a:rPr lang="en-US" dirty="0" smtClean="0"/>
+              <a:t>K means</a:t>
+            </a:r>
+          </a:p>
+          <a:p>
+            <a:r>
+              <a:rPr lang="en-US" dirty="0" smtClean="0"/>
+              <a:t>Hierarchical Clustering</a:t>
+            </a:r>
+          </a:p>
+          <a:p>
+            <a:r>
+              <a:rPr lang="en-US" dirty="0" smtClean="0"/>
+              <a:t>DBSCAN</a:t>
+            </a:r>
+            <a:endParaRPr lang="en-US" dirty="0"/>
+          </a:p>
+        </p:txBody>
+      </p:sp>
+    </p:spTree>
+    <p:extLst>
+      <p:ext uri="{BB962C8B-B14F-4D97-AF65-F5344CB8AC3E}">
+        <p14:creationId xmlns:p14="http://schemas.microsoft.com/office/powerpoint/2010/main" val="1925213278"/>
+      </p:ext>
+    </p:extLst>
+  </p:cSld>
+  <p:clrMapOvr>
+    <a:masterClrMapping/>
+  </p:clrMapOvr>
+</p:sld>
+</file>
+
+<file path=ppt/slides/slide8.xml><?xml version="1.0" encoding="utf-8"?>
+<p:sld xmlns:a="http://schemas.openxmlformats.org/drawingml/2006/main" xmlns:r="http://schemas.openxmlformats.org/officeDocument/2006/relationships" xmlns:p="http://schemas.openxmlformats.org/presentationml/2006/main">
+  <p:cSld>
+    <p:spTree>
+      <p:nvGrpSpPr>
+        <p:cNvPr id="1" name=""/>
+        <p:cNvGrpSpPr/>
+        <p:nvPr/>
+      </p:nvGrpSpPr>
+      <p:grpSpPr>
+        <a:xfrm>
+          <a:off x="0" y="0"/>
+          <a:ext cx="0" cy="0"/>
+          <a:chOff x="0" y="0"/>
+          <a:chExt cx="0" cy="0"/>
+        </a:xfrm>
+      </p:grpSpPr>
+      <p:sp>
+        <p:nvSpPr>
+          <p:cNvPr id="2" name="Title 1"/>
+          <p:cNvSpPr>
+            <a:spLocks noGrp="1"/>
+          </p:cNvSpPr>
+          <p:nvPr>
+            <p:ph type="title"/>
+          </p:nvPr>
+        </p:nvSpPr>
+        <p:spPr/>
+        <p:txBody>
+          <a:bodyPr/>
+          <a:lstStyle/>
+          <a:p>
+            <a:r>
+              <a:rPr lang="en-US" dirty="0" smtClean="0"/>
+              <a:t>K Means</a:t>
+            </a:r>
+            <a:endParaRPr lang="en-US" dirty="0"/>
+          </a:p>
+        </p:txBody>
+      </p:sp>
+      <p:sp>
+        <p:nvSpPr>
+          <p:cNvPr id="3" name="Content Placeholder 2"/>
+          <p:cNvSpPr>
+            <a:spLocks noGrp="1"/>
+          </p:cNvSpPr>
+          <p:nvPr>
+            <p:ph idx="1"/>
+          </p:nvPr>
+        </p:nvSpPr>
+        <p:spPr/>
+        <p:txBody>
+          <a:bodyPr/>
+          <a:lstStyle/>
+          <a:p>
+            <a:r>
+              <a:rPr lang="en-US" dirty="0" smtClean="0"/>
+              <a:t>“Hello, world” of clustering algorithms</a:t>
+            </a:r>
+          </a:p>
+          <a:p>
+            <a:r>
+              <a:rPr lang="en-US" dirty="0" smtClean="0"/>
+              <a:t>Simple, yet effective</a:t>
+            </a:r>
+          </a:p>
+        </p:txBody>
+      </p:sp>
+    </p:spTree>
+    <p:extLst>
+      <p:ext uri="{BB962C8B-B14F-4D97-AF65-F5344CB8AC3E}">
+        <p14:creationId xmlns:p14="http://schemas.microsoft.com/office/powerpoint/2010/main" val="2554314544"/>
+      </p:ext>
+    </p:extLst>
+  </p:cSld>
+  <p:clrMapOvr>
+    <a:masterClrMapping/>
+  </p:clrMapOvr>
+</p:sld>
+</file>
+
+<file path=ppt/slides/slide9.xml><?xml version="1.0" encoding="utf-8"?>
+<p:sld xmlns:a="http://schemas.openxmlformats.org/drawingml/2006/main" xmlns:r="http://schemas.openxmlformats.org/officeDocument/2006/relationships" xmlns:p="http://schemas.openxmlformats.org/presentationml/2006/main">
+  <p:cSld>
+    <p:spTree>
+      <p:nvGrpSpPr>
+        <p:cNvPr id="1" name=""/>
+        <p:cNvGrpSpPr/>
+        <p:nvPr/>
+      </p:nvGrpSpPr>
+      <p:grpSpPr>
+        <a:xfrm>
+          <a:off x="0" y="0"/>
+          <a:ext cx="0" cy="0"/>
+          <a:chOff x="0" y="0"/>
+          <a:chExt cx="0" cy="0"/>
+        </a:xfrm>
+      </p:grpSpPr>
+      <p:sp>
+        <p:nvSpPr>
+          <p:cNvPr id="2" name="Title 1"/>
+          <p:cNvSpPr>
+            <a:spLocks noGrp="1"/>
+          </p:cNvSpPr>
+          <p:nvPr>
+            <p:ph type="title"/>
+          </p:nvPr>
+        </p:nvSpPr>
+        <p:spPr/>
+        <p:txBody>
+          <a:bodyPr/>
+          <a:lstStyle/>
+          <a:p>
+            <a:r>
+              <a:rPr lang="en-US" dirty="0" smtClean="0"/>
+              <a:t>DBSCAN</a:t>
+            </a:r>
+            <a:endParaRPr lang="en-US" dirty="0"/>
+          </a:p>
+        </p:txBody>
+      </p:sp>
+      <p:sp>
+        <p:nvSpPr>
+          <p:cNvPr id="3" name="Content Placeholder 2"/>
+          <p:cNvSpPr>
+            <a:spLocks noGrp="1"/>
+          </p:cNvSpPr>
+          <p:nvPr>
+            <p:ph idx="1"/>
+          </p:nvPr>
+        </p:nvSpPr>
+        <p:spPr/>
+        <p:txBody>
+          <a:bodyPr/>
+          <a:lstStyle/>
+          <a:p>
+            <a:endParaRPr lang="en-US"/>
+          </a:p>
+        </p:txBody>
+      </p:sp>
+    </p:spTree>
+    <p:extLst>
+      <p:ext uri="{BB962C8B-B14F-4D97-AF65-F5344CB8AC3E}">
+        <p14:creationId xmlns:p14="http://schemas.microsoft.com/office/powerpoint/2010/main" val="1783629603"/>
       </p:ext>
     </p:extLst>
   </p:cSld>
@@ -1962,4 +3927,265 @@
     </a:ext>
   </a:extLst>
 </a:theme>
+</file>
+
+<file path=ppt/theme/theme2.xml><?xml version="1.0" encoding="utf-8"?>
+<a:theme xmlns:a="http://schemas.openxmlformats.org/drawingml/2006/main" name="Office Theme">
+  <a:themeElements>
+    <a:clrScheme name="Office">
+      <a:dk1>
+        <a:sysClr val="windowText" lastClr="000000"/>
+      </a:dk1>
+      <a:lt1>
+        <a:sysClr val="window" lastClr="FFFFFF"/>
+      </a:lt1>
+      <a:dk2>
+        <a:srgbClr val="44546A"/>
+      </a:dk2>
+      <a:lt2>
+        <a:srgbClr val="E7E6E6"/>
+      </a:lt2>
+      <a:accent1>
+        <a:srgbClr val="5B9BD5"/>
+      </a:accent1>
+      <a:accent2>
+        <a:srgbClr val="ED7D31"/>
+      </a:accent2>
+      <a:accent3>
+        <a:srgbClr val="A5A5A5"/>
+      </a:accent3>
+      <a:accent4>
+        <a:srgbClr val="FFC000"/>
+      </a:accent4>
+      <a:accent5>
+        <a:srgbClr val="4472C4"/>
+      </a:accent5>
+      <a:accent6>
+        <a:srgbClr val="70AD47"/>
+      </a:accent6>
+      <a:hlink>
+        <a:srgbClr val="0563C1"/>
+      </a:hlink>
+      <a:folHlink>
+        <a:srgbClr val="954F72"/>
+      </a:folHlink>
+    </a:clrScheme>
+    <a:fontScheme name="Office">
+      <a:majorFont>
+        <a:latin typeface="Calibri Light" panose="020F0302020204030204"/>
+        <a:ea typeface=""/>
+        <a:cs typeface=""/>
+        <a:font script="Jpan" typeface="游ゴシック Light"/>
+        <a:font script="Hang" typeface="맑은 고딕"/>
+        <a:font script="Hans" typeface="等线 Light"/>
+        <a:font script="Hant" typeface="新細明體"/>
+        <a:font script="Arab" typeface="Times New Roman"/>
+        <a:font script="Hebr" typeface="Times New Roman"/>
+        <a:font script="Thai" typeface="Angsana New"/>
+        <a:font script="Ethi" typeface="Nyala"/>
+        <a:font script="Beng" typeface="Vrinda"/>
+        <a:font script="Gujr" typeface="Shruti"/>
+        <a:font script="Khmr" typeface="MoolBoran"/>
+        <a:font script="Knda" typeface="Tunga"/>
+        <a:font script="Guru" typeface="Raavi"/>
+        <a:font script="Cans" typeface="Euphemia"/>
+        <a:font script="Cher" typeface="Plantagenet Cherokee"/>
+        <a:font script="Yiii" typeface="Microsoft Yi Baiti"/>
+        <a:font script="Tibt" typeface="Microsoft Himalaya"/>
+        <a:font script="Thaa" typeface="MV Boli"/>
+        <a:font script="Deva" typeface="Mangal"/>
+        <a:font script="Telu" typeface="Gautami"/>
+        <a:font script="Taml" typeface="Latha"/>
+        <a:font script="Syrc" typeface="Estrangelo Edessa"/>
+        <a:font script="Orya" typeface="Kalinga"/>
+        <a:font script="Mlym" typeface="Kartika"/>
+        <a:font script="Laoo" typeface="DokChampa"/>
+        <a:font script="Sinh" typeface="Iskoola Pota"/>
+        <a:font script="Mong" typeface="Mongolian Baiti"/>
+        <a:font script="Viet" typeface="Times New Roman"/>
+        <a:font script="Uigh" typeface="Microsoft Uighur"/>
+        <a:font script="Geor" typeface="Sylfaen"/>
+      </a:majorFont>
+      <a:minorFont>
+        <a:latin typeface="Calibri" panose="020F0502020204030204"/>
+        <a:ea typeface=""/>
+        <a:cs typeface=""/>
+        <a:font script="Jpan" typeface="游ゴシック"/>
+        <a:font script="Hang" typeface="맑은 고딕"/>
+        <a:font script="Hans" typeface="等线"/>
+        <a:font script="Hant" typeface="新細明體"/>
+        <a:font script="Arab" typeface="Arial"/>
+        <a:font script="Hebr" typeface="Arial"/>
+        <a:font script="Thai" typeface="Cordia New"/>
+        <a:font script="Ethi" typeface="Nyala"/>
+        <a:font script="Beng" typeface="Vrinda"/>
+        <a:font script="Gujr" typeface="Shruti"/>
+        <a:font script="Khmr" typeface="DaunPenh"/>
+        <a:font script="Knda" typeface="Tunga"/>
+        <a:font script="Guru" typeface="Raavi"/>
+        <a:font script="Cans" typeface="Euphemia"/>
+        <a:font script="Cher" typeface="Plantagenet Cherokee"/>
+        <a:font script="Yiii" typeface="Microsoft Yi Baiti"/>
+        <a:font script="Tibt" typeface="Microsoft Himalaya"/>
+        <a:font script="Thaa" typeface="MV Boli"/>
+        <a:font script="Deva" typeface="Mangal"/>
+        <a:font script="Telu" typeface="Gautami"/>
+        <a:font script="Taml" typeface="Latha"/>
+        <a:font script="Syrc" typeface="Estrangelo Edessa"/>
+        <a:font script="Orya" typeface="Kalinga"/>
+        <a:font script="Mlym" typeface="Kartika"/>
+        <a:font script="Laoo" typeface="DokChampa"/>
+        <a:font script="Sinh" typeface="Iskoola Pota"/>
+        <a:font script="Mong" typeface="Mongolian Baiti"/>
+        <a:font script="Viet" typeface="Arial"/>
+        <a:font script="Uigh" typeface="Microsoft Uighur"/>
+        <a:font script="Geor" typeface="Sylfaen"/>
+      </a:minorFont>
+    </a:fontScheme>
+    <a:fmtScheme name="Office">
+      <a:fillStyleLst>
+        <a:solidFill>
+          <a:schemeClr val="phClr"/>
+        </a:solidFill>
+        <a:gradFill rotWithShape="1">
+          <a:gsLst>
+            <a:gs pos="0">
+              <a:schemeClr val="phClr">
+                <a:lumMod val="110000"/>
+                <a:satMod val="105000"/>
+                <a:tint val="67000"/>
+              </a:schemeClr>
+            </a:gs>
+            <a:gs pos="50000">
+              <a:schemeClr val="phClr">
+                <a:lumMod val="105000"/>
+                <a:satMod val="103000"/>
+                <a:tint val="73000"/>
+              </a:schemeClr>
+            </a:gs>
+            <a:gs pos="100000">
+              <a:schemeClr val="phClr">
+                <a:lumMod val="105000"/>
+                <a:satMod val="109000"/>
+                <a:tint val="81000"/>
+              </a:schemeClr>
+            </a:gs>
+          </a:gsLst>
+          <a:lin ang="5400000" scaled="0"/>
+        </a:gradFill>
+        <a:gradFill rotWithShape="1">
+          <a:gsLst>
+            <a:gs pos="0">
+              <a:schemeClr val="phClr">
+                <a:satMod val="103000"/>
+                <a:lumMod val="102000"/>
+                <a:tint val="94000"/>
+              </a:schemeClr>
+            </a:gs>
+            <a:gs pos="50000">
+              <a:schemeClr val="phClr">
+                <a:satMod val="110000"/>
+                <a:lumMod val="100000"/>
+                <a:shade val="100000"/>
+              </a:schemeClr>
+            </a:gs>
+            <a:gs pos="100000">
+              <a:schemeClr val="phClr">
+                <a:lumMod val="99000"/>
+                <a:satMod val="120000"/>
+                <a:shade val="78000"/>
+              </a:schemeClr>
+            </a:gs>
+          </a:gsLst>
+          <a:lin ang="5400000" scaled="0"/>
+        </a:gradFill>
+      </a:fillStyleLst>
+      <a:lnStyleLst>
+        <a:ln w="6350" cap="flat" cmpd="sng" algn="ctr">
+          <a:solidFill>
+            <a:schemeClr val="phClr"/>
+          </a:solidFill>
+          <a:prstDash val="solid"/>
+          <a:miter lim="800000"/>
+        </a:ln>
+        <a:ln w="12700" cap="flat" cmpd="sng" algn="ctr">
+          <a:solidFill>
+            <a:schemeClr val="phClr"/>
+          </a:solidFill>
+          <a:prstDash val="solid"/>
+          <a:miter lim="800000"/>
+        </a:ln>
+        <a:ln w="19050" cap="flat" cmpd="sng" algn="ctr">
+          <a:solidFill>
+            <a:schemeClr val="phClr"/>
+          </a:solidFill>
+          <a:prstDash val="solid"/>
+          <a:miter lim="800000"/>
+        </a:ln>
+      </a:lnStyleLst>
+      <a:effectStyleLst>
+        <a:effectStyle>
+          <a:effectLst/>
+        </a:effectStyle>
+        <a:effectStyle>
+          <a:effectLst/>
+        </a:effectStyle>
+        <a:effectStyle>
+          <a:effectLst>
+            <a:outerShdw blurRad="57150" dist="19050" dir="5400000" algn="ctr" rotWithShape="0">
+              <a:srgbClr val="000000">
+                <a:alpha val="63000"/>
+              </a:srgbClr>
+            </a:outerShdw>
+          </a:effectLst>
+        </a:effectStyle>
+      </a:effectStyleLst>
+      <a:bgFillStyleLst>
+        <a:solidFill>
+          <a:schemeClr val="phClr"/>
+        </a:solidFill>
+        <a:solidFill>
+          <a:schemeClr val="phClr">
+            <a:tint val="95000"/>
+            <a:satMod val="170000"/>
+          </a:schemeClr>
+        </a:solidFill>
+        <a:gradFill rotWithShape="1">
+          <a:gsLst>
+            <a:gs pos="0">
+              <a:schemeClr val="phClr">
+                <a:tint val="93000"/>
+                <a:satMod val="150000"/>
+                <a:shade val="98000"/>
+                <a:lumMod val="102000"/>
+              </a:schemeClr>
+            </a:gs>
+            <a:gs pos="50000">
+              <a:schemeClr val="phClr">
+                <a:tint val="98000"/>
+                <a:satMod val="130000"/>
+                <a:shade val="90000"/>
+                <a:lumMod val="103000"/>
+              </a:schemeClr>
+            </a:gs>
+            <a:gs pos="100000">
+              <a:schemeClr val="phClr">
+                <a:shade val="63000"/>
+                <a:satMod val="120000"/>
+              </a:schemeClr>
+            </a:gs>
+          </a:gsLst>
+          <a:lin ang="5400000" scaled="0"/>
+        </a:gradFill>
+      </a:bgFillStyleLst>
+    </a:fmtScheme>
+  </a:themeElements>
+  <a:objectDefaults/>
+  <a:extraClrSchemeLst/>
+  <a:extLst>
+    <a:ext uri="{05A4C25C-085E-4340-85A3-A5531E510DB2}">
+      <thm15:themeFamily xmlns:thm15="http://schemas.microsoft.com/office/thememl/2012/main" name="Office Theme" id="{62F939B6-93AF-4DB8-9C6B-D6C7DFDC589F}" vid="{4A3C46E8-61CC-4603-A589-7422A47A8E4A}"/>
+    </a:ext>
+  </a:extLst>
+</a:theme>
 </file>
</xml_diff>

<commit_message>
more updates, additions to pres
</commit_message>
<xml_diff>
--- a/Generating Insights from Clustering Large Donors - BStieber APRA DAS19.pptx
+++ b/Generating Insights from Clustering Large Donors - BStieber APRA DAS19.pptx
@@ -5,7 +5,7 @@
     <p:sldMasterId id="2147483660" r:id="rId1"/>
   </p:sldMasterIdLst>
   <p:notesMasterIdLst>
-    <p:notesMasterId r:id="rId24"/>
+    <p:notesMasterId r:id="rId26"/>
   </p:notesMasterIdLst>
   <p:sldIdLst>
     <p:sldId id="258" r:id="rId2"/>
@@ -18,18 +18,20 @@
     <p:sldId id="267" r:id="rId9"/>
     <p:sldId id="280" r:id="rId10"/>
     <p:sldId id="268" r:id="rId11"/>
-    <p:sldId id="281" r:id="rId12"/>
-    <p:sldId id="271" r:id="rId13"/>
-    <p:sldId id="273" r:id="rId14"/>
-    <p:sldId id="272" r:id="rId15"/>
-    <p:sldId id="270" r:id="rId16"/>
-    <p:sldId id="274" r:id="rId17"/>
-    <p:sldId id="275" r:id="rId18"/>
-    <p:sldId id="276" r:id="rId19"/>
-    <p:sldId id="277" r:id="rId20"/>
-    <p:sldId id="278" r:id="rId21"/>
-    <p:sldId id="279" r:id="rId22"/>
-    <p:sldId id="259" r:id="rId23"/>
+    <p:sldId id="283" r:id="rId12"/>
+    <p:sldId id="281" r:id="rId13"/>
+    <p:sldId id="271" r:id="rId14"/>
+    <p:sldId id="273" r:id="rId15"/>
+    <p:sldId id="272" r:id="rId16"/>
+    <p:sldId id="270" r:id="rId17"/>
+    <p:sldId id="274" r:id="rId18"/>
+    <p:sldId id="275" r:id="rId19"/>
+    <p:sldId id="276" r:id="rId20"/>
+    <p:sldId id="277" r:id="rId21"/>
+    <p:sldId id="278" r:id="rId22"/>
+    <p:sldId id="279" r:id="rId23"/>
+    <p:sldId id="282" r:id="rId24"/>
+    <p:sldId id="259" r:id="rId25"/>
   </p:sldIdLst>
   <p:sldSz cx="9144000" cy="5143500" type="screen16x9"/>
   <p:notesSz cx="6858000" cy="9144000"/>
@@ -229,7 +231,7 @@
           <a:p>
             <a:fld id="{1DEEC2B6-86D3-4D9F-A8F6-E4F5C06381F6}" type="datetimeFigureOut">
               <a:rPr lang="en-US" smtClean="0"/>
-              <a:t>5/6/2019</a:t>
+              <a:t>5/8/2019</a:t>
             </a:fld>
             <a:endParaRPr lang="en-US"/>
           </a:p>
@@ -723,6 +725,174 @@
           <a:bodyPr/>
           <a:lstStyle/>
           <a:p>
+            <a:endParaRPr lang="en-US" dirty="0"/>
+          </a:p>
+        </p:txBody>
+      </p:sp>
+      <p:sp>
+        <p:nvSpPr>
+          <p:cNvPr id="4" name="Slide Number Placeholder 3"/>
+          <p:cNvSpPr>
+            <a:spLocks noGrp="1"/>
+          </p:cNvSpPr>
+          <p:nvPr>
+            <p:ph type="sldNum" sz="quarter" idx="10"/>
+          </p:nvPr>
+        </p:nvSpPr>
+        <p:spPr/>
+        <p:txBody>
+          <a:bodyPr/>
+          <a:lstStyle/>
+          <a:p>
+            <a:fld id="{340F17E4-2B4D-4428-9E25-E07F235B5058}" type="slidenum">
+              <a:rPr lang="en-US" smtClean="0"/>
+              <a:t>3</a:t>
+            </a:fld>
+            <a:endParaRPr lang="en-US"/>
+          </a:p>
+        </p:txBody>
+      </p:sp>
+    </p:spTree>
+    <p:extLst>
+      <p:ext uri="{BB962C8B-B14F-4D97-AF65-F5344CB8AC3E}">
+        <p14:creationId xmlns:p14="http://schemas.microsoft.com/office/powerpoint/2010/main" val="551994057"/>
+      </p:ext>
+    </p:extLst>
+  </p:cSld>
+  <p:clrMapOvr>
+    <a:masterClrMapping/>
+  </p:clrMapOvr>
+</p:notes>
+</file>
+
+<file path=ppt/notesSlides/notesSlide4.xml><?xml version="1.0" encoding="utf-8"?>
+<p:notes xmlns:a="http://schemas.openxmlformats.org/drawingml/2006/main" xmlns:r="http://schemas.openxmlformats.org/officeDocument/2006/relationships" xmlns:p="http://schemas.openxmlformats.org/presentationml/2006/main">
+  <p:cSld>
+    <p:spTree>
+      <p:nvGrpSpPr>
+        <p:cNvPr id="1" name=""/>
+        <p:cNvGrpSpPr/>
+        <p:nvPr/>
+      </p:nvGrpSpPr>
+      <p:grpSpPr>
+        <a:xfrm>
+          <a:off x="0" y="0"/>
+          <a:ext cx="0" cy="0"/>
+          <a:chOff x="0" y="0"/>
+          <a:chExt cx="0" cy="0"/>
+        </a:xfrm>
+      </p:grpSpPr>
+      <p:sp>
+        <p:nvSpPr>
+          <p:cNvPr id="2" name="Slide Image Placeholder 1"/>
+          <p:cNvSpPr>
+            <a:spLocks noGrp="1" noRot="1" noChangeAspect="1"/>
+          </p:cNvSpPr>
+          <p:nvPr>
+            <p:ph type="sldImg"/>
+          </p:nvPr>
+        </p:nvSpPr>
+        <p:spPr/>
+      </p:sp>
+      <p:sp>
+        <p:nvSpPr>
+          <p:cNvPr id="3" name="Notes Placeholder 2"/>
+          <p:cNvSpPr>
+            <a:spLocks noGrp="1"/>
+          </p:cNvSpPr>
+          <p:nvPr>
+            <p:ph type="body" idx="1"/>
+          </p:nvPr>
+        </p:nvSpPr>
+        <p:spPr/>
+        <p:txBody>
+          <a:bodyPr/>
+          <a:lstStyle/>
+          <a:p>
+            <a:endParaRPr lang="en-US" dirty="0"/>
+          </a:p>
+        </p:txBody>
+      </p:sp>
+      <p:sp>
+        <p:nvSpPr>
+          <p:cNvPr id="4" name="Slide Number Placeholder 3"/>
+          <p:cNvSpPr>
+            <a:spLocks noGrp="1"/>
+          </p:cNvSpPr>
+          <p:nvPr>
+            <p:ph type="sldNum" sz="quarter" idx="10"/>
+          </p:nvPr>
+        </p:nvSpPr>
+        <p:spPr/>
+        <p:txBody>
+          <a:bodyPr/>
+          <a:lstStyle/>
+          <a:p>
+            <a:fld id="{340F17E4-2B4D-4428-9E25-E07F235B5058}" type="slidenum">
+              <a:rPr lang="en-US" smtClean="0"/>
+              <a:t>4</a:t>
+            </a:fld>
+            <a:endParaRPr lang="en-US"/>
+          </a:p>
+        </p:txBody>
+      </p:sp>
+    </p:spTree>
+    <p:extLst>
+      <p:ext uri="{BB962C8B-B14F-4D97-AF65-F5344CB8AC3E}">
+        <p14:creationId xmlns:p14="http://schemas.microsoft.com/office/powerpoint/2010/main" val="2645675023"/>
+      </p:ext>
+    </p:extLst>
+  </p:cSld>
+  <p:clrMapOvr>
+    <a:masterClrMapping/>
+  </p:clrMapOvr>
+</p:notes>
+</file>
+
+<file path=ppt/notesSlides/notesSlide5.xml><?xml version="1.0" encoding="utf-8"?>
+<p:notes xmlns:a="http://schemas.openxmlformats.org/drawingml/2006/main" xmlns:r="http://schemas.openxmlformats.org/officeDocument/2006/relationships" xmlns:p="http://schemas.openxmlformats.org/presentationml/2006/main">
+  <p:cSld>
+    <p:spTree>
+      <p:nvGrpSpPr>
+        <p:cNvPr id="1" name=""/>
+        <p:cNvGrpSpPr/>
+        <p:nvPr/>
+      </p:nvGrpSpPr>
+      <p:grpSpPr>
+        <a:xfrm>
+          <a:off x="0" y="0"/>
+          <a:ext cx="0" cy="0"/>
+          <a:chOff x="0" y="0"/>
+          <a:chExt cx="0" cy="0"/>
+        </a:xfrm>
+      </p:grpSpPr>
+      <p:sp>
+        <p:nvSpPr>
+          <p:cNvPr id="2" name="Slide Image Placeholder 1"/>
+          <p:cNvSpPr>
+            <a:spLocks noGrp="1" noRot="1" noChangeAspect="1"/>
+          </p:cNvSpPr>
+          <p:nvPr>
+            <p:ph type="sldImg"/>
+          </p:nvPr>
+        </p:nvSpPr>
+        <p:spPr/>
+      </p:sp>
+      <p:sp>
+        <p:nvSpPr>
+          <p:cNvPr id="3" name="Notes Placeholder 2"/>
+          <p:cNvSpPr>
+            <a:spLocks noGrp="1"/>
+          </p:cNvSpPr>
+          <p:nvPr>
+            <p:ph type="body" idx="1"/>
+          </p:nvPr>
+        </p:nvSpPr>
+        <p:spPr/>
+        <p:txBody>
+          <a:bodyPr/>
+          <a:lstStyle/>
+          <a:p>
             <a:r>
               <a:rPr lang="en-US" dirty="0" smtClean="0"/>
               <a:t>DBSCAN-Density-based</a:t>
@@ -762,6 +932,202 @@
     <p:extLst>
       <p:ext uri="{BB962C8B-B14F-4D97-AF65-F5344CB8AC3E}">
         <p14:creationId xmlns:p14="http://schemas.microsoft.com/office/powerpoint/2010/main" val="3542213727"/>
+      </p:ext>
+    </p:extLst>
+  </p:cSld>
+  <p:clrMapOvr>
+    <a:masterClrMapping/>
+  </p:clrMapOvr>
+</p:notes>
+</file>
+
+<file path=ppt/notesSlides/notesSlide6.xml><?xml version="1.0" encoding="utf-8"?>
+<p:notes xmlns:a="http://schemas.openxmlformats.org/drawingml/2006/main" xmlns:r="http://schemas.openxmlformats.org/officeDocument/2006/relationships" xmlns:p="http://schemas.openxmlformats.org/presentationml/2006/main">
+  <p:cSld>
+    <p:spTree>
+      <p:nvGrpSpPr>
+        <p:cNvPr id="1" name=""/>
+        <p:cNvGrpSpPr/>
+        <p:nvPr/>
+      </p:nvGrpSpPr>
+      <p:grpSpPr>
+        <a:xfrm>
+          <a:off x="0" y="0"/>
+          <a:ext cx="0" cy="0"/>
+          <a:chOff x="0" y="0"/>
+          <a:chExt cx="0" cy="0"/>
+        </a:xfrm>
+      </p:grpSpPr>
+      <p:sp>
+        <p:nvSpPr>
+          <p:cNvPr id="2" name="Slide Image Placeholder 1"/>
+          <p:cNvSpPr>
+            <a:spLocks noGrp="1" noRot="1" noChangeAspect="1"/>
+          </p:cNvSpPr>
+          <p:nvPr>
+            <p:ph type="sldImg"/>
+          </p:nvPr>
+        </p:nvSpPr>
+        <p:spPr/>
+      </p:sp>
+      <p:sp>
+        <p:nvSpPr>
+          <p:cNvPr id="3" name="Notes Placeholder 2"/>
+          <p:cNvSpPr>
+            <a:spLocks noGrp="1"/>
+          </p:cNvSpPr>
+          <p:nvPr>
+            <p:ph type="body" idx="1"/>
+          </p:nvPr>
+        </p:nvSpPr>
+        <p:spPr/>
+        <p:txBody>
+          <a:bodyPr/>
+          <a:lstStyle/>
+          <a:p>
+            <a:pPr marL="0" marR="0" lvl="0" indent="0" algn="l" defTabSz="914400" rtl="0" eaLnBrk="1" fontAlgn="auto" latinLnBrk="0" hangingPunct="1">
+              <a:lnSpc>
+                <a:spcPct val="100000"/>
+              </a:lnSpc>
+              <a:spcBef>
+                <a:spcPts val="0"/>
+              </a:spcBef>
+              <a:spcAft>
+                <a:spcPts val="0"/>
+              </a:spcAft>
+              <a:buClrTx/>
+              <a:buSzTx/>
+              <a:buFontTx/>
+              <a:buNone/>
+              <a:tabLst/>
+              <a:defRPr/>
+            </a:pPr>
+            <a:r>
+              <a:rPr lang="en-US" dirty="0" smtClean="0"/>
+              <a:t>DBSCAN-Density-based</a:t>
+            </a:r>
+            <a:r>
+              <a:rPr lang="en-US" baseline="0" dirty="0" smtClean="0"/>
+              <a:t> spatial clustering of applications with noise</a:t>
+            </a:r>
+            <a:endParaRPr lang="en-US" dirty="0" smtClean="0"/>
+          </a:p>
+          <a:p>
+            <a:endParaRPr lang="en-US" dirty="0"/>
+          </a:p>
+        </p:txBody>
+      </p:sp>
+      <p:sp>
+        <p:nvSpPr>
+          <p:cNvPr id="4" name="Slide Number Placeholder 3"/>
+          <p:cNvSpPr>
+            <a:spLocks noGrp="1"/>
+          </p:cNvSpPr>
+          <p:nvPr>
+            <p:ph type="sldNum" sz="quarter" idx="10"/>
+          </p:nvPr>
+        </p:nvSpPr>
+        <p:spPr/>
+        <p:txBody>
+          <a:bodyPr/>
+          <a:lstStyle/>
+          <a:p>
+            <a:fld id="{340F17E4-2B4D-4428-9E25-E07F235B5058}" type="slidenum">
+              <a:rPr lang="en-US" smtClean="0"/>
+              <a:t>10</a:t>
+            </a:fld>
+            <a:endParaRPr lang="en-US"/>
+          </a:p>
+        </p:txBody>
+      </p:sp>
+    </p:spTree>
+    <p:extLst>
+      <p:ext uri="{BB962C8B-B14F-4D97-AF65-F5344CB8AC3E}">
+        <p14:creationId xmlns:p14="http://schemas.microsoft.com/office/powerpoint/2010/main" val="710510024"/>
+      </p:ext>
+    </p:extLst>
+  </p:cSld>
+  <p:clrMapOvr>
+    <a:masterClrMapping/>
+  </p:clrMapOvr>
+</p:notes>
+</file>
+
+<file path=ppt/notesSlides/notesSlide7.xml><?xml version="1.0" encoding="utf-8"?>
+<p:notes xmlns:a="http://schemas.openxmlformats.org/drawingml/2006/main" xmlns:r="http://schemas.openxmlformats.org/officeDocument/2006/relationships" xmlns:p="http://schemas.openxmlformats.org/presentationml/2006/main">
+  <p:cSld>
+    <p:spTree>
+      <p:nvGrpSpPr>
+        <p:cNvPr id="1" name=""/>
+        <p:cNvGrpSpPr/>
+        <p:nvPr/>
+      </p:nvGrpSpPr>
+      <p:grpSpPr>
+        <a:xfrm>
+          <a:off x="0" y="0"/>
+          <a:ext cx="0" cy="0"/>
+          <a:chOff x="0" y="0"/>
+          <a:chExt cx="0" cy="0"/>
+        </a:xfrm>
+      </p:grpSpPr>
+      <p:sp>
+        <p:nvSpPr>
+          <p:cNvPr id="2" name="Slide Image Placeholder 1"/>
+          <p:cNvSpPr>
+            <a:spLocks noGrp="1" noRot="1" noChangeAspect="1"/>
+          </p:cNvSpPr>
+          <p:nvPr>
+            <p:ph type="sldImg"/>
+          </p:nvPr>
+        </p:nvSpPr>
+        <p:spPr/>
+      </p:sp>
+      <p:sp>
+        <p:nvSpPr>
+          <p:cNvPr id="3" name="Notes Placeholder 2"/>
+          <p:cNvSpPr>
+            <a:spLocks noGrp="1"/>
+          </p:cNvSpPr>
+          <p:nvPr>
+            <p:ph type="body" idx="1"/>
+          </p:nvPr>
+        </p:nvSpPr>
+        <p:spPr/>
+        <p:txBody>
+          <a:bodyPr/>
+          <a:lstStyle/>
+          <a:p>
+            <a:endParaRPr lang="en-US" dirty="0"/>
+          </a:p>
+        </p:txBody>
+      </p:sp>
+      <p:sp>
+        <p:nvSpPr>
+          <p:cNvPr id="4" name="Slide Number Placeholder 3"/>
+          <p:cNvSpPr>
+            <a:spLocks noGrp="1"/>
+          </p:cNvSpPr>
+          <p:nvPr>
+            <p:ph type="sldNum" sz="quarter" idx="10"/>
+          </p:nvPr>
+        </p:nvSpPr>
+        <p:spPr/>
+        <p:txBody>
+          <a:bodyPr/>
+          <a:lstStyle/>
+          <a:p>
+            <a:fld id="{340F17E4-2B4D-4428-9E25-E07F235B5058}" type="slidenum">
+              <a:rPr lang="en-US" smtClean="0"/>
+              <a:t>23</a:t>
+            </a:fld>
+            <a:endParaRPr lang="en-US"/>
+          </a:p>
+        </p:txBody>
+      </p:sp>
+    </p:spTree>
+    <p:extLst>
+      <p:ext uri="{BB962C8B-B14F-4D97-AF65-F5344CB8AC3E}">
+        <p14:creationId xmlns:p14="http://schemas.microsoft.com/office/powerpoint/2010/main" val="1448205010"/>
       </p:ext>
     </p:extLst>
   </p:cSld>
@@ -2207,7 +2573,44 @@
           <a:bodyPr/>
           <a:lstStyle/>
           <a:p>
-            <a:endParaRPr lang="en-US"/>
+            <a:r>
+              <a:rPr lang="en-US" dirty="0" smtClean="0"/>
+              <a:t>More advanced than K-Means or hierarchical clustering</a:t>
+            </a:r>
+          </a:p>
+          <a:p>
+            <a:r>
+              <a:rPr lang="en-US" dirty="0" smtClean="0"/>
+              <a:t>Useful in outlier detection and is flexible with respect to cluster shape</a:t>
+            </a:r>
+          </a:p>
+          <a:p>
+            <a:r>
+              <a:rPr lang="en-US" dirty="0"/>
+              <a:t>DBSCAN is “region-based”, trying to identify neighborhoods of densely packed data </a:t>
+            </a:r>
+            <a:r>
+              <a:rPr lang="en-US" dirty="0" smtClean="0"/>
+              <a:t>points</a:t>
+            </a:r>
+          </a:p>
+          <a:p>
+            <a:r>
+              <a:rPr lang="en-US" dirty="0" smtClean="0"/>
+              <a:t>Don’t specify number of clusters, but need to specify </a:t>
+            </a:r>
+            <a:r>
+              <a:rPr lang="en-US" b="1" dirty="0" smtClean="0"/>
+              <a:t>epsilon (radius) </a:t>
+            </a:r>
+            <a:r>
+              <a:rPr lang="en-US" dirty="0" smtClean="0"/>
+              <a:t>and </a:t>
+            </a:r>
+            <a:r>
+              <a:rPr lang="en-US" b="1" dirty="0" smtClean="0"/>
+              <a:t>minimum points (number of neighbors to be a core point)</a:t>
+            </a:r>
           </a:p>
         </p:txBody>
       </p:sp>
@@ -2258,35 +2661,135 @@
           <a:p>
             <a:r>
               <a:rPr lang="en-US" dirty="0" smtClean="0"/>
-              <a:t>Bonus: Dimensionality Reduction</a:t>
+              <a:t>DBSCAN Example</a:t>
             </a:r>
             <a:endParaRPr lang="en-US" dirty="0"/>
           </a:p>
         </p:txBody>
       </p:sp>
-      <p:sp>
-        <p:nvSpPr>
-          <p:cNvPr id="3" name="Content Placeholder 2"/>
-          <p:cNvSpPr>
-            <a:spLocks noGrp="1"/>
-          </p:cNvSpPr>
-          <p:nvPr>
-            <p:ph idx="1"/>
-          </p:nvPr>
-        </p:nvSpPr>
-        <p:spPr/>
-        <p:txBody>
-          <a:bodyPr/>
-          <a:lstStyle/>
-          <a:p>
+      <p:pic>
+        <p:nvPicPr>
+          <p:cNvPr id="4" name="Picture 3"/>
+          <p:cNvPicPr>
+            <a:picLocks noChangeAspect="1"/>
+          </p:cNvPicPr>
+          <p:nvPr/>
+        </p:nvPicPr>
+        <p:blipFill>
+          <a:blip r:embed="rId2"/>
+          <a:stretch>
+            <a:fillRect/>
+          </a:stretch>
+        </p:blipFill>
+        <p:spPr>
+          <a:xfrm>
+            <a:off x="329784" y="1165856"/>
+            <a:ext cx="3259809" cy="3020672"/>
+          </a:xfrm>
+          <a:prstGeom prst="rect">
+            <a:avLst/>
+          </a:prstGeom>
+        </p:spPr>
+      </p:pic>
+      <p:sp>
+        <p:nvSpPr>
+          <p:cNvPr id="7" name="Right Arrow 6"/>
+          <p:cNvSpPr/>
+          <p:nvPr/>
+        </p:nvSpPr>
+        <p:spPr>
+          <a:xfrm>
+            <a:off x="3696829" y="2552648"/>
+            <a:ext cx="1670050" cy="247088"/>
+          </a:xfrm>
+          <a:prstGeom prst="rightArrow">
+            <a:avLst/>
+          </a:prstGeom>
+        </p:spPr>
+        <p:style>
+          <a:lnRef idx="2">
+            <a:schemeClr val="accent1">
+              <a:shade val="50000"/>
+            </a:schemeClr>
+          </a:lnRef>
+          <a:fillRef idx="1">
+            <a:schemeClr val="accent1"/>
+          </a:fillRef>
+          <a:effectRef idx="0">
+            <a:schemeClr val="accent1"/>
+          </a:effectRef>
+          <a:fontRef idx="minor">
+            <a:schemeClr val="lt1"/>
+          </a:fontRef>
+        </p:style>
+        <p:txBody>
+          <a:bodyPr rtlCol="0" anchor="ctr"/>
+          <a:lstStyle/>
+          <a:p>
+            <a:pPr algn="ctr"/>
             <a:endParaRPr lang="en-US"/>
+          </a:p>
+        </p:txBody>
+      </p:sp>
+      <p:pic>
+        <p:nvPicPr>
+          <p:cNvPr id="8" name="Picture 7"/>
+          <p:cNvPicPr>
+            <a:picLocks noChangeAspect="1"/>
+          </p:cNvPicPr>
+          <p:nvPr/>
+        </p:nvPicPr>
+        <p:blipFill rotWithShape="1">
+          <a:blip r:embed="rId3"/>
+          <a:srcRect l="2661" t="4219" r="5829" b="1896"/>
+          <a:stretch/>
+        </p:blipFill>
+        <p:spPr>
+          <a:xfrm>
+            <a:off x="5474116" y="1101748"/>
+            <a:ext cx="3489961" cy="3317852"/>
+          </a:xfrm>
+          <a:prstGeom prst="rect">
+            <a:avLst/>
+          </a:prstGeom>
+        </p:spPr>
+      </p:pic>
+      <p:sp>
+        <p:nvSpPr>
+          <p:cNvPr id="9" name="TextBox 8"/>
+          <p:cNvSpPr txBox="1"/>
+          <p:nvPr/>
+        </p:nvSpPr>
+        <p:spPr>
+          <a:xfrm>
+            <a:off x="640080" y="4419600"/>
+            <a:ext cx="5455920" cy="300082"/>
+          </a:xfrm>
+          <a:prstGeom prst="rect">
+            <a:avLst/>
+          </a:prstGeom>
+          <a:noFill/>
+        </p:spPr>
+        <p:txBody>
+          <a:bodyPr wrap="square" rtlCol="0">
+            <a:spAutoFit/>
+          </a:bodyPr>
+          <a:lstStyle/>
+          <a:p>
+            <a:r>
+              <a:rPr lang="en-US" i="1" dirty="0">
+                <a:hlinkClick r:id="rId4"/>
+              </a:rPr>
+              <a:t>http://www.sthda.com/english/wiki/wiki.php?id_contents=7940</a:t>
+            </a:r>
+            <a:endParaRPr lang="en-US" i="1" dirty="0"/>
           </a:p>
         </p:txBody>
       </p:sp>
     </p:spTree>
     <p:extLst>
       <p:ext uri="{BB962C8B-B14F-4D97-AF65-F5344CB8AC3E}">
-        <p14:creationId xmlns:p14="http://schemas.microsoft.com/office/powerpoint/2010/main" val="3530676003"/>
+        <p14:creationId xmlns:p14="http://schemas.microsoft.com/office/powerpoint/2010/main" val="885589397"/>
       </p:ext>
     </p:extLst>
   </p:cSld>
@@ -2330,7 +2833,7 @@
           <a:p>
             <a:r>
               <a:rPr lang="en-US" dirty="0" smtClean="0"/>
-              <a:t>Example from WFAA – Setup</a:t>
+              <a:t>Bonus: Dimensionality Reduction</a:t>
             </a:r>
             <a:endParaRPr lang="en-US" dirty="0"/>
           </a:p>
@@ -2351,14 +2854,14 @@
           <a:bodyPr/>
           <a:lstStyle/>
           <a:p>
-            <a:endParaRPr lang="en-US"/>
+            <a:endParaRPr lang="en-US" dirty="0"/>
           </a:p>
         </p:txBody>
       </p:sp>
     </p:spTree>
     <p:extLst>
       <p:ext uri="{BB962C8B-B14F-4D97-AF65-F5344CB8AC3E}">
-        <p14:creationId xmlns:p14="http://schemas.microsoft.com/office/powerpoint/2010/main" val="3684728735"/>
+        <p14:creationId xmlns:p14="http://schemas.microsoft.com/office/powerpoint/2010/main" val="3530676003"/>
       </p:ext>
     </p:extLst>
   </p:cSld>
@@ -2402,7 +2905,7 @@
           <a:p>
             <a:r>
               <a:rPr lang="en-US" dirty="0" smtClean="0"/>
-              <a:t>Example from WFAA – Data/Methods</a:t>
+              <a:t>Example from WFAA – Setup</a:t>
             </a:r>
             <a:endParaRPr lang="en-US" dirty="0"/>
           </a:p>
@@ -2423,14 +2926,14 @@
           <a:bodyPr/>
           <a:lstStyle/>
           <a:p>
-            <a:endParaRPr lang="en-US"/>
+            <a:endParaRPr lang="en-US" dirty="0"/>
           </a:p>
         </p:txBody>
       </p:sp>
     </p:spTree>
     <p:extLst>
       <p:ext uri="{BB962C8B-B14F-4D97-AF65-F5344CB8AC3E}">
-        <p14:creationId xmlns:p14="http://schemas.microsoft.com/office/powerpoint/2010/main" val="2105481535"/>
+        <p14:creationId xmlns:p14="http://schemas.microsoft.com/office/powerpoint/2010/main" val="3684728735"/>
       </p:ext>
     </p:extLst>
   </p:cSld>
@@ -2474,7 +2977,7 @@
           <a:p>
             <a:r>
               <a:rPr lang="en-US" dirty="0" smtClean="0"/>
-              <a:t>Example from WFAA – Results</a:t>
+              <a:t>Example from WFAA – Data/Methods</a:t>
             </a:r>
             <a:endParaRPr lang="en-US" dirty="0"/>
           </a:p>
@@ -2502,7 +3005,7 @@
     </p:spTree>
     <p:extLst>
       <p:ext uri="{BB962C8B-B14F-4D97-AF65-F5344CB8AC3E}">
-        <p14:creationId xmlns:p14="http://schemas.microsoft.com/office/powerpoint/2010/main" val="1263122911"/>
+        <p14:creationId xmlns:p14="http://schemas.microsoft.com/office/powerpoint/2010/main" val="2105481535"/>
       </p:ext>
     </p:extLst>
   </p:cSld>
@@ -2546,7 +3049,7 @@
           <a:p>
             <a:r>
               <a:rPr lang="en-US" dirty="0" smtClean="0"/>
-              <a:t>Example from WFAA – Implementation</a:t>
+              <a:t>Example from WFAA – Results</a:t>
             </a:r>
             <a:endParaRPr lang="en-US" dirty="0"/>
           </a:p>
@@ -2574,7 +3077,7 @@
     </p:spTree>
     <p:extLst>
       <p:ext uri="{BB962C8B-B14F-4D97-AF65-F5344CB8AC3E}">
-        <p14:creationId xmlns:p14="http://schemas.microsoft.com/office/powerpoint/2010/main" val="1621333358"/>
+        <p14:creationId xmlns:p14="http://schemas.microsoft.com/office/powerpoint/2010/main" val="1263122911"/>
       </p:ext>
     </p:extLst>
   </p:cSld>
@@ -2618,7 +3121,7 @@
           <a:p>
             <a:r>
               <a:rPr lang="en-US" dirty="0" smtClean="0"/>
-              <a:t>Large Donor Disruption</a:t>
+              <a:t>Example from WFAA – Implementation</a:t>
             </a:r>
             <a:endParaRPr lang="en-US" dirty="0"/>
           </a:p>
@@ -2646,7 +3149,7 @@
     </p:spTree>
     <p:extLst>
       <p:ext uri="{BB962C8B-B14F-4D97-AF65-F5344CB8AC3E}">
-        <p14:creationId xmlns:p14="http://schemas.microsoft.com/office/powerpoint/2010/main" val="1449896529"/>
+        <p14:creationId xmlns:p14="http://schemas.microsoft.com/office/powerpoint/2010/main" val="1621333358"/>
       </p:ext>
     </p:extLst>
   </p:cSld>
@@ -2718,7 +3221,7 @@
     </p:spTree>
     <p:extLst>
       <p:ext uri="{BB962C8B-B14F-4D97-AF65-F5344CB8AC3E}">
-        <p14:creationId xmlns:p14="http://schemas.microsoft.com/office/powerpoint/2010/main" val="3268452489"/>
+        <p14:creationId xmlns:p14="http://schemas.microsoft.com/office/powerpoint/2010/main" val="1449896529"/>
       </p:ext>
     </p:extLst>
   </p:cSld>
@@ -2790,7 +3293,7 @@
     </p:spTree>
     <p:extLst>
       <p:ext uri="{BB962C8B-B14F-4D97-AF65-F5344CB8AC3E}">
-        <p14:creationId xmlns:p14="http://schemas.microsoft.com/office/powerpoint/2010/main" val="3479376838"/>
+        <p14:creationId xmlns:p14="http://schemas.microsoft.com/office/powerpoint/2010/main" val="3268452489"/>
       </p:ext>
     </p:extLst>
   </p:cSld>
@@ -2834,7 +3337,7 @@
           <a:p>
             <a:r>
               <a:rPr lang="en-US" dirty="0" smtClean="0"/>
-              <a:t>Wrapping Up</a:t>
+              <a:t>Large Donor Disruption</a:t>
             </a:r>
             <a:endParaRPr lang="en-US" dirty="0"/>
           </a:p>
@@ -2862,7 +3365,7 @@
     </p:spTree>
     <p:extLst>
       <p:ext uri="{BB962C8B-B14F-4D97-AF65-F5344CB8AC3E}">
-        <p14:creationId xmlns:p14="http://schemas.microsoft.com/office/powerpoint/2010/main" val="2994578432"/>
+        <p14:creationId xmlns:p14="http://schemas.microsoft.com/office/powerpoint/2010/main" val="3479376838"/>
       </p:ext>
     </p:extLst>
   </p:cSld>
@@ -2941,11 +3444,7 @@
           <a:p>
             <a:r>
               <a:rPr lang="en-US" dirty="0" smtClean="0"/>
-              <a:t>Three Clustering Algorithms You Should </a:t>
-            </a:r>
-            <a:r>
-              <a:rPr lang="en-US" dirty="0" smtClean="0"/>
-              <a:t>Know</a:t>
+              <a:t>Three Clustering Algorithms You Should Know</a:t>
             </a:r>
           </a:p>
           <a:p>
@@ -2953,7 +3452,6 @@
               <a:rPr lang="en-US" dirty="0" smtClean="0"/>
               <a:t>Using Results from Unsupervised Learning</a:t>
             </a:r>
-            <a:endParaRPr lang="en-US" dirty="0" smtClean="0"/>
           </a:p>
           <a:p>
             <a:r>
@@ -3051,7 +3549,7 @@
     </p:spTree>
     <p:extLst>
       <p:ext uri="{BB962C8B-B14F-4D97-AF65-F5344CB8AC3E}">
-        <p14:creationId xmlns:p14="http://schemas.microsoft.com/office/powerpoint/2010/main" val="1749157500"/>
+        <p14:creationId xmlns:p14="http://schemas.microsoft.com/office/powerpoint/2010/main" val="2994578432"/>
       </p:ext>
     </p:extLst>
   </p:cSld>
@@ -3123,6 +3621,78 @@
     </p:spTree>
     <p:extLst>
       <p:ext uri="{BB962C8B-B14F-4D97-AF65-F5344CB8AC3E}">
+        <p14:creationId xmlns:p14="http://schemas.microsoft.com/office/powerpoint/2010/main" val="1749157500"/>
+      </p:ext>
+    </p:extLst>
+  </p:cSld>
+  <p:clrMapOvr>
+    <a:masterClrMapping/>
+  </p:clrMapOvr>
+</p:sld>
+</file>
+
+<file path=ppt/slides/slide22.xml><?xml version="1.0" encoding="utf-8"?>
+<p:sld xmlns:a="http://schemas.openxmlformats.org/drawingml/2006/main" xmlns:r="http://schemas.openxmlformats.org/officeDocument/2006/relationships" xmlns:p="http://schemas.openxmlformats.org/presentationml/2006/main">
+  <p:cSld>
+    <p:spTree>
+      <p:nvGrpSpPr>
+        <p:cNvPr id="1" name=""/>
+        <p:cNvGrpSpPr/>
+        <p:nvPr/>
+      </p:nvGrpSpPr>
+      <p:grpSpPr>
+        <a:xfrm>
+          <a:off x="0" y="0"/>
+          <a:ext cx="0" cy="0"/>
+          <a:chOff x="0" y="0"/>
+          <a:chExt cx="0" cy="0"/>
+        </a:xfrm>
+      </p:grpSpPr>
+      <p:sp>
+        <p:nvSpPr>
+          <p:cNvPr id="2" name="Title 1"/>
+          <p:cNvSpPr>
+            <a:spLocks noGrp="1"/>
+          </p:cNvSpPr>
+          <p:nvPr>
+            <p:ph type="title"/>
+          </p:nvPr>
+        </p:nvSpPr>
+        <p:spPr/>
+        <p:txBody>
+          <a:bodyPr/>
+          <a:lstStyle/>
+          <a:p>
+            <a:r>
+              <a:rPr lang="en-US" dirty="0" smtClean="0"/>
+              <a:t>Wrapping Up</a:t>
+            </a:r>
+            <a:endParaRPr lang="en-US" dirty="0"/>
+          </a:p>
+        </p:txBody>
+      </p:sp>
+      <p:sp>
+        <p:nvSpPr>
+          <p:cNvPr id="3" name="Content Placeholder 2"/>
+          <p:cNvSpPr>
+            <a:spLocks noGrp="1"/>
+          </p:cNvSpPr>
+          <p:nvPr>
+            <p:ph idx="1"/>
+          </p:nvPr>
+        </p:nvSpPr>
+        <p:spPr/>
+        <p:txBody>
+          <a:bodyPr/>
+          <a:lstStyle/>
+          <a:p>
+            <a:endParaRPr lang="en-US"/>
+          </a:p>
+        </p:txBody>
+      </p:sp>
+    </p:spTree>
+    <p:extLst>
+      <p:ext uri="{BB962C8B-B14F-4D97-AF65-F5344CB8AC3E}">
         <p14:creationId xmlns:p14="http://schemas.microsoft.com/office/powerpoint/2010/main" val="557220253"/>
       </p:ext>
     </p:extLst>
@@ -3133,7 +3703,131 @@
 </p:sld>
 </file>
 
-<file path=ppt/slides/slide22.xml><?xml version="1.0" encoding="utf-8"?>
+<file path=ppt/slides/slide23.xml><?xml version="1.0" encoding="utf-8"?>
+<p:sld xmlns:a="http://schemas.openxmlformats.org/drawingml/2006/main" xmlns:r="http://schemas.openxmlformats.org/officeDocument/2006/relationships" xmlns:p="http://schemas.openxmlformats.org/presentationml/2006/main">
+  <p:cSld>
+    <p:spTree>
+      <p:nvGrpSpPr>
+        <p:cNvPr id="1" name=""/>
+        <p:cNvGrpSpPr/>
+        <p:nvPr/>
+      </p:nvGrpSpPr>
+      <p:grpSpPr>
+        <a:xfrm>
+          <a:off x="0" y="0"/>
+          <a:ext cx="0" cy="0"/>
+          <a:chOff x="0" y="0"/>
+          <a:chExt cx="0" cy="0"/>
+        </a:xfrm>
+      </p:grpSpPr>
+      <p:sp>
+        <p:nvSpPr>
+          <p:cNvPr id="2" name="Title 1"/>
+          <p:cNvSpPr>
+            <a:spLocks noGrp="1"/>
+          </p:cNvSpPr>
+          <p:nvPr>
+            <p:ph type="title"/>
+          </p:nvPr>
+        </p:nvSpPr>
+        <p:spPr/>
+        <p:txBody>
+          <a:bodyPr>
+            <a:normAutofit/>
+          </a:bodyPr>
+          <a:lstStyle/>
+          <a:p>
+            <a:pPr algn="ctr"/>
+            <a:r>
+              <a:rPr lang="en-US" sz="4400" dirty="0" smtClean="0"/>
+              <a:t>Questions</a:t>
+            </a:r>
+            <a:r>
+              <a:rPr lang="en-US" sz="3600" dirty="0" smtClean="0"/>
+              <a:t>?</a:t>
+            </a:r>
+            <a:endParaRPr lang="en-US" sz="3600" dirty="0"/>
+          </a:p>
+        </p:txBody>
+      </p:sp>
+      <p:sp>
+        <p:nvSpPr>
+          <p:cNvPr id="3" name="Content Placeholder 2"/>
+          <p:cNvSpPr>
+            <a:spLocks noGrp="1"/>
+          </p:cNvSpPr>
+          <p:nvPr>
+            <p:ph idx="1"/>
+          </p:nvPr>
+        </p:nvSpPr>
+        <p:spPr/>
+        <p:txBody>
+          <a:bodyPr anchor="ctr"/>
+          <a:lstStyle/>
+          <a:p>
+            <a:pPr marL="0" indent="0" algn="ctr">
+              <a:buNone/>
+            </a:pPr>
+            <a:r>
+              <a:rPr lang="en-US" sz="2800" dirty="0"/>
+              <a:t>Brad Stieber</a:t>
+            </a:r>
+            <a:r>
+              <a:rPr lang="en-US" dirty="0"/>
+              <a:t/>
+            </a:r>
+            <a:br>
+              <a:rPr lang="en-US" dirty="0"/>
+            </a:br>
+            <a:r>
+              <a:rPr lang="en-US" dirty="0"/>
+              <a:t>Data Analyst, Wisconsin Foundation and Alumni Association</a:t>
+            </a:r>
+            <a:br>
+              <a:rPr lang="en-US" dirty="0"/>
+            </a:br>
+            <a:r>
+              <a:rPr lang="en-US" u="sng" dirty="0"/>
+              <a:t>Brad.Stieber@supportuw.org</a:t>
+            </a:r>
+            <a:r>
+              <a:rPr lang="en-US" dirty="0"/>
+              <a:t> </a:t>
+            </a:r>
+            <a:r>
+              <a:rPr lang="en-US" sz="2800" dirty="0"/>
+              <a:t>|</a:t>
+            </a:r>
+            <a:r>
+              <a:rPr lang="en-US" dirty="0"/>
+              <a:t> </a:t>
+            </a:r>
+            <a:r>
+              <a:rPr lang="en-US" u="sng" dirty="0"/>
+              <a:t>bgstieber.github.io</a:t>
+            </a:r>
+            <a:endParaRPr lang="en-US" dirty="0"/>
+          </a:p>
+          <a:p>
+            <a:pPr algn="ctr"/>
+            <a:endParaRPr lang="en-US" dirty="0"/>
+          </a:p>
+        </p:txBody>
+      </p:sp>
+    </p:spTree>
+    <p:extLst>
+      <p:ext uri="{BB962C8B-B14F-4D97-AF65-F5344CB8AC3E}">
+        <p14:creationId xmlns:p14="http://schemas.microsoft.com/office/powerpoint/2010/main" val="4087647575"/>
+      </p:ext>
+    </p:extLst>
+  </p:cSld>
+  <p:clrMapOvr>
+    <a:masterClrMapping/>
+  </p:clrMapOvr>
+</p:sld>
+</file>
+
+<file path=ppt/slides/slide24.xml><?xml version="1.0" encoding="utf-8"?>
 <p:sld xmlns:a="http://schemas.openxmlformats.org/drawingml/2006/main" xmlns:r="http://schemas.openxmlformats.org/officeDocument/2006/relationships" xmlns:p="http://schemas.openxmlformats.org/presentationml/2006/main">
   <p:cSld>
     <p:spTree>
@@ -3267,7 +3961,7 @@
           <a:p>
             <a:r>
               <a:rPr lang="en-US" dirty="0" smtClean="0"/>
-              <a:t>Who Am I</a:t>
+              <a:t>About Me</a:t>
             </a:r>
             <a:endParaRPr lang="en-US" dirty="0"/>
           </a:p>
@@ -3288,7 +3982,293 @@
           <a:bodyPr/>
           <a:lstStyle/>
           <a:p>
-            <a:endParaRPr lang="en-US" dirty="0"/>
+            <a:r>
+              <a:rPr lang="en-US" dirty="0" smtClean="0"/>
+              <a:t>Data Scientist with experience in non-profit and private finance</a:t>
+            </a:r>
+          </a:p>
+          <a:p>
+            <a:r>
+              <a:rPr lang="en-US" dirty="0" smtClean="0"/>
+              <a:t>Passionate about communicating quantitative information effectively</a:t>
+            </a:r>
+          </a:p>
+          <a:p>
+            <a:r>
+              <a:rPr lang="en-US" dirty="0" smtClean="0"/>
+              <a:t>Main tools are R, SQL, and Tableau</a:t>
+            </a:r>
+            <a:endParaRPr lang="en-US" dirty="0" smtClean="0"/>
+          </a:p>
+          <a:p>
+            <a:r>
+              <a:rPr lang="en-US" dirty="0" smtClean="0"/>
+              <a:t>Frequently quote Box, Tukey, and Wickham</a:t>
+            </a:r>
+          </a:p>
+        </p:txBody>
+      </p:sp>
+      <p:sp>
+        <p:nvSpPr>
+          <p:cNvPr id="6" name="TextBox 5"/>
+          <p:cNvSpPr txBox="1"/>
+          <p:nvPr/>
+        </p:nvSpPr>
+        <p:spPr>
+          <a:xfrm>
+            <a:off x="6584538" y="2918285"/>
+            <a:ext cx="2131081" cy="1938992"/>
+          </a:xfrm>
+          <a:prstGeom prst="rect">
+            <a:avLst/>
+          </a:prstGeom>
+          <a:solidFill>
+            <a:schemeClr val="tx1">
+              <a:lumMod val="50000"/>
+              <a:lumOff val="50000"/>
+            </a:schemeClr>
+          </a:solidFill>
+          <a:ln>
+            <a:solidFill>
+              <a:schemeClr val="tx1"/>
+            </a:solidFill>
+          </a:ln>
+        </p:spPr>
+        <p:style>
+          <a:lnRef idx="3">
+            <a:schemeClr val="lt1"/>
+          </a:lnRef>
+          <a:fillRef idx="1">
+            <a:schemeClr val="accent3"/>
+          </a:fillRef>
+          <a:effectRef idx="1">
+            <a:schemeClr val="accent3"/>
+          </a:effectRef>
+          <a:fontRef idx="minor">
+            <a:schemeClr val="lt1"/>
+          </a:fontRef>
+        </p:style>
+        <p:txBody>
+          <a:bodyPr wrap="square" rtlCol="0">
+            <a:spAutoFit/>
+          </a:bodyPr>
+          <a:lstStyle/>
+          <a:p>
+            <a:pPr algn="ctr"/>
+            <a:r>
+              <a:rPr lang="en-US" sz="2000" dirty="0">
+                <a:latin typeface="Segoe Condensed" panose="020B0606040200020203" pitchFamily="34" charset="0"/>
+              </a:rPr>
+              <a:t>Tidy datasets are all alike, but every messy dataset is messy in its own way</a:t>
+            </a:r>
+            <a:r>
+              <a:rPr lang="en-US" sz="2000" dirty="0" smtClean="0">
+                <a:latin typeface="Segoe Condensed" panose="020B0606040200020203" pitchFamily="34" charset="0"/>
+              </a:rPr>
+              <a:t>.</a:t>
+            </a:r>
+          </a:p>
+          <a:p>
+            <a:pPr algn="ctr"/>
+            <a:endParaRPr lang="en-US" sz="2000" dirty="0">
+              <a:latin typeface="Segoe Condensed" panose="020B0606040200020203" pitchFamily="34" charset="0"/>
+            </a:endParaRPr>
+          </a:p>
+          <a:p>
+            <a:pPr algn="ctr"/>
+            <a:r>
+              <a:rPr lang="en-US" sz="1600" dirty="0" smtClean="0">
+                <a:solidFill>
+                  <a:schemeClr val="bg1">
+                    <a:lumMod val="95000"/>
+                  </a:schemeClr>
+                </a:solidFill>
+                <a:latin typeface="Segoe Condensed" panose="020B0606040200020203" pitchFamily="34" charset="0"/>
+              </a:rPr>
+              <a:t>Hadley Wickham</a:t>
+            </a:r>
+            <a:endParaRPr lang="en-US" sz="1800" dirty="0">
+              <a:solidFill>
+                <a:schemeClr val="bg1">
+                  <a:lumMod val="95000"/>
+                </a:schemeClr>
+              </a:solidFill>
+              <a:latin typeface="Segoe Condensed" panose="020B0606040200020203" pitchFamily="34" charset="0"/>
+            </a:endParaRPr>
+          </a:p>
+        </p:txBody>
+      </p:sp>
+      <p:sp>
+        <p:nvSpPr>
+          <p:cNvPr id="7" name="TextBox 6"/>
+          <p:cNvSpPr txBox="1"/>
+          <p:nvPr/>
+        </p:nvSpPr>
+        <p:spPr>
+          <a:xfrm>
+            <a:off x="596346" y="2918285"/>
+            <a:ext cx="2131081" cy="1938528"/>
+          </a:xfrm>
+          <a:prstGeom prst="rect">
+            <a:avLst/>
+          </a:prstGeom>
+          <a:solidFill>
+            <a:schemeClr val="tx1">
+              <a:lumMod val="50000"/>
+              <a:lumOff val="50000"/>
+            </a:schemeClr>
+          </a:solidFill>
+          <a:ln>
+            <a:solidFill>
+              <a:schemeClr val="tx1"/>
+            </a:solidFill>
+          </a:ln>
+        </p:spPr>
+        <p:style>
+          <a:lnRef idx="3">
+            <a:schemeClr val="lt1"/>
+          </a:lnRef>
+          <a:fillRef idx="1">
+            <a:schemeClr val="accent3"/>
+          </a:fillRef>
+          <a:effectRef idx="1">
+            <a:schemeClr val="accent3"/>
+          </a:effectRef>
+          <a:fontRef idx="minor">
+            <a:schemeClr val="lt1"/>
+          </a:fontRef>
+        </p:style>
+        <p:txBody>
+          <a:bodyPr wrap="square" rtlCol="0">
+            <a:spAutoFit/>
+          </a:bodyPr>
+          <a:lstStyle/>
+          <a:p>
+            <a:pPr algn="ctr"/>
+            <a:r>
+              <a:rPr lang="en-US" sz="2000" dirty="0" smtClean="0">
+                <a:latin typeface="Segoe Condensed" panose="020B0606040200020203" pitchFamily="34" charset="0"/>
+              </a:rPr>
+              <a:t>All models are wrong, but some are useful.</a:t>
+            </a:r>
+          </a:p>
+          <a:p>
+            <a:pPr algn="ctr"/>
+            <a:endParaRPr lang="en-US" sz="2000" dirty="0" smtClean="0">
+              <a:latin typeface="Segoe Condensed" panose="020B0606040200020203" pitchFamily="34" charset="0"/>
+            </a:endParaRPr>
+          </a:p>
+          <a:p>
+            <a:pPr algn="ctr"/>
+            <a:endParaRPr lang="en-US" sz="2000" dirty="0">
+              <a:latin typeface="Segoe Condensed" panose="020B0606040200020203" pitchFamily="34" charset="0"/>
+            </a:endParaRPr>
+          </a:p>
+          <a:p>
+            <a:pPr algn="ctr"/>
+            <a:r>
+              <a:rPr lang="en-US" sz="1600" dirty="0" smtClean="0">
+                <a:solidFill>
+                  <a:schemeClr val="bg1">
+                    <a:lumMod val="95000"/>
+                  </a:schemeClr>
+                </a:solidFill>
+                <a:latin typeface="Segoe Condensed" panose="020B0606040200020203" pitchFamily="34" charset="0"/>
+              </a:rPr>
+              <a:t>George Box</a:t>
+            </a:r>
+            <a:endParaRPr lang="en-US" sz="1800" dirty="0">
+              <a:solidFill>
+                <a:schemeClr val="bg1">
+                  <a:lumMod val="95000"/>
+                </a:schemeClr>
+              </a:solidFill>
+              <a:latin typeface="Segoe Condensed" panose="020B0606040200020203" pitchFamily="34" charset="0"/>
+            </a:endParaRPr>
+          </a:p>
+        </p:txBody>
+      </p:sp>
+      <p:sp>
+        <p:nvSpPr>
+          <p:cNvPr id="8" name="TextBox 7"/>
+          <p:cNvSpPr txBox="1"/>
+          <p:nvPr/>
+        </p:nvSpPr>
+        <p:spPr>
+          <a:xfrm>
+            <a:off x="3503964" y="2918285"/>
+            <a:ext cx="2304037" cy="1938528"/>
+          </a:xfrm>
+          <a:prstGeom prst="rect">
+            <a:avLst/>
+          </a:prstGeom>
+          <a:solidFill>
+            <a:schemeClr val="tx1">
+              <a:lumMod val="50000"/>
+              <a:lumOff val="50000"/>
+            </a:schemeClr>
+          </a:solidFill>
+          <a:ln>
+            <a:solidFill>
+              <a:schemeClr val="tx1"/>
+            </a:solidFill>
+          </a:ln>
+        </p:spPr>
+        <p:style>
+          <a:lnRef idx="3">
+            <a:schemeClr val="lt1"/>
+          </a:lnRef>
+          <a:fillRef idx="1">
+            <a:schemeClr val="accent3"/>
+          </a:fillRef>
+          <a:effectRef idx="1">
+            <a:schemeClr val="accent3"/>
+          </a:effectRef>
+          <a:fontRef idx="minor">
+            <a:schemeClr val="lt1"/>
+          </a:fontRef>
+        </p:style>
+        <p:txBody>
+          <a:bodyPr wrap="square" rtlCol="0">
+            <a:spAutoFit/>
+          </a:bodyPr>
+          <a:lstStyle/>
+          <a:p>
+            <a:pPr algn="ctr"/>
+            <a:r>
+              <a:rPr lang="en-US" sz="2000" dirty="0" smtClean="0">
+                <a:latin typeface="Segoe Condensed" panose="020B0606040200020203" pitchFamily="34" charset="0"/>
+              </a:rPr>
+              <a:t>The best thing about being a statistician is that you get to play in everyone’s backyard.</a:t>
+            </a:r>
+          </a:p>
+          <a:p>
+            <a:pPr algn="ctr"/>
+            <a:endParaRPr lang="en-US" sz="2000" dirty="0">
+              <a:latin typeface="Segoe Condensed" panose="020B0606040200020203" pitchFamily="34" charset="0"/>
+            </a:endParaRPr>
+          </a:p>
+          <a:p>
+            <a:pPr algn="ctr"/>
+            <a:r>
+              <a:rPr lang="en-US" sz="1600" dirty="0" smtClean="0">
+                <a:solidFill>
+                  <a:schemeClr val="bg1">
+                    <a:lumMod val="95000"/>
+                  </a:schemeClr>
+                </a:solidFill>
+                <a:latin typeface="Segoe Condensed" panose="020B0606040200020203" pitchFamily="34" charset="0"/>
+              </a:rPr>
+              <a:t>John Tukey</a:t>
+            </a:r>
+            <a:endParaRPr lang="en-US" sz="1800" dirty="0">
+              <a:solidFill>
+                <a:schemeClr val="bg1">
+                  <a:lumMod val="95000"/>
+                </a:schemeClr>
+              </a:solidFill>
+              <a:latin typeface="Segoe Condensed" panose="020B0606040200020203" pitchFamily="34" charset="0"/>
+            </a:endParaRPr>
           </a:p>
         </p:txBody>
       </p:sp>
@@ -3339,7 +4319,7 @@
           <a:p>
             <a:r>
               <a:rPr lang="en-US" dirty="0" smtClean="0"/>
-              <a:t>What do I do</a:t>
+              <a:t>About WFAA</a:t>
             </a:r>
             <a:endParaRPr lang="en-US" dirty="0"/>
           </a:p>
@@ -3360,6 +4340,31 @@
           <a:bodyPr/>
           <a:lstStyle/>
           <a:p>
+            <a:r>
+              <a:rPr lang="en-US" dirty="0" smtClean="0"/>
+              <a:t>Official </a:t>
+            </a:r>
+            <a:r>
+              <a:rPr lang="en-US" dirty="0"/>
+              <a:t>fundraising and gift-receiving organization for the </a:t>
+            </a:r>
+            <a:r>
+              <a:rPr lang="en-US" dirty="0" smtClean="0"/>
+              <a:t>UW–Madison</a:t>
+            </a:r>
+            <a:endParaRPr lang="en-US" dirty="0"/>
+          </a:p>
+          <a:p>
+            <a:r>
+              <a:rPr lang="en-US" dirty="0" smtClean="0"/>
+              <a:t>In the midst of a $3.2B campaign, ending in 2020</a:t>
+            </a:r>
+          </a:p>
+          <a:p>
+            <a:r>
+              <a:rPr lang="en-US" dirty="0" smtClean="0"/>
+              <a:t>Staff of 300, 70 development officers, 13 in Data Solutions Team (DW, BI, DA), 13 in Research</a:t>
+            </a:r>
             <a:endParaRPr lang="en-US" dirty="0"/>
           </a:p>
         </p:txBody>
@@ -3375,7 +4380,7 @@
           </p:nvPr>
         </p:nvPicPr>
         <p:blipFill>
-          <a:blip r:embed="rId2"/>
+          <a:blip r:embed="rId3"/>
           <a:stretch>
             <a:fillRect/>
           </a:stretch>
@@ -3399,7 +4404,7 @@
           <p:nvPr/>
         </p:nvPicPr>
         <p:blipFill>
-          <a:blip r:embed="rId3"/>
+          <a:blip r:embed="rId4"/>
           <a:stretch>
             <a:fillRect/>
           </a:stretch>
@@ -3630,8 +4635,9 @@
           <a:p>
             <a:r>
               <a:rPr lang="en-US" dirty="0" smtClean="0"/>
-              <a:t>K means</a:t>
-            </a:r>
+              <a:t>K-Means</a:t>
+            </a:r>
+            <a:endParaRPr lang="en-US" dirty="0" smtClean="0"/>
           </a:p>
           <a:p>
             <a:r>
@@ -3704,7 +4710,7 @@
           <a:p>
             <a:r>
               <a:rPr lang="en-US" dirty="0" smtClean="0"/>
-              <a:t>K Means</a:t>
+              <a:t>K-Means</a:t>
             </a:r>
             <a:endParaRPr lang="en-US" dirty="0"/>
           </a:p>
@@ -3733,8 +4739,23 @@
           <a:p>
             <a:r>
               <a:rPr lang="en-US" dirty="0" smtClean="0"/>
-              <a:t>Simple, yet effective</a:t>
-            </a:r>
+              <a:t>Simple, yet </a:t>
+            </a:r>
+            <a:r>
+              <a:rPr lang="en-US" dirty="0" smtClean="0"/>
+              <a:t>effective</a:t>
+            </a:r>
+          </a:p>
+          <a:p>
+            <a:r>
+              <a:rPr lang="en-US" dirty="0" smtClean="0"/>
+              <a:t>Need to specify number of clusters, many methods for determining optimal number of clusters, but depends </a:t>
+            </a:r>
+            <a:r>
+              <a:rPr lang="en-US" smtClean="0"/>
+              <a:t>on context</a:t>
+            </a:r>
+            <a:endParaRPr lang="en-US" dirty="0" smtClean="0"/>
           </a:p>
         </p:txBody>
       </p:sp>

</xml_diff>

<commit_message>
more pres tweaks, vis
</commit_message>
<xml_diff>
--- a/Generating Insights from Clustering Large Donors - BStieber APRA DAS19.pptx
+++ b/Generating Insights from Clustering Large Donors - BStieber APRA DAS19.pptx
@@ -5,7 +5,7 @@
     <p:sldMasterId id="2147483660" r:id="rId1"/>
   </p:sldMasterIdLst>
   <p:notesMasterIdLst>
-    <p:notesMasterId r:id="rId26"/>
+    <p:notesMasterId r:id="rId27"/>
   </p:notesMasterIdLst>
   <p:sldIdLst>
     <p:sldId id="258" r:id="rId2"/>
@@ -16,22 +16,23 @@
     <p:sldId id="265" r:id="rId7"/>
     <p:sldId id="266" r:id="rId8"/>
     <p:sldId id="267" r:id="rId9"/>
-    <p:sldId id="280" r:id="rId10"/>
-    <p:sldId id="268" r:id="rId11"/>
-    <p:sldId id="283" r:id="rId12"/>
-    <p:sldId id="281" r:id="rId13"/>
-    <p:sldId id="271" r:id="rId14"/>
-    <p:sldId id="273" r:id="rId15"/>
-    <p:sldId id="272" r:id="rId16"/>
-    <p:sldId id="270" r:id="rId17"/>
-    <p:sldId id="274" r:id="rId18"/>
-    <p:sldId id="275" r:id="rId19"/>
-    <p:sldId id="276" r:id="rId20"/>
-    <p:sldId id="277" r:id="rId21"/>
-    <p:sldId id="278" r:id="rId22"/>
-    <p:sldId id="279" r:id="rId23"/>
-    <p:sldId id="282" r:id="rId24"/>
-    <p:sldId id="259" r:id="rId25"/>
+    <p:sldId id="284" r:id="rId10"/>
+    <p:sldId id="280" r:id="rId11"/>
+    <p:sldId id="268" r:id="rId12"/>
+    <p:sldId id="283" r:id="rId13"/>
+    <p:sldId id="281" r:id="rId14"/>
+    <p:sldId id="271" r:id="rId15"/>
+    <p:sldId id="273" r:id="rId16"/>
+    <p:sldId id="272" r:id="rId17"/>
+    <p:sldId id="270" r:id="rId18"/>
+    <p:sldId id="274" r:id="rId19"/>
+    <p:sldId id="275" r:id="rId20"/>
+    <p:sldId id="276" r:id="rId21"/>
+    <p:sldId id="277" r:id="rId22"/>
+    <p:sldId id="278" r:id="rId23"/>
+    <p:sldId id="279" r:id="rId24"/>
+    <p:sldId id="282" r:id="rId25"/>
+    <p:sldId id="259" r:id="rId26"/>
   </p:sldIdLst>
   <p:sldSz cx="9144000" cy="5143500" type="screen16x9"/>
   <p:notesSz cx="6858000" cy="9144000"/>
@@ -639,9 +640,15 @@
           <a:p>
             <a:r>
               <a:rPr lang="en-US" baseline="0" dirty="0" smtClean="0"/>
-              <a:t>How we’ve used it at WFAA to cluster our large donors, and why that group is so important</a:t>
-            </a:r>
-            <a:endParaRPr lang="en-US" dirty="0"/>
+              <a:t>How we’ve used it at WFAA to cluster our large donors, and why that group is so </a:t>
+            </a:r>
+            <a:r>
+              <a:rPr lang="en-US" baseline="0" dirty="0" smtClean="0"/>
+              <a:t>important</a:t>
+            </a:r>
+          </a:p>
+          <a:p>
+            <a:endParaRPr lang="en-US" baseline="0" dirty="0" smtClean="0"/>
           </a:p>
         </p:txBody>
       </p:sp>
@@ -893,14 +900,6 @@
           <a:bodyPr/>
           <a:lstStyle/>
           <a:p>
-            <a:r>
-              <a:rPr lang="en-US" dirty="0" smtClean="0"/>
-              <a:t>DBSCAN-Density-based</a:t>
-            </a:r>
-            <a:r>
-              <a:rPr lang="en-US" baseline="0" dirty="0" smtClean="0"/>
-              <a:t> spatial clustering of applications with noise</a:t>
-            </a:r>
             <a:endParaRPr lang="en-US" dirty="0"/>
           </a:p>
         </p:txBody>
@@ -922,7 +921,7 @@
           <a:p>
             <a:fld id="{340F17E4-2B4D-4428-9E25-E07F235B5058}" type="slidenum">
               <a:rPr lang="en-US" smtClean="0"/>
-              <a:t>7</a:t>
+              <a:t>5</a:t>
             </a:fld>
             <a:endParaRPr lang="en-US"/>
           </a:p>
@@ -931,7 +930,7 @@
     </p:spTree>
     <p:extLst>
       <p:ext uri="{BB962C8B-B14F-4D97-AF65-F5344CB8AC3E}">
-        <p14:creationId xmlns:p14="http://schemas.microsoft.com/office/powerpoint/2010/main" val="3542213727"/>
+        <p14:creationId xmlns:p14="http://schemas.microsoft.com/office/powerpoint/2010/main" val="2490292923"/>
       </p:ext>
     </p:extLst>
   </p:cSld>
@@ -985,23 +984,6 @@
           <a:bodyPr/>
           <a:lstStyle/>
           <a:p>
-            <a:pPr marL="0" marR="0" lvl="0" indent="0" algn="l" defTabSz="914400" rtl="0" eaLnBrk="1" fontAlgn="auto" latinLnBrk="0" hangingPunct="1">
-              <a:lnSpc>
-                <a:spcPct val="100000"/>
-              </a:lnSpc>
-              <a:spcBef>
-                <a:spcPts val="0"/>
-              </a:spcBef>
-              <a:spcAft>
-                <a:spcPts val="0"/>
-              </a:spcAft>
-              <a:buClrTx/>
-              <a:buSzTx/>
-              <a:buFontTx/>
-              <a:buNone/>
-              <a:tabLst/>
-              <a:defRPr/>
-            </a:pPr>
             <a:r>
               <a:rPr lang="en-US" dirty="0" smtClean="0"/>
               <a:t>DBSCAN-Density-based</a:t>
@@ -1010,9 +992,6 @@
               <a:rPr lang="en-US" baseline="0" dirty="0" smtClean="0"/>
               <a:t> spatial clustering of applications with noise</a:t>
             </a:r>
-            <a:endParaRPr lang="en-US" dirty="0" smtClean="0"/>
-          </a:p>
-          <a:p>
             <a:endParaRPr lang="en-US" dirty="0"/>
           </a:p>
         </p:txBody>
@@ -1034,7 +1013,7 @@
           <a:p>
             <a:fld id="{340F17E4-2B4D-4428-9E25-E07F235B5058}" type="slidenum">
               <a:rPr lang="en-US" smtClean="0"/>
-              <a:t>10</a:t>
+              <a:t>7</a:t>
             </a:fld>
             <a:endParaRPr lang="en-US"/>
           </a:p>
@@ -1043,7 +1022,7 @@
     </p:spTree>
     <p:extLst>
       <p:ext uri="{BB962C8B-B14F-4D97-AF65-F5344CB8AC3E}">
-        <p14:creationId xmlns:p14="http://schemas.microsoft.com/office/powerpoint/2010/main" val="710510024"/>
+        <p14:creationId xmlns:p14="http://schemas.microsoft.com/office/powerpoint/2010/main" val="3542213727"/>
       </p:ext>
     </p:extLst>
   </p:cSld>
@@ -1118,7 +1097,203 @@
           <a:p>
             <a:fld id="{340F17E4-2B4D-4428-9E25-E07F235B5058}" type="slidenum">
               <a:rPr lang="en-US" smtClean="0"/>
-              <a:t>23</a:t>
+              <a:t>8</a:t>
+            </a:fld>
+            <a:endParaRPr lang="en-US"/>
+          </a:p>
+        </p:txBody>
+      </p:sp>
+    </p:spTree>
+    <p:extLst>
+      <p:ext uri="{BB962C8B-B14F-4D97-AF65-F5344CB8AC3E}">
+        <p14:creationId xmlns:p14="http://schemas.microsoft.com/office/powerpoint/2010/main" val="2124194029"/>
+      </p:ext>
+    </p:extLst>
+  </p:cSld>
+  <p:clrMapOvr>
+    <a:masterClrMapping/>
+  </p:clrMapOvr>
+</p:notes>
+</file>
+
+<file path=ppt/notesSlides/notesSlide8.xml><?xml version="1.0" encoding="utf-8"?>
+<p:notes xmlns:a="http://schemas.openxmlformats.org/drawingml/2006/main" xmlns:r="http://schemas.openxmlformats.org/officeDocument/2006/relationships" xmlns:p="http://schemas.openxmlformats.org/presentationml/2006/main">
+  <p:cSld>
+    <p:spTree>
+      <p:nvGrpSpPr>
+        <p:cNvPr id="1" name=""/>
+        <p:cNvGrpSpPr/>
+        <p:nvPr/>
+      </p:nvGrpSpPr>
+      <p:grpSpPr>
+        <a:xfrm>
+          <a:off x="0" y="0"/>
+          <a:ext cx="0" cy="0"/>
+          <a:chOff x="0" y="0"/>
+          <a:chExt cx="0" cy="0"/>
+        </a:xfrm>
+      </p:grpSpPr>
+      <p:sp>
+        <p:nvSpPr>
+          <p:cNvPr id="2" name="Slide Image Placeholder 1"/>
+          <p:cNvSpPr>
+            <a:spLocks noGrp="1" noRot="1" noChangeAspect="1"/>
+          </p:cNvSpPr>
+          <p:nvPr>
+            <p:ph type="sldImg"/>
+          </p:nvPr>
+        </p:nvSpPr>
+        <p:spPr/>
+      </p:sp>
+      <p:sp>
+        <p:nvSpPr>
+          <p:cNvPr id="3" name="Notes Placeholder 2"/>
+          <p:cNvSpPr>
+            <a:spLocks noGrp="1"/>
+          </p:cNvSpPr>
+          <p:nvPr>
+            <p:ph type="body" idx="1"/>
+          </p:nvPr>
+        </p:nvSpPr>
+        <p:spPr/>
+        <p:txBody>
+          <a:bodyPr/>
+          <a:lstStyle/>
+          <a:p>
+            <a:pPr marL="0" marR="0" lvl="0" indent="0" algn="l" defTabSz="914400" rtl="0" eaLnBrk="1" fontAlgn="auto" latinLnBrk="0" hangingPunct="1">
+              <a:lnSpc>
+                <a:spcPct val="100000"/>
+              </a:lnSpc>
+              <a:spcBef>
+                <a:spcPts val="0"/>
+              </a:spcBef>
+              <a:spcAft>
+                <a:spcPts val="0"/>
+              </a:spcAft>
+              <a:buClrTx/>
+              <a:buSzTx/>
+              <a:buFontTx/>
+              <a:buNone/>
+              <a:tabLst/>
+              <a:defRPr/>
+            </a:pPr>
+            <a:r>
+              <a:rPr lang="en-US" dirty="0" smtClean="0"/>
+              <a:t>DBSCAN-Density-based</a:t>
+            </a:r>
+            <a:r>
+              <a:rPr lang="en-US" baseline="0" dirty="0" smtClean="0"/>
+              <a:t> spatial clustering of applications with noise</a:t>
+            </a:r>
+            <a:endParaRPr lang="en-US" dirty="0" smtClean="0"/>
+          </a:p>
+          <a:p>
+            <a:endParaRPr lang="en-US" dirty="0"/>
+          </a:p>
+        </p:txBody>
+      </p:sp>
+      <p:sp>
+        <p:nvSpPr>
+          <p:cNvPr id="4" name="Slide Number Placeholder 3"/>
+          <p:cNvSpPr>
+            <a:spLocks noGrp="1"/>
+          </p:cNvSpPr>
+          <p:nvPr>
+            <p:ph type="sldNum" sz="quarter" idx="10"/>
+          </p:nvPr>
+        </p:nvSpPr>
+        <p:spPr/>
+        <p:txBody>
+          <a:bodyPr/>
+          <a:lstStyle/>
+          <a:p>
+            <a:fld id="{340F17E4-2B4D-4428-9E25-E07F235B5058}" type="slidenum">
+              <a:rPr lang="en-US" smtClean="0"/>
+              <a:t>11</a:t>
+            </a:fld>
+            <a:endParaRPr lang="en-US"/>
+          </a:p>
+        </p:txBody>
+      </p:sp>
+    </p:spTree>
+    <p:extLst>
+      <p:ext uri="{BB962C8B-B14F-4D97-AF65-F5344CB8AC3E}">
+        <p14:creationId xmlns:p14="http://schemas.microsoft.com/office/powerpoint/2010/main" val="710510024"/>
+      </p:ext>
+    </p:extLst>
+  </p:cSld>
+  <p:clrMapOvr>
+    <a:masterClrMapping/>
+  </p:clrMapOvr>
+</p:notes>
+</file>
+
+<file path=ppt/notesSlides/notesSlide9.xml><?xml version="1.0" encoding="utf-8"?>
+<p:notes xmlns:a="http://schemas.openxmlformats.org/drawingml/2006/main" xmlns:r="http://schemas.openxmlformats.org/officeDocument/2006/relationships" xmlns:p="http://schemas.openxmlformats.org/presentationml/2006/main">
+  <p:cSld>
+    <p:spTree>
+      <p:nvGrpSpPr>
+        <p:cNvPr id="1" name=""/>
+        <p:cNvGrpSpPr/>
+        <p:nvPr/>
+      </p:nvGrpSpPr>
+      <p:grpSpPr>
+        <a:xfrm>
+          <a:off x="0" y="0"/>
+          <a:ext cx="0" cy="0"/>
+          <a:chOff x="0" y="0"/>
+          <a:chExt cx="0" cy="0"/>
+        </a:xfrm>
+      </p:grpSpPr>
+      <p:sp>
+        <p:nvSpPr>
+          <p:cNvPr id="2" name="Slide Image Placeholder 1"/>
+          <p:cNvSpPr>
+            <a:spLocks noGrp="1" noRot="1" noChangeAspect="1"/>
+          </p:cNvSpPr>
+          <p:nvPr>
+            <p:ph type="sldImg"/>
+          </p:nvPr>
+        </p:nvSpPr>
+        <p:spPr/>
+      </p:sp>
+      <p:sp>
+        <p:nvSpPr>
+          <p:cNvPr id="3" name="Notes Placeholder 2"/>
+          <p:cNvSpPr>
+            <a:spLocks noGrp="1"/>
+          </p:cNvSpPr>
+          <p:nvPr>
+            <p:ph type="body" idx="1"/>
+          </p:nvPr>
+        </p:nvSpPr>
+        <p:spPr/>
+        <p:txBody>
+          <a:bodyPr/>
+          <a:lstStyle/>
+          <a:p>
+            <a:endParaRPr lang="en-US" dirty="0"/>
+          </a:p>
+        </p:txBody>
+      </p:sp>
+      <p:sp>
+        <p:nvSpPr>
+          <p:cNvPr id="4" name="Slide Number Placeholder 3"/>
+          <p:cNvSpPr>
+            <a:spLocks noGrp="1"/>
+          </p:cNvSpPr>
+          <p:nvPr>
+            <p:ph type="sldNum" sz="quarter" idx="10"/>
+          </p:nvPr>
+        </p:nvSpPr>
+        <p:spPr/>
+        <p:txBody>
+          <a:bodyPr/>
+          <a:lstStyle/>
+          <a:p>
+            <a:fld id="{340F17E4-2B4D-4428-9E25-E07F235B5058}" type="slidenum">
+              <a:rPr lang="en-US" smtClean="0"/>
+              <a:t>24</a:t>
             </a:fld>
             <a:endParaRPr lang="en-US"/>
           </a:p>
@@ -2552,7 +2727,7 @@
           <a:p>
             <a:r>
               <a:rPr lang="en-US" dirty="0" smtClean="0"/>
-              <a:t>DBSCAN</a:t>
+              <a:t>Hierarchical Clustering</a:t>
             </a:r>
             <a:endParaRPr lang="en-US" dirty="0"/>
           </a:p>
@@ -2573,51 +2748,14 @@
           <a:bodyPr/>
           <a:lstStyle/>
           <a:p>
-            <a:r>
-              <a:rPr lang="en-US" dirty="0" smtClean="0"/>
-              <a:t>More advanced than K-Means or hierarchical clustering</a:t>
-            </a:r>
-          </a:p>
-          <a:p>
-            <a:r>
-              <a:rPr lang="en-US" dirty="0" smtClean="0"/>
-              <a:t>Useful in outlier detection and is flexible with respect to cluster shape</a:t>
-            </a:r>
-          </a:p>
-          <a:p>
-            <a:r>
-              <a:rPr lang="en-US" dirty="0"/>
-              <a:t>DBSCAN is “region-based”, trying to identify neighborhoods of densely packed data </a:t>
-            </a:r>
-            <a:r>
-              <a:rPr lang="en-US" dirty="0" smtClean="0"/>
-              <a:t>points</a:t>
-            </a:r>
-          </a:p>
-          <a:p>
-            <a:r>
-              <a:rPr lang="en-US" dirty="0" smtClean="0"/>
-              <a:t>Don’t specify number of clusters, but need to specify </a:t>
-            </a:r>
-            <a:r>
-              <a:rPr lang="en-US" b="1" dirty="0" smtClean="0"/>
-              <a:t>epsilon (radius) </a:t>
-            </a:r>
-            <a:r>
-              <a:rPr lang="en-US" dirty="0" smtClean="0"/>
-              <a:t>and </a:t>
-            </a:r>
-            <a:r>
-              <a:rPr lang="en-US" b="1" dirty="0" smtClean="0"/>
-              <a:t>minimum points (number of neighbors to be a core point)</a:t>
-            </a:r>
+            <a:endParaRPr lang="en-US"/>
           </a:p>
         </p:txBody>
       </p:sp>
     </p:spTree>
     <p:extLst>
       <p:ext uri="{BB962C8B-B14F-4D97-AF65-F5344CB8AC3E}">
-        <p14:creationId xmlns:p14="http://schemas.microsoft.com/office/powerpoint/2010/main" val="1783629603"/>
+        <p14:creationId xmlns:p14="http://schemas.microsoft.com/office/powerpoint/2010/main" val="1108066659"/>
       </p:ext>
     </p:extLst>
   </p:cSld>
@@ -2661,135 +2799,72 @@
           <a:p>
             <a:r>
               <a:rPr lang="en-US" dirty="0" smtClean="0"/>
-              <a:t>DBSCAN Example</a:t>
+              <a:t>DBSCAN</a:t>
             </a:r>
             <a:endParaRPr lang="en-US" dirty="0"/>
           </a:p>
         </p:txBody>
       </p:sp>
-      <p:pic>
-        <p:nvPicPr>
-          <p:cNvPr id="4" name="Picture 3"/>
-          <p:cNvPicPr>
-            <a:picLocks noChangeAspect="1"/>
-          </p:cNvPicPr>
-          <p:nvPr/>
-        </p:nvPicPr>
-        <p:blipFill>
-          <a:blip r:embed="rId2"/>
-          <a:stretch>
-            <a:fillRect/>
-          </a:stretch>
-        </p:blipFill>
-        <p:spPr>
-          <a:xfrm>
-            <a:off x="329784" y="1165856"/>
-            <a:ext cx="3259809" cy="3020672"/>
-          </a:xfrm>
-          <a:prstGeom prst="rect">
-            <a:avLst/>
-          </a:prstGeom>
-        </p:spPr>
-      </p:pic>
-      <p:sp>
-        <p:nvSpPr>
-          <p:cNvPr id="7" name="Right Arrow 6"/>
-          <p:cNvSpPr/>
-          <p:nvPr/>
-        </p:nvSpPr>
-        <p:spPr>
-          <a:xfrm>
-            <a:off x="3696829" y="2552648"/>
-            <a:ext cx="1670050" cy="247088"/>
-          </a:xfrm>
-          <a:prstGeom prst="rightArrow">
-            <a:avLst/>
-          </a:prstGeom>
-        </p:spPr>
-        <p:style>
-          <a:lnRef idx="2">
-            <a:schemeClr val="accent1">
-              <a:shade val="50000"/>
-            </a:schemeClr>
-          </a:lnRef>
-          <a:fillRef idx="1">
-            <a:schemeClr val="accent1"/>
-          </a:fillRef>
-          <a:effectRef idx="0">
-            <a:schemeClr val="accent1"/>
-          </a:effectRef>
-          <a:fontRef idx="minor">
-            <a:schemeClr val="lt1"/>
-          </a:fontRef>
-        </p:style>
-        <p:txBody>
-          <a:bodyPr rtlCol="0" anchor="ctr"/>
+      <p:sp>
+        <p:nvSpPr>
+          <p:cNvPr id="3" name="Content Placeholder 2"/>
+          <p:cNvSpPr>
+            <a:spLocks noGrp="1"/>
+          </p:cNvSpPr>
+          <p:nvPr>
+            <p:ph idx="1"/>
+          </p:nvPr>
+        </p:nvSpPr>
+        <p:spPr/>
+        <p:txBody>
+          <a:bodyPr/>
           <a:lstStyle/>
           <a:p>
-            <a:pPr algn="ctr"/>
-            <a:endParaRPr lang="en-US"/>
-          </a:p>
-        </p:txBody>
-      </p:sp>
-      <p:pic>
-        <p:nvPicPr>
-          <p:cNvPr id="8" name="Picture 7"/>
-          <p:cNvPicPr>
-            <a:picLocks noChangeAspect="1"/>
-          </p:cNvPicPr>
-          <p:nvPr/>
-        </p:nvPicPr>
-        <p:blipFill rotWithShape="1">
-          <a:blip r:embed="rId3"/>
-          <a:srcRect l="2661" t="4219" r="5829" b="1896"/>
-          <a:stretch/>
-        </p:blipFill>
-        <p:spPr>
-          <a:xfrm>
-            <a:off x="5474116" y="1101748"/>
-            <a:ext cx="3489961" cy="3317852"/>
-          </a:xfrm>
-          <a:prstGeom prst="rect">
-            <a:avLst/>
-          </a:prstGeom>
-        </p:spPr>
-      </p:pic>
-      <p:sp>
-        <p:nvSpPr>
-          <p:cNvPr id="9" name="TextBox 8"/>
-          <p:cNvSpPr txBox="1"/>
-          <p:nvPr/>
-        </p:nvSpPr>
-        <p:spPr>
-          <a:xfrm>
-            <a:off x="640080" y="4419600"/>
-            <a:ext cx="5455920" cy="300082"/>
-          </a:xfrm>
-          <a:prstGeom prst="rect">
-            <a:avLst/>
-          </a:prstGeom>
-          <a:noFill/>
-        </p:spPr>
-        <p:txBody>
-          <a:bodyPr wrap="square" rtlCol="0">
-            <a:spAutoFit/>
-          </a:bodyPr>
-          <a:lstStyle/>
-          <a:p>
-            <a:r>
-              <a:rPr lang="en-US" i="1" dirty="0">
-                <a:hlinkClick r:id="rId4"/>
-              </a:rPr>
-              <a:t>http://www.sthda.com/english/wiki/wiki.php?id_contents=7940</a:t>
-            </a:r>
-            <a:endParaRPr lang="en-US" i="1" dirty="0"/>
+            <a:r>
+              <a:rPr lang="en-US" dirty="0" smtClean="0"/>
+              <a:t>More advanced than K-Means or hierarchical clustering</a:t>
+            </a:r>
+          </a:p>
+          <a:p>
+            <a:r>
+              <a:rPr lang="en-US" dirty="0" smtClean="0"/>
+              <a:t>Useful in outlier detection and is flexible with respect to cluster shape</a:t>
+            </a:r>
+          </a:p>
+          <a:p>
+            <a:r>
+              <a:rPr lang="en-US" dirty="0"/>
+              <a:t>DBSCAN is “region-based”, trying to identify neighborhoods of densely packed data </a:t>
+            </a:r>
+            <a:r>
+              <a:rPr lang="en-US" dirty="0" smtClean="0"/>
+              <a:t>points</a:t>
+            </a:r>
+          </a:p>
+          <a:p>
+            <a:r>
+              <a:rPr lang="en-US" dirty="0" smtClean="0"/>
+              <a:t>Don’t specify number of clusters, but need to specify </a:t>
+            </a:r>
+            <a:r>
+              <a:rPr lang="en-US" b="1" dirty="0" smtClean="0"/>
+              <a:t>epsilon (radius) </a:t>
+            </a:r>
+            <a:r>
+              <a:rPr lang="en-US" dirty="0" smtClean="0"/>
+              <a:t>and </a:t>
+            </a:r>
+            <a:r>
+              <a:rPr lang="en-US" b="1" dirty="0" smtClean="0"/>
+              <a:t>minimum points (number of neighbors to be a core point)</a:t>
+            </a:r>
           </a:p>
         </p:txBody>
       </p:sp>
     </p:spTree>
     <p:extLst>
       <p:ext uri="{BB962C8B-B14F-4D97-AF65-F5344CB8AC3E}">
-        <p14:creationId xmlns:p14="http://schemas.microsoft.com/office/powerpoint/2010/main" val="885589397"/>
+        <p14:creationId xmlns:p14="http://schemas.microsoft.com/office/powerpoint/2010/main" val="1783629603"/>
       </p:ext>
     </p:extLst>
   </p:cSld>
@@ -2833,35 +2908,135 @@
           <a:p>
             <a:r>
               <a:rPr lang="en-US" dirty="0" smtClean="0"/>
-              <a:t>Bonus: Dimensionality Reduction</a:t>
+              <a:t>DBSCAN Example</a:t>
             </a:r>
             <a:endParaRPr lang="en-US" dirty="0"/>
           </a:p>
         </p:txBody>
       </p:sp>
-      <p:sp>
-        <p:nvSpPr>
-          <p:cNvPr id="3" name="Content Placeholder 2"/>
-          <p:cNvSpPr>
-            <a:spLocks noGrp="1"/>
-          </p:cNvSpPr>
-          <p:nvPr>
-            <p:ph idx="1"/>
-          </p:nvPr>
-        </p:nvSpPr>
-        <p:spPr/>
-        <p:txBody>
-          <a:bodyPr/>
+      <p:pic>
+        <p:nvPicPr>
+          <p:cNvPr id="4" name="Picture 3"/>
+          <p:cNvPicPr>
+            <a:picLocks noChangeAspect="1"/>
+          </p:cNvPicPr>
+          <p:nvPr/>
+        </p:nvPicPr>
+        <p:blipFill>
+          <a:blip r:embed="rId2"/>
+          <a:stretch>
+            <a:fillRect/>
+          </a:stretch>
+        </p:blipFill>
+        <p:spPr>
+          <a:xfrm>
+            <a:off x="329784" y="1165856"/>
+            <a:ext cx="3259809" cy="3020672"/>
+          </a:xfrm>
+          <a:prstGeom prst="rect">
+            <a:avLst/>
+          </a:prstGeom>
+        </p:spPr>
+      </p:pic>
+      <p:sp>
+        <p:nvSpPr>
+          <p:cNvPr id="7" name="Right Arrow 6"/>
+          <p:cNvSpPr/>
+          <p:nvPr/>
+        </p:nvSpPr>
+        <p:spPr>
+          <a:xfrm>
+            <a:off x="3696829" y="2552648"/>
+            <a:ext cx="1670050" cy="247088"/>
+          </a:xfrm>
+          <a:prstGeom prst="rightArrow">
+            <a:avLst/>
+          </a:prstGeom>
+        </p:spPr>
+        <p:style>
+          <a:lnRef idx="2">
+            <a:schemeClr val="accent1">
+              <a:shade val="50000"/>
+            </a:schemeClr>
+          </a:lnRef>
+          <a:fillRef idx="1">
+            <a:schemeClr val="accent1"/>
+          </a:fillRef>
+          <a:effectRef idx="0">
+            <a:schemeClr val="accent1"/>
+          </a:effectRef>
+          <a:fontRef idx="minor">
+            <a:schemeClr val="lt1"/>
+          </a:fontRef>
+        </p:style>
+        <p:txBody>
+          <a:bodyPr rtlCol="0" anchor="ctr"/>
           <a:lstStyle/>
           <a:p>
-            <a:endParaRPr lang="en-US" dirty="0"/>
+            <a:pPr algn="ctr"/>
+            <a:endParaRPr lang="en-US"/>
+          </a:p>
+        </p:txBody>
+      </p:sp>
+      <p:pic>
+        <p:nvPicPr>
+          <p:cNvPr id="8" name="Picture 7"/>
+          <p:cNvPicPr>
+            <a:picLocks noChangeAspect="1"/>
+          </p:cNvPicPr>
+          <p:nvPr/>
+        </p:nvPicPr>
+        <p:blipFill rotWithShape="1">
+          <a:blip r:embed="rId3"/>
+          <a:srcRect l="2661" t="4219" r="5829" b="1896"/>
+          <a:stretch/>
+        </p:blipFill>
+        <p:spPr>
+          <a:xfrm>
+            <a:off x="5474116" y="1101748"/>
+            <a:ext cx="3489961" cy="3317852"/>
+          </a:xfrm>
+          <a:prstGeom prst="rect">
+            <a:avLst/>
+          </a:prstGeom>
+        </p:spPr>
+      </p:pic>
+      <p:sp>
+        <p:nvSpPr>
+          <p:cNvPr id="9" name="TextBox 8"/>
+          <p:cNvSpPr txBox="1"/>
+          <p:nvPr/>
+        </p:nvSpPr>
+        <p:spPr>
+          <a:xfrm>
+            <a:off x="640080" y="4419600"/>
+            <a:ext cx="5455920" cy="300082"/>
+          </a:xfrm>
+          <a:prstGeom prst="rect">
+            <a:avLst/>
+          </a:prstGeom>
+          <a:noFill/>
+        </p:spPr>
+        <p:txBody>
+          <a:bodyPr wrap="square" rtlCol="0">
+            <a:spAutoFit/>
+          </a:bodyPr>
+          <a:lstStyle/>
+          <a:p>
+            <a:r>
+              <a:rPr lang="en-US" i="1" dirty="0">
+                <a:hlinkClick r:id="rId4"/>
+              </a:rPr>
+              <a:t>http://www.sthda.com/english/wiki/wiki.php?id_contents=7940</a:t>
+            </a:r>
+            <a:endParaRPr lang="en-US" i="1" dirty="0"/>
           </a:p>
         </p:txBody>
       </p:sp>
     </p:spTree>
     <p:extLst>
       <p:ext uri="{BB962C8B-B14F-4D97-AF65-F5344CB8AC3E}">
-        <p14:creationId xmlns:p14="http://schemas.microsoft.com/office/powerpoint/2010/main" val="3530676003"/>
+        <p14:creationId xmlns:p14="http://schemas.microsoft.com/office/powerpoint/2010/main" val="885589397"/>
       </p:ext>
     </p:extLst>
   </p:cSld>
@@ -2905,7 +3080,7 @@
           <a:p>
             <a:r>
               <a:rPr lang="en-US" dirty="0" smtClean="0"/>
-              <a:t>Example from WFAA – Setup</a:t>
+              <a:t>Bonus: Dimensionality Reduction</a:t>
             </a:r>
             <a:endParaRPr lang="en-US" dirty="0"/>
           </a:p>
@@ -2926,14 +3101,65 @@
           <a:bodyPr/>
           <a:lstStyle/>
           <a:p>
+            <a:r>
+              <a:rPr lang="en-US" dirty="0" smtClean="0"/>
+              <a:t>Large number of data features (columns) makes standard data exploration hard</a:t>
+            </a:r>
+          </a:p>
+          <a:p>
+            <a:r>
+              <a:rPr lang="en-US" dirty="0" smtClean="0"/>
+              <a:t>Redundancy or correlation between variables will affect machine learning algorithms</a:t>
+            </a:r>
+          </a:p>
+          <a:p>
+            <a:r>
+              <a:rPr lang="en-US" dirty="0" smtClean="0"/>
+              <a:t>I’ve found it especially helpful for unstructured data</a:t>
+            </a:r>
             <a:endParaRPr lang="en-US" dirty="0"/>
+          </a:p>
+          <a:p>
+            <a:r>
+              <a:rPr lang="en-US" dirty="0" smtClean="0"/>
+              <a:t>Techniques</a:t>
+            </a:r>
+          </a:p>
+          <a:p>
+            <a:pPr lvl="1"/>
+            <a:r>
+              <a:rPr lang="en-US" dirty="0" smtClean="0"/>
+              <a:t>Principal component analysis (“hello, world” of dimensionality reduction)</a:t>
+            </a:r>
+          </a:p>
+          <a:p>
+            <a:pPr lvl="1"/>
+            <a:r>
+              <a:rPr lang="en-US" dirty="0" smtClean="0"/>
+              <a:t>t-SNE (more advanced algorithm, lots of cool examples on the web)</a:t>
+            </a:r>
+          </a:p>
+          <a:p>
+            <a:pPr lvl="1"/>
+            <a:r>
+              <a:rPr lang="en-US" dirty="0" smtClean="0"/>
+              <a:t>LASSO (for regression tasks)</a:t>
+            </a:r>
+          </a:p>
+          <a:p>
+            <a:pPr lvl="1"/>
+            <a:r>
+              <a:rPr lang="en-US" dirty="0" smtClean="0"/>
+              <a:t>By document word2vec summaries</a:t>
+            </a:r>
+            <a:endParaRPr lang="en-US" dirty="0" smtClean="0"/>
           </a:p>
         </p:txBody>
       </p:sp>
     </p:spTree>
     <p:extLst>
       <p:ext uri="{BB962C8B-B14F-4D97-AF65-F5344CB8AC3E}">
-        <p14:creationId xmlns:p14="http://schemas.microsoft.com/office/powerpoint/2010/main" val="3684728735"/>
+        <p14:creationId xmlns:p14="http://schemas.microsoft.com/office/powerpoint/2010/main" val="3530676003"/>
       </p:ext>
     </p:extLst>
   </p:cSld>
@@ -2977,7 +3203,7 @@
           <a:p>
             <a:r>
               <a:rPr lang="en-US" dirty="0" smtClean="0"/>
-              <a:t>Example from WFAA – Data/Methods</a:t>
+              <a:t>Example from WFAA – Setup</a:t>
             </a:r>
             <a:endParaRPr lang="en-US" dirty="0"/>
           </a:p>
@@ -2998,14 +3224,14 @@
           <a:bodyPr/>
           <a:lstStyle/>
           <a:p>
-            <a:endParaRPr lang="en-US"/>
+            <a:endParaRPr lang="en-US" dirty="0"/>
           </a:p>
         </p:txBody>
       </p:sp>
     </p:spTree>
     <p:extLst>
       <p:ext uri="{BB962C8B-B14F-4D97-AF65-F5344CB8AC3E}">
-        <p14:creationId xmlns:p14="http://schemas.microsoft.com/office/powerpoint/2010/main" val="2105481535"/>
+        <p14:creationId xmlns:p14="http://schemas.microsoft.com/office/powerpoint/2010/main" val="3684728735"/>
       </p:ext>
     </p:extLst>
   </p:cSld>
@@ -3049,7 +3275,7 @@
           <a:p>
             <a:r>
               <a:rPr lang="en-US" dirty="0" smtClean="0"/>
-              <a:t>Example from WFAA – Results</a:t>
+              <a:t>Example from WFAA – Data/Methods</a:t>
             </a:r>
             <a:endParaRPr lang="en-US" dirty="0"/>
           </a:p>
@@ -3077,7 +3303,7 @@
     </p:spTree>
     <p:extLst>
       <p:ext uri="{BB962C8B-B14F-4D97-AF65-F5344CB8AC3E}">
-        <p14:creationId xmlns:p14="http://schemas.microsoft.com/office/powerpoint/2010/main" val="1263122911"/>
+        <p14:creationId xmlns:p14="http://schemas.microsoft.com/office/powerpoint/2010/main" val="2105481535"/>
       </p:ext>
     </p:extLst>
   </p:cSld>
@@ -3121,7 +3347,7 @@
           <a:p>
             <a:r>
               <a:rPr lang="en-US" dirty="0" smtClean="0"/>
-              <a:t>Example from WFAA – Implementation</a:t>
+              <a:t>Example from WFAA – Results</a:t>
             </a:r>
             <a:endParaRPr lang="en-US" dirty="0"/>
           </a:p>
@@ -3149,7 +3375,7 @@
     </p:spTree>
     <p:extLst>
       <p:ext uri="{BB962C8B-B14F-4D97-AF65-F5344CB8AC3E}">
-        <p14:creationId xmlns:p14="http://schemas.microsoft.com/office/powerpoint/2010/main" val="1621333358"/>
+        <p14:creationId xmlns:p14="http://schemas.microsoft.com/office/powerpoint/2010/main" val="1263122911"/>
       </p:ext>
     </p:extLst>
   </p:cSld>
@@ -3193,7 +3419,7 @@
           <a:p>
             <a:r>
               <a:rPr lang="en-US" dirty="0" smtClean="0"/>
-              <a:t>Large Donor Disruption</a:t>
+              <a:t>Example from WFAA – Implementation</a:t>
             </a:r>
             <a:endParaRPr lang="en-US" dirty="0"/>
           </a:p>
@@ -3221,7 +3447,7 @@
     </p:spTree>
     <p:extLst>
       <p:ext uri="{BB962C8B-B14F-4D97-AF65-F5344CB8AC3E}">
-        <p14:creationId xmlns:p14="http://schemas.microsoft.com/office/powerpoint/2010/main" val="1449896529"/>
+        <p14:creationId xmlns:p14="http://schemas.microsoft.com/office/powerpoint/2010/main" val="1621333358"/>
       </p:ext>
     </p:extLst>
   </p:cSld>
@@ -3293,7 +3519,7 @@
     </p:spTree>
     <p:extLst>
       <p:ext uri="{BB962C8B-B14F-4D97-AF65-F5344CB8AC3E}">
-        <p14:creationId xmlns:p14="http://schemas.microsoft.com/office/powerpoint/2010/main" val="3268452489"/>
+        <p14:creationId xmlns:p14="http://schemas.microsoft.com/office/powerpoint/2010/main" val="1449896529"/>
       </p:ext>
     </p:extLst>
   </p:cSld>
@@ -3365,7 +3591,7 @@
     </p:spTree>
     <p:extLst>
       <p:ext uri="{BB962C8B-B14F-4D97-AF65-F5344CB8AC3E}">
-        <p14:creationId xmlns:p14="http://schemas.microsoft.com/office/powerpoint/2010/main" val="3479376838"/>
+        <p14:creationId xmlns:p14="http://schemas.microsoft.com/office/powerpoint/2010/main" val="3268452489"/>
       </p:ext>
     </p:extLst>
   </p:cSld>
@@ -3422,7 +3648,7 @@
             <a:spLocks noGrp="1"/>
           </p:cNvSpPr>
           <p:nvPr>
-            <p:ph idx="1"/>
+            <p:ph sz="half" idx="1"/>
           </p:nvPr>
         </p:nvSpPr>
         <p:spPr/>
@@ -3432,8 +3658,9 @@
           <a:p>
             <a:r>
               <a:rPr lang="en-US" dirty="0" smtClean="0"/>
-              <a:t>Background and Context</a:t>
-            </a:r>
+              <a:t>Background</a:t>
+            </a:r>
+            <a:endParaRPr lang="en-US" dirty="0" smtClean="0"/>
           </a:p>
           <a:p>
             <a:r>
@@ -3444,26 +3671,34 @@
           <a:p>
             <a:r>
               <a:rPr lang="en-US" dirty="0" smtClean="0"/>
-              <a:t>Three Clustering Algorithms You Should Know</a:t>
-            </a:r>
-          </a:p>
-          <a:p>
+              <a:t>Three Clustering </a:t>
+            </a:r>
             <a:r>
               <a:rPr lang="en-US" dirty="0" smtClean="0"/>
-              <a:t>Using Results from Unsupervised Learning</a:t>
-            </a:r>
+              <a:t>Algorithms</a:t>
+            </a:r>
+            <a:endParaRPr lang="en-US" dirty="0" smtClean="0"/>
           </a:p>
           <a:p>
             <a:r>
               <a:rPr lang="en-US" dirty="0" smtClean="0"/>
-              <a:t>An Example from WFAA</a:t>
-            </a:r>
-          </a:p>
-          <a:p>
+              <a:t>An </a:t>
+            </a:r>
             <a:r>
               <a:rPr lang="en-US" dirty="0" smtClean="0"/>
-              <a:t>Bonus: Large Donor Disruption in Philanthropy</a:t>
-            </a:r>
+              <a:t>Example from WFAA</a:t>
+            </a:r>
+          </a:p>
+          <a:p>
+            <a:r>
+              <a:rPr lang="en-US" dirty="0" smtClean="0"/>
+              <a:t>Bonus: Large Donor </a:t>
+            </a:r>
+            <a:r>
+              <a:rPr lang="en-US" dirty="0" smtClean="0"/>
+              <a:t>Disruption</a:t>
+            </a:r>
+            <a:endParaRPr lang="en-US" dirty="0" smtClean="0"/>
           </a:p>
           <a:p>
             <a:r>
@@ -3474,6 +3709,32 @@
           </a:p>
         </p:txBody>
       </p:sp>
+      <p:pic>
+        <p:nvPicPr>
+          <p:cNvPr id="12" name="Content Placeholder 11"/>
+          <p:cNvPicPr>
+            <a:picLocks noGrp="1" noChangeAspect="1"/>
+          </p:cNvPicPr>
+          <p:nvPr>
+            <p:ph sz="half" idx="2"/>
+          </p:nvPr>
+        </p:nvPicPr>
+        <p:blipFill>
+          <a:blip r:embed="rId3"/>
+          <a:stretch>
+            <a:fillRect/>
+          </a:stretch>
+        </p:blipFill>
+        <p:spPr>
+          <a:xfrm>
+            <a:off x="4580312" y="956760"/>
+            <a:ext cx="4511713" cy="3675565"/>
+          </a:xfrm>
+          <a:prstGeom prst="rect">
+            <a:avLst/>
+          </a:prstGeom>
+        </p:spPr>
+      </p:pic>
     </p:spTree>
     <p:extLst>
       <p:ext uri="{BB962C8B-B14F-4D97-AF65-F5344CB8AC3E}">
@@ -3484,6 +3745,13 @@
   <p:clrMapOvr>
     <a:masterClrMapping/>
   </p:clrMapOvr>
+  <p:timing>
+    <p:tnLst>
+      <p:par>
+        <p:cTn id="1" dur="indefinite" restart="never" nodeType="tmRoot"/>
+      </p:par>
+    </p:tnLst>
+  </p:timing>
 </p:sld>
 </file>
 
@@ -3521,7 +3789,7 @@
           <a:p>
             <a:r>
               <a:rPr lang="en-US" dirty="0" smtClean="0"/>
-              <a:t>Wrapping Up</a:t>
+              <a:t>Large Donor Disruption</a:t>
             </a:r>
             <a:endParaRPr lang="en-US" dirty="0"/>
           </a:p>
@@ -3549,7 +3817,7 @@
     </p:spTree>
     <p:extLst>
       <p:ext uri="{BB962C8B-B14F-4D97-AF65-F5344CB8AC3E}">
-        <p14:creationId xmlns:p14="http://schemas.microsoft.com/office/powerpoint/2010/main" val="2994578432"/>
+        <p14:creationId xmlns:p14="http://schemas.microsoft.com/office/powerpoint/2010/main" val="3479376838"/>
       </p:ext>
     </p:extLst>
   </p:cSld>
@@ -3621,7 +3889,7 @@
     </p:spTree>
     <p:extLst>
       <p:ext uri="{BB962C8B-B14F-4D97-AF65-F5344CB8AC3E}">
-        <p14:creationId xmlns:p14="http://schemas.microsoft.com/office/powerpoint/2010/main" val="1749157500"/>
+        <p14:creationId xmlns:p14="http://schemas.microsoft.com/office/powerpoint/2010/main" val="2994578432"/>
       </p:ext>
     </p:extLst>
   </p:cSld>
@@ -3693,7 +3961,7 @@
     </p:spTree>
     <p:extLst>
       <p:ext uri="{BB962C8B-B14F-4D97-AF65-F5344CB8AC3E}">
-        <p14:creationId xmlns:p14="http://schemas.microsoft.com/office/powerpoint/2010/main" val="557220253"/>
+        <p14:creationId xmlns:p14="http://schemas.microsoft.com/office/powerpoint/2010/main" val="1749157500"/>
       </p:ext>
     </p:extLst>
   </p:cSld>
@@ -3732,6 +4000,78 @@
         </p:nvSpPr>
         <p:spPr/>
         <p:txBody>
+          <a:bodyPr/>
+          <a:lstStyle/>
+          <a:p>
+            <a:r>
+              <a:rPr lang="en-US" dirty="0" smtClean="0"/>
+              <a:t>Wrapping Up</a:t>
+            </a:r>
+            <a:endParaRPr lang="en-US" dirty="0"/>
+          </a:p>
+        </p:txBody>
+      </p:sp>
+      <p:sp>
+        <p:nvSpPr>
+          <p:cNvPr id="3" name="Content Placeholder 2"/>
+          <p:cNvSpPr>
+            <a:spLocks noGrp="1"/>
+          </p:cNvSpPr>
+          <p:nvPr>
+            <p:ph idx="1"/>
+          </p:nvPr>
+        </p:nvSpPr>
+        <p:spPr/>
+        <p:txBody>
+          <a:bodyPr/>
+          <a:lstStyle/>
+          <a:p>
+            <a:endParaRPr lang="en-US"/>
+          </a:p>
+        </p:txBody>
+      </p:sp>
+    </p:spTree>
+    <p:extLst>
+      <p:ext uri="{BB962C8B-B14F-4D97-AF65-F5344CB8AC3E}">
+        <p14:creationId xmlns:p14="http://schemas.microsoft.com/office/powerpoint/2010/main" val="557220253"/>
+      </p:ext>
+    </p:extLst>
+  </p:cSld>
+  <p:clrMapOvr>
+    <a:masterClrMapping/>
+  </p:clrMapOvr>
+</p:sld>
+</file>
+
+<file path=ppt/slides/slide24.xml><?xml version="1.0" encoding="utf-8"?>
+<p:sld xmlns:a="http://schemas.openxmlformats.org/drawingml/2006/main" xmlns:r="http://schemas.openxmlformats.org/officeDocument/2006/relationships" xmlns:p="http://schemas.openxmlformats.org/presentationml/2006/main">
+  <p:cSld>
+    <p:spTree>
+      <p:nvGrpSpPr>
+        <p:cNvPr id="1" name=""/>
+        <p:cNvGrpSpPr/>
+        <p:nvPr/>
+      </p:nvGrpSpPr>
+      <p:grpSpPr>
+        <a:xfrm>
+          <a:off x="0" y="0"/>
+          <a:ext cx="0" cy="0"/>
+          <a:chOff x="0" y="0"/>
+          <a:chExt cx="0" cy="0"/>
+        </a:xfrm>
+      </p:grpSpPr>
+      <p:sp>
+        <p:nvSpPr>
+          <p:cNvPr id="2" name="Title 1"/>
+          <p:cNvSpPr>
+            <a:spLocks noGrp="1"/>
+          </p:cNvSpPr>
+          <p:nvPr>
+            <p:ph type="title"/>
+          </p:nvPr>
+        </p:nvSpPr>
+        <p:spPr/>
+        <p:txBody>
           <a:bodyPr>
             <a:normAutofit/>
           </a:bodyPr>
@@ -3827,7 +4167,7 @@
 </p:sld>
 </file>
 
-<file path=ppt/slides/slide24.xml><?xml version="1.0" encoding="utf-8"?>
+<file path=ppt/slides/slide25.xml><?xml version="1.0" encoding="utf-8"?>
 <p:sld xmlns:a="http://schemas.openxmlformats.org/drawingml/2006/main" xmlns:r="http://schemas.openxmlformats.org/officeDocument/2006/relationships" xmlns:p="http://schemas.openxmlformats.org/presentationml/2006/main">
   <p:cSld>
     <p:spTree>
@@ -3977,14 +4317,19 @@
             <p:ph idx="1"/>
           </p:nvPr>
         </p:nvSpPr>
-        <p:spPr/>
+        <p:spPr>
+          <a:xfrm>
+            <a:off x="329784" y="1115366"/>
+            <a:ext cx="8484432" cy="3558817"/>
+          </a:xfrm>
+        </p:spPr>
         <p:txBody>
           <a:bodyPr/>
           <a:lstStyle/>
           <a:p>
             <a:r>
               <a:rPr lang="en-US" dirty="0" smtClean="0"/>
-              <a:t>Data Scientist with experience in non-profit and private finance</a:t>
+              <a:t>Data Scientist with experience in private finance, non-profit, and law enforcement</a:t>
             </a:r>
           </a:p>
           <a:p>
@@ -4016,8 +4361,8 @@
         </p:nvSpPr>
         <p:spPr>
           <a:xfrm>
-            <a:off x="6584538" y="2918285"/>
-            <a:ext cx="2131081" cy="1938992"/>
+            <a:off x="6584538" y="3055445"/>
+            <a:ext cx="2131081" cy="1874520"/>
           </a:xfrm>
           <a:prstGeom prst="rect">
             <a:avLst/>
@@ -4106,8 +4451,8 @@
         </p:nvSpPr>
         <p:spPr>
           <a:xfrm>
-            <a:off x="596346" y="2918285"/>
-            <a:ext cx="2131081" cy="1938528"/>
+            <a:off x="596346" y="3055445"/>
+            <a:ext cx="2131081" cy="1874520"/>
           </a:xfrm>
           <a:prstGeom prst="rect">
             <a:avLst/>
@@ -4196,8 +4541,8 @@
         </p:nvSpPr>
         <p:spPr>
           <a:xfrm>
-            <a:off x="3503964" y="2918285"/>
-            <a:ext cx="2304037" cy="1938528"/>
+            <a:off x="3503964" y="3055445"/>
+            <a:ext cx="2304037" cy="1874520"/>
           </a:xfrm>
           <a:prstGeom prst="rect">
             <a:avLst/>
@@ -4282,6 +4627,13 @@
   <p:clrMapOvr>
     <a:masterClrMapping/>
   </p:clrMapOvr>
+  <p:timing>
+    <p:tnLst>
+      <p:par>
+        <p:cTn id="1" dur="indefinite" restart="never" nodeType="tmRoot"/>
+      </p:par>
+    </p:tnLst>
+  </p:timing>
 </p:sld>
 </file>
 
@@ -4387,7 +4739,7 @@
         </p:blipFill>
         <p:spPr>
           <a:xfrm>
-            <a:off x="5154722" y="1161153"/>
+            <a:off x="5154721" y="1268016"/>
             <a:ext cx="3085083" cy="1966446"/>
           </a:xfrm>
           <a:prstGeom prst="rect">
@@ -4411,7 +4763,7 @@
         </p:blipFill>
         <p:spPr>
           <a:xfrm>
-            <a:off x="5952756" y="3199754"/>
+            <a:off x="5952756" y="3329294"/>
             <a:ext cx="1489014" cy="1630307"/>
           </a:xfrm>
           <a:prstGeom prst="rect">
@@ -4487,7 +4839,3218 @@
           <a:bodyPr/>
           <a:lstStyle/>
           <a:p>
-            <a:endParaRPr lang="en-US"/>
+            <a:r>
+              <a:rPr lang="en-US" dirty="0" smtClean="0"/>
+              <a:t>We have </a:t>
+            </a:r>
+            <a:r>
+              <a:rPr lang="en-US" dirty="0" smtClean="0">
+                <a:latin typeface="Consolas" panose="020B0609020204030204" pitchFamily="49" charset="0"/>
+              </a:rPr>
+              <a:t>X</a:t>
+            </a:r>
+            <a:r>
+              <a:rPr lang="en-US" dirty="0" smtClean="0"/>
+              <a:t> (data set), but no </a:t>
+            </a:r>
+            <a:r>
+              <a:rPr lang="en-US" dirty="0" smtClean="0">
+                <a:latin typeface="Consolas" panose="020B0609020204030204" pitchFamily="49" charset="0"/>
+              </a:rPr>
+              <a:t>y</a:t>
+            </a:r>
+            <a:r>
+              <a:rPr lang="en-US" dirty="0" smtClean="0"/>
+              <a:t> for classification or regression</a:t>
+            </a:r>
+          </a:p>
+          <a:p>
+            <a:r>
+              <a:rPr lang="en-US" dirty="0" smtClean="0"/>
+              <a:t>What can we learn about the underlying structure of the data?</a:t>
+            </a:r>
+          </a:p>
+          <a:p>
+            <a:r>
+              <a:rPr lang="en-US" dirty="0" smtClean="0"/>
+              <a:t>Great for data exploration and initial analyses, but sometimes difficult to generate out-of-sample predictions</a:t>
+            </a:r>
+            <a:endParaRPr lang="en-US" dirty="0"/>
+          </a:p>
+        </p:txBody>
+      </p:sp>
+      <p:graphicFrame>
+        <p:nvGraphicFramePr>
+          <p:cNvPr id="4" name="Table 3"/>
+          <p:cNvGraphicFramePr>
+            <a:graphicFrameLocks noGrp="1"/>
+          </p:cNvGraphicFramePr>
+          <p:nvPr>
+            <p:extLst>
+              <p:ext uri="{D42A27DB-BD31-4B8C-83A1-F6EECF244321}">
+                <p14:modId xmlns:p14="http://schemas.microsoft.com/office/powerpoint/2010/main" val="1286186949"/>
+              </p:ext>
+            </p:extLst>
+          </p:nvPr>
+        </p:nvGraphicFramePr>
+        <p:xfrm>
+          <a:off x="329783" y="2870367"/>
+          <a:ext cx="4713987" cy="1453515"/>
+        </p:xfrm>
+        <a:graphic>
+          <a:graphicData uri="http://schemas.openxmlformats.org/drawingml/2006/table">
+            <a:tbl>
+              <a:tblPr/>
+              <a:tblGrid>
+                <a:gridCol w="788797">
+                  <a:extLst>
+                    <a:ext uri="{9D8B030D-6E8A-4147-A177-3AD203B41FA5}">
+                      <a16:colId xmlns:a16="http://schemas.microsoft.com/office/drawing/2014/main" val="4179934092"/>
+                    </a:ext>
+                  </a:extLst>
+                </a:gridCol>
+                <a:gridCol w="1031558">
+                  <a:extLst>
+                    <a:ext uri="{9D8B030D-6E8A-4147-A177-3AD203B41FA5}">
+                      <a16:colId xmlns:a16="http://schemas.microsoft.com/office/drawing/2014/main" val="3096467080"/>
+                    </a:ext>
+                  </a:extLst>
+                </a:gridCol>
+                <a:gridCol w="968058">
+                  <a:extLst>
+                    <a:ext uri="{9D8B030D-6E8A-4147-A177-3AD203B41FA5}">
+                      <a16:colId xmlns:a16="http://schemas.microsoft.com/office/drawing/2014/main" val="1650012958"/>
+                    </a:ext>
+                  </a:extLst>
+                </a:gridCol>
+                <a:gridCol w="994537">
+                  <a:extLst>
+                    <a:ext uri="{9D8B030D-6E8A-4147-A177-3AD203B41FA5}">
+                      <a16:colId xmlns:a16="http://schemas.microsoft.com/office/drawing/2014/main" val="2615359438"/>
+                    </a:ext>
+                  </a:extLst>
+                </a:gridCol>
+                <a:gridCol w="931037">
+                  <a:extLst>
+                    <a:ext uri="{9D8B030D-6E8A-4147-A177-3AD203B41FA5}">
+                      <a16:colId xmlns:a16="http://schemas.microsoft.com/office/drawing/2014/main" val="7980392"/>
+                    </a:ext>
+                  </a:extLst>
+                </a:gridCol>
+              </a:tblGrid>
+              <a:tr h="190500">
+                <a:tc>
+                  <a:txBody>
+                    <a:bodyPr/>
+                    <a:lstStyle/>
+                    <a:p>
+                      <a:pPr algn="ctr" fontAlgn="b"/>
+                      <a:r>
+                        <a:rPr lang="en-US" sz="1300" b="0" i="0" u="none" strike="noStrike" dirty="0">
+                          <a:solidFill>
+                            <a:srgbClr val="000000"/>
+                          </a:solidFill>
+                          <a:effectLst/>
+                          <a:latin typeface="Segoe UI" panose="020B0502040204020203" pitchFamily="34" charset="0"/>
+                          <a:cs typeface="Segoe UI" panose="020B0502040204020203" pitchFamily="34" charset="0"/>
+                        </a:rPr>
+                        <a:t>y</a:t>
+                      </a:r>
+                    </a:p>
+                  </a:txBody>
+                  <a:tcPr marL="9525" marR="9525" marT="9525" marB="0" anchor="b">
+                    <a:lnL w="12700" cap="flat" cmpd="sng" algn="ctr">
+                      <a:solidFill>
+                        <a:schemeClr val="tx1"/>
+                      </a:solidFill>
+                      <a:prstDash val="solid"/>
+                      <a:round/>
+                      <a:headEnd type="none" w="med" len="med"/>
+                      <a:tailEnd type="none" w="med" len="med"/>
+                    </a:lnL>
+                    <a:lnR w="12700" cap="flat" cmpd="sng" algn="ctr">
+                      <a:solidFill>
+                        <a:schemeClr val="tx1"/>
+                      </a:solidFill>
+                      <a:prstDash val="solid"/>
+                      <a:round/>
+                      <a:headEnd type="none" w="med" len="med"/>
+                      <a:tailEnd type="none" w="med" len="med"/>
+                    </a:lnR>
+                    <a:lnT w="12700" cap="flat" cmpd="sng" algn="ctr">
+                      <a:solidFill>
+                        <a:schemeClr val="tx1"/>
+                      </a:solidFill>
+                      <a:prstDash val="solid"/>
+                      <a:round/>
+                      <a:headEnd type="none" w="med" len="med"/>
+                      <a:tailEnd type="none" w="med" len="med"/>
+                    </a:lnT>
+                    <a:lnB w="12700" cap="flat" cmpd="sng" algn="ctr">
+                      <a:solidFill>
+                        <a:schemeClr val="tx1"/>
+                      </a:solidFill>
+                      <a:prstDash val="solid"/>
+                      <a:round/>
+                      <a:headEnd type="none" w="med" len="med"/>
+                      <a:tailEnd type="none" w="med" len="med"/>
+                    </a:lnB>
+                  </a:tcPr>
+                </a:tc>
+                <a:tc gridSpan="4">
+                  <a:txBody>
+                    <a:bodyPr/>
+                    <a:lstStyle/>
+                    <a:p>
+                      <a:pPr algn="ctr" fontAlgn="b"/>
+                      <a:r>
+                        <a:rPr lang="en-US" sz="1300" b="0" i="0" u="none" strike="noStrike" dirty="0">
+                          <a:solidFill>
+                            <a:srgbClr val="000000"/>
+                          </a:solidFill>
+                          <a:effectLst/>
+                          <a:latin typeface="Segoe UI" panose="020B0502040204020203" pitchFamily="34" charset="0"/>
+                          <a:cs typeface="Segoe UI" panose="020B0502040204020203" pitchFamily="34" charset="0"/>
+                        </a:rPr>
+                        <a:t>X</a:t>
+                      </a:r>
+                    </a:p>
+                  </a:txBody>
+                  <a:tcPr marL="9525" marR="9525" marT="9525" marB="0" anchor="b">
+                    <a:lnL w="12700" cap="flat" cmpd="sng" algn="ctr">
+                      <a:solidFill>
+                        <a:schemeClr val="tx1"/>
+                      </a:solidFill>
+                      <a:prstDash val="solid"/>
+                      <a:round/>
+                      <a:headEnd type="none" w="med" len="med"/>
+                      <a:tailEnd type="none" w="med" len="med"/>
+                    </a:lnL>
+                    <a:lnR w="12700" cap="flat" cmpd="sng" algn="ctr">
+                      <a:solidFill>
+                        <a:schemeClr val="tx1"/>
+                      </a:solidFill>
+                      <a:prstDash val="solid"/>
+                      <a:round/>
+                      <a:headEnd type="none" w="med" len="med"/>
+                      <a:tailEnd type="none" w="med" len="med"/>
+                    </a:lnR>
+                    <a:lnT w="12700" cap="flat" cmpd="sng" algn="ctr">
+                      <a:solidFill>
+                        <a:schemeClr val="tx1"/>
+                      </a:solidFill>
+                      <a:prstDash val="solid"/>
+                      <a:round/>
+                      <a:headEnd type="none" w="med" len="med"/>
+                      <a:tailEnd type="none" w="med" len="med"/>
+                    </a:lnT>
+                    <a:lnB w="12700" cap="flat" cmpd="sng" algn="ctr">
+                      <a:solidFill>
+                        <a:schemeClr val="tx1"/>
+                      </a:solidFill>
+                      <a:prstDash val="solid"/>
+                      <a:round/>
+                      <a:headEnd type="none" w="med" len="med"/>
+                      <a:tailEnd type="none" w="med" len="med"/>
+                    </a:lnB>
+                  </a:tcPr>
+                </a:tc>
+                <a:tc hMerge="1">
+                  <a:txBody>
+                    <a:bodyPr/>
+                    <a:lstStyle/>
+                    <a:p>
+                      <a:endParaRPr lang="en-US"/>
+                    </a:p>
+                  </a:txBody>
+                  <a:tcPr/>
+                </a:tc>
+                <a:tc hMerge="1">
+                  <a:txBody>
+                    <a:bodyPr/>
+                    <a:lstStyle/>
+                    <a:p>
+                      <a:endParaRPr lang="en-US"/>
+                    </a:p>
+                  </a:txBody>
+                  <a:tcPr/>
+                </a:tc>
+                <a:tc hMerge="1">
+                  <a:txBody>
+                    <a:bodyPr/>
+                    <a:lstStyle/>
+                    <a:p>
+                      <a:endParaRPr lang="en-US"/>
+                    </a:p>
+                  </a:txBody>
+                  <a:tcPr/>
+                </a:tc>
+                <a:extLst>
+                  <a:ext uri="{0D108BD9-81ED-4DB2-BD59-A6C34878D82A}">
+                    <a16:rowId xmlns:a16="http://schemas.microsoft.com/office/drawing/2014/main" val="1364165960"/>
+                  </a:ext>
+                </a:extLst>
+              </a:tr>
+              <a:tr h="190500">
+                <a:tc>
+                  <a:txBody>
+                    <a:bodyPr/>
+                    <a:lstStyle/>
+                    <a:p>
+                      <a:pPr algn="l" fontAlgn="b"/>
+                      <a:r>
+                        <a:rPr lang="en-US" sz="1300" b="0" i="0" u="none" strike="noStrike" dirty="0">
+                          <a:solidFill>
+                            <a:srgbClr val="FFFFFF"/>
+                          </a:solidFill>
+                          <a:effectLst/>
+                          <a:latin typeface="Segoe UI Semibold" panose="020B0702040204020203" pitchFamily="34" charset="0"/>
+                          <a:cs typeface="Segoe UI Semibold" panose="020B0702040204020203" pitchFamily="34" charset="0"/>
+                        </a:rPr>
+                        <a:t>Species</a:t>
+                      </a:r>
+                    </a:p>
+                  </a:txBody>
+                  <a:tcPr marL="9525" marR="9525" marT="9525" marB="0" anchor="b">
+                    <a:lnL w="12700" cap="flat" cmpd="sng" algn="ctr">
+                      <a:solidFill>
+                        <a:schemeClr val="tx1"/>
+                      </a:solidFill>
+                      <a:prstDash val="solid"/>
+                      <a:round/>
+                      <a:headEnd type="none" w="med" len="med"/>
+                      <a:tailEnd type="none" w="med" len="med"/>
+                    </a:lnL>
+                    <a:lnR w="12700" cap="flat" cmpd="sng" algn="ctr">
+                      <a:solidFill>
+                        <a:schemeClr val="tx1"/>
+                      </a:solidFill>
+                      <a:prstDash val="solid"/>
+                      <a:round/>
+                      <a:headEnd type="none" w="med" len="med"/>
+                      <a:tailEnd type="none" w="med" len="med"/>
+                    </a:lnR>
+                    <a:lnT w="12700" cap="flat" cmpd="sng" algn="ctr">
+                      <a:solidFill>
+                        <a:schemeClr val="tx1"/>
+                      </a:solidFill>
+                      <a:prstDash val="solid"/>
+                      <a:round/>
+                      <a:headEnd type="none" w="med" len="med"/>
+                      <a:tailEnd type="none" w="med" len="med"/>
+                    </a:lnT>
+                    <a:lnB w="12700" cap="flat" cmpd="sng" algn="ctr">
+                      <a:solidFill>
+                        <a:schemeClr val="tx1"/>
+                      </a:solidFill>
+                      <a:prstDash val="solid"/>
+                      <a:round/>
+                      <a:headEnd type="none" w="med" len="med"/>
+                      <a:tailEnd type="none" w="med" len="med"/>
+                    </a:lnB>
+                    <a:solidFill>
+                      <a:srgbClr val="A5A5A5"/>
+                    </a:solidFill>
+                  </a:tcPr>
+                </a:tc>
+                <a:tc>
+                  <a:txBody>
+                    <a:bodyPr/>
+                    <a:lstStyle/>
+                    <a:p>
+                      <a:pPr algn="l" fontAlgn="b"/>
+                      <a:r>
+                        <a:rPr lang="en-US" sz="1300" b="0" i="0" u="none" strike="noStrike" dirty="0" err="1">
+                          <a:solidFill>
+                            <a:srgbClr val="FFFFFF"/>
+                          </a:solidFill>
+                          <a:effectLst/>
+                          <a:latin typeface="Segoe UI Semibold" panose="020B0702040204020203" pitchFamily="34" charset="0"/>
+                          <a:cs typeface="Segoe UI Semibold" panose="020B0702040204020203" pitchFamily="34" charset="0"/>
+                        </a:rPr>
+                        <a:t>Sepal.Length</a:t>
+                      </a:r>
+                      <a:endParaRPr lang="en-US" sz="1300" b="0" i="0" u="none" strike="noStrike" dirty="0">
+                        <a:solidFill>
+                          <a:srgbClr val="FFFFFF"/>
+                        </a:solidFill>
+                        <a:effectLst/>
+                        <a:latin typeface="Segoe UI Semibold" panose="020B0702040204020203" pitchFamily="34" charset="0"/>
+                        <a:cs typeface="Segoe UI Semibold" panose="020B0702040204020203" pitchFamily="34" charset="0"/>
+                      </a:endParaRPr>
+                    </a:p>
+                  </a:txBody>
+                  <a:tcPr marL="9525" marR="9525" marT="9525" marB="0" anchor="b">
+                    <a:lnL w="12700" cap="flat" cmpd="sng" algn="ctr">
+                      <a:solidFill>
+                        <a:schemeClr val="tx1"/>
+                      </a:solidFill>
+                      <a:prstDash val="solid"/>
+                      <a:round/>
+                      <a:headEnd type="none" w="med" len="med"/>
+                      <a:tailEnd type="none" w="med" len="med"/>
+                    </a:lnL>
+                    <a:lnR>
+                      <a:noFill/>
+                    </a:lnR>
+                    <a:lnT w="12700" cap="flat" cmpd="sng" algn="ctr">
+                      <a:solidFill>
+                        <a:schemeClr val="tx1"/>
+                      </a:solidFill>
+                      <a:prstDash val="solid"/>
+                      <a:round/>
+                      <a:headEnd type="none" w="med" len="med"/>
+                      <a:tailEnd type="none" w="med" len="med"/>
+                    </a:lnT>
+                    <a:lnB w="12700" cap="flat" cmpd="sng" algn="ctr">
+                      <a:solidFill>
+                        <a:schemeClr val="tx1"/>
+                      </a:solidFill>
+                      <a:prstDash val="solid"/>
+                      <a:round/>
+                      <a:headEnd type="none" w="med" len="med"/>
+                      <a:tailEnd type="none" w="med" len="med"/>
+                    </a:lnB>
+                    <a:solidFill>
+                      <a:srgbClr val="A5A5A5"/>
+                    </a:solidFill>
+                  </a:tcPr>
+                </a:tc>
+                <a:tc>
+                  <a:txBody>
+                    <a:bodyPr/>
+                    <a:lstStyle/>
+                    <a:p>
+                      <a:pPr algn="l" fontAlgn="b"/>
+                      <a:r>
+                        <a:rPr lang="en-US" sz="1300" b="0" i="0" u="none" strike="noStrike">
+                          <a:solidFill>
+                            <a:srgbClr val="FFFFFF"/>
+                          </a:solidFill>
+                          <a:effectLst/>
+                          <a:latin typeface="Segoe UI Semibold" panose="020B0702040204020203" pitchFamily="34" charset="0"/>
+                          <a:cs typeface="Segoe UI Semibold" panose="020B0702040204020203" pitchFamily="34" charset="0"/>
+                        </a:rPr>
+                        <a:t>Sepal.Width</a:t>
+                      </a:r>
+                    </a:p>
+                  </a:txBody>
+                  <a:tcPr marL="9525" marR="9525" marT="9525" marB="0" anchor="b">
+                    <a:lnL>
+                      <a:noFill/>
+                    </a:lnL>
+                    <a:lnR>
+                      <a:noFill/>
+                    </a:lnR>
+                    <a:lnT w="12700" cap="flat" cmpd="sng" algn="ctr">
+                      <a:solidFill>
+                        <a:schemeClr val="tx1"/>
+                      </a:solidFill>
+                      <a:prstDash val="solid"/>
+                      <a:round/>
+                      <a:headEnd type="none" w="med" len="med"/>
+                      <a:tailEnd type="none" w="med" len="med"/>
+                    </a:lnT>
+                    <a:lnB w="12700" cap="flat" cmpd="sng" algn="ctr">
+                      <a:solidFill>
+                        <a:schemeClr val="tx1"/>
+                      </a:solidFill>
+                      <a:prstDash val="solid"/>
+                      <a:round/>
+                      <a:headEnd type="none" w="med" len="med"/>
+                      <a:tailEnd type="none" w="med" len="med"/>
+                    </a:lnB>
+                    <a:solidFill>
+                      <a:srgbClr val="A5A5A5"/>
+                    </a:solidFill>
+                  </a:tcPr>
+                </a:tc>
+                <a:tc>
+                  <a:txBody>
+                    <a:bodyPr/>
+                    <a:lstStyle/>
+                    <a:p>
+                      <a:pPr algn="l" fontAlgn="b"/>
+                      <a:r>
+                        <a:rPr lang="en-US" sz="1300" b="0" i="0" u="none" strike="noStrike" dirty="0" err="1">
+                          <a:solidFill>
+                            <a:srgbClr val="FFFFFF"/>
+                          </a:solidFill>
+                          <a:effectLst/>
+                          <a:latin typeface="Segoe UI Semibold" panose="020B0702040204020203" pitchFamily="34" charset="0"/>
+                          <a:cs typeface="Segoe UI Semibold" panose="020B0702040204020203" pitchFamily="34" charset="0"/>
+                        </a:rPr>
+                        <a:t>Petal.Length</a:t>
+                      </a:r>
+                      <a:endParaRPr lang="en-US" sz="1300" b="0" i="0" u="none" strike="noStrike" dirty="0">
+                        <a:solidFill>
+                          <a:srgbClr val="FFFFFF"/>
+                        </a:solidFill>
+                        <a:effectLst/>
+                        <a:latin typeface="Segoe UI Semibold" panose="020B0702040204020203" pitchFamily="34" charset="0"/>
+                        <a:cs typeface="Segoe UI Semibold" panose="020B0702040204020203" pitchFamily="34" charset="0"/>
+                      </a:endParaRPr>
+                    </a:p>
+                  </a:txBody>
+                  <a:tcPr marL="9525" marR="9525" marT="9525" marB="0" anchor="b">
+                    <a:lnL>
+                      <a:noFill/>
+                    </a:lnL>
+                    <a:lnR>
+                      <a:noFill/>
+                    </a:lnR>
+                    <a:lnT w="12700" cap="flat" cmpd="sng" algn="ctr">
+                      <a:solidFill>
+                        <a:schemeClr val="tx1"/>
+                      </a:solidFill>
+                      <a:prstDash val="solid"/>
+                      <a:round/>
+                      <a:headEnd type="none" w="med" len="med"/>
+                      <a:tailEnd type="none" w="med" len="med"/>
+                    </a:lnT>
+                    <a:lnB w="12700" cap="flat" cmpd="sng" algn="ctr">
+                      <a:solidFill>
+                        <a:schemeClr val="tx1"/>
+                      </a:solidFill>
+                      <a:prstDash val="solid"/>
+                      <a:round/>
+                      <a:headEnd type="none" w="med" len="med"/>
+                      <a:tailEnd type="none" w="med" len="med"/>
+                    </a:lnB>
+                    <a:solidFill>
+                      <a:srgbClr val="A5A5A5"/>
+                    </a:solidFill>
+                  </a:tcPr>
+                </a:tc>
+                <a:tc>
+                  <a:txBody>
+                    <a:bodyPr/>
+                    <a:lstStyle/>
+                    <a:p>
+                      <a:pPr algn="l" fontAlgn="b"/>
+                      <a:r>
+                        <a:rPr lang="en-US" sz="1300" b="0" i="0" u="none" strike="noStrike" dirty="0" err="1">
+                          <a:solidFill>
+                            <a:srgbClr val="FFFFFF"/>
+                          </a:solidFill>
+                          <a:effectLst/>
+                          <a:latin typeface="Segoe UI Semibold" panose="020B0702040204020203" pitchFamily="34" charset="0"/>
+                          <a:cs typeface="Segoe UI Semibold" panose="020B0702040204020203" pitchFamily="34" charset="0"/>
+                        </a:rPr>
+                        <a:t>Petal.Width</a:t>
+                      </a:r>
+                      <a:endParaRPr lang="en-US" sz="1300" b="0" i="0" u="none" strike="noStrike" dirty="0">
+                        <a:solidFill>
+                          <a:srgbClr val="FFFFFF"/>
+                        </a:solidFill>
+                        <a:effectLst/>
+                        <a:latin typeface="Segoe UI Semibold" panose="020B0702040204020203" pitchFamily="34" charset="0"/>
+                        <a:cs typeface="Segoe UI Semibold" panose="020B0702040204020203" pitchFamily="34" charset="0"/>
+                      </a:endParaRPr>
+                    </a:p>
+                  </a:txBody>
+                  <a:tcPr marL="9525" marR="9525" marT="9525" marB="0" anchor="b">
+                    <a:lnL>
+                      <a:noFill/>
+                    </a:lnL>
+                    <a:lnR w="12700" cap="flat" cmpd="sng" algn="ctr">
+                      <a:solidFill>
+                        <a:schemeClr val="tx1"/>
+                      </a:solidFill>
+                      <a:prstDash val="solid"/>
+                      <a:round/>
+                      <a:headEnd type="none" w="med" len="med"/>
+                      <a:tailEnd type="none" w="med" len="med"/>
+                    </a:lnR>
+                    <a:lnT w="12700" cap="flat" cmpd="sng" algn="ctr">
+                      <a:solidFill>
+                        <a:schemeClr val="tx1"/>
+                      </a:solidFill>
+                      <a:prstDash val="solid"/>
+                      <a:round/>
+                      <a:headEnd type="none" w="med" len="med"/>
+                      <a:tailEnd type="none" w="med" len="med"/>
+                    </a:lnT>
+                    <a:lnB w="12700" cap="flat" cmpd="sng" algn="ctr">
+                      <a:solidFill>
+                        <a:schemeClr val="tx1"/>
+                      </a:solidFill>
+                      <a:prstDash val="solid"/>
+                      <a:round/>
+                      <a:headEnd type="none" w="med" len="med"/>
+                      <a:tailEnd type="none" w="med" len="med"/>
+                    </a:lnB>
+                    <a:solidFill>
+                      <a:srgbClr val="A5A5A5"/>
+                    </a:solidFill>
+                  </a:tcPr>
+                </a:tc>
+                <a:extLst>
+                  <a:ext uri="{0D108BD9-81ED-4DB2-BD59-A6C34878D82A}">
+                    <a16:rowId xmlns:a16="http://schemas.microsoft.com/office/drawing/2014/main" val="1455962748"/>
+                  </a:ext>
+                </a:extLst>
+              </a:tr>
+              <a:tr h="190500">
+                <a:tc>
+                  <a:txBody>
+                    <a:bodyPr/>
+                    <a:lstStyle/>
+                    <a:p>
+                      <a:pPr algn="l" fontAlgn="b"/>
+                      <a:r>
+                        <a:rPr lang="en-US" sz="1300" b="0" i="0" u="sng" strike="noStrike" dirty="0">
+                          <a:solidFill>
+                            <a:srgbClr val="C65911"/>
+                          </a:solidFill>
+                          <a:effectLst/>
+                          <a:latin typeface="Segoe UI Semibold" panose="020B0702040204020203" pitchFamily="34" charset="0"/>
+                          <a:cs typeface="Segoe UI Semibold" panose="020B0702040204020203" pitchFamily="34" charset="0"/>
+                        </a:rPr>
+                        <a:t>versicolor</a:t>
+                      </a:r>
+                    </a:p>
+                  </a:txBody>
+                  <a:tcPr marL="9525" marR="9525" marT="9525" marB="0" anchor="b">
+                    <a:lnL w="12700" cap="flat" cmpd="sng" algn="ctr">
+                      <a:solidFill>
+                        <a:schemeClr val="tx1"/>
+                      </a:solidFill>
+                      <a:prstDash val="solid"/>
+                      <a:round/>
+                      <a:headEnd type="none" w="med" len="med"/>
+                      <a:tailEnd type="none" w="med" len="med"/>
+                    </a:lnL>
+                    <a:lnR w="12700" cap="flat" cmpd="sng" algn="ctr">
+                      <a:solidFill>
+                        <a:schemeClr val="tx1"/>
+                      </a:solidFill>
+                      <a:prstDash val="solid"/>
+                      <a:round/>
+                      <a:headEnd type="none" w="med" len="med"/>
+                      <a:tailEnd type="none" w="med" len="med"/>
+                    </a:lnR>
+                    <a:lnT w="12700" cap="flat" cmpd="sng" algn="ctr">
+                      <a:solidFill>
+                        <a:schemeClr val="tx1"/>
+                      </a:solidFill>
+                      <a:prstDash val="solid"/>
+                      <a:round/>
+                      <a:headEnd type="none" w="med" len="med"/>
+                      <a:tailEnd type="none" w="med" len="med"/>
+                    </a:lnT>
+                    <a:lnB w="6350" cap="flat" cmpd="sng" algn="ctr">
+                      <a:solidFill>
+                        <a:srgbClr val="A5A5A5"/>
+                      </a:solidFill>
+                      <a:prstDash val="solid"/>
+                      <a:round/>
+                      <a:headEnd type="none" w="med" len="med"/>
+                      <a:tailEnd type="none" w="med" len="med"/>
+                    </a:lnB>
+                    <a:solidFill>
+                      <a:schemeClr val="accent2">
+                        <a:lumMod val="20000"/>
+                        <a:lumOff val="80000"/>
+                      </a:schemeClr>
+                    </a:solidFill>
+                  </a:tcPr>
+                </a:tc>
+                <a:tc>
+                  <a:txBody>
+                    <a:bodyPr/>
+                    <a:lstStyle/>
+                    <a:p>
+                      <a:pPr algn="r" fontAlgn="b"/>
+                      <a:r>
+                        <a:rPr lang="en-US" sz="1300" b="0" i="0" u="none" strike="noStrike" dirty="0">
+                          <a:solidFill>
+                            <a:srgbClr val="000000"/>
+                          </a:solidFill>
+                          <a:effectLst/>
+                          <a:latin typeface="Segoe UI" panose="020B0502040204020203" pitchFamily="34" charset="0"/>
+                          <a:cs typeface="Segoe UI" panose="020B0502040204020203" pitchFamily="34" charset="0"/>
+                        </a:rPr>
+                        <a:t>6</a:t>
+                      </a:r>
+                    </a:p>
+                  </a:txBody>
+                  <a:tcPr marL="9525" marR="9525" marT="9525" marB="0" anchor="b">
+                    <a:lnL w="12700" cap="flat" cmpd="sng" algn="ctr">
+                      <a:solidFill>
+                        <a:schemeClr val="tx1"/>
+                      </a:solidFill>
+                      <a:prstDash val="solid"/>
+                      <a:round/>
+                      <a:headEnd type="none" w="med" len="med"/>
+                      <a:tailEnd type="none" w="med" len="med"/>
+                    </a:lnL>
+                    <a:lnR>
+                      <a:noFill/>
+                    </a:lnR>
+                    <a:lnT w="12700" cap="flat" cmpd="sng" algn="ctr">
+                      <a:solidFill>
+                        <a:schemeClr val="tx1"/>
+                      </a:solidFill>
+                      <a:prstDash val="solid"/>
+                      <a:round/>
+                      <a:headEnd type="none" w="med" len="med"/>
+                      <a:tailEnd type="none" w="med" len="med"/>
+                    </a:lnT>
+                    <a:lnB w="6350" cap="flat" cmpd="sng" algn="ctr">
+                      <a:solidFill>
+                        <a:srgbClr val="A5A5A5"/>
+                      </a:solidFill>
+                      <a:prstDash val="solid"/>
+                      <a:round/>
+                      <a:headEnd type="none" w="med" len="med"/>
+                      <a:tailEnd type="none" w="med" len="med"/>
+                    </a:lnB>
+                  </a:tcPr>
+                </a:tc>
+                <a:tc>
+                  <a:txBody>
+                    <a:bodyPr/>
+                    <a:lstStyle/>
+                    <a:p>
+                      <a:pPr algn="r" fontAlgn="b"/>
+                      <a:r>
+                        <a:rPr lang="en-US" sz="1300" b="0" i="0" u="none" strike="noStrike" dirty="0">
+                          <a:solidFill>
+                            <a:srgbClr val="000000"/>
+                          </a:solidFill>
+                          <a:effectLst/>
+                          <a:latin typeface="Segoe UI" panose="020B0502040204020203" pitchFamily="34" charset="0"/>
+                          <a:cs typeface="Segoe UI" panose="020B0502040204020203" pitchFamily="34" charset="0"/>
+                        </a:rPr>
+                        <a:t>2.2</a:t>
+                      </a:r>
+                    </a:p>
+                  </a:txBody>
+                  <a:tcPr marL="9525" marR="9525" marT="9525" marB="0" anchor="b">
+                    <a:lnL>
+                      <a:noFill/>
+                    </a:lnL>
+                    <a:lnR>
+                      <a:noFill/>
+                    </a:lnR>
+                    <a:lnT w="12700" cap="flat" cmpd="sng" algn="ctr">
+                      <a:solidFill>
+                        <a:schemeClr val="tx1"/>
+                      </a:solidFill>
+                      <a:prstDash val="solid"/>
+                      <a:round/>
+                      <a:headEnd type="none" w="med" len="med"/>
+                      <a:tailEnd type="none" w="med" len="med"/>
+                    </a:lnT>
+                    <a:lnB w="6350" cap="flat" cmpd="sng" algn="ctr">
+                      <a:solidFill>
+                        <a:srgbClr val="A5A5A5"/>
+                      </a:solidFill>
+                      <a:prstDash val="solid"/>
+                      <a:round/>
+                      <a:headEnd type="none" w="med" len="med"/>
+                      <a:tailEnd type="none" w="med" len="med"/>
+                    </a:lnB>
+                  </a:tcPr>
+                </a:tc>
+                <a:tc>
+                  <a:txBody>
+                    <a:bodyPr/>
+                    <a:lstStyle/>
+                    <a:p>
+                      <a:pPr algn="r" fontAlgn="b"/>
+                      <a:r>
+                        <a:rPr lang="en-US" sz="1300" b="0" i="0" u="none" strike="noStrike">
+                          <a:solidFill>
+                            <a:srgbClr val="000000"/>
+                          </a:solidFill>
+                          <a:effectLst/>
+                          <a:latin typeface="Segoe UI" panose="020B0502040204020203" pitchFamily="34" charset="0"/>
+                          <a:cs typeface="Segoe UI" panose="020B0502040204020203" pitchFamily="34" charset="0"/>
+                        </a:rPr>
+                        <a:t>4</a:t>
+                      </a:r>
+                    </a:p>
+                  </a:txBody>
+                  <a:tcPr marL="9525" marR="9525" marT="9525" marB="0" anchor="b">
+                    <a:lnL>
+                      <a:noFill/>
+                    </a:lnL>
+                    <a:lnR>
+                      <a:noFill/>
+                    </a:lnR>
+                    <a:lnT w="12700" cap="flat" cmpd="sng" algn="ctr">
+                      <a:solidFill>
+                        <a:schemeClr val="tx1"/>
+                      </a:solidFill>
+                      <a:prstDash val="solid"/>
+                      <a:round/>
+                      <a:headEnd type="none" w="med" len="med"/>
+                      <a:tailEnd type="none" w="med" len="med"/>
+                    </a:lnT>
+                    <a:lnB w="6350" cap="flat" cmpd="sng" algn="ctr">
+                      <a:solidFill>
+                        <a:srgbClr val="A5A5A5"/>
+                      </a:solidFill>
+                      <a:prstDash val="solid"/>
+                      <a:round/>
+                      <a:headEnd type="none" w="med" len="med"/>
+                      <a:tailEnd type="none" w="med" len="med"/>
+                    </a:lnB>
+                  </a:tcPr>
+                </a:tc>
+                <a:tc>
+                  <a:txBody>
+                    <a:bodyPr/>
+                    <a:lstStyle/>
+                    <a:p>
+                      <a:pPr algn="r" fontAlgn="b"/>
+                      <a:r>
+                        <a:rPr lang="en-US" sz="1300" b="0" i="0" u="none" strike="noStrike" dirty="0">
+                          <a:solidFill>
+                            <a:srgbClr val="000000"/>
+                          </a:solidFill>
+                          <a:effectLst/>
+                          <a:latin typeface="Segoe UI" panose="020B0502040204020203" pitchFamily="34" charset="0"/>
+                          <a:cs typeface="Segoe UI" panose="020B0502040204020203" pitchFamily="34" charset="0"/>
+                        </a:rPr>
+                        <a:t>1</a:t>
+                      </a:r>
+                    </a:p>
+                  </a:txBody>
+                  <a:tcPr marL="9525" marR="9525" marT="9525" marB="0" anchor="b">
+                    <a:lnL>
+                      <a:noFill/>
+                    </a:lnL>
+                    <a:lnR w="12700" cap="flat" cmpd="sng" algn="ctr">
+                      <a:solidFill>
+                        <a:schemeClr val="tx1"/>
+                      </a:solidFill>
+                      <a:prstDash val="solid"/>
+                      <a:round/>
+                      <a:headEnd type="none" w="med" len="med"/>
+                      <a:tailEnd type="none" w="med" len="med"/>
+                    </a:lnR>
+                    <a:lnT w="12700" cap="flat" cmpd="sng" algn="ctr">
+                      <a:solidFill>
+                        <a:schemeClr val="tx1"/>
+                      </a:solidFill>
+                      <a:prstDash val="solid"/>
+                      <a:round/>
+                      <a:headEnd type="none" w="med" len="med"/>
+                      <a:tailEnd type="none" w="med" len="med"/>
+                    </a:lnT>
+                    <a:lnB w="6350" cap="flat" cmpd="sng" algn="ctr">
+                      <a:solidFill>
+                        <a:srgbClr val="A5A5A5"/>
+                      </a:solidFill>
+                      <a:prstDash val="solid"/>
+                      <a:round/>
+                      <a:headEnd type="none" w="med" len="med"/>
+                      <a:tailEnd type="none" w="med" len="med"/>
+                    </a:lnB>
+                  </a:tcPr>
+                </a:tc>
+                <a:extLst>
+                  <a:ext uri="{0D108BD9-81ED-4DB2-BD59-A6C34878D82A}">
+                    <a16:rowId xmlns:a16="http://schemas.microsoft.com/office/drawing/2014/main" val="1669768053"/>
+                  </a:ext>
+                </a:extLst>
+              </a:tr>
+              <a:tr h="190500">
+                <a:tc>
+                  <a:txBody>
+                    <a:bodyPr/>
+                    <a:lstStyle/>
+                    <a:p>
+                      <a:pPr algn="l" fontAlgn="b"/>
+                      <a:r>
+                        <a:rPr lang="en-US" sz="1300" b="0" i="0" u="sng" strike="noStrike" dirty="0">
+                          <a:solidFill>
+                            <a:srgbClr val="C65911"/>
+                          </a:solidFill>
+                          <a:effectLst/>
+                          <a:latin typeface="Segoe UI Semibold" panose="020B0702040204020203" pitchFamily="34" charset="0"/>
+                          <a:cs typeface="Segoe UI Semibold" panose="020B0702040204020203" pitchFamily="34" charset="0"/>
+                        </a:rPr>
+                        <a:t>versicolor</a:t>
+                      </a:r>
+                    </a:p>
+                  </a:txBody>
+                  <a:tcPr marL="9525" marR="9525" marT="9525" marB="0" anchor="b">
+                    <a:lnL w="12700" cap="flat" cmpd="sng" algn="ctr">
+                      <a:solidFill>
+                        <a:schemeClr val="tx1"/>
+                      </a:solidFill>
+                      <a:prstDash val="solid"/>
+                      <a:round/>
+                      <a:headEnd type="none" w="med" len="med"/>
+                      <a:tailEnd type="none" w="med" len="med"/>
+                    </a:lnL>
+                    <a:lnR w="12700" cap="flat" cmpd="sng" algn="ctr">
+                      <a:solidFill>
+                        <a:schemeClr val="tx1"/>
+                      </a:solidFill>
+                      <a:prstDash val="solid"/>
+                      <a:round/>
+                      <a:headEnd type="none" w="med" len="med"/>
+                      <a:tailEnd type="none" w="med" len="med"/>
+                    </a:lnR>
+                    <a:lnT w="6350" cap="flat" cmpd="sng" algn="ctr">
+                      <a:solidFill>
+                        <a:srgbClr val="A5A5A5"/>
+                      </a:solidFill>
+                      <a:prstDash val="solid"/>
+                      <a:round/>
+                      <a:headEnd type="none" w="med" len="med"/>
+                      <a:tailEnd type="none" w="med" len="med"/>
+                    </a:lnT>
+                    <a:lnB w="12700" cap="flat" cmpd="sng" algn="ctr">
+                      <a:solidFill>
+                        <a:schemeClr val="tx1"/>
+                      </a:solidFill>
+                      <a:prstDash val="solid"/>
+                      <a:round/>
+                      <a:headEnd type="none" w="med" len="med"/>
+                      <a:tailEnd type="none" w="med" len="med"/>
+                    </a:lnB>
+                    <a:solidFill>
+                      <a:schemeClr val="accent2">
+                        <a:lumMod val="20000"/>
+                        <a:lumOff val="80000"/>
+                      </a:schemeClr>
+                    </a:solidFill>
+                  </a:tcPr>
+                </a:tc>
+                <a:tc>
+                  <a:txBody>
+                    <a:bodyPr/>
+                    <a:lstStyle/>
+                    <a:p>
+                      <a:pPr algn="r" fontAlgn="b"/>
+                      <a:r>
+                        <a:rPr lang="en-US" sz="1300" b="0" i="0" u="none" strike="noStrike" dirty="0">
+                          <a:solidFill>
+                            <a:srgbClr val="000000"/>
+                          </a:solidFill>
+                          <a:effectLst/>
+                          <a:latin typeface="Segoe UI" panose="020B0502040204020203" pitchFamily="34" charset="0"/>
+                          <a:cs typeface="Segoe UI" panose="020B0502040204020203" pitchFamily="34" charset="0"/>
+                        </a:rPr>
+                        <a:t>6.1</a:t>
+                      </a:r>
+                    </a:p>
+                  </a:txBody>
+                  <a:tcPr marL="9525" marR="9525" marT="9525" marB="0" anchor="b">
+                    <a:lnL w="12700" cap="flat" cmpd="sng" algn="ctr">
+                      <a:solidFill>
+                        <a:schemeClr val="tx1"/>
+                      </a:solidFill>
+                      <a:prstDash val="solid"/>
+                      <a:round/>
+                      <a:headEnd type="none" w="med" len="med"/>
+                      <a:tailEnd type="none" w="med" len="med"/>
+                    </a:lnL>
+                    <a:lnR>
+                      <a:noFill/>
+                    </a:lnR>
+                    <a:lnT w="6350" cap="flat" cmpd="sng" algn="ctr">
+                      <a:solidFill>
+                        <a:srgbClr val="A5A5A5"/>
+                      </a:solidFill>
+                      <a:prstDash val="solid"/>
+                      <a:round/>
+                      <a:headEnd type="none" w="med" len="med"/>
+                      <a:tailEnd type="none" w="med" len="med"/>
+                    </a:lnT>
+                    <a:lnB w="12700" cap="flat" cmpd="sng" algn="ctr">
+                      <a:solidFill>
+                        <a:schemeClr val="tx1"/>
+                      </a:solidFill>
+                      <a:prstDash val="solid"/>
+                      <a:round/>
+                      <a:headEnd type="none" w="med" len="med"/>
+                      <a:tailEnd type="none" w="med" len="med"/>
+                    </a:lnB>
+                  </a:tcPr>
+                </a:tc>
+                <a:tc>
+                  <a:txBody>
+                    <a:bodyPr/>
+                    <a:lstStyle/>
+                    <a:p>
+                      <a:pPr algn="r" fontAlgn="b"/>
+                      <a:r>
+                        <a:rPr lang="en-US" sz="1300" b="0" i="0" u="none" strike="noStrike">
+                          <a:solidFill>
+                            <a:srgbClr val="000000"/>
+                          </a:solidFill>
+                          <a:effectLst/>
+                          <a:latin typeface="Segoe UI" panose="020B0502040204020203" pitchFamily="34" charset="0"/>
+                          <a:cs typeface="Segoe UI" panose="020B0502040204020203" pitchFamily="34" charset="0"/>
+                        </a:rPr>
+                        <a:t>2.8</a:t>
+                      </a:r>
+                    </a:p>
+                  </a:txBody>
+                  <a:tcPr marL="9525" marR="9525" marT="9525" marB="0" anchor="b">
+                    <a:lnL>
+                      <a:noFill/>
+                    </a:lnL>
+                    <a:lnR>
+                      <a:noFill/>
+                    </a:lnR>
+                    <a:lnT w="6350" cap="flat" cmpd="sng" algn="ctr">
+                      <a:solidFill>
+                        <a:srgbClr val="A5A5A5"/>
+                      </a:solidFill>
+                      <a:prstDash val="solid"/>
+                      <a:round/>
+                      <a:headEnd type="none" w="med" len="med"/>
+                      <a:tailEnd type="none" w="med" len="med"/>
+                    </a:lnT>
+                    <a:lnB w="12700" cap="flat" cmpd="sng" algn="ctr">
+                      <a:solidFill>
+                        <a:schemeClr val="tx1"/>
+                      </a:solidFill>
+                      <a:prstDash val="solid"/>
+                      <a:round/>
+                      <a:headEnd type="none" w="med" len="med"/>
+                      <a:tailEnd type="none" w="med" len="med"/>
+                    </a:lnB>
+                  </a:tcPr>
+                </a:tc>
+                <a:tc>
+                  <a:txBody>
+                    <a:bodyPr/>
+                    <a:lstStyle/>
+                    <a:p>
+                      <a:pPr algn="r" fontAlgn="b"/>
+                      <a:r>
+                        <a:rPr lang="en-US" sz="1300" b="0" i="0" u="none" strike="noStrike" dirty="0">
+                          <a:solidFill>
+                            <a:srgbClr val="000000"/>
+                          </a:solidFill>
+                          <a:effectLst/>
+                          <a:latin typeface="Segoe UI" panose="020B0502040204020203" pitchFamily="34" charset="0"/>
+                          <a:cs typeface="Segoe UI" panose="020B0502040204020203" pitchFamily="34" charset="0"/>
+                        </a:rPr>
+                        <a:t>4</a:t>
+                      </a:r>
+                    </a:p>
+                  </a:txBody>
+                  <a:tcPr marL="9525" marR="9525" marT="9525" marB="0" anchor="b">
+                    <a:lnL>
+                      <a:noFill/>
+                    </a:lnL>
+                    <a:lnR>
+                      <a:noFill/>
+                    </a:lnR>
+                    <a:lnT w="6350" cap="flat" cmpd="sng" algn="ctr">
+                      <a:solidFill>
+                        <a:srgbClr val="A5A5A5"/>
+                      </a:solidFill>
+                      <a:prstDash val="solid"/>
+                      <a:round/>
+                      <a:headEnd type="none" w="med" len="med"/>
+                      <a:tailEnd type="none" w="med" len="med"/>
+                    </a:lnT>
+                    <a:lnB w="12700" cap="flat" cmpd="sng" algn="ctr">
+                      <a:solidFill>
+                        <a:schemeClr val="tx1"/>
+                      </a:solidFill>
+                      <a:prstDash val="solid"/>
+                      <a:round/>
+                      <a:headEnd type="none" w="med" len="med"/>
+                      <a:tailEnd type="none" w="med" len="med"/>
+                    </a:lnB>
+                  </a:tcPr>
+                </a:tc>
+                <a:tc>
+                  <a:txBody>
+                    <a:bodyPr/>
+                    <a:lstStyle/>
+                    <a:p>
+                      <a:pPr algn="r" fontAlgn="b"/>
+                      <a:r>
+                        <a:rPr lang="en-US" sz="1300" b="0" i="0" u="none" strike="noStrike" dirty="0">
+                          <a:solidFill>
+                            <a:srgbClr val="000000"/>
+                          </a:solidFill>
+                          <a:effectLst/>
+                          <a:latin typeface="Segoe UI" panose="020B0502040204020203" pitchFamily="34" charset="0"/>
+                          <a:cs typeface="Segoe UI" panose="020B0502040204020203" pitchFamily="34" charset="0"/>
+                        </a:rPr>
+                        <a:t>1.3</a:t>
+                      </a:r>
+                    </a:p>
+                  </a:txBody>
+                  <a:tcPr marL="9525" marR="9525" marT="9525" marB="0" anchor="b">
+                    <a:lnL>
+                      <a:noFill/>
+                    </a:lnL>
+                    <a:lnR w="12700" cap="flat" cmpd="sng" algn="ctr">
+                      <a:solidFill>
+                        <a:schemeClr val="tx1"/>
+                      </a:solidFill>
+                      <a:prstDash val="solid"/>
+                      <a:round/>
+                      <a:headEnd type="none" w="med" len="med"/>
+                      <a:tailEnd type="none" w="med" len="med"/>
+                    </a:lnR>
+                    <a:lnT w="6350" cap="flat" cmpd="sng" algn="ctr">
+                      <a:solidFill>
+                        <a:srgbClr val="A5A5A5"/>
+                      </a:solidFill>
+                      <a:prstDash val="solid"/>
+                      <a:round/>
+                      <a:headEnd type="none" w="med" len="med"/>
+                      <a:tailEnd type="none" w="med" len="med"/>
+                    </a:lnT>
+                    <a:lnB w="12700" cap="flat" cmpd="sng" algn="ctr">
+                      <a:solidFill>
+                        <a:schemeClr val="tx1"/>
+                      </a:solidFill>
+                      <a:prstDash val="solid"/>
+                      <a:round/>
+                      <a:headEnd type="none" w="med" len="med"/>
+                      <a:tailEnd type="none" w="med" len="med"/>
+                    </a:lnB>
+                  </a:tcPr>
+                </a:tc>
+                <a:extLst>
+                  <a:ext uri="{0D108BD9-81ED-4DB2-BD59-A6C34878D82A}">
+                    <a16:rowId xmlns:a16="http://schemas.microsoft.com/office/drawing/2014/main" val="2824785359"/>
+                  </a:ext>
+                </a:extLst>
+              </a:tr>
+              <a:tr h="190500">
+                <a:tc>
+                  <a:txBody>
+                    <a:bodyPr/>
+                    <a:lstStyle/>
+                    <a:p>
+                      <a:pPr algn="l" fontAlgn="b"/>
+                      <a:r>
+                        <a:rPr lang="en-US" sz="1300" b="0" i="0" u="sng" strike="noStrike" dirty="0" err="1">
+                          <a:solidFill>
+                            <a:srgbClr val="2F75B5"/>
+                          </a:solidFill>
+                          <a:effectLst/>
+                          <a:latin typeface="Segoe UI Semibold" panose="020B0702040204020203" pitchFamily="34" charset="0"/>
+                          <a:cs typeface="Segoe UI Semibold" panose="020B0702040204020203" pitchFamily="34" charset="0"/>
+                        </a:rPr>
+                        <a:t>setosa</a:t>
+                      </a:r>
+                      <a:endParaRPr lang="en-US" sz="1300" b="0" i="0" u="sng" strike="noStrike" dirty="0">
+                        <a:solidFill>
+                          <a:srgbClr val="2F75B5"/>
+                        </a:solidFill>
+                        <a:effectLst/>
+                        <a:latin typeface="Segoe UI Semibold" panose="020B0702040204020203" pitchFamily="34" charset="0"/>
+                        <a:cs typeface="Segoe UI Semibold" panose="020B0702040204020203" pitchFamily="34" charset="0"/>
+                      </a:endParaRPr>
+                    </a:p>
+                  </a:txBody>
+                  <a:tcPr marL="9525" marR="9525" marT="9525" marB="0" anchor="b">
+                    <a:lnL w="12700" cap="flat" cmpd="sng" algn="ctr">
+                      <a:solidFill>
+                        <a:schemeClr val="tx1"/>
+                      </a:solidFill>
+                      <a:prstDash val="solid"/>
+                      <a:round/>
+                      <a:headEnd type="none" w="med" len="med"/>
+                      <a:tailEnd type="none" w="med" len="med"/>
+                    </a:lnL>
+                    <a:lnR w="12700" cap="flat" cmpd="sng" algn="ctr">
+                      <a:solidFill>
+                        <a:schemeClr val="tx1"/>
+                      </a:solidFill>
+                      <a:prstDash val="solid"/>
+                      <a:round/>
+                      <a:headEnd type="none" w="med" len="med"/>
+                      <a:tailEnd type="none" w="med" len="med"/>
+                    </a:lnR>
+                    <a:lnT w="12700" cap="flat" cmpd="sng" algn="ctr">
+                      <a:solidFill>
+                        <a:schemeClr val="tx1"/>
+                      </a:solidFill>
+                      <a:prstDash val="solid"/>
+                      <a:round/>
+                      <a:headEnd type="none" w="med" len="med"/>
+                      <a:tailEnd type="none" w="med" len="med"/>
+                    </a:lnT>
+                    <a:lnB w="6350" cap="flat" cmpd="sng" algn="ctr">
+                      <a:solidFill>
+                        <a:srgbClr val="A5A5A5"/>
+                      </a:solidFill>
+                      <a:prstDash val="solid"/>
+                      <a:round/>
+                      <a:headEnd type="none" w="med" len="med"/>
+                      <a:tailEnd type="none" w="med" len="med"/>
+                    </a:lnB>
+                    <a:solidFill>
+                      <a:schemeClr val="accent5">
+                        <a:lumMod val="20000"/>
+                        <a:lumOff val="80000"/>
+                      </a:schemeClr>
+                    </a:solidFill>
+                  </a:tcPr>
+                </a:tc>
+                <a:tc>
+                  <a:txBody>
+                    <a:bodyPr/>
+                    <a:lstStyle/>
+                    <a:p>
+                      <a:pPr algn="r" fontAlgn="b"/>
+                      <a:r>
+                        <a:rPr lang="en-US" sz="1300" b="0" i="0" u="none" strike="noStrike" dirty="0">
+                          <a:solidFill>
+                            <a:srgbClr val="000000"/>
+                          </a:solidFill>
+                          <a:effectLst/>
+                          <a:latin typeface="Segoe UI" panose="020B0502040204020203" pitchFamily="34" charset="0"/>
+                          <a:cs typeface="Segoe UI" panose="020B0502040204020203" pitchFamily="34" charset="0"/>
+                        </a:rPr>
+                        <a:t>5.1</a:t>
+                      </a:r>
+                    </a:p>
+                  </a:txBody>
+                  <a:tcPr marL="9525" marR="9525" marT="9525" marB="0" anchor="b">
+                    <a:lnL w="12700" cap="flat" cmpd="sng" algn="ctr">
+                      <a:solidFill>
+                        <a:schemeClr val="tx1"/>
+                      </a:solidFill>
+                      <a:prstDash val="solid"/>
+                      <a:round/>
+                      <a:headEnd type="none" w="med" len="med"/>
+                      <a:tailEnd type="none" w="med" len="med"/>
+                    </a:lnL>
+                    <a:lnR>
+                      <a:noFill/>
+                    </a:lnR>
+                    <a:lnT w="12700" cap="flat" cmpd="sng" algn="ctr">
+                      <a:solidFill>
+                        <a:schemeClr val="tx1"/>
+                      </a:solidFill>
+                      <a:prstDash val="solid"/>
+                      <a:round/>
+                      <a:headEnd type="none" w="med" len="med"/>
+                      <a:tailEnd type="none" w="med" len="med"/>
+                    </a:lnT>
+                    <a:lnB w="6350" cap="flat" cmpd="sng" algn="ctr">
+                      <a:solidFill>
+                        <a:srgbClr val="A5A5A5"/>
+                      </a:solidFill>
+                      <a:prstDash val="solid"/>
+                      <a:round/>
+                      <a:headEnd type="none" w="med" len="med"/>
+                      <a:tailEnd type="none" w="med" len="med"/>
+                    </a:lnB>
+                  </a:tcPr>
+                </a:tc>
+                <a:tc>
+                  <a:txBody>
+                    <a:bodyPr/>
+                    <a:lstStyle/>
+                    <a:p>
+                      <a:pPr algn="r" fontAlgn="b"/>
+                      <a:r>
+                        <a:rPr lang="en-US" sz="1300" b="0" i="0" u="none" strike="noStrike">
+                          <a:solidFill>
+                            <a:srgbClr val="000000"/>
+                          </a:solidFill>
+                          <a:effectLst/>
+                          <a:latin typeface="Segoe UI" panose="020B0502040204020203" pitchFamily="34" charset="0"/>
+                          <a:cs typeface="Segoe UI" panose="020B0502040204020203" pitchFamily="34" charset="0"/>
+                        </a:rPr>
+                        <a:t>3.8</a:t>
+                      </a:r>
+                    </a:p>
+                  </a:txBody>
+                  <a:tcPr marL="9525" marR="9525" marT="9525" marB="0" anchor="b">
+                    <a:lnL>
+                      <a:noFill/>
+                    </a:lnL>
+                    <a:lnR>
+                      <a:noFill/>
+                    </a:lnR>
+                    <a:lnT w="12700" cap="flat" cmpd="sng" algn="ctr">
+                      <a:solidFill>
+                        <a:schemeClr val="tx1"/>
+                      </a:solidFill>
+                      <a:prstDash val="solid"/>
+                      <a:round/>
+                      <a:headEnd type="none" w="med" len="med"/>
+                      <a:tailEnd type="none" w="med" len="med"/>
+                    </a:lnT>
+                    <a:lnB w="6350" cap="flat" cmpd="sng" algn="ctr">
+                      <a:solidFill>
+                        <a:srgbClr val="A5A5A5"/>
+                      </a:solidFill>
+                      <a:prstDash val="solid"/>
+                      <a:round/>
+                      <a:headEnd type="none" w="med" len="med"/>
+                      <a:tailEnd type="none" w="med" len="med"/>
+                    </a:lnB>
+                  </a:tcPr>
+                </a:tc>
+                <a:tc>
+                  <a:txBody>
+                    <a:bodyPr/>
+                    <a:lstStyle/>
+                    <a:p>
+                      <a:pPr algn="r" fontAlgn="b"/>
+                      <a:r>
+                        <a:rPr lang="en-US" sz="1300" b="0" i="0" u="none" strike="noStrike">
+                          <a:solidFill>
+                            <a:srgbClr val="000000"/>
+                          </a:solidFill>
+                          <a:effectLst/>
+                          <a:latin typeface="Segoe UI" panose="020B0502040204020203" pitchFamily="34" charset="0"/>
+                          <a:cs typeface="Segoe UI" panose="020B0502040204020203" pitchFamily="34" charset="0"/>
+                        </a:rPr>
+                        <a:t>1.9</a:t>
+                      </a:r>
+                    </a:p>
+                  </a:txBody>
+                  <a:tcPr marL="9525" marR="9525" marT="9525" marB="0" anchor="b">
+                    <a:lnL>
+                      <a:noFill/>
+                    </a:lnL>
+                    <a:lnR>
+                      <a:noFill/>
+                    </a:lnR>
+                    <a:lnT w="12700" cap="flat" cmpd="sng" algn="ctr">
+                      <a:solidFill>
+                        <a:schemeClr val="tx1"/>
+                      </a:solidFill>
+                      <a:prstDash val="solid"/>
+                      <a:round/>
+                      <a:headEnd type="none" w="med" len="med"/>
+                      <a:tailEnd type="none" w="med" len="med"/>
+                    </a:lnT>
+                    <a:lnB w="6350" cap="flat" cmpd="sng" algn="ctr">
+                      <a:solidFill>
+                        <a:srgbClr val="A5A5A5"/>
+                      </a:solidFill>
+                      <a:prstDash val="solid"/>
+                      <a:round/>
+                      <a:headEnd type="none" w="med" len="med"/>
+                      <a:tailEnd type="none" w="med" len="med"/>
+                    </a:lnB>
+                  </a:tcPr>
+                </a:tc>
+                <a:tc>
+                  <a:txBody>
+                    <a:bodyPr/>
+                    <a:lstStyle/>
+                    <a:p>
+                      <a:pPr algn="r" fontAlgn="b"/>
+                      <a:r>
+                        <a:rPr lang="en-US" sz="1300" b="0" i="0" u="none" strike="noStrike">
+                          <a:solidFill>
+                            <a:srgbClr val="000000"/>
+                          </a:solidFill>
+                          <a:effectLst/>
+                          <a:latin typeface="Segoe UI" panose="020B0502040204020203" pitchFamily="34" charset="0"/>
+                          <a:cs typeface="Segoe UI" panose="020B0502040204020203" pitchFamily="34" charset="0"/>
+                        </a:rPr>
+                        <a:t>0.4</a:t>
+                      </a:r>
+                    </a:p>
+                  </a:txBody>
+                  <a:tcPr marL="9525" marR="9525" marT="9525" marB="0" anchor="b">
+                    <a:lnL>
+                      <a:noFill/>
+                    </a:lnL>
+                    <a:lnR w="12700" cap="flat" cmpd="sng" algn="ctr">
+                      <a:solidFill>
+                        <a:schemeClr val="tx1"/>
+                      </a:solidFill>
+                      <a:prstDash val="solid"/>
+                      <a:round/>
+                      <a:headEnd type="none" w="med" len="med"/>
+                      <a:tailEnd type="none" w="med" len="med"/>
+                    </a:lnR>
+                    <a:lnT w="12700" cap="flat" cmpd="sng" algn="ctr">
+                      <a:solidFill>
+                        <a:schemeClr val="tx1"/>
+                      </a:solidFill>
+                      <a:prstDash val="solid"/>
+                      <a:round/>
+                      <a:headEnd type="none" w="med" len="med"/>
+                      <a:tailEnd type="none" w="med" len="med"/>
+                    </a:lnT>
+                    <a:lnB w="6350" cap="flat" cmpd="sng" algn="ctr">
+                      <a:solidFill>
+                        <a:srgbClr val="A5A5A5"/>
+                      </a:solidFill>
+                      <a:prstDash val="solid"/>
+                      <a:round/>
+                      <a:headEnd type="none" w="med" len="med"/>
+                      <a:tailEnd type="none" w="med" len="med"/>
+                    </a:lnB>
+                  </a:tcPr>
+                </a:tc>
+                <a:extLst>
+                  <a:ext uri="{0D108BD9-81ED-4DB2-BD59-A6C34878D82A}">
+                    <a16:rowId xmlns:a16="http://schemas.microsoft.com/office/drawing/2014/main" val="2017058007"/>
+                  </a:ext>
+                </a:extLst>
+              </a:tr>
+              <a:tr h="190500">
+                <a:tc>
+                  <a:txBody>
+                    <a:bodyPr/>
+                    <a:lstStyle/>
+                    <a:p>
+                      <a:pPr algn="l" fontAlgn="b"/>
+                      <a:r>
+                        <a:rPr lang="en-US" sz="1300" b="0" i="0" u="sng" strike="noStrike" dirty="0" err="1">
+                          <a:solidFill>
+                            <a:srgbClr val="2F75B5"/>
+                          </a:solidFill>
+                          <a:effectLst/>
+                          <a:latin typeface="Segoe UI Semibold" panose="020B0702040204020203" pitchFamily="34" charset="0"/>
+                          <a:cs typeface="Segoe UI Semibold" panose="020B0702040204020203" pitchFamily="34" charset="0"/>
+                        </a:rPr>
+                        <a:t>setosa</a:t>
+                      </a:r>
+                      <a:endParaRPr lang="en-US" sz="1300" b="0" i="0" u="sng" strike="noStrike" dirty="0">
+                        <a:solidFill>
+                          <a:srgbClr val="2F75B5"/>
+                        </a:solidFill>
+                        <a:effectLst/>
+                        <a:latin typeface="Segoe UI Semibold" panose="020B0702040204020203" pitchFamily="34" charset="0"/>
+                        <a:cs typeface="Segoe UI Semibold" panose="020B0702040204020203" pitchFamily="34" charset="0"/>
+                      </a:endParaRPr>
+                    </a:p>
+                  </a:txBody>
+                  <a:tcPr marL="9525" marR="9525" marT="9525" marB="0" anchor="b">
+                    <a:lnL w="12700" cap="flat" cmpd="sng" algn="ctr">
+                      <a:solidFill>
+                        <a:schemeClr val="tx1"/>
+                      </a:solidFill>
+                      <a:prstDash val="solid"/>
+                      <a:round/>
+                      <a:headEnd type="none" w="med" len="med"/>
+                      <a:tailEnd type="none" w="med" len="med"/>
+                    </a:lnL>
+                    <a:lnR w="12700" cap="flat" cmpd="sng" algn="ctr">
+                      <a:solidFill>
+                        <a:schemeClr val="tx1"/>
+                      </a:solidFill>
+                      <a:prstDash val="solid"/>
+                      <a:round/>
+                      <a:headEnd type="none" w="med" len="med"/>
+                      <a:tailEnd type="none" w="med" len="med"/>
+                    </a:lnR>
+                    <a:lnT w="6350" cap="flat" cmpd="sng" algn="ctr">
+                      <a:solidFill>
+                        <a:srgbClr val="A5A5A5"/>
+                      </a:solidFill>
+                      <a:prstDash val="solid"/>
+                      <a:round/>
+                      <a:headEnd type="none" w="med" len="med"/>
+                      <a:tailEnd type="none" w="med" len="med"/>
+                    </a:lnT>
+                    <a:lnB w="12700" cap="flat" cmpd="sng" algn="ctr">
+                      <a:solidFill>
+                        <a:schemeClr val="tx1"/>
+                      </a:solidFill>
+                      <a:prstDash val="solid"/>
+                      <a:round/>
+                      <a:headEnd type="none" w="med" len="med"/>
+                      <a:tailEnd type="none" w="med" len="med"/>
+                    </a:lnB>
+                    <a:solidFill>
+                      <a:schemeClr val="accent5">
+                        <a:lumMod val="20000"/>
+                        <a:lumOff val="80000"/>
+                      </a:schemeClr>
+                    </a:solidFill>
+                  </a:tcPr>
+                </a:tc>
+                <a:tc>
+                  <a:txBody>
+                    <a:bodyPr/>
+                    <a:lstStyle/>
+                    <a:p>
+                      <a:pPr algn="r" fontAlgn="b"/>
+                      <a:r>
+                        <a:rPr lang="en-US" sz="1300" b="0" i="0" u="none" strike="noStrike" dirty="0">
+                          <a:solidFill>
+                            <a:srgbClr val="000000"/>
+                          </a:solidFill>
+                          <a:effectLst/>
+                          <a:latin typeface="Segoe UI" panose="020B0502040204020203" pitchFamily="34" charset="0"/>
+                          <a:cs typeface="Segoe UI" panose="020B0502040204020203" pitchFamily="34" charset="0"/>
+                        </a:rPr>
+                        <a:t>5.2</a:t>
+                      </a:r>
+                    </a:p>
+                  </a:txBody>
+                  <a:tcPr marL="9525" marR="9525" marT="9525" marB="0" anchor="b">
+                    <a:lnL w="12700" cap="flat" cmpd="sng" algn="ctr">
+                      <a:solidFill>
+                        <a:schemeClr val="tx1"/>
+                      </a:solidFill>
+                      <a:prstDash val="solid"/>
+                      <a:round/>
+                      <a:headEnd type="none" w="med" len="med"/>
+                      <a:tailEnd type="none" w="med" len="med"/>
+                    </a:lnL>
+                    <a:lnR>
+                      <a:noFill/>
+                    </a:lnR>
+                    <a:lnT w="6350" cap="flat" cmpd="sng" algn="ctr">
+                      <a:solidFill>
+                        <a:srgbClr val="A5A5A5"/>
+                      </a:solidFill>
+                      <a:prstDash val="solid"/>
+                      <a:round/>
+                      <a:headEnd type="none" w="med" len="med"/>
+                      <a:tailEnd type="none" w="med" len="med"/>
+                    </a:lnT>
+                    <a:lnB w="12700" cap="flat" cmpd="sng" algn="ctr">
+                      <a:solidFill>
+                        <a:schemeClr val="tx1"/>
+                      </a:solidFill>
+                      <a:prstDash val="solid"/>
+                      <a:round/>
+                      <a:headEnd type="none" w="med" len="med"/>
+                      <a:tailEnd type="none" w="med" len="med"/>
+                    </a:lnB>
+                  </a:tcPr>
+                </a:tc>
+                <a:tc>
+                  <a:txBody>
+                    <a:bodyPr/>
+                    <a:lstStyle/>
+                    <a:p>
+                      <a:pPr algn="r" fontAlgn="b"/>
+                      <a:r>
+                        <a:rPr lang="en-US" sz="1300" b="0" i="0" u="none" strike="noStrike">
+                          <a:solidFill>
+                            <a:srgbClr val="000000"/>
+                          </a:solidFill>
+                          <a:effectLst/>
+                          <a:latin typeface="Segoe UI" panose="020B0502040204020203" pitchFamily="34" charset="0"/>
+                          <a:cs typeface="Segoe UI" panose="020B0502040204020203" pitchFamily="34" charset="0"/>
+                        </a:rPr>
+                        <a:t>3.4</a:t>
+                      </a:r>
+                    </a:p>
+                  </a:txBody>
+                  <a:tcPr marL="9525" marR="9525" marT="9525" marB="0" anchor="b">
+                    <a:lnL>
+                      <a:noFill/>
+                    </a:lnL>
+                    <a:lnR>
+                      <a:noFill/>
+                    </a:lnR>
+                    <a:lnT w="6350" cap="flat" cmpd="sng" algn="ctr">
+                      <a:solidFill>
+                        <a:srgbClr val="A5A5A5"/>
+                      </a:solidFill>
+                      <a:prstDash val="solid"/>
+                      <a:round/>
+                      <a:headEnd type="none" w="med" len="med"/>
+                      <a:tailEnd type="none" w="med" len="med"/>
+                    </a:lnT>
+                    <a:lnB w="12700" cap="flat" cmpd="sng" algn="ctr">
+                      <a:solidFill>
+                        <a:schemeClr val="tx1"/>
+                      </a:solidFill>
+                      <a:prstDash val="solid"/>
+                      <a:round/>
+                      <a:headEnd type="none" w="med" len="med"/>
+                      <a:tailEnd type="none" w="med" len="med"/>
+                    </a:lnB>
+                  </a:tcPr>
+                </a:tc>
+                <a:tc>
+                  <a:txBody>
+                    <a:bodyPr/>
+                    <a:lstStyle/>
+                    <a:p>
+                      <a:pPr algn="r" fontAlgn="b"/>
+                      <a:r>
+                        <a:rPr lang="en-US" sz="1300" b="0" i="0" u="none" strike="noStrike">
+                          <a:solidFill>
+                            <a:srgbClr val="000000"/>
+                          </a:solidFill>
+                          <a:effectLst/>
+                          <a:latin typeface="Segoe UI" panose="020B0502040204020203" pitchFamily="34" charset="0"/>
+                          <a:cs typeface="Segoe UI" panose="020B0502040204020203" pitchFamily="34" charset="0"/>
+                        </a:rPr>
+                        <a:t>1.4</a:t>
+                      </a:r>
+                    </a:p>
+                  </a:txBody>
+                  <a:tcPr marL="9525" marR="9525" marT="9525" marB="0" anchor="b">
+                    <a:lnL>
+                      <a:noFill/>
+                    </a:lnL>
+                    <a:lnR>
+                      <a:noFill/>
+                    </a:lnR>
+                    <a:lnT w="6350" cap="flat" cmpd="sng" algn="ctr">
+                      <a:solidFill>
+                        <a:srgbClr val="A5A5A5"/>
+                      </a:solidFill>
+                      <a:prstDash val="solid"/>
+                      <a:round/>
+                      <a:headEnd type="none" w="med" len="med"/>
+                      <a:tailEnd type="none" w="med" len="med"/>
+                    </a:lnT>
+                    <a:lnB w="12700" cap="flat" cmpd="sng" algn="ctr">
+                      <a:solidFill>
+                        <a:schemeClr val="tx1"/>
+                      </a:solidFill>
+                      <a:prstDash val="solid"/>
+                      <a:round/>
+                      <a:headEnd type="none" w="med" len="med"/>
+                      <a:tailEnd type="none" w="med" len="med"/>
+                    </a:lnB>
+                  </a:tcPr>
+                </a:tc>
+                <a:tc>
+                  <a:txBody>
+                    <a:bodyPr/>
+                    <a:lstStyle/>
+                    <a:p>
+                      <a:pPr algn="r" fontAlgn="b"/>
+                      <a:r>
+                        <a:rPr lang="en-US" sz="1300" b="0" i="0" u="none" strike="noStrike" dirty="0">
+                          <a:solidFill>
+                            <a:srgbClr val="000000"/>
+                          </a:solidFill>
+                          <a:effectLst/>
+                          <a:latin typeface="Segoe UI" panose="020B0502040204020203" pitchFamily="34" charset="0"/>
+                          <a:cs typeface="Segoe UI" panose="020B0502040204020203" pitchFamily="34" charset="0"/>
+                        </a:rPr>
+                        <a:t>0.2</a:t>
+                      </a:r>
+                    </a:p>
+                  </a:txBody>
+                  <a:tcPr marL="9525" marR="9525" marT="9525" marB="0" anchor="b">
+                    <a:lnL>
+                      <a:noFill/>
+                    </a:lnL>
+                    <a:lnR w="12700" cap="flat" cmpd="sng" algn="ctr">
+                      <a:solidFill>
+                        <a:schemeClr val="tx1"/>
+                      </a:solidFill>
+                      <a:prstDash val="solid"/>
+                      <a:round/>
+                      <a:headEnd type="none" w="med" len="med"/>
+                      <a:tailEnd type="none" w="med" len="med"/>
+                    </a:lnR>
+                    <a:lnT w="6350" cap="flat" cmpd="sng" algn="ctr">
+                      <a:solidFill>
+                        <a:srgbClr val="A5A5A5"/>
+                      </a:solidFill>
+                      <a:prstDash val="solid"/>
+                      <a:round/>
+                      <a:headEnd type="none" w="med" len="med"/>
+                      <a:tailEnd type="none" w="med" len="med"/>
+                    </a:lnT>
+                    <a:lnB w="12700" cap="flat" cmpd="sng" algn="ctr">
+                      <a:solidFill>
+                        <a:schemeClr val="tx1"/>
+                      </a:solidFill>
+                      <a:prstDash val="solid"/>
+                      <a:round/>
+                      <a:headEnd type="none" w="med" len="med"/>
+                      <a:tailEnd type="none" w="med" len="med"/>
+                    </a:lnB>
+                  </a:tcPr>
+                </a:tc>
+                <a:extLst>
+                  <a:ext uri="{0D108BD9-81ED-4DB2-BD59-A6C34878D82A}">
+                    <a16:rowId xmlns:a16="http://schemas.microsoft.com/office/drawing/2014/main" val="1654210390"/>
+                  </a:ext>
+                </a:extLst>
+              </a:tr>
+              <a:tr h="190500">
+                <a:tc>
+                  <a:txBody>
+                    <a:bodyPr/>
+                    <a:lstStyle/>
+                    <a:p>
+                      <a:pPr algn="l" fontAlgn="b"/>
+                      <a:r>
+                        <a:rPr lang="en-US" sz="1300" b="0" i="0" u="sng" strike="noStrike" dirty="0" err="1">
+                          <a:solidFill>
+                            <a:srgbClr val="C00000"/>
+                          </a:solidFill>
+                          <a:effectLst/>
+                          <a:latin typeface="Segoe UI Semibold" panose="020B0702040204020203" pitchFamily="34" charset="0"/>
+                          <a:cs typeface="Segoe UI Semibold" panose="020B0702040204020203" pitchFamily="34" charset="0"/>
+                        </a:rPr>
+                        <a:t>virginica</a:t>
+                      </a:r>
+                      <a:endParaRPr lang="en-US" sz="1300" b="0" i="0" u="sng" strike="noStrike" dirty="0">
+                        <a:solidFill>
+                          <a:srgbClr val="C00000"/>
+                        </a:solidFill>
+                        <a:effectLst/>
+                        <a:latin typeface="Segoe UI Semibold" panose="020B0702040204020203" pitchFamily="34" charset="0"/>
+                        <a:cs typeface="Segoe UI Semibold" panose="020B0702040204020203" pitchFamily="34" charset="0"/>
+                      </a:endParaRPr>
+                    </a:p>
+                  </a:txBody>
+                  <a:tcPr marL="9525" marR="9525" marT="9525" marB="0" anchor="b">
+                    <a:lnL w="12700" cap="flat" cmpd="sng" algn="ctr">
+                      <a:solidFill>
+                        <a:schemeClr val="tx1"/>
+                      </a:solidFill>
+                      <a:prstDash val="solid"/>
+                      <a:round/>
+                      <a:headEnd type="none" w="med" len="med"/>
+                      <a:tailEnd type="none" w="med" len="med"/>
+                    </a:lnL>
+                    <a:lnR w="12700" cap="flat" cmpd="sng" algn="ctr">
+                      <a:solidFill>
+                        <a:schemeClr val="tx1"/>
+                      </a:solidFill>
+                      <a:prstDash val="solid"/>
+                      <a:round/>
+                      <a:headEnd type="none" w="med" len="med"/>
+                      <a:tailEnd type="none" w="med" len="med"/>
+                    </a:lnR>
+                    <a:lnT w="12700" cap="flat" cmpd="sng" algn="ctr">
+                      <a:solidFill>
+                        <a:schemeClr val="tx1"/>
+                      </a:solidFill>
+                      <a:prstDash val="solid"/>
+                      <a:round/>
+                      <a:headEnd type="none" w="med" len="med"/>
+                      <a:tailEnd type="none" w="med" len="med"/>
+                    </a:lnT>
+                    <a:lnB w="12700" cap="flat" cmpd="sng" algn="ctr">
+                      <a:solidFill>
+                        <a:schemeClr val="tx1"/>
+                      </a:solidFill>
+                      <a:prstDash val="solid"/>
+                      <a:round/>
+                      <a:headEnd type="none" w="med" len="med"/>
+                      <a:tailEnd type="none" w="med" len="med"/>
+                    </a:lnB>
+                    <a:solidFill>
+                      <a:srgbClr val="FFCDCD"/>
+                    </a:solidFill>
+                  </a:tcPr>
+                </a:tc>
+                <a:tc>
+                  <a:txBody>
+                    <a:bodyPr/>
+                    <a:lstStyle/>
+                    <a:p>
+                      <a:pPr algn="r" fontAlgn="b"/>
+                      <a:r>
+                        <a:rPr lang="en-US" sz="1300" b="0" i="0" u="none" strike="noStrike" dirty="0">
+                          <a:solidFill>
+                            <a:srgbClr val="000000"/>
+                          </a:solidFill>
+                          <a:effectLst/>
+                          <a:latin typeface="Segoe UI" panose="020B0502040204020203" pitchFamily="34" charset="0"/>
+                          <a:cs typeface="Segoe UI" panose="020B0502040204020203" pitchFamily="34" charset="0"/>
+                        </a:rPr>
+                        <a:t>6.3</a:t>
+                      </a:r>
+                    </a:p>
+                  </a:txBody>
+                  <a:tcPr marL="9525" marR="9525" marT="9525" marB="0" anchor="b">
+                    <a:lnL w="12700" cap="flat" cmpd="sng" algn="ctr">
+                      <a:solidFill>
+                        <a:schemeClr val="tx1"/>
+                      </a:solidFill>
+                      <a:prstDash val="solid"/>
+                      <a:round/>
+                      <a:headEnd type="none" w="med" len="med"/>
+                      <a:tailEnd type="none" w="med" len="med"/>
+                    </a:lnL>
+                    <a:lnR>
+                      <a:noFill/>
+                    </a:lnR>
+                    <a:lnT w="12700" cap="flat" cmpd="sng" algn="ctr">
+                      <a:solidFill>
+                        <a:schemeClr val="tx1"/>
+                      </a:solidFill>
+                      <a:prstDash val="solid"/>
+                      <a:round/>
+                      <a:headEnd type="none" w="med" len="med"/>
+                      <a:tailEnd type="none" w="med" len="med"/>
+                    </a:lnT>
+                    <a:lnB w="12700" cap="flat" cmpd="sng" algn="ctr">
+                      <a:solidFill>
+                        <a:schemeClr val="tx1"/>
+                      </a:solidFill>
+                      <a:prstDash val="solid"/>
+                      <a:round/>
+                      <a:headEnd type="none" w="med" len="med"/>
+                      <a:tailEnd type="none" w="med" len="med"/>
+                    </a:lnB>
+                  </a:tcPr>
+                </a:tc>
+                <a:tc>
+                  <a:txBody>
+                    <a:bodyPr/>
+                    <a:lstStyle/>
+                    <a:p>
+                      <a:pPr algn="r" fontAlgn="b"/>
+                      <a:r>
+                        <a:rPr lang="en-US" sz="1300" b="0" i="0" u="none" strike="noStrike" dirty="0">
+                          <a:solidFill>
+                            <a:srgbClr val="000000"/>
+                          </a:solidFill>
+                          <a:effectLst/>
+                          <a:latin typeface="Segoe UI" panose="020B0502040204020203" pitchFamily="34" charset="0"/>
+                          <a:cs typeface="Segoe UI" panose="020B0502040204020203" pitchFamily="34" charset="0"/>
+                        </a:rPr>
+                        <a:t>2.7</a:t>
+                      </a:r>
+                    </a:p>
+                  </a:txBody>
+                  <a:tcPr marL="9525" marR="9525" marT="9525" marB="0" anchor="b">
+                    <a:lnL>
+                      <a:noFill/>
+                    </a:lnL>
+                    <a:lnR>
+                      <a:noFill/>
+                    </a:lnR>
+                    <a:lnT w="12700" cap="flat" cmpd="sng" algn="ctr">
+                      <a:solidFill>
+                        <a:schemeClr val="tx1"/>
+                      </a:solidFill>
+                      <a:prstDash val="solid"/>
+                      <a:round/>
+                      <a:headEnd type="none" w="med" len="med"/>
+                      <a:tailEnd type="none" w="med" len="med"/>
+                    </a:lnT>
+                    <a:lnB w="12700" cap="flat" cmpd="sng" algn="ctr">
+                      <a:solidFill>
+                        <a:schemeClr val="tx1"/>
+                      </a:solidFill>
+                      <a:prstDash val="solid"/>
+                      <a:round/>
+                      <a:headEnd type="none" w="med" len="med"/>
+                      <a:tailEnd type="none" w="med" len="med"/>
+                    </a:lnB>
+                  </a:tcPr>
+                </a:tc>
+                <a:tc>
+                  <a:txBody>
+                    <a:bodyPr/>
+                    <a:lstStyle/>
+                    <a:p>
+                      <a:pPr algn="r" fontAlgn="b"/>
+                      <a:r>
+                        <a:rPr lang="en-US" sz="1300" b="0" i="0" u="none" strike="noStrike" dirty="0">
+                          <a:solidFill>
+                            <a:srgbClr val="000000"/>
+                          </a:solidFill>
+                          <a:effectLst/>
+                          <a:latin typeface="Segoe UI" panose="020B0502040204020203" pitchFamily="34" charset="0"/>
+                          <a:cs typeface="Segoe UI" panose="020B0502040204020203" pitchFamily="34" charset="0"/>
+                        </a:rPr>
+                        <a:t>4.9</a:t>
+                      </a:r>
+                    </a:p>
+                  </a:txBody>
+                  <a:tcPr marL="9525" marR="9525" marT="9525" marB="0" anchor="b">
+                    <a:lnL>
+                      <a:noFill/>
+                    </a:lnL>
+                    <a:lnR>
+                      <a:noFill/>
+                    </a:lnR>
+                    <a:lnT w="12700" cap="flat" cmpd="sng" algn="ctr">
+                      <a:solidFill>
+                        <a:schemeClr val="tx1"/>
+                      </a:solidFill>
+                      <a:prstDash val="solid"/>
+                      <a:round/>
+                      <a:headEnd type="none" w="med" len="med"/>
+                      <a:tailEnd type="none" w="med" len="med"/>
+                    </a:lnT>
+                    <a:lnB w="12700" cap="flat" cmpd="sng" algn="ctr">
+                      <a:solidFill>
+                        <a:schemeClr val="tx1"/>
+                      </a:solidFill>
+                      <a:prstDash val="solid"/>
+                      <a:round/>
+                      <a:headEnd type="none" w="med" len="med"/>
+                      <a:tailEnd type="none" w="med" len="med"/>
+                    </a:lnB>
+                  </a:tcPr>
+                </a:tc>
+                <a:tc>
+                  <a:txBody>
+                    <a:bodyPr/>
+                    <a:lstStyle/>
+                    <a:p>
+                      <a:pPr algn="r" fontAlgn="b"/>
+                      <a:r>
+                        <a:rPr lang="en-US" sz="1300" b="0" i="0" u="none" strike="noStrike" dirty="0">
+                          <a:solidFill>
+                            <a:srgbClr val="000000"/>
+                          </a:solidFill>
+                          <a:effectLst/>
+                          <a:latin typeface="Segoe UI" panose="020B0502040204020203" pitchFamily="34" charset="0"/>
+                          <a:cs typeface="Segoe UI" panose="020B0502040204020203" pitchFamily="34" charset="0"/>
+                        </a:rPr>
+                        <a:t>1.8</a:t>
+                      </a:r>
+                    </a:p>
+                  </a:txBody>
+                  <a:tcPr marL="9525" marR="9525" marT="9525" marB="0" anchor="b">
+                    <a:lnL>
+                      <a:noFill/>
+                    </a:lnL>
+                    <a:lnR w="12700" cap="flat" cmpd="sng" algn="ctr">
+                      <a:solidFill>
+                        <a:schemeClr val="tx1"/>
+                      </a:solidFill>
+                      <a:prstDash val="solid"/>
+                      <a:round/>
+                      <a:headEnd type="none" w="med" len="med"/>
+                      <a:tailEnd type="none" w="med" len="med"/>
+                    </a:lnR>
+                    <a:lnT w="12700" cap="flat" cmpd="sng" algn="ctr">
+                      <a:solidFill>
+                        <a:schemeClr val="tx1"/>
+                      </a:solidFill>
+                      <a:prstDash val="solid"/>
+                      <a:round/>
+                      <a:headEnd type="none" w="med" len="med"/>
+                      <a:tailEnd type="none" w="med" len="med"/>
+                    </a:lnT>
+                    <a:lnB w="12700" cap="flat" cmpd="sng" algn="ctr">
+                      <a:solidFill>
+                        <a:schemeClr val="tx1"/>
+                      </a:solidFill>
+                      <a:prstDash val="solid"/>
+                      <a:round/>
+                      <a:headEnd type="none" w="med" len="med"/>
+                      <a:tailEnd type="none" w="med" len="med"/>
+                    </a:lnB>
+                  </a:tcPr>
+                </a:tc>
+                <a:extLst>
+                  <a:ext uri="{0D108BD9-81ED-4DB2-BD59-A6C34878D82A}">
+                    <a16:rowId xmlns:a16="http://schemas.microsoft.com/office/drawing/2014/main" val="908379808"/>
+                  </a:ext>
+                </a:extLst>
+              </a:tr>
+            </a:tbl>
+          </a:graphicData>
+        </a:graphic>
+      </p:graphicFrame>
+      <p:sp>
+        <p:nvSpPr>
+          <p:cNvPr id="5" name="TextBox 4"/>
+          <p:cNvSpPr txBox="1"/>
+          <p:nvPr/>
+        </p:nvSpPr>
+        <p:spPr>
+          <a:xfrm>
+            <a:off x="215418" y="4392307"/>
+            <a:ext cx="3624996" cy="584775"/>
+          </a:xfrm>
+          <a:prstGeom prst="rect">
+            <a:avLst/>
+          </a:prstGeom>
+          <a:noFill/>
+        </p:spPr>
+        <p:txBody>
+          <a:bodyPr wrap="square" rtlCol="0">
+            <a:spAutoFit/>
+          </a:bodyPr>
+          <a:lstStyle/>
+          <a:p>
+            <a:r>
+              <a:rPr lang="en-US" sz="1600" dirty="0" smtClean="0"/>
+              <a:t>Supervised learning (iris): </a:t>
+            </a:r>
+          </a:p>
+          <a:p>
+            <a:r>
+              <a:rPr lang="en-US" sz="1600" dirty="0" smtClean="0"/>
+              <a:t>predict y from X</a:t>
+            </a:r>
+            <a:endParaRPr lang="en-US" sz="1600" dirty="0"/>
+          </a:p>
+        </p:txBody>
+      </p:sp>
+      <p:graphicFrame>
+        <p:nvGraphicFramePr>
+          <p:cNvPr id="6" name="Table 5"/>
+          <p:cNvGraphicFramePr>
+            <a:graphicFrameLocks noGrp="1"/>
+          </p:cNvGraphicFramePr>
+          <p:nvPr>
+            <p:extLst>
+              <p:ext uri="{D42A27DB-BD31-4B8C-83A1-F6EECF244321}">
+                <p14:modId xmlns:p14="http://schemas.microsoft.com/office/powerpoint/2010/main" val="825778339"/>
+              </p:ext>
+            </p:extLst>
+          </p:nvPr>
+        </p:nvGraphicFramePr>
+        <p:xfrm>
+          <a:off x="6918963" y="2864439"/>
+          <a:ext cx="1895254" cy="1453515"/>
+        </p:xfrm>
+        <a:graphic>
+          <a:graphicData uri="http://schemas.openxmlformats.org/drawingml/2006/table">
+            <a:tbl>
+              <a:tblPr/>
+              <a:tblGrid>
+                <a:gridCol w="511906">
+                  <a:extLst>
+                    <a:ext uri="{9D8B030D-6E8A-4147-A177-3AD203B41FA5}">
+                      <a16:colId xmlns:a16="http://schemas.microsoft.com/office/drawing/2014/main" val="2274863530"/>
+                    </a:ext>
+                  </a:extLst>
+                </a:gridCol>
+                <a:gridCol w="657644">
+                  <a:extLst>
+                    <a:ext uri="{9D8B030D-6E8A-4147-A177-3AD203B41FA5}">
+                      <a16:colId xmlns:a16="http://schemas.microsoft.com/office/drawing/2014/main" val="1035217968"/>
+                    </a:ext>
+                  </a:extLst>
+                </a:gridCol>
+                <a:gridCol w="725704">
+                  <a:extLst>
+                    <a:ext uri="{9D8B030D-6E8A-4147-A177-3AD203B41FA5}">
+                      <a16:colId xmlns:a16="http://schemas.microsoft.com/office/drawing/2014/main" val="3422948398"/>
+                    </a:ext>
+                  </a:extLst>
+                </a:gridCol>
+              </a:tblGrid>
+              <a:tr h="190500">
+                <a:tc gridSpan="3">
+                  <a:txBody>
+                    <a:bodyPr/>
+                    <a:lstStyle/>
+                    <a:p>
+                      <a:pPr algn="ctr" fontAlgn="b"/>
+                      <a:r>
+                        <a:rPr lang="en-US" sz="1300" b="0" i="0" u="none" strike="noStrike" dirty="0">
+                          <a:solidFill>
+                            <a:srgbClr val="000000"/>
+                          </a:solidFill>
+                          <a:effectLst/>
+                          <a:latin typeface="Segoe UI" panose="020B0502040204020203" pitchFamily="34" charset="0"/>
+                          <a:cs typeface="Segoe UI" panose="020B0502040204020203" pitchFamily="34" charset="0"/>
+                        </a:rPr>
+                        <a:t>X</a:t>
+                      </a:r>
+                    </a:p>
+                  </a:txBody>
+                  <a:tcPr marL="9525" marR="9525" marT="9525" marB="0" anchor="b">
+                    <a:lnL w="6350" cap="flat" cmpd="sng" algn="ctr">
+                      <a:solidFill>
+                        <a:srgbClr val="000000"/>
+                      </a:solidFill>
+                      <a:prstDash val="solid"/>
+                      <a:round/>
+                      <a:headEnd type="none" w="med" len="med"/>
+                      <a:tailEnd type="none" w="med" len="med"/>
+                    </a:lnL>
+                    <a:lnR w="6350" cap="flat" cmpd="sng" algn="ctr">
+                      <a:solidFill>
+                        <a:srgbClr val="000000"/>
+                      </a:solidFill>
+                      <a:prstDash val="solid"/>
+                      <a:round/>
+                      <a:headEnd type="none" w="med" len="med"/>
+                      <a:tailEnd type="none" w="med" len="med"/>
+                    </a:lnR>
+                    <a:lnT w="6350" cap="flat" cmpd="sng" algn="ctr">
+                      <a:solidFill>
+                        <a:srgbClr val="000000"/>
+                      </a:solidFill>
+                      <a:prstDash val="solid"/>
+                      <a:round/>
+                      <a:headEnd type="none" w="med" len="med"/>
+                      <a:tailEnd type="none" w="med" len="med"/>
+                    </a:lnT>
+                    <a:lnB w="12700" cap="flat" cmpd="sng" algn="ctr">
+                      <a:solidFill>
+                        <a:schemeClr val="tx1"/>
+                      </a:solidFill>
+                      <a:prstDash val="solid"/>
+                      <a:round/>
+                      <a:headEnd type="none" w="med" len="med"/>
+                      <a:tailEnd type="none" w="med" len="med"/>
+                    </a:lnB>
+                  </a:tcPr>
+                </a:tc>
+                <a:tc hMerge="1">
+                  <a:txBody>
+                    <a:bodyPr/>
+                    <a:lstStyle/>
+                    <a:p>
+                      <a:endParaRPr lang="en-US"/>
+                    </a:p>
+                  </a:txBody>
+                  <a:tcPr/>
+                </a:tc>
+                <a:tc hMerge="1">
+                  <a:txBody>
+                    <a:bodyPr/>
+                    <a:lstStyle/>
+                    <a:p>
+                      <a:endParaRPr lang="en-US"/>
+                    </a:p>
+                  </a:txBody>
+                  <a:tcPr/>
+                </a:tc>
+                <a:extLst>
+                  <a:ext uri="{0D108BD9-81ED-4DB2-BD59-A6C34878D82A}">
+                    <a16:rowId xmlns:a16="http://schemas.microsoft.com/office/drawing/2014/main" val="4080688250"/>
+                  </a:ext>
+                </a:extLst>
+              </a:tr>
+              <a:tr h="190500">
+                <a:tc>
+                  <a:txBody>
+                    <a:bodyPr/>
+                    <a:lstStyle/>
+                    <a:p>
+                      <a:pPr algn="l" fontAlgn="b"/>
+                      <a:r>
+                        <a:rPr lang="en-US" sz="1300" b="0" i="0" u="none" strike="noStrike" dirty="0">
+                          <a:solidFill>
+                            <a:srgbClr val="FFFFFF"/>
+                          </a:solidFill>
+                          <a:effectLst/>
+                          <a:latin typeface="Segoe UI Semibold" panose="020B0702040204020203" pitchFamily="34" charset="0"/>
+                          <a:cs typeface="Segoe UI Semibold" panose="020B0702040204020203" pitchFamily="34" charset="0"/>
+                        </a:rPr>
+                        <a:t>Girth</a:t>
+                      </a:r>
+                    </a:p>
+                  </a:txBody>
+                  <a:tcPr marL="9525" marR="9525" marT="9525" marB="0" anchor="b">
+                    <a:lnL w="12700" cap="flat" cmpd="sng" algn="ctr">
+                      <a:solidFill>
+                        <a:schemeClr val="tx1"/>
+                      </a:solidFill>
+                      <a:prstDash val="solid"/>
+                      <a:round/>
+                      <a:headEnd type="none" w="med" len="med"/>
+                      <a:tailEnd type="none" w="med" len="med"/>
+                    </a:lnL>
+                    <a:lnR w="12700" cap="flat" cmpd="sng" algn="ctr">
+                      <a:solidFill>
+                        <a:schemeClr val="tx1"/>
+                      </a:solidFill>
+                      <a:prstDash val="solid"/>
+                      <a:round/>
+                      <a:headEnd type="none" w="med" len="med"/>
+                      <a:tailEnd type="none" w="med" len="med"/>
+                    </a:lnR>
+                    <a:lnT w="12700" cap="flat" cmpd="sng" algn="ctr">
+                      <a:solidFill>
+                        <a:schemeClr val="tx1"/>
+                      </a:solidFill>
+                      <a:prstDash val="solid"/>
+                      <a:round/>
+                      <a:headEnd type="none" w="med" len="med"/>
+                      <a:tailEnd type="none" w="med" len="med"/>
+                    </a:lnT>
+                    <a:lnB w="6350" cap="flat" cmpd="sng" algn="ctr">
+                      <a:solidFill>
+                        <a:srgbClr val="A5A5A5"/>
+                      </a:solidFill>
+                      <a:prstDash val="solid"/>
+                      <a:round/>
+                      <a:headEnd type="none" w="med" len="med"/>
+                      <a:tailEnd type="none" w="med" len="med"/>
+                    </a:lnB>
+                    <a:solidFill>
+                      <a:srgbClr val="A5A5A5"/>
+                    </a:solidFill>
+                  </a:tcPr>
+                </a:tc>
+                <a:tc>
+                  <a:txBody>
+                    <a:bodyPr/>
+                    <a:lstStyle/>
+                    <a:p>
+                      <a:pPr algn="l" fontAlgn="b"/>
+                      <a:r>
+                        <a:rPr lang="en-US" sz="1300" b="0" i="0" u="none" strike="noStrike" dirty="0">
+                          <a:solidFill>
+                            <a:srgbClr val="FFFFFF"/>
+                          </a:solidFill>
+                          <a:effectLst/>
+                          <a:latin typeface="Segoe UI Semibold" panose="020B0702040204020203" pitchFamily="34" charset="0"/>
+                          <a:cs typeface="Segoe UI Semibold" panose="020B0702040204020203" pitchFamily="34" charset="0"/>
+                        </a:rPr>
+                        <a:t>Height</a:t>
+                      </a:r>
+                    </a:p>
+                  </a:txBody>
+                  <a:tcPr marL="9525" marR="9525" marT="9525" marB="0" anchor="b">
+                    <a:lnL w="12700" cap="flat" cmpd="sng" algn="ctr">
+                      <a:solidFill>
+                        <a:schemeClr val="tx1"/>
+                      </a:solidFill>
+                      <a:prstDash val="solid"/>
+                      <a:round/>
+                      <a:headEnd type="none" w="med" len="med"/>
+                      <a:tailEnd type="none" w="med" len="med"/>
+                    </a:lnL>
+                    <a:lnR w="12700" cap="flat" cmpd="sng" algn="ctr">
+                      <a:solidFill>
+                        <a:schemeClr val="tx1"/>
+                      </a:solidFill>
+                      <a:prstDash val="solid"/>
+                      <a:round/>
+                      <a:headEnd type="none" w="med" len="med"/>
+                      <a:tailEnd type="none" w="med" len="med"/>
+                    </a:lnR>
+                    <a:lnT w="12700" cap="flat" cmpd="sng" algn="ctr">
+                      <a:solidFill>
+                        <a:schemeClr val="tx1"/>
+                      </a:solidFill>
+                      <a:prstDash val="solid"/>
+                      <a:round/>
+                      <a:headEnd type="none" w="med" len="med"/>
+                      <a:tailEnd type="none" w="med" len="med"/>
+                    </a:lnT>
+                    <a:lnB w="6350" cap="flat" cmpd="sng" algn="ctr">
+                      <a:solidFill>
+                        <a:srgbClr val="A5A5A5"/>
+                      </a:solidFill>
+                      <a:prstDash val="solid"/>
+                      <a:round/>
+                      <a:headEnd type="none" w="med" len="med"/>
+                      <a:tailEnd type="none" w="med" len="med"/>
+                    </a:lnB>
+                    <a:solidFill>
+                      <a:srgbClr val="A5A5A5"/>
+                    </a:solidFill>
+                  </a:tcPr>
+                </a:tc>
+                <a:tc>
+                  <a:txBody>
+                    <a:bodyPr/>
+                    <a:lstStyle/>
+                    <a:p>
+                      <a:pPr algn="l" fontAlgn="b"/>
+                      <a:r>
+                        <a:rPr lang="en-US" sz="1300" b="0" i="0" u="none" strike="noStrike" dirty="0">
+                          <a:solidFill>
+                            <a:srgbClr val="FFFFFF"/>
+                          </a:solidFill>
+                          <a:effectLst/>
+                          <a:latin typeface="Segoe UI Semibold" panose="020B0702040204020203" pitchFamily="34" charset="0"/>
+                          <a:cs typeface="Segoe UI Semibold" panose="020B0702040204020203" pitchFamily="34" charset="0"/>
+                        </a:rPr>
+                        <a:t>Volume</a:t>
+                      </a:r>
+                    </a:p>
+                  </a:txBody>
+                  <a:tcPr marL="9525" marR="9525" marT="9525" marB="0" anchor="b">
+                    <a:lnL w="12700" cap="flat" cmpd="sng" algn="ctr">
+                      <a:solidFill>
+                        <a:schemeClr val="tx1"/>
+                      </a:solidFill>
+                      <a:prstDash val="solid"/>
+                      <a:round/>
+                      <a:headEnd type="none" w="med" len="med"/>
+                      <a:tailEnd type="none" w="med" len="med"/>
+                    </a:lnL>
+                    <a:lnR w="12700" cap="flat" cmpd="sng" algn="ctr">
+                      <a:solidFill>
+                        <a:schemeClr val="tx1"/>
+                      </a:solidFill>
+                      <a:prstDash val="solid"/>
+                      <a:round/>
+                      <a:headEnd type="none" w="med" len="med"/>
+                      <a:tailEnd type="none" w="med" len="med"/>
+                    </a:lnR>
+                    <a:lnT w="12700" cap="flat" cmpd="sng" algn="ctr">
+                      <a:solidFill>
+                        <a:schemeClr val="tx1"/>
+                      </a:solidFill>
+                      <a:prstDash val="solid"/>
+                      <a:round/>
+                      <a:headEnd type="none" w="med" len="med"/>
+                      <a:tailEnd type="none" w="med" len="med"/>
+                    </a:lnT>
+                    <a:lnB w="6350" cap="flat" cmpd="sng" algn="ctr">
+                      <a:solidFill>
+                        <a:srgbClr val="A5A5A5"/>
+                      </a:solidFill>
+                      <a:prstDash val="solid"/>
+                      <a:round/>
+                      <a:headEnd type="none" w="med" len="med"/>
+                      <a:tailEnd type="none" w="med" len="med"/>
+                    </a:lnB>
+                    <a:solidFill>
+                      <a:srgbClr val="A5A5A5"/>
+                    </a:solidFill>
+                  </a:tcPr>
+                </a:tc>
+                <a:extLst>
+                  <a:ext uri="{0D108BD9-81ED-4DB2-BD59-A6C34878D82A}">
+                    <a16:rowId xmlns:a16="http://schemas.microsoft.com/office/drawing/2014/main" val="505115064"/>
+                  </a:ext>
+                </a:extLst>
+              </a:tr>
+              <a:tr h="190500">
+                <a:tc>
+                  <a:txBody>
+                    <a:bodyPr/>
+                    <a:lstStyle/>
+                    <a:p>
+                      <a:pPr algn="r" fontAlgn="b"/>
+                      <a:r>
+                        <a:rPr lang="en-US" sz="1300" b="0" i="0" u="none" strike="noStrike" dirty="0">
+                          <a:solidFill>
+                            <a:srgbClr val="000000"/>
+                          </a:solidFill>
+                          <a:effectLst/>
+                          <a:latin typeface="Segoe UI" panose="020B0502040204020203" pitchFamily="34" charset="0"/>
+                          <a:cs typeface="Segoe UI" panose="020B0502040204020203" pitchFamily="34" charset="0"/>
+                        </a:rPr>
+                        <a:t>10.8</a:t>
+                      </a:r>
+                    </a:p>
+                  </a:txBody>
+                  <a:tcPr marL="9525" marR="9525" marT="9525" marB="0" anchor="b">
+                    <a:lnL w="12700" cap="flat" cmpd="sng" algn="ctr">
+                      <a:solidFill>
+                        <a:schemeClr val="tx1"/>
+                      </a:solidFill>
+                      <a:prstDash val="solid"/>
+                      <a:round/>
+                      <a:headEnd type="none" w="med" len="med"/>
+                      <a:tailEnd type="none" w="med" len="med"/>
+                    </a:lnL>
+                    <a:lnR w="12700" cap="flat" cmpd="sng" algn="ctr">
+                      <a:solidFill>
+                        <a:schemeClr val="tx1"/>
+                      </a:solidFill>
+                      <a:prstDash val="solid"/>
+                      <a:round/>
+                      <a:headEnd type="none" w="med" len="med"/>
+                      <a:tailEnd type="none" w="med" len="med"/>
+                    </a:lnR>
+                    <a:lnT w="6350" cap="flat" cmpd="sng" algn="ctr">
+                      <a:solidFill>
+                        <a:srgbClr val="A5A5A5"/>
+                      </a:solidFill>
+                      <a:prstDash val="solid"/>
+                      <a:round/>
+                      <a:headEnd type="none" w="med" len="med"/>
+                      <a:tailEnd type="none" w="med" len="med"/>
+                    </a:lnT>
+                    <a:lnB w="6350" cap="flat" cmpd="sng" algn="ctr">
+                      <a:solidFill>
+                        <a:srgbClr val="A5A5A5"/>
+                      </a:solidFill>
+                      <a:prstDash val="solid"/>
+                      <a:round/>
+                      <a:headEnd type="none" w="med" len="med"/>
+                      <a:tailEnd type="none" w="med" len="med"/>
+                    </a:lnB>
+                  </a:tcPr>
+                </a:tc>
+                <a:tc>
+                  <a:txBody>
+                    <a:bodyPr/>
+                    <a:lstStyle/>
+                    <a:p>
+                      <a:pPr algn="r" fontAlgn="b"/>
+                      <a:r>
+                        <a:rPr lang="en-US" sz="1300" b="0" i="0" u="none" strike="noStrike" dirty="0">
+                          <a:solidFill>
+                            <a:srgbClr val="000000"/>
+                          </a:solidFill>
+                          <a:effectLst/>
+                          <a:latin typeface="Segoe UI" panose="020B0502040204020203" pitchFamily="34" charset="0"/>
+                          <a:cs typeface="Segoe UI" panose="020B0502040204020203" pitchFamily="34" charset="0"/>
+                        </a:rPr>
+                        <a:t>83</a:t>
+                      </a:r>
+                    </a:p>
+                  </a:txBody>
+                  <a:tcPr marL="9525" marR="9525" marT="9525" marB="0" anchor="b">
+                    <a:lnL w="12700" cap="flat" cmpd="sng" algn="ctr">
+                      <a:solidFill>
+                        <a:schemeClr val="tx1"/>
+                      </a:solidFill>
+                      <a:prstDash val="solid"/>
+                      <a:round/>
+                      <a:headEnd type="none" w="med" len="med"/>
+                      <a:tailEnd type="none" w="med" len="med"/>
+                    </a:lnL>
+                    <a:lnR w="12700" cap="flat" cmpd="sng" algn="ctr">
+                      <a:solidFill>
+                        <a:schemeClr val="tx1"/>
+                      </a:solidFill>
+                      <a:prstDash val="solid"/>
+                      <a:round/>
+                      <a:headEnd type="none" w="med" len="med"/>
+                      <a:tailEnd type="none" w="med" len="med"/>
+                    </a:lnR>
+                    <a:lnT w="6350" cap="flat" cmpd="sng" algn="ctr">
+                      <a:solidFill>
+                        <a:srgbClr val="A5A5A5"/>
+                      </a:solidFill>
+                      <a:prstDash val="solid"/>
+                      <a:round/>
+                      <a:headEnd type="none" w="med" len="med"/>
+                      <a:tailEnd type="none" w="med" len="med"/>
+                    </a:lnT>
+                    <a:lnB w="6350" cap="flat" cmpd="sng" algn="ctr">
+                      <a:solidFill>
+                        <a:srgbClr val="A5A5A5"/>
+                      </a:solidFill>
+                      <a:prstDash val="solid"/>
+                      <a:round/>
+                      <a:headEnd type="none" w="med" len="med"/>
+                      <a:tailEnd type="none" w="med" len="med"/>
+                    </a:lnB>
+                  </a:tcPr>
+                </a:tc>
+                <a:tc>
+                  <a:txBody>
+                    <a:bodyPr/>
+                    <a:lstStyle/>
+                    <a:p>
+                      <a:pPr algn="r" fontAlgn="b"/>
+                      <a:r>
+                        <a:rPr lang="en-US" sz="1300" b="0" i="0" u="none" strike="noStrike" dirty="0">
+                          <a:solidFill>
+                            <a:srgbClr val="000000"/>
+                          </a:solidFill>
+                          <a:effectLst/>
+                          <a:latin typeface="Segoe UI" panose="020B0502040204020203" pitchFamily="34" charset="0"/>
+                          <a:cs typeface="Segoe UI" panose="020B0502040204020203" pitchFamily="34" charset="0"/>
+                        </a:rPr>
+                        <a:t>19.7</a:t>
+                      </a:r>
+                    </a:p>
+                  </a:txBody>
+                  <a:tcPr marL="9525" marR="9525" marT="9525" marB="0" anchor="b">
+                    <a:lnL w="12700" cap="flat" cmpd="sng" algn="ctr">
+                      <a:solidFill>
+                        <a:schemeClr val="tx1"/>
+                      </a:solidFill>
+                      <a:prstDash val="solid"/>
+                      <a:round/>
+                      <a:headEnd type="none" w="med" len="med"/>
+                      <a:tailEnd type="none" w="med" len="med"/>
+                    </a:lnL>
+                    <a:lnR w="12700" cap="flat" cmpd="sng" algn="ctr">
+                      <a:solidFill>
+                        <a:schemeClr val="tx1"/>
+                      </a:solidFill>
+                      <a:prstDash val="solid"/>
+                      <a:round/>
+                      <a:headEnd type="none" w="med" len="med"/>
+                      <a:tailEnd type="none" w="med" len="med"/>
+                    </a:lnR>
+                    <a:lnT w="6350" cap="flat" cmpd="sng" algn="ctr">
+                      <a:solidFill>
+                        <a:srgbClr val="A5A5A5"/>
+                      </a:solidFill>
+                      <a:prstDash val="solid"/>
+                      <a:round/>
+                      <a:headEnd type="none" w="med" len="med"/>
+                      <a:tailEnd type="none" w="med" len="med"/>
+                    </a:lnT>
+                    <a:lnB w="6350" cap="flat" cmpd="sng" algn="ctr">
+                      <a:solidFill>
+                        <a:srgbClr val="A5A5A5"/>
+                      </a:solidFill>
+                      <a:prstDash val="solid"/>
+                      <a:round/>
+                      <a:headEnd type="none" w="med" len="med"/>
+                      <a:tailEnd type="none" w="med" len="med"/>
+                    </a:lnB>
+                  </a:tcPr>
+                </a:tc>
+                <a:extLst>
+                  <a:ext uri="{0D108BD9-81ED-4DB2-BD59-A6C34878D82A}">
+                    <a16:rowId xmlns:a16="http://schemas.microsoft.com/office/drawing/2014/main" val="2833432085"/>
+                  </a:ext>
+                </a:extLst>
+              </a:tr>
+              <a:tr h="190500">
+                <a:tc>
+                  <a:txBody>
+                    <a:bodyPr/>
+                    <a:lstStyle/>
+                    <a:p>
+                      <a:pPr algn="r" fontAlgn="b"/>
+                      <a:r>
+                        <a:rPr lang="en-US" sz="1300" b="0" i="0" u="none" strike="noStrike" dirty="0">
+                          <a:solidFill>
+                            <a:srgbClr val="000000"/>
+                          </a:solidFill>
+                          <a:effectLst/>
+                          <a:latin typeface="Segoe UI" panose="020B0502040204020203" pitchFamily="34" charset="0"/>
+                          <a:cs typeface="Segoe UI" panose="020B0502040204020203" pitchFamily="34" charset="0"/>
+                        </a:rPr>
+                        <a:t>16</a:t>
+                      </a:r>
+                    </a:p>
+                  </a:txBody>
+                  <a:tcPr marL="9525" marR="9525" marT="9525" marB="0" anchor="b">
+                    <a:lnL w="12700" cap="flat" cmpd="sng" algn="ctr">
+                      <a:solidFill>
+                        <a:schemeClr val="tx1"/>
+                      </a:solidFill>
+                      <a:prstDash val="solid"/>
+                      <a:round/>
+                      <a:headEnd type="none" w="med" len="med"/>
+                      <a:tailEnd type="none" w="med" len="med"/>
+                    </a:lnL>
+                    <a:lnR w="12700" cap="flat" cmpd="sng" algn="ctr">
+                      <a:solidFill>
+                        <a:schemeClr val="tx1"/>
+                      </a:solidFill>
+                      <a:prstDash val="solid"/>
+                      <a:round/>
+                      <a:headEnd type="none" w="med" len="med"/>
+                      <a:tailEnd type="none" w="med" len="med"/>
+                    </a:lnR>
+                    <a:lnT w="6350" cap="flat" cmpd="sng" algn="ctr">
+                      <a:solidFill>
+                        <a:srgbClr val="A5A5A5"/>
+                      </a:solidFill>
+                      <a:prstDash val="solid"/>
+                      <a:round/>
+                      <a:headEnd type="none" w="med" len="med"/>
+                      <a:tailEnd type="none" w="med" len="med"/>
+                    </a:lnT>
+                    <a:lnB w="6350" cap="flat" cmpd="sng" algn="ctr">
+                      <a:solidFill>
+                        <a:srgbClr val="A5A5A5"/>
+                      </a:solidFill>
+                      <a:prstDash val="solid"/>
+                      <a:round/>
+                      <a:headEnd type="none" w="med" len="med"/>
+                      <a:tailEnd type="none" w="med" len="med"/>
+                    </a:lnB>
+                  </a:tcPr>
+                </a:tc>
+                <a:tc>
+                  <a:txBody>
+                    <a:bodyPr/>
+                    <a:lstStyle/>
+                    <a:p>
+                      <a:pPr algn="r" fontAlgn="b"/>
+                      <a:r>
+                        <a:rPr lang="en-US" sz="1300" b="0" i="0" u="none" strike="noStrike" dirty="0">
+                          <a:solidFill>
+                            <a:srgbClr val="000000"/>
+                          </a:solidFill>
+                          <a:effectLst/>
+                          <a:latin typeface="Segoe UI" panose="020B0502040204020203" pitchFamily="34" charset="0"/>
+                          <a:cs typeface="Segoe UI" panose="020B0502040204020203" pitchFamily="34" charset="0"/>
+                        </a:rPr>
+                        <a:t>72</a:t>
+                      </a:r>
+                    </a:p>
+                  </a:txBody>
+                  <a:tcPr marL="9525" marR="9525" marT="9525" marB="0" anchor="b">
+                    <a:lnL w="12700" cap="flat" cmpd="sng" algn="ctr">
+                      <a:solidFill>
+                        <a:schemeClr val="tx1"/>
+                      </a:solidFill>
+                      <a:prstDash val="solid"/>
+                      <a:round/>
+                      <a:headEnd type="none" w="med" len="med"/>
+                      <a:tailEnd type="none" w="med" len="med"/>
+                    </a:lnL>
+                    <a:lnR w="12700" cap="flat" cmpd="sng" algn="ctr">
+                      <a:solidFill>
+                        <a:schemeClr val="tx1"/>
+                      </a:solidFill>
+                      <a:prstDash val="solid"/>
+                      <a:round/>
+                      <a:headEnd type="none" w="med" len="med"/>
+                      <a:tailEnd type="none" w="med" len="med"/>
+                    </a:lnR>
+                    <a:lnT w="6350" cap="flat" cmpd="sng" algn="ctr">
+                      <a:solidFill>
+                        <a:srgbClr val="A5A5A5"/>
+                      </a:solidFill>
+                      <a:prstDash val="solid"/>
+                      <a:round/>
+                      <a:headEnd type="none" w="med" len="med"/>
+                      <a:tailEnd type="none" w="med" len="med"/>
+                    </a:lnT>
+                    <a:lnB w="6350" cap="flat" cmpd="sng" algn="ctr">
+                      <a:solidFill>
+                        <a:srgbClr val="A5A5A5"/>
+                      </a:solidFill>
+                      <a:prstDash val="solid"/>
+                      <a:round/>
+                      <a:headEnd type="none" w="med" len="med"/>
+                      <a:tailEnd type="none" w="med" len="med"/>
+                    </a:lnB>
+                  </a:tcPr>
+                </a:tc>
+                <a:tc>
+                  <a:txBody>
+                    <a:bodyPr/>
+                    <a:lstStyle/>
+                    <a:p>
+                      <a:pPr algn="r" fontAlgn="b"/>
+                      <a:r>
+                        <a:rPr lang="en-US" sz="1300" b="0" i="0" u="none" strike="noStrike" dirty="0">
+                          <a:solidFill>
+                            <a:srgbClr val="000000"/>
+                          </a:solidFill>
+                          <a:effectLst/>
+                          <a:latin typeface="Segoe UI" panose="020B0502040204020203" pitchFamily="34" charset="0"/>
+                          <a:cs typeface="Segoe UI" panose="020B0502040204020203" pitchFamily="34" charset="0"/>
+                        </a:rPr>
+                        <a:t>38.3</a:t>
+                      </a:r>
+                    </a:p>
+                  </a:txBody>
+                  <a:tcPr marL="9525" marR="9525" marT="9525" marB="0" anchor="b">
+                    <a:lnL w="12700" cap="flat" cmpd="sng" algn="ctr">
+                      <a:solidFill>
+                        <a:schemeClr val="tx1"/>
+                      </a:solidFill>
+                      <a:prstDash val="solid"/>
+                      <a:round/>
+                      <a:headEnd type="none" w="med" len="med"/>
+                      <a:tailEnd type="none" w="med" len="med"/>
+                    </a:lnL>
+                    <a:lnR w="12700" cap="flat" cmpd="sng" algn="ctr">
+                      <a:solidFill>
+                        <a:schemeClr val="tx1"/>
+                      </a:solidFill>
+                      <a:prstDash val="solid"/>
+                      <a:round/>
+                      <a:headEnd type="none" w="med" len="med"/>
+                      <a:tailEnd type="none" w="med" len="med"/>
+                    </a:lnR>
+                    <a:lnT w="6350" cap="flat" cmpd="sng" algn="ctr">
+                      <a:solidFill>
+                        <a:srgbClr val="A5A5A5"/>
+                      </a:solidFill>
+                      <a:prstDash val="solid"/>
+                      <a:round/>
+                      <a:headEnd type="none" w="med" len="med"/>
+                      <a:tailEnd type="none" w="med" len="med"/>
+                    </a:lnT>
+                    <a:lnB w="6350" cap="flat" cmpd="sng" algn="ctr">
+                      <a:solidFill>
+                        <a:srgbClr val="A5A5A5"/>
+                      </a:solidFill>
+                      <a:prstDash val="solid"/>
+                      <a:round/>
+                      <a:headEnd type="none" w="med" len="med"/>
+                      <a:tailEnd type="none" w="med" len="med"/>
+                    </a:lnB>
+                  </a:tcPr>
+                </a:tc>
+                <a:extLst>
+                  <a:ext uri="{0D108BD9-81ED-4DB2-BD59-A6C34878D82A}">
+                    <a16:rowId xmlns:a16="http://schemas.microsoft.com/office/drawing/2014/main" val="1690227733"/>
+                  </a:ext>
+                </a:extLst>
+              </a:tr>
+              <a:tr h="190500">
+                <a:tc>
+                  <a:txBody>
+                    <a:bodyPr/>
+                    <a:lstStyle/>
+                    <a:p>
+                      <a:pPr algn="r" fontAlgn="b"/>
+                      <a:r>
+                        <a:rPr lang="en-US" sz="1300" b="0" i="0" u="none" strike="noStrike" dirty="0">
+                          <a:solidFill>
+                            <a:srgbClr val="000000"/>
+                          </a:solidFill>
+                          <a:effectLst/>
+                          <a:latin typeface="Segoe UI" panose="020B0502040204020203" pitchFamily="34" charset="0"/>
+                          <a:cs typeface="Segoe UI" panose="020B0502040204020203" pitchFamily="34" charset="0"/>
+                        </a:rPr>
+                        <a:t>12.9</a:t>
+                      </a:r>
+                    </a:p>
+                  </a:txBody>
+                  <a:tcPr marL="9525" marR="9525" marT="9525" marB="0" anchor="b">
+                    <a:lnL w="12700" cap="flat" cmpd="sng" algn="ctr">
+                      <a:solidFill>
+                        <a:schemeClr val="tx1"/>
+                      </a:solidFill>
+                      <a:prstDash val="solid"/>
+                      <a:round/>
+                      <a:headEnd type="none" w="med" len="med"/>
+                      <a:tailEnd type="none" w="med" len="med"/>
+                    </a:lnL>
+                    <a:lnR w="12700" cap="flat" cmpd="sng" algn="ctr">
+                      <a:solidFill>
+                        <a:schemeClr val="tx1"/>
+                      </a:solidFill>
+                      <a:prstDash val="solid"/>
+                      <a:round/>
+                      <a:headEnd type="none" w="med" len="med"/>
+                      <a:tailEnd type="none" w="med" len="med"/>
+                    </a:lnR>
+                    <a:lnT w="6350" cap="flat" cmpd="sng" algn="ctr">
+                      <a:solidFill>
+                        <a:srgbClr val="A5A5A5"/>
+                      </a:solidFill>
+                      <a:prstDash val="solid"/>
+                      <a:round/>
+                      <a:headEnd type="none" w="med" len="med"/>
+                      <a:tailEnd type="none" w="med" len="med"/>
+                    </a:lnT>
+                    <a:lnB w="6350" cap="flat" cmpd="sng" algn="ctr">
+                      <a:solidFill>
+                        <a:srgbClr val="A5A5A5"/>
+                      </a:solidFill>
+                      <a:prstDash val="solid"/>
+                      <a:round/>
+                      <a:headEnd type="none" w="med" len="med"/>
+                      <a:tailEnd type="none" w="med" len="med"/>
+                    </a:lnB>
+                  </a:tcPr>
+                </a:tc>
+                <a:tc>
+                  <a:txBody>
+                    <a:bodyPr/>
+                    <a:lstStyle/>
+                    <a:p>
+                      <a:pPr algn="r" fontAlgn="b"/>
+                      <a:r>
+                        <a:rPr lang="en-US" sz="1300" b="0" i="0" u="none" strike="noStrike" dirty="0">
+                          <a:solidFill>
+                            <a:srgbClr val="000000"/>
+                          </a:solidFill>
+                          <a:effectLst/>
+                          <a:latin typeface="Segoe UI" panose="020B0502040204020203" pitchFamily="34" charset="0"/>
+                          <a:cs typeface="Segoe UI" panose="020B0502040204020203" pitchFamily="34" charset="0"/>
+                        </a:rPr>
+                        <a:t>85</a:t>
+                      </a:r>
+                    </a:p>
+                  </a:txBody>
+                  <a:tcPr marL="9525" marR="9525" marT="9525" marB="0" anchor="b">
+                    <a:lnL w="12700" cap="flat" cmpd="sng" algn="ctr">
+                      <a:solidFill>
+                        <a:schemeClr val="tx1"/>
+                      </a:solidFill>
+                      <a:prstDash val="solid"/>
+                      <a:round/>
+                      <a:headEnd type="none" w="med" len="med"/>
+                      <a:tailEnd type="none" w="med" len="med"/>
+                    </a:lnL>
+                    <a:lnR w="12700" cap="flat" cmpd="sng" algn="ctr">
+                      <a:solidFill>
+                        <a:schemeClr val="tx1"/>
+                      </a:solidFill>
+                      <a:prstDash val="solid"/>
+                      <a:round/>
+                      <a:headEnd type="none" w="med" len="med"/>
+                      <a:tailEnd type="none" w="med" len="med"/>
+                    </a:lnR>
+                    <a:lnT w="6350" cap="flat" cmpd="sng" algn="ctr">
+                      <a:solidFill>
+                        <a:srgbClr val="A5A5A5"/>
+                      </a:solidFill>
+                      <a:prstDash val="solid"/>
+                      <a:round/>
+                      <a:headEnd type="none" w="med" len="med"/>
+                      <a:tailEnd type="none" w="med" len="med"/>
+                    </a:lnT>
+                    <a:lnB w="6350" cap="flat" cmpd="sng" algn="ctr">
+                      <a:solidFill>
+                        <a:srgbClr val="A5A5A5"/>
+                      </a:solidFill>
+                      <a:prstDash val="solid"/>
+                      <a:round/>
+                      <a:headEnd type="none" w="med" len="med"/>
+                      <a:tailEnd type="none" w="med" len="med"/>
+                    </a:lnB>
+                  </a:tcPr>
+                </a:tc>
+                <a:tc>
+                  <a:txBody>
+                    <a:bodyPr/>
+                    <a:lstStyle/>
+                    <a:p>
+                      <a:pPr algn="r" fontAlgn="b"/>
+                      <a:r>
+                        <a:rPr lang="en-US" sz="1300" b="0" i="0" u="none" strike="noStrike" dirty="0">
+                          <a:solidFill>
+                            <a:srgbClr val="000000"/>
+                          </a:solidFill>
+                          <a:effectLst/>
+                          <a:latin typeface="Segoe UI" panose="020B0502040204020203" pitchFamily="34" charset="0"/>
+                          <a:cs typeface="Segoe UI" panose="020B0502040204020203" pitchFamily="34" charset="0"/>
+                        </a:rPr>
+                        <a:t>33.8</a:t>
+                      </a:r>
+                    </a:p>
+                  </a:txBody>
+                  <a:tcPr marL="9525" marR="9525" marT="9525" marB="0" anchor="b">
+                    <a:lnL w="12700" cap="flat" cmpd="sng" algn="ctr">
+                      <a:solidFill>
+                        <a:schemeClr val="tx1"/>
+                      </a:solidFill>
+                      <a:prstDash val="solid"/>
+                      <a:round/>
+                      <a:headEnd type="none" w="med" len="med"/>
+                      <a:tailEnd type="none" w="med" len="med"/>
+                    </a:lnL>
+                    <a:lnR w="12700" cap="flat" cmpd="sng" algn="ctr">
+                      <a:solidFill>
+                        <a:schemeClr val="tx1"/>
+                      </a:solidFill>
+                      <a:prstDash val="solid"/>
+                      <a:round/>
+                      <a:headEnd type="none" w="med" len="med"/>
+                      <a:tailEnd type="none" w="med" len="med"/>
+                    </a:lnR>
+                    <a:lnT w="6350" cap="flat" cmpd="sng" algn="ctr">
+                      <a:solidFill>
+                        <a:srgbClr val="A5A5A5"/>
+                      </a:solidFill>
+                      <a:prstDash val="solid"/>
+                      <a:round/>
+                      <a:headEnd type="none" w="med" len="med"/>
+                      <a:tailEnd type="none" w="med" len="med"/>
+                    </a:lnT>
+                    <a:lnB w="6350" cap="flat" cmpd="sng" algn="ctr">
+                      <a:solidFill>
+                        <a:srgbClr val="A5A5A5"/>
+                      </a:solidFill>
+                      <a:prstDash val="solid"/>
+                      <a:round/>
+                      <a:headEnd type="none" w="med" len="med"/>
+                      <a:tailEnd type="none" w="med" len="med"/>
+                    </a:lnB>
+                  </a:tcPr>
+                </a:tc>
+                <a:extLst>
+                  <a:ext uri="{0D108BD9-81ED-4DB2-BD59-A6C34878D82A}">
+                    <a16:rowId xmlns:a16="http://schemas.microsoft.com/office/drawing/2014/main" val="3935558292"/>
+                  </a:ext>
+                </a:extLst>
+              </a:tr>
+              <a:tr h="190500">
+                <a:tc>
+                  <a:txBody>
+                    <a:bodyPr/>
+                    <a:lstStyle/>
+                    <a:p>
+                      <a:pPr algn="r" fontAlgn="b"/>
+                      <a:r>
+                        <a:rPr lang="en-US" sz="1300" b="0" i="0" u="none" strike="noStrike" dirty="0">
+                          <a:solidFill>
+                            <a:srgbClr val="000000"/>
+                          </a:solidFill>
+                          <a:effectLst/>
+                          <a:latin typeface="Segoe UI" panose="020B0502040204020203" pitchFamily="34" charset="0"/>
+                          <a:cs typeface="Segoe UI" panose="020B0502040204020203" pitchFamily="34" charset="0"/>
+                        </a:rPr>
+                        <a:t>10.5</a:t>
+                      </a:r>
+                    </a:p>
+                  </a:txBody>
+                  <a:tcPr marL="9525" marR="9525" marT="9525" marB="0" anchor="b">
+                    <a:lnL w="12700" cap="flat" cmpd="sng" algn="ctr">
+                      <a:solidFill>
+                        <a:schemeClr val="tx1"/>
+                      </a:solidFill>
+                      <a:prstDash val="solid"/>
+                      <a:round/>
+                      <a:headEnd type="none" w="med" len="med"/>
+                      <a:tailEnd type="none" w="med" len="med"/>
+                    </a:lnL>
+                    <a:lnR w="12700" cap="flat" cmpd="sng" algn="ctr">
+                      <a:solidFill>
+                        <a:schemeClr val="tx1"/>
+                      </a:solidFill>
+                      <a:prstDash val="solid"/>
+                      <a:round/>
+                      <a:headEnd type="none" w="med" len="med"/>
+                      <a:tailEnd type="none" w="med" len="med"/>
+                    </a:lnR>
+                    <a:lnT w="6350" cap="flat" cmpd="sng" algn="ctr">
+                      <a:solidFill>
+                        <a:srgbClr val="A5A5A5"/>
+                      </a:solidFill>
+                      <a:prstDash val="solid"/>
+                      <a:round/>
+                      <a:headEnd type="none" w="med" len="med"/>
+                      <a:tailEnd type="none" w="med" len="med"/>
+                    </a:lnT>
+                    <a:lnB w="6350" cap="flat" cmpd="sng" algn="ctr">
+                      <a:solidFill>
+                        <a:srgbClr val="A5A5A5"/>
+                      </a:solidFill>
+                      <a:prstDash val="solid"/>
+                      <a:round/>
+                      <a:headEnd type="none" w="med" len="med"/>
+                      <a:tailEnd type="none" w="med" len="med"/>
+                    </a:lnB>
+                  </a:tcPr>
+                </a:tc>
+                <a:tc>
+                  <a:txBody>
+                    <a:bodyPr/>
+                    <a:lstStyle/>
+                    <a:p>
+                      <a:pPr algn="r" fontAlgn="b"/>
+                      <a:r>
+                        <a:rPr lang="en-US" sz="1300" b="0" i="0" u="none" strike="noStrike" dirty="0">
+                          <a:solidFill>
+                            <a:srgbClr val="000000"/>
+                          </a:solidFill>
+                          <a:effectLst/>
+                          <a:latin typeface="Segoe UI" panose="020B0502040204020203" pitchFamily="34" charset="0"/>
+                          <a:cs typeface="Segoe UI" panose="020B0502040204020203" pitchFamily="34" charset="0"/>
+                        </a:rPr>
+                        <a:t>72</a:t>
+                      </a:r>
+                    </a:p>
+                  </a:txBody>
+                  <a:tcPr marL="9525" marR="9525" marT="9525" marB="0" anchor="b">
+                    <a:lnL w="12700" cap="flat" cmpd="sng" algn="ctr">
+                      <a:solidFill>
+                        <a:schemeClr val="tx1"/>
+                      </a:solidFill>
+                      <a:prstDash val="solid"/>
+                      <a:round/>
+                      <a:headEnd type="none" w="med" len="med"/>
+                      <a:tailEnd type="none" w="med" len="med"/>
+                    </a:lnL>
+                    <a:lnR w="12700" cap="flat" cmpd="sng" algn="ctr">
+                      <a:solidFill>
+                        <a:schemeClr val="tx1"/>
+                      </a:solidFill>
+                      <a:prstDash val="solid"/>
+                      <a:round/>
+                      <a:headEnd type="none" w="med" len="med"/>
+                      <a:tailEnd type="none" w="med" len="med"/>
+                    </a:lnR>
+                    <a:lnT w="6350" cap="flat" cmpd="sng" algn="ctr">
+                      <a:solidFill>
+                        <a:srgbClr val="A5A5A5"/>
+                      </a:solidFill>
+                      <a:prstDash val="solid"/>
+                      <a:round/>
+                      <a:headEnd type="none" w="med" len="med"/>
+                      <a:tailEnd type="none" w="med" len="med"/>
+                    </a:lnT>
+                    <a:lnB w="6350" cap="flat" cmpd="sng" algn="ctr">
+                      <a:solidFill>
+                        <a:srgbClr val="A5A5A5"/>
+                      </a:solidFill>
+                      <a:prstDash val="solid"/>
+                      <a:round/>
+                      <a:headEnd type="none" w="med" len="med"/>
+                      <a:tailEnd type="none" w="med" len="med"/>
+                    </a:lnB>
+                  </a:tcPr>
+                </a:tc>
+                <a:tc>
+                  <a:txBody>
+                    <a:bodyPr/>
+                    <a:lstStyle/>
+                    <a:p>
+                      <a:pPr algn="r" fontAlgn="b"/>
+                      <a:r>
+                        <a:rPr lang="en-US" sz="1300" b="0" i="0" u="none" strike="noStrike" dirty="0">
+                          <a:solidFill>
+                            <a:srgbClr val="000000"/>
+                          </a:solidFill>
+                          <a:effectLst/>
+                          <a:latin typeface="Segoe UI" panose="020B0502040204020203" pitchFamily="34" charset="0"/>
+                          <a:cs typeface="Segoe UI" panose="020B0502040204020203" pitchFamily="34" charset="0"/>
+                        </a:rPr>
+                        <a:t>16.4</a:t>
+                      </a:r>
+                    </a:p>
+                  </a:txBody>
+                  <a:tcPr marL="9525" marR="9525" marT="9525" marB="0" anchor="b">
+                    <a:lnL w="12700" cap="flat" cmpd="sng" algn="ctr">
+                      <a:solidFill>
+                        <a:schemeClr val="tx1"/>
+                      </a:solidFill>
+                      <a:prstDash val="solid"/>
+                      <a:round/>
+                      <a:headEnd type="none" w="med" len="med"/>
+                      <a:tailEnd type="none" w="med" len="med"/>
+                    </a:lnL>
+                    <a:lnR w="12700" cap="flat" cmpd="sng" algn="ctr">
+                      <a:solidFill>
+                        <a:schemeClr val="tx1"/>
+                      </a:solidFill>
+                      <a:prstDash val="solid"/>
+                      <a:round/>
+                      <a:headEnd type="none" w="med" len="med"/>
+                      <a:tailEnd type="none" w="med" len="med"/>
+                    </a:lnR>
+                    <a:lnT w="6350" cap="flat" cmpd="sng" algn="ctr">
+                      <a:solidFill>
+                        <a:srgbClr val="A5A5A5"/>
+                      </a:solidFill>
+                      <a:prstDash val="solid"/>
+                      <a:round/>
+                      <a:headEnd type="none" w="med" len="med"/>
+                      <a:tailEnd type="none" w="med" len="med"/>
+                    </a:lnT>
+                    <a:lnB w="6350" cap="flat" cmpd="sng" algn="ctr">
+                      <a:solidFill>
+                        <a:srgbClr val="A5A5A5"/>
+                      </a:solidFill>
+                      <a:prstDash val="solid"/>
+                      <a:round/>
+                      <a:headEnd type="none" w="med" len="med"/>
+                      <a:tailEnd type="none" w="med" len="med"/>
+                    </a:lnB>
+                  </a:tcPr>
+                </a:tc>
+                <a:extLst>
+                  <a:ext uri="{0D108BD9-81ED-4DB2-BD59-A6C34878D82A}">
+                    <a16:rowId xmlns:a16="http://schemas.microsoft.com/office/drawing/2014/main" val="4187257003"/>
+                  </a:ext>
+                </a:extLst>
+              </a:tr>
+              <a:tr h="190500">
+                <a:tc>
+                  <a:txBody>
+                    <a:bodyPr/>
+                    <a:lstStyle/>
+                    <a:p>
+                      <a:pPr algn="r" fontAlgn="b"/>
+                      <a:r>
+                        <a:rPr lang="en-US" sz="1300" b="0" i="0" u="none" strike="noStrike" dirty="0">
+                          <a:solidFill>
+                            <a:srgbClr val="000000"/>
+                          </a:solidFill>
+                          <a:effectLst/>
+                          <a:latin typeface="Segoe UI" panose="020B0502040204020203" pitchFamily="34" charset="0"/>
+                          <a:cs typeface="Segoe UI" panose="020B0502040204020203" pitchFamily="34" charset="0"/>
+                        </a:rPr>
+                        <a:t>11</a:t>
+                      </a:r>
+                    </a:p>
+                  </a:txBody>
+                  <a:tcPr marL="9525" marR="9525" marT="9525" marB="0" anchor="b">
+                    <a:lnL w="12700" cap="flat" cmpd="sng" algn="ctr">
+                      <a:solidFill>
+                        <a:schemeClr val="tx1"/>
+                      </a:solidFill>
+                      <a:prstDash val="solid"/>
+                      <a:round/>
+                      <a:headEnd type="none" w="med" len="med"/>
+                      <a:tailEnd type="none" w="med" len="med"/>
+                    </a:lnL>
+                    <a:lnR w="12700" cap="flat" cmpd="sng" algn="ctr">
+                      <a:solidFill>
+                        <a:schemeClr val="tx1"/>
+                      </a:solidFill>
+                      <a:prstDash val="solid"/>
+                      <a:round/>
+                      <a:headEnd type="none" w="med" len="med"/>
+                      <a:tailEnd type="none" w="med" len="med"/>
+                    </a:lnR>
+                    <a:lnT w="6350" cap="flat" cmpd="sng" algn="ctr">
+                      <a:solidFill>
+                        <a:srgbClr val="A5A5A5"/>
+                      </a:solidFill>
+                      <a:prstDash val="solid"/>
+                      <a:round/>
+                      <a:headEnd type="none" w="med" len="med"/>
+                      <a:tailEnd type="none" w="med" len="med"/>
+                    </a:lnT>
+                    <a:lnB w="12700" cap="flat" cmpd="sng" algn="ctr">
+                      <a:solidFill>
+                        <a:schemeClr val="tx1"/>
+                      </a:solidFill>
+                      <a:prstDash val="solid"/>
+                      <a:round/>
+                      <a:headEnd type="none" w="med" len="med"/>
+                      <a:tailEnd type="none" w="med" len="med"/>
+                    </a:lnB>
+                  </a:tcPr>
+                </a:tc>
+                <a:tc>
+                  <a:txBody>
+                    <a:bodyPr/>
+                    <a:lstStyle/>
+                    <a:p>
+                      <a:pPr algn="r" fontAlgn="b"/>
+                      <a:r>
+                        <a:rPr lang="en-US" sz="1300" b="0" i="0" u="none" strike="noStrike" dirty="0">
+                          <a:solidFill>
+                            <a:srgbClr val="000000"/>
+                          </a:solidFill>
+                          <a:effectLst/>
+                          <a:latin typeface="Segoe UI" panose="020B0502040204020203" pitchFamily="34" charset="0"/>
+                          <a:cs typeface="Segoe UI" panose="020B0502040204020203" pitchFamily="34" charset="0"/>
+                        </a:rPr>
+                        <a:t>75</a:t>
+                      </a:r>
+                    </a:p>
+                  </a:txBody>
+                  <a:tcPr marL="9525" marR="9525" marT="9525" marB="0" anchor="b">
+                    <a:lnL w="12700" cap="flat" cmpd="sng" algn="ctr">
+                      <a:solidFill>
+                        <a:schemeClr val="tx1"/>
+                      </a:solidFill>
+                      <a:prstDash val="solid"/>
+                      <a:round/>
+                      <a:headEnd type="none" w="med" len="med"/>
+                      <a:tailEnd type="none" w="med" len="med"/>
+                    </a:lnL>
+                    <a:lnR w="12700" cap="flat" cmpd="sng" algn="ctr">
+                      <a:solidFill>
+                        <a:schemeClr val="tx1"/>
+                      </a:solidFill>
+                      <a:prstDash val="solid"/>
+                      <a:round/>
+                      <a:headEnd type="none" w="med" len="med"/>
+                      <a:tailEnd type="none" w="med" len="med"/>
+                    </a:lnR>
+                    <a:lnT w="6350" cap="flat" cmpd="sng" algn="ctr">
+                      <a:solidFill>
+                        <a:srgbClr val="A5A5A5"/>
+                      </a:solidFill>
+                      <a:prstDash val="solid"/>
+                      <a:round/>
+                      <a:headEnd type="none" w="med" len="med"/>
+                      <a:tailEnd type="none" w="med" len="med"/>
+                    </a:lnT>
+                    <a:lnB w="12700" cap="flat" cmpd="sng" algn="ctr">
+                      <a:solidFill>
+                        <a:schemeClr val="tx1"/>
+                      </a:solidFill>
+                      <a:prstDash val="solid"/>
+                      <a:round/>
+                      <a:headEnd type="none" w="med" len="med"/>
+                      <a:tailEnd type="none" w="med" len="med"/>
+                    </a:lnB>
+                  </a:tcPr>
+                </a:tc>
+                <a:tc>
+                  <a:txBody>
+                    <a:bodyPr/>
+                    <a:lstStyle/>
+                    <a:p>
+                      <a:pPr algn="r" fontAlgn="b"/>
+                      <a:r>
+                        <a:rPr lang="en-US" sz="1300" b="0" i="0" u="none" strike="noStrike" dirty="0">
+                          <a:solidFill>
+                            <a:srgbClr val="000000"/>
+                          </a:solidFill>
+                          <a:effectLst/>
+                          <a:latin typeface="Segoe UI" panose="020B0502040204020203" pitchFamily="34" charset="0"/>
+                          <a:cs typeface="Segoe UI" panose="020B0502040204020203" pitchFamily="34" charset="0"/>
+                        </a:rPr>
+                        <a:t>18.2</a:t>
+                      </a:r>
+                    </a:p>
+                  </a:txBody>
+                  <a:tcPr marL="9525" marR="9525" marT="9525" marB="0" anchor="b">
+                    <a:lnL w="12700" cap="flat" cmpd="sng" algn="ctr">
+                      <a:solidFill>
+                        <a:schemeClr val="tx1"/>
+                      </a:solidFill>
+                      <a:prstDash val="solid"/>
+                      <a:round/>
+                      <a:headEnd type="none" w="med" len="med"/>
+                      <a:tailEnd type="none" w="med" len="med"/>
+                    </a:lnL>
+                    <a:lnR w="12700" cap="flat" cmpd="sng" algn="ctr">
+                      <a:solidFill>
+                        <a:schemeClr val="tx1"/>
+                      </a:solidFill>
+                      <a:prstDash val="solid"/>
+                      <a:round/>
+                      <a:headEnd type="none" w="med" len="med"/>
+                      <a:tailEnd type="none" w="med" len="med"/>
+                    </a:lnR>
+                    <a:lnT w="6350" cap="flat" cmpd="sng" algn="ctr">
+                      <a:solidFill>
+                        <a:srgbClr val="A5A5A5"/>
+                      </a:solidFill>
+                      <a:prstDash val="solid"/>
+                      <a:round/>
+                      <a:headEnd type="none" w="med" len="med"/>
+                      <a:tailEnd type="none" w="med" len="med"/>
+                    </a:lnT>
+                    <a:lnB w="12700" cap="flat" cmpd="sng" algn="ctr">
+                      <a:solidFill>
+                        <a:schemeClr val="tx1"/>
+                      </a:solidFill>
+                      <a:prstDash val="solid"/>
+                      <a:round/>
+                      <a:headEnd type="none" w="med" len="med"/>
+                      <a:tailEnd type="none" w="med" len="med"/>
+                    </a:lnB>
+                  </a:tcPr>
+                </a:tc>
+                <a:extLst>
+                  <a:ext uri="{0D108BD9-81ED-4DB2-BD59-A6C34878D82A}">
+                    <a16:rowId xmlns:a16="http://schemas.microsoft.com/office/drawing/2014/main" val="1675949392"/>
+                  </a:ext>
+                </a:extLst>
+              </a:tr>
+            </a:tbl>
+          </a:graphicData>
+        </a:graphic>
+      </p:graphicFrame>
+      <p:sp>
+        <p:nvSpPr>
+          <p:cNvPr id="7" name="TextBox 6"/>
+          <p:cNvSpPr txBox="1"/>
+          <p:nvPr/>
+        </p:nvSpPr>
+        <p:spPr>
+          <a:xfrm>
+            <a:off x="4581371" y="4392307"/>
+            <a:ext cx="4232846" cy="584775"/>
+          </a:xfrm>
+          <a:prstGeom prst="rect">
+            <a:avLst/>
+          </a:prstGeom>
+          <a:noFill/>
+        </p:spPr>
+        <p:txBody>
+          <a:bodyPr wrap="square" rtlCol="0">
+            <a:spAutoFit/>
+          </a:bodyPr>
+          <a:lstStyle/>
+          <a:p>
+            <a:pPr algn="r"/>
+            <a:r>
+              <a:rPr lang="en-US" sz="1600" dirty="0" smtClean="0"/>
+              <a:t>Unsupervised learning (trees): </a:t>
+            </a:r>
+          </a:p>
+          <a:p>
+            <a:pPr algn="r"/>
+            <a:r>
+              <a:rPr lang="en-US" sz="1600" dirty="0" smtClean="0"/>
+              <a:t>learn structure from X</a:t>
+            </a:r>
+            <a:endParaRPr lang="en-US" sz="1600" dirty="0"/>
           </a:p>
         </p:txBody>
       </p:sp>
@@ -4501,6 +8064,13 @@
   <p:clrMapOvr>
     <a:masterClrMapping/>
   </p:clrMapOvr>
+  <p:timing>
+    <p:tnLst>
+      <p:par>
+        <p:cTn id="1" dur="indefinite" restart="never" nodeType="tmRoot"/>
+      </p:par>
+    </p:tnLst>
+  </p:timing>
 </p:sld>
 </file>
 
@@ -4573,6 +8143,13 @@
   <p:clrMapOvr>
     <a:masterClrMapping/>
   </p:clrMapOvr>
+  <p:timing>
+    <p:tnLst>
+      <p:par>
+        <p:cTn id="1" dur="indefinite" restart="never" nodeType="tmRoot"/>
+      </p:par>
+    </p:tnLst>
+  </p:timing>
 </p:sld>
 </file>
 
@@ -4703,7 +8280,12 @@
             <p:ph type="title"/>
           </p:nvPr>
         </p:nvSpPr>
-        <p:spPr/>
+        <p:spPr>
+          <a:xfrm>
+            <a:off x="329784" y="258128"/>
+            <a:ext cx="8484432" cy="994172"/>
+          </a:xfrm>
+        </p:spPr>
         <p:txBody>
           <a:bodyPr/>
           <a:lstStyle/>
@@ -4749,11 +8331,13 @@
           <a:p>
             <a:r>
               <a:rPr lang="en-US" dirty="0" smtClean="0"/>
-              <a:t>Need to specify number of clusters, many methods for determining optimal number of clusters, but depends </a:t>
-            </a:r>
-            <a:r>
-              <a:rPr lang="en-US" smtClean="0"/>
-              <a:t>on context</a:t>
+              <a:t>Need to specify number of clusters, many methods for determining optimal number of clusters, but depends on context</a:t>
+            </a:r>
+          </a:p>
+          <a:p>
+            <a:r>
+              <a:rPr lang="en-US" dirty="0" smtClean="0"/>
+              <a:t>Scale your data!</a:t>
             </a:r>
             <a:endParaRPr lang="en-US" dirty="0" smtClean="0"/>
           </a:p>
@@ -4806,35 +8390,64 @@
           <a:p>
             <a:r>
               <a:rPr lang="en-US" dirty="0" smtClean="0"/>
-              <a:t>Hierarchical Clustering</a:t>
+              <a:t>K-Means Example</a:t>
             </a:r>
             <a:endParaRPr lang="en-US" dirty="0"/>
           </a:p>
         </p:txBody>
       </p:sp>
-      <p:sp>
-        <p:nvSpPr>
-          <p:cNvPr id="3" name="Content Placeholder 2"/>
-          <p:cNvSpPr>
-            <a:spLocks noGrp="1"/>
-          </p:cNvSpPr>
-          <p:nvPr>
-            <p:ph idx="1"/>
-          </p:nvPr>
-        </p:nvSpPr>
-        <p:spPr/>
-        <p:txBody>
-          <a:bodyPr/>
-          <a:lstStyle/>
-          <a:p>
-            <a:endParaRPr lang="en-US"/>
-          </a:p>
-        </p:txBody>
-      </p:sp>
+      <p:pic>
+        <p:nvPicPr>
+          <p:cNvPr id="4" name="Picture 3"/>
+          <p:cNvPicPr>
+            <a:picLocks noChangeAspect="1"/>
+          </p:cNvPicPr>
+          <p:nvPr/>
+        </p:nvPicPr>
+        <p:blipFill>
+          <a:blip r:embed="rId2"/>
+          <a:stretch>
+            <a:fillRect/>
+          </a:stretch>
+        </p:blipFill>
+        <p:spPr>
+          <a:xfrm>
+            <a:off x="4572000" y="1269778"/>
+            <a:ext cx="4114800" cy="2943706"/>
+          </a:xfrm>
+          <a:prstGeom prst="rect">
+            <a:avLst/>
+          </a:prstGeom>
+        </p:spPr>
+      </p:pic>
+      <p:pic>
+        <p:nvPicPr>
+          <p:cNvPr id="5" name="Picture 4"/>
+          <p:cNvPicPr>
+            <a:picLocks noChangeAspect="1"/>
+          </p:cNvPicPr>
+          <p:nvPr/>
+        </p:nvPicPr>
+        <p:blipFill>
+          <a:blip r:embed="rId3"/>
+          <a:stretch>
+            <a:fillRect/>
+          </a:stretch>
+        </p:blipFill>
+        <p:spPr>
+          <a:xfrm>
+            <a:off x="329784" y="1268016"/>
+            <a:ext cx="4114800" cy="2943706"/>
+          </a:xfrm>
+          <a:prstGeom prst="rect">
+            <a:avLst/>
+          </a:prstGeom>
+        </p:spPr>
+      </p:pic>
     </p:spTree>
     <p:extLst>
       <p:ext uri="{BB962C8B-B14F-4D97-AF65-F5344CB8AC3E}">
-        <p14:creationId xmlns:p14="http://schemas.microsoft.com/office/powerpoint/2010/main" val="1108066659"/>
+        <p14:creationId xmlns:p14="http://schemas.microsoft.com/office/powerpoint/2010/main" val="3656605779"/>
       </p:ext>
     </p:extLst>
   </p:cSld>

</xml_diff>

<commit_message>
more pres tweaks, bucky picture
</commit_message>
<xml_diff>
--- a/Generating Insights from Clustering Large Donors - BStieber APRA DAS19.pptx
+++ b/Generating Insights from Clustering Large Donors - BStieber APRA DAS19.pptx
@@ -3491,7 +3491,11 @@
           <a:p>
             <a:r>
               <a:rPr lang="en-US" dirty="0" smtClean="0"/>
-              <a:t>Large Donor Disruption</a:t>
+              <a:t>Large Donor </a:t>
+            </a:r>
+            <a:r>
+              <a:rPr lang="en-US" dirty="0" smtClean="0"/>
+              <a:t>Disruption – Headwinds </a:t>
             </a:r>
             <a:endParaRPr lang="en-US" dirty="0"/>
           </a:p>
@@ -3563,7 +3567,11 @@
           <a:p>
             <a:r>
               <a:rPr lang="en-US" dirty="0" smtClean="0"/>
-              <a:t>Large Donor Disruption</a:t>
+              <a:t>Large Donor </a:t>
+            </a:r>
+            <a:r>
+              <a:rPr lang="en-US" dirty="0" smtClean="0"/>
+              <a:t>Disruption – Data</a:t>
             </a:r>
             <a:endParaRPr lang="en-US" dirty="0"/>
           </a:p>
@@ -3789,7 +3797,11 @@
           <a:p>
             <a:r>
               <a:rPr lang="en-US" dirty="0" smtClean="0"/>
-              <a:t>Large Donor Disruption</a:t>
+              <a:t>Large Donor </a:t>
+            </a:r>
+            <a:r>
+              <a:rPr lang="en-US" dirty="0" smtClean="0"/>
+              <a:t>Disruption – Opinions</a:t>
             </a:r>
             <a:endParaRPr lang="en-US" dirty="0"/>
           </a:p>
@@ -4070,7 +4082,12 @@
             <p:ph type="title"/>
           </p:nvPr>
         </p:nvSpPr>
-        <p:spPr/>
+        <p:spPr>
+          <a:xfrm>
+            <a:off x="329784" y="115956"/>
+            <a:ext cx="8484432" cy="994172"/>
+          </a:xfrm>
+        </p:spPr>
         <p:txBody>
           <a:bodyPr>
             <a:normAutofit/>
@@ -4100,9 +4117,16 @@
             <p:ph idx="1"/>
           </p:nvPr>
         </p:nvSpPr>
-        <p:spPr/>
+        <p:spPr>
+          <a:xfrm>
+            <a:off x="329784" y="3764280"/>
+            <a:ext cx="8484432" cy="1188720"/>
+          </a:xfrm>
+        </p:spPr>
         <p:txBody>
-          <a:bodyPr anchor="ctr"/>
+          <a:bodyPr anchor="b">
+            <a:normAutofit/>
+          </a:bodyPr>
           <a:lstStyle/>
           <a:p>
             <a:pPr marL="0" indent="0" algn="ctr">
@@ -4143,17 +4167,37 @@
               <a:t> </a:t>
             </a:r>
             <a:r>
-              <a:rPr lang="en-US" u="sng" dirty="0"/>
+              <a:rPr lang="en-US" u="sng" dirty="0" smtClean="0"/>
               <a:t>bgstieber.github.io</a:t>
             </a:r>
             <a:endParaRPr lang="en-US" dirty="0"/>
           </a:p>
-          <a:p>
-            <a:pPr algn="ctr"/>
-            <a:endParaRPr lang="en-US" dirty="0"/>
-          </a:p>
         </p:txBody>
       </p:sp>
+      <p:pic>
+        <p:nvPicPr>
+          <p:cNvPr id="4" name="Picture 3"/>
+          <p:cNvPicPr>
+            <a:picLocks noChangeAspect="1"/>
+          </p:cNvPicPr>
+          <p:nvPr/>
+        </p:nvPicPr>
+        <p:blipFill>
+          <a:blip r:embed="rId3"/>
+          <a:stretch>
+            <a:fillRect/>
+          </a:stretch>
+        </p:blipFill>
+        <p:spPr>
+          <a:xfrm>
+            <a:off x="2558110" y="1232748"/>
+            <a:ext cx="4027780" cy="2341732"/>
+          </a:xfrm>
+          <a:prstGeom prst="rect">
+            <a:avLst/>
+          </a:prstGeom>
+        </p:spPr>
+      </p:pic>
     </p:spTree>
     <p:extLst>
       <p:ext uri="{BB962C8B-B14F-4D97-AF65-F5344CB8AC3E}">
@@ -4361,8 +4405,8 @@
         </p:nvSpPr>
         <p:spPr>
           <a:xfrm>
-            <a:off x="6584538" y="3055445"/>
-            <a:ext cx="2131081" cy="1874520"/>
+            <a:off x="6584538" y="3124025"/>
+            <a:ext cx="2131081" cy="1828800"/>
           </a:xfrm>
           <a:prstGeom prst="rect">
             <a:avLst/>
@@ -4451,8 +4495,8 @@
         </p:nvSpPr>
         <p:spPr>
           <a:xfrm>
-            <a:off x="596346" y="3055445"/>
-            <a:ext cx="2131081" cy="1874520"/>
+            <a:off x="596346" y="3124025"/>
+            <a:ext cx="2131081" cy="1828800"/>
           </a:xfrm>
           <a:prstGeom prst="rect">
             <a:avLst/>
@@ -4541,8 +4585,8 @@
         </p:nvSpPr>
         <p:spPr>
           <a:xfrm>
-            <a:off x="3503964" y="3055445"/>
-            <a:ext cx="2304037" cy="1874520"/>
+            <a:off x="3503964" y="3124025"/>
+            <a:ext cx="2304037" cy="1828800"/>
           </a:xfrm>
           <a:prstGeom prst="rect">
             <a:avLst/>
@@ -4715,7 +4759,7 @@
           <a:p>
             <a:r>
               <a:rPr lang="en-US" dirty="0" smtClean="0"/>
-              <a:t>Staff of 300, 70 development officers, 13 in Data Solutions Team (DW, BI, DA), 13 in Research</a:t>
+              <a:t>Staff of 300: 70 development officers, 13 in Data Solutions Team (DW, BI, DA), 13 in Research</a:t>
             </a:r>
             <a:endParaRPr lang="en-US" dirty="0"/>
           </a:p>
@@ -6774,16 +6818,25 @@
           <a:lstStyle/>
           <a:p>
             <a:r>
-              <a:rPr lang="en-US" sz="1600" dirty="0" smtClean="0"/>
+              <a:rPr lang="en-US" sz="1600" dirty="0" smtClean="0">
+                <a:latin typeface="Segoe UI" panose="020B0502040204020203" pitchFamily="34" charset="0"/>
+                <a:cs typeface="Segoe UI" panose="020B0502040204020203" pitchFamily="34" charset="0"/>
+              </a:rPr>
               <a:t>Supervised learning (iris): </a:t>
             </a:r>
           </a:p>
           <a:p>
             <a:r>
-              <a:rPr lang="en-US" sz="1600" dirty="0" smtClean="0"/>
+              <a:rPr lang="en-US" sz="1600" dirty="0" smtClean="0">
+                <a:latin typeface="Segoe UI" panose="020B0502040204020203" pitchFamily="34" charset="0"/>
+                <a:cs typeface="Segoe UI" panose="020B0502040204020203" pitchFamily="34" charset="0"/>
+              </a:rPr>
               <a:t>predict y from X</a:t>
             </a:r>
-            <a:endParaRPr lang="en-US" sz="1600" dirty="0"/>
+            <a:endParaRPr lang="en-US" sz="1600" dirty="0">
+              <a:latin typeface="Segoe UI" panose="020B0502040204020203" pitchFamily="34" charset="0"/>
+              <a:cs typeface="Segoe UI" panose="020B0502040204020203" pitchFamily="34" charset="0"/>
+            </a:endParaRPr>
           </a:p>
         </p:txBody>
       </p:sp>
@@ -8040,17 +8093,26 @@
           <a:p>
             <a:pPr algn="r"/>
             <a:r>
-              <a:rPr lang="en-US" sz="1600" dirty="0" smtClean="0"/>
+              <a:rPr lang="en-US" sz="1600" dirty="0" smtClean="0">
+                <a:latin typeface="Segoe UI" panose="020B0502040204020203" pitchFamily="34" charset="0"/>
+                <a:cs typeface="Segoe UI" panose="020B0502040204020203" pitchFamily="34" charset="0"/>
+              </a:rPr>
               <a:t>Unsupervised learning (trees): </a:t>
             </a:r>
           </a:p>
           <a:p>
             <a:pPr algn="r"/>
             <a:r>
-              <a:rPr lang="en-US" sz="1600" dirty="0" smtClean="0"/>
-              <a:t>learn structure from X</a:t>
-            </a:r>
-            <a:endParaRPr lang="en-US" sz="1600" dirty="0"/>
+              <a:rPr lang="en-US" sz="1600" dirty="0" smtClean="0">
+                <a:latin typeface="Segoe UI" panose="020B0502040204020203" pitchFamily="34" charset="0"/>
+                <a:cs typeface="Segoe UI" panose="020B0502040204020203" pitchFamily="34" charset="0"/>
+              </a:rPr>
+              <a:t>learn some structure about X</a:t>
+            </a:r>
+            <a:endParaRPr lang="en-US" sz="1600" dirty="0">
+              <a:latin typeface="Segoe UI" panose="020B0502040204020203" pitchFamily="34" charset="0"/>
+              <a:cs typeface="Segoe UI" panose="020B0502040204020203" pitchFamily="34" charset="0"/>
+            </a:endParaRPr>
           </a:p>
         </p:txBody>
       </p:sp>

</xml_diff>

<commit_message>
more pictures, more pres
</commit_message>
<xml_diff>
--- a/Generating Insights from Clustering Large Donors - BStieber APRA DAS19.pptx
+++ b/Generating Insights from Clustering Large Donors - BStieber APRA DAS19.pptx
@@ -5,7 +5,7 @@
     <p:sldMasterId id="2147483660" r:id="rId1"/>
   </p:sldMasterIdLst>
   <p:notesMasterIdLst>
-    <p:notesMasterId r:id="rId27"/>
+    <p:notesMasterId r:id="rId29"/>
   </p:notesMasterIdLst>
   <p:sldIdLst>
     <p:sldId id="258" r:id="rId2"/>
@@ -18,21 +18,23 @@
     <p:sldId id="267" r:id="rId9"/>
     <p:sldId id="284" r:id="rId10"/>
     <p:sldId id="280" r:id="rId11"/>
-    <p:sldId id="268" r:id="rId12"/>
-    <p:sldId id="283" r:id="rId13"/>
-    <p:sldId id="281" r:id="rId14"/>
-    <p:sldId id="271" r:id="rId15"/>
-    <p:sldId id="273" r:id="rId16"/>
-    <p:sldId id="272" r:id="rId17"/>
-    <p:sldId id="270" r:id="rId18"/>
-    <p:sldId id="274" r:id="rId19"/>
-    <p:sldId id="275" r:id="rId20"/>
-    <p:sldId id="276" r:id="rId21"/>
-    <p:sldId id="277" r:id="rId22"/>
-    <p:sldId id="278" r:id="rId23"/>
-    <p:sldId id="279" r:id="rId24"/>
-    <p:sldId id="282" r:id="rId25"/>
-    <p:sldId id="259" r:id="rId26"/>
+    <p:sldId id="285" r:id="rId12"/>
+    <p:sldId id="268" r:id="rId13"/>
+    <p:sldId id="283" r:id="rId14"/>
+    <p:sldId id="281" r:id="rId15"/>
+    <p:sldId id="271" r:id="rId16"/>
+    <p:sldId id="273" r:id="rId17"/>
+    <p:sldId id="272" r:id="rId18"/>
+    <p:sldId id="286" r:id="rId19"/>
+    <p:sldId id="270" r:id="rId20"/>
+    <p:sldId id="274" r:id="rId21"/>
+    <p:sldId id="275" r:id="rId22"/>
+    <p:sldId id="276" r:id="rId23"/>
+    <p:sldId id="277" r:id="rId24"/>
+    <p:sldId id="278" r:id="rId25"/>
+    <p:sldId id="279" r:id="rId26"/>
+    <p:sldId id="282" r:id="rId27"/>
+    <p:sldId id="259" r:id="rId28"/>
   </p:sldIdLst>
   <p:sldSz cx="9144000" cy="5143500" type="screen16x9"/>
   <p:notesSz cx="6858000" cy="9144000"/>
@@ -232,7 +234,7 @@
           <a:p>
             <a:fld id="{1DEEC2B6-86D3-4D9F-A8F6-E4F5C06381F6}" type="datetimeFigureOut">
               <a:rPr lang="en-US" smtClean="0"/>
-              <a:t>5/8/2019</a:t>
+              <a:t>5/9/2019</a:t>
             </a:fld>
             <a:endParaRPr lang="en-US"/>
           </a:p>
@@ -584,6 +586,358 @@
 </p:notes>
 </file>
 
+<file path=ppt/notesSlides/notesSlide10.xml><?xml version="1.0" encoding="utf-8"?>
+<p:notes xmlns:a="http://schemas.openxmlformats.org/drawingml/2006/main" xmlns:r="http://schemas.openxmlformats.org/officeDocument/2006/relationships" xmlns:p="http://schemas.openxmlformats.org/presentationml/2006/main">
+  <p:cSld>
+    <p:spTree>
+      <p:nvGrpSpPr>
+        <p:cNvPr id="1" name=""/>
+        <p:cNvGrpSpPr/>
+        <p:nvPr/>
+      </p:nvGrpSpPr>
+      <p:grpSpPr>
+        <a:xfrm>
+          <a:off x="0" y="0"/>
+          <a:ext cx="0" cy="0"/>
+          <a:chOff x="0" y="0"/>
+          <a:chExt cx="0" cy="0"/>
+        </a:xfrm>
+      </p:grpSpPr>
+      <p:sp>
+        <p:nvSpPr>
+          <p:cNvPr id="2" name="Slide Image Placeholder 1"/>
+          <p:cNvSpPr>
+            <a:spLocks noGrp="1" noRot="1" noChangeAspect="1"/>
+          </p:cNvSpPr>
+          <p:nvPr>
+            <p:ph type="sldImg"/>
+          </p:nvPr>
+        </p:nvSpPr>
+        <p:spPr/>
+      </p:sp>
+      <p:sp>
+        <p:nvSpPr>
+          <p:cNvPr id="3" name="Notes Placeholder 2"/>
+          <p:cNvSpPr>
+            <a:spLocks noGrp="1"/>
+          </p:cNvSpPr>
+          <p:nvPr>
+            <p:ph type="body" idx="1"/>
+          </p:nvPr>
+        </p:nvSpPr>
+        <p:spPr/>
+        <p:txBody>
+          <a:bodyPr/>
+          <a:lstStyle/>
+          <a:p>
+            <a:r>
+              <a:rPr lang="en-US" dirty="0" smtClean="0"/>
+              <a:t>This top</a:t>
+            </a:r>
+            <a:r>
+              <a:rPr lang="en-US" baseline="0" dirty="0" smtClean="0"/>
+              <a:t> donor g</a:t>
+            </a:r>
+            <a:r>
+              <a:rPr lang="en-US" dirty="0" smtClean="0"/>
+              <a:t>roup represented about</a:t>
+            </a:r>
+            <a:r>
+              <a:rPr lang="en-US" baseline="0" dirty="0" smtClean="0"/>
+              <a:t> 0.6% of all eligible donors…accounted for 75% of dollars</a:t>
+            </a:r>
+            <a:endParaRPr lang="en-US" dirty="0"/>
+          </a:p>
+        </p:txBody>
+      </p:sp>
+      <p:sp>
+        <p:nvSpPr>
+          <p:cNvPr id="4" name="Slide Number Placeholder 3"/>
+          <p:cNvSpPr>
+            <a:spLocks noGrp="1"/>
+          </p:cNvSpPr>
+          <p:nvPr>
+            <p:ph type="sldNum" sz="quarter" idx="10"/>
+          </p:nvPr>
+        </p:nvSpPr>
+        <p:spPr/>
+        <p:txBody>
+          <a:bodyPr/>
+          <a:lstStyle/>
+          <a:p>
+            <a:fld id="{340F17E4-2B4D-4428-9E25-E07F235B5058}" type="slidenum">
+              <a:rPr lang="en-US" smtClean="0"/>
+              <a:t>16</a:t>
+            </a:fld>
+            <a:endParaRPr lang="en-US"/>
+          </a:p>
+        </p:txBody>
+      </p:sp>
+    </p:spTree>
+    <p:extLst>
+      <p:ext uri="{BB962C8B-B14F-4D97-AF65-F5344CB8AC3E}">
+        <p14:creationId xmlns:p14="http://schemas.microsoft.com/office/powerpoint/2010/main" val="2048275783"/>
+      </p:ext>
+    </p:extLst>
+  </p:cSld>
+  <p:clrMapOvr>
+    <a:masterClrMapping/>
+  </p:clrMapOvr>
+</p:notes>
+</file>
+
+<file path=ppt/notesSlides/notesSlide11.xml><?xml version="1.0" encoding="utf-8"?>
+<p:notes xmlns:a="http://schemas.openxmlformats.org/drawingml/2006/main" xmlns:r="http://schemas.openxmlformats.org/officeDocument/2006/relationships" xmlns:p="http://schemas.openxmlformats.org/presentationml/2006/main">
+  <p:cSld>
+    <p:spTree>
+      <p:nvGrpSpPr>
+        <p:cNvPr id="1" name=""/>
+        <p:cNvGrpSpPr/>
+        <p:nvPr/>
+      </p:nvGrpSpPr>
+      <p:grpSpPr>
+        <a:xfrm>
+          <a:off x="0" y="0"/>
+          <a:ext cx="0" cy="0"/>
+          <a:chOff x="0" y="0"/>
+          <a:chExt cx="0" cy="0"/>
+        </a:xfrm>
+      </p:grpSpPr>
+      <p:sp>
+        <p:nvSpPr>
+          <p:cNvPr id="2" name="Slide Image Placeholder 1"/>
+          <p:cNvSpPr>
+            <a:spLocks noGrp="1" noRot="1" noChangeAspect="1"/>
+          </p:cNvSpPr>
+          <p:nvPr>
+            <p:ph type="sldImg"/>
+          </p:nvPr>
+        </p:nvSpPr>
+        <p:spPr/>
+      </p:sp>
+      <p:sp>
+        <p:nvSpPr>
+          <p:cNvPr id="3" name="Notes Placeholder 2"/>
+          <p:cNvSpPr>
+            <a:spLocks noGrp="1"/>
+          </p:cNvSpPr>
+          <p:nvPr>
+            <p:ph type="body" idx="1"/>
+          </p:nvPr>
+        </p:nvSpPr>
+        <p:spPr/>
+        <p:txBody>
+          <a:bodyPr/>
+          <a:lstStyle/>
+          <a:p>
+            <a:endParaRPr lang="en-US" dirty="0"/>
+          </a:p>
+        </p:txBody>
+      </p:sp>
+      <p:sp>
+        <p:nvSpPr>
+          <p:cNvPr id="4" name="Slide Number Placeholder 3"/>
+          <p:cNvSpPr>
+            <a:spLocks noGrp="1"/>
+          </p:cNvSpPr>
+          <p:nvPr>
+            <p:ph type="sldNum" sz="quarter" idx="10"/>
+          </p:nvPr>
+        </p:nvSpPr>
+        <p:spPr/>
+        <p:txBody>
+          <a:bodyPr/>
+          <a:lstStyle/>
+          <a:p>
+            <a:fld id="{340F17E4-2B4D-4428-9E25-E07F235B5058}" type="slidenum">
+              <a:rPr lang="en-US" smtClean="0"/>
+              <a:t>17</a:t>
+            </a:fld>
+            <a:endParaRPr lang="en-US"/>
+          </a:p>
+        </p:txBody>
+      </p:sp>
+    </p:spTree>
+    <p:extLst>
+      <p:ext uri="{BB962C8B-B14F-4D97-AF65-F5344CB8AC3E}">
+        <p14:creationId xmlns:p14="http://schemas.microsoft.com/office/powerpoint/2010/main" val="2413913167"/>
+      </p:ext>
+    </p:extLst>
+  </p:cSld>
+  <p:clrMapOvr>
+    <a:masterClrMapping/>
+  </p:clrMapOvr>
+</p:notes>
+</file>
+
+<file path=ppt/notesSlides/notesSlide12.xml><?xml version="1.0" encoding="utf-8"?>
+<p:notes xmlns:a="http://schemas.openxmlformats.org/drawingml/2006/main" xmlns:r="http://schemas.openxmlformats.org/officeDocument/2006/relationships" xmlns:p="http://schemas.openxmlformats.org/presentationml/2006/main">
+  <p:cSld>
+    <p:spTree>
+      <p:nvGrpSpPr>
+        <p:cNvPr id="1" name=""/>
+        <p:cNvGrpSpPr/>
+        <p:nvPr/>
+      </p:nvGrpSpPr>
+      <p:grpSpPr>
+        <a:xfrm>
+          <a:off x="0" y="0"/>
+          <a:ext cx="0" cy="0"/>
+          <a:chOff x="0" y="0"/>
+          <a:chExt cx="0" cy="0"/>
+        </a:xfrm>
+      </p:grpSpPr>
+      <p:sp>
+        <p:nvSpPr>
+          <p:cNvPr id="2" name="Slide Image Placeholder 1"/>
+          <p:cNvSpPr>
+            <a:spLocks noGrp="1" noRot="1" noChangeAspect="1"/>
+          </p:cNvSpPr>
+          <p:nvPr>
+            <p:ph type="sldImg"/>
+          </p:nvPr>
+        </p:nvSpPr>
+        <p:spPr/>
+      </p:sp>
+      <p:sp>
+        <p:nvSpPr>
+          <p:cNvPr id="3" name="Notes Placeholder 2"/>
+          <p:cNvSpPr>
+            <a:spLocks noGrp="1"/>
+          </p:cNvSpPr>
+          <p:nvPr>
+            <p:ph type="body" idx="1"/>
+          </p:nvPr>
+        </p:nvSpPr>
+        <p:spPr/>
+        <p:txBody>
+          <a:bodyPr/>
+          <a:lstStyle/>
+          <a:p>
+            <a:endParaRPr lang="en-US" dirty="0"/>
+          </a:p>
+        </p:txBody>
+      </p:sp>
+      <p:sp>
+        <p:nvSpPr>
+          <p:cNvPr id="4" name="Slide Number Placeholder 3"/>
+          <p:cNvSpPr>
+            <a:spLocks noGrp="1"/>
+          </p:cNvSpPr>
+          <p:nvPr>
+            <p:ph type="sldNum" sz="quarter" idx="10"/>
+          </p:nvPr>
+        </p:nvSpPr>
+        <p:spPr/>
+        <p:txBody>
+          <a:bodyPr/>
+          <a:lstStyle/>
+          <a:p>
+            <a:fld id="{340F17E4-2B4D-4428-9E25-E07F235B5058}" type="slidenum">
+              <a:rPr lang="en-US" smtClean="0"/>
+              <a:t>18</a:t>
+            </a:fld>
+            <a:endParaRPr lang="en-US"/>
+          </a:p>
+        </p:txBody>
+      </p:sp>
+    </p:spTree>
+    <p:extLst>
+      <p:ext uri="{BB962C8B-B14F-4D97-AF65-F5344CB8AC3E}">
+        <p14:creationId xmlns:p14="http://schemas.microsoft.com/office/powerpoint/2010/main" val="2984097489"/>
+      </p:ext>
+    </p:extLst>
+  </p:cSld>
+  <p:clrMapOvr>
+    <a:masterClrMapping/>
+  </p:clrMapOvr>
+</p:notes>
+</file>
+
+<file path=ppt/notesSlides/notesSlide13.xml><?xml version="1.0" encoding="utf-8"?>
+<p:notes xmlns:a="http://schemas.openxmlformats.org/drawingml/2006/main" xmlns:r="http://schemas.openxmlformats.org/officeDocument/2006/relationships" xmlns:p="http://schemas.openxmlformats.org/presentationml/2006/main">
+  <p:cSld>
+    <p:spTree>
+      <p:nvGrpSpPr>
+        <p:cNvPr id="1" name=""/>
+        <p:cNvGrpSpPr/>
+        <p:nvPr/>
+      </p:nvGrpSpPr>
+      <p:grpSpPr>
+        <a:xfrm>
+          <a:off x="0" y="0"/>
+          <a:ext cx="0" cy="0"/>
+          <a:chOff x="0" y="0"/>
+          <a:chExt cx="0" cy="0"/>
+        </a:xfrm>
+      </p:grpSpPr>
+      <p:sp>
+        <p:nvSpPr>
+          <p:cNvPr id="2" name="Slide Image Placeholder 1"/>
+          <p:cNvSpPr>
+            <a:spLocks noGrp="1" noRot="1" noChangeAspect="1"/>
+          </p:cNvSpPr>
+          <p:nvPr>
+            <p:ph type="sldImg"/>
+          </p:nvPr>
+        </p:nvSpPr>
+        <p:spPr/>
+      </p:sp>
+      <p:sp>
+        <p:nvSpPr>
+          <p:cNvPr id="3" name="Notes Placeholder 2"/>
+          <p:cNvSpPr>
+            <a:spLocks noGrp="1"/>
+          </p:cNvSpPr>
+          <p:nvPr>
+            <p:ph type="body" idx="1"/>
+          </p:nvPr>
+        </p:nvSpPr>
+        <p:spPr/>
+        <p:txBody>
+          <a:bodyPr/>
+          <a:lstStyle/>
+          <a:p>
+            <a:endParaRPr lang="en-US" dirty="0"/>
+          </a:p>
+        </p:txBody>
+      </p:sp>
+      <p:sp>
+        <p:nvSpPr>
+          <p:cNvPr id="4" name="Slide Number Placeholder 3"/>
+          <p:cNvSpPr>
+            <a:spLocks noGrp="1"/>
+          </p:cNvSpPr>
+          <p:nvPr>
+            <p:ph type="sldNum" sz="quarter" idx="10"/>
+          </p:nvPr>
+        </p:nvSpPr>
+        <p:spPr/>
+        <p:txBody>
+          <a:bodyPr/>
+          <a:lstStyle/>
+          <a:p>
+            <a:fld id="{340F17E4-2B4D-4428-9E25-E07F235B5058}" type="slidenum">
+              <a:rPr lang="en-US" smtClean="0"/>
+              <a:t>26</a:t>
+            </a:fld>
+            <a:endParaRPr lang="en-US"/>
+          </a:p>
+        </p:txBody>
+      </p:sp>
+    </p:spTree>
+    <p:extLst>
+      <p:ext uri="{BB962C8B-B14F-4D97-AF65-F5344CB8AC3E}">
+        <p14:creationId xmlns:p14="http://schemas.microsoft.com/office/powerpoint/2010/main" val="1448205010"/>
+      </p:ext>
+    </p:extLst>
+  </p:cSld>
+  <p:clrMapOvr>
+    <a:masterClrMapping/>
+  </p:clrMapOvr>
+</p:notes>
+</file>
+
 <file path=ppt/notesSlides/notesSlide2.xml><?xml version="1.0" encoding="utf-8"?>
 <p:notes xmlns:a="http://schemas.openxmlformats.org/drawingml/2006/main" xmlns:r="http://schemas.openxmlformats.org/officeDocument/2006/relationships" xmlns:p="http://schemas.openxmlformats.org/presentationml/2006/main">
   <p:cSld>
@@ -640,11 +994,7 @@
           <a:p>
             <a:r>
               <a:rPr lang="en-US" baseline="0" dirty="0" smtClean="0"/>
-              <a:t>How we’ve used it at WFAA to cluster our large donors, and why that group is so </a:t>
-            </a:r>
-            <a:r>
-              <a:rPr lang="en-US" baseline="0" dirty="0" smtClean="0"/>
-              <a:t>important</a:t>
+              <a:t>How we’ve used it at WFAA to cluster our large donors, and why that group is so important</a:t>
             </a:r>
           </a:p>
           <a:p>
@@ -1160,34 +1510,18 @@
           <a:bodyPr/>
           <a:lstStyle/>
           <a:p>
-            <a:pPr marL="0" marR="0" lvl="0" indent="0" algn="l" defTabSz="914400" rtl="0" eaLnBrk="1" fontAlgn="auto" latinLnBrk="0" hangingPunct="1">
-              <a:lnSpc>
-                <a:spcPct val="100000"/>
-              </a:lnSpc>
-              <a:spcBef>
-                <a:spcPts val="0"/>
-              </a:spcBef>
-              <a:spcAft>
-                <a:spcPts val="0"/>
-              </a:spcAft>
-              <a:buClrTx/>
-              <a:buSzTx/>
-              <a:buFontTx/>
-              <a:buNone/>
-              <a:tabLst/>
-              <a:defRPr/>
-            </a:pPr>
-            <a:r>
-              <a:rPr lang="en-US" dirty="0" smtClean="0"/>
-              <a:t>DBSCAN-Density-based</a:t>
-            </a:r>
-            <a:r>
-              <a:rPr lang="en-US" baseline="0" dirty="0" smtClean="0"/>
-              <a:t> spatial clustering of applications with noise</a:t>
-            </a:r>
-            <a:endParaRPr lang="en-US" dirty="0" smtClean="0"/>
-          </a:p>
-          <a:p>
+            <a:r>
+              <a:rPr lang="en-US" sz="1200" b="0" i="1" kern="1200" dirty="0" smtClean="0">
+                <a:solidFill>
+                  <a:schemeClr val="tx1"/>
+                </a:solidFill>
+                <a:effectLst/>
+                <a:latin typeface="+mn-lt"/>
+                <a:ea typeface="+mn-ea"/>
+                <a:cs typeface="+mn-cs"/>
+              </a:rPr>
+              <a:t>Note that agglomerative clustering is good at identifying small clusters. Divisive hierarchical clustering is good at identifying large clusters.</a:t>
+            </a:r>
             <a:endParaRPr lang="en-US" dirty="0"/>
           </a:p>
         </p:txBody>
@@ -1209,7 +1543,7 @@
           <a:p>
             <a:fld id="{340F17E4-2B4D-4428-9E25-E07F235B5058}" type="slidenum">
               <a:rPr lang="en-US" smtClean="0"/>
-              <a:t>11</a:t>
+              <a:t>10</a:t>
             </a:fld>
             <a:endParaRPr lang="en-US"/>
           </a:p>
@@ -1218,7 +1552,7 @@
     </p:spTree>
     <p:extLst>
       <p:ext uri="{BB962C8B-B14F-4D97-AF65-F5344CB8AC3E}">
-        <p14:creationId xmlns:p14="http://schemas.microsoft.com/office/powerpoint/2010/main" val="710510024"/>
+        <p14:creationId xmlns:p14="http://schemas.microsoft.com/office/powerpoint/2010/main" val="3872828281"/>
       </p:ext>
     </p:extLst>
   </p:cSld>
@@ -1272,6 +1606,34 @@
           <a:bodyPr/>
           <a:lstStyle/>
           <a:p>
+            <a:pPr marL="0" marR="0" lvl="0" indent="0" algn="l" defTabSz="914400" rtl="0" eaLnBrk="1" fontAlgn="auto" latinLnBrk="0" hangingPunct="1">
+              <a:lnSpc>
+                <a:spcPct val="100000"/>
+              </a:lnSpc>
+              <a:spcBef>
+                <a:spcPts val="0"/>
+              </a:spcBef>
+              <a:spcAft>
+                <a:spcPts val="0"/>
+              </a:spcAft>
+              <a:buClrTx/>
+              <a:buSzTx/>
+              <a:buFontTx/>
+              <a:buNone/>
+              <a:tabLst/>
+              <a:defRPr/>
+            </a:pPr>
+            <a:r>
+              <a:rPr lang="en-US" dirty="0" smtClean="0"/>
+              <a:t>DBSCAN-Density-based</a:t>
+            </a:r>
+            <a:r>
+              <a:rPr lang="en-US" baseline="0" dirty="0" smtClean="0"/>
+              <a:t> spatial clustering of applications with noise</a:t>
+            </a:r>
+            <a:endParaRPr lang="en-US" dirty="0" smtClean="0"/>
+          </a:p>
+          <a:p>
             <a:endParaRPr lang="en-US" dirty="0"/>
           </a:p>
         </p:txBody>
@@ -1293,7 +1655,7 @@
           <a:p>
             <a:fld id="{340F17E4-2B4D-4428-9E25-E07F235B5058}" type="slidenum">
               <a:rPr lang="en-US" smtClean="0"/>
-              <a:t>24</a:t>
+              <a:t>12</a:t>
             </a:fld>
             <a:endParaRPr lang="en-US"/>
           </a:p>
@@ -1302,7 +1664,7 @@
     </p:spTree>
     <p:extLst>
       <p:ext uri="{BB962C8B-B14F-4D97-AF65-F5344CB8AC3E}">
-        <p14:creationId xmlns:p14="http://schemas.microsoft.com/office/powerpoint/2010/main" val="1448205010"/>
+        <p14:creationId xmlns:p14="http://schemas.microsoft.com/office/powerpoint/2010/main" val="710510024"/>
       </p:ext>
     </p:extLst>
   </p:cSld>
@@ -2740,7 +3102,7 @@
             <a:spLocks noGrp="1"/>
           </p:cNvSpPr>
           <p:nvPr>
-            <p:ph idx="1"/>
+            <p:ph sz="half" idx="1"/>
           </p:nvPr>
         </p:nvSpPr>
         <p:spPr/>
@@ -2748,7 +3110,84 @@
           <a:bodyPr/>
           <a:lstStyle/>
           <a:p>
-            <a:endParaRPr lang="en-US"/>
+            <a:r>
+              <a:rPr lang="en-US" dirty="0" smtClean="0"/>
+              <a:t>Control of how high or low you go on the hierarchy</a:t>
+            </a:r>
+          </a:p>
+          <a:p>
+            <a:r>
+              <a:rPr lang="en-US" dirty="0" smtClean="0"/>
+              <a:t>Learn to interpret a </a:t>
+            </a:r>
+            <a:r>
+              <a:rPr lang="en-US" dirty="0" err="1" smtClean="0"/>
+              <a:t>dendrogram</a:t>
+            </a:r>
+            <a:endParaRPr lang="en-US" dirty="0" smtClean="0"/>
+          </a:p>
+          <a:p>
+            <a:r>
+              <a:rPr lang="en-US" dirty="0" smtClean="0"/>
+              <a:t>More flexible than K-Means, but harder to generate predictions</a:t>
+            </a:r>
+          </a:p>
+        </p:txBody>
+      </p:sp>
+      <p:pic>
+        <p:nvPicPr>
+          <p:cNvPr id="5" name="Content Placeholder 4"/>
+          <p:cNvPicPr>
+            <a:picLocks noGrp="1" noChangeAspect="1"/>
+          </p:cNvPicPr>
+          <p:nvPr>
+            <p:ph sz="half" idx="2"/>
+          </p:nvPr>
+        </p:nvPicPr>
+        <p:blipFill>
+          <a:blip r:embed="rId3"/>
+          <a:stretch>
+            <a:fillRect/>
+          </a:stretch>
+        </p:blipFill>
+        <p:spPr>
+          <a:xfrm>
+            <a:off x="4704029" y="1268016"/>
+            <a:ext cx="4439971" cy="2168358"/>
+          </a:xfrm>
+          <a:prstGeom prst="rect">
+            <a:avLst/>
+          </a:prstGeom>
+        </p:spPr>
+      </p:pic>
+      <p:sp>
+        <p:nvSpPr>
+          <p:cNvPr id="8" name="Rectangle 7"/>
+          <p:cNvSpPr/>
+          <p:nvPr/>
+        </p:nvSpPr>
+        <p:spPr>
+          <a:xfrm>
+            <a:off x="6051857" y="3751621"/>
+            <a:ext cx="2762359" cy="300082"/>
+          </a:xfrm>
+          <a:prstGeom prst="rect">
+            <a:avLst/>
+          </a:prstGeom>
+        </p:spPr>
+        <p:txBody>
+          <a:bodyPr wrap="none">
+            <a:spAutoFit/>
+          </a:bodyPr>
+          <a:lstStyle/>
+          <a:p>
+            <a:r>
+              <a:rPr lang="en-US" dirty="0">
+                <a:hlinkClick r:id="rId4"/>
+              </a:rPr>
+              <a:t>https://uc-r.github.io/hc_clustering</a:t>
+            </a:r>
+            <a:endParaRPr lang="en-US" dirty="0"/>
           </a:p>
         </p:txBody>
       </p:sp>
@@ -2797,11 +3236,7 @@
           <a:bodyPr/>
           <a:lstStyle/>
           <a:p>
-            <a:r>
-              <a:rPr lang="en-US" dirty="0" smtClean="0"/>
-              <a:t>DBSCAN</a:t>
-            </a:r>
-            <a:endParaRPr lang="en-US" dirty="0"/>
+            <a:endParaRPr lang="en-US"/>
           </a:p>
         </p:txBody>
       </p:sp>
@@ -2820,51 +3255,14 @@
           <a:bodyPr/>
           <a:lstStyle/>
           <a:p>
-            <a:r>
-              <a:rPr lang="en-US" dirty="0" smtClean="0"/>
-              <a:t>More advanced than K-Means or hierarchical clustering</a:t>
-            </a:r>
-          </a:p>
-          <a:p>
-            <a:r>
-              <a:rPr lang="en-US" dirty="0" smtClean="0"/>
-              <a:t>Useful in outlier detection and is flexible with respect to cluster shape</a:t>
-            </a:r>
-          </a:p>
-          <a:p>
-            <a:r>
-              <a:rPr lang="en-US" dirty="0"/>
-              <a:t>DBSCAN is “region-based”, trying to identify neighborhoods of densely packed data </a:t>
-            </a:r>
-            <a:r>
-              <a:rPr lang="en-US" dirty="0" smtClean="0"/>
-              <a:t>points</a:t>
-            </a:r>
-          </a:p>
-          <a:p>
-            <a:r>
-              <a:rPr lang="en-US" dirty="0" smtClean="0"/>
-              <a:t>Don’t specify number of clusters, but need to specify </a:t>
-            </a:r>
-            <a:r>
-              <a:rPr lang="en-US" b="1" dirty="0" smtClean="0"/>
-              <a:t>epsilon (radius) </a:t>
-            </a:r>
-            <a:r>
-              <a:rPr lang="en-US" dirty="0" smtClean="0"/>
-              <a:t>and </a:t>
-            </a:r>
-            <a:r>
-              <a:rPr lang="en-US" b="1" dirty="0" smtClean="0"/>
-              <a:t>minimum points (number of neighbors to be a core point)</a:t>
-            </a:r>
+            <a:endParaRPr lang="en-US"/>
           </a:p>
         </p:txBody>
       </p:sp>
     </p:spTree>
     <p:extLst>
       <p:ext uri="{BB962C8B-B14F-4D97-AF65-F5344CB8AC3E}">
-        <p14:creationId xmlns:p14="http://schemas.microsoft.com/office/powerpoint/2010/main" val="1783629603"/>
+        <p14:creationId xmlns:p14="http://schemas.microsoft.com/office/powerpoint/2010/main" val="4286423339"/>
       </p:ext>
     </p:extLst>
   </p:cSld>
@@ -2908,135 +3306,83 @@
           <a:p>
             <a:r>
               <a:rPr lang="en-US" dirty="0" smtClean="0"/>
-              <a:t>DBSCAN Example</a:t>
+              <a:t>DBSCAN</a:t>
             </a:r>
             <a:endParaRPr lang="en-US" dirty="0"/>
           </a:p>
         </p:txBody>
       </p:sp>
-      <p:pic>
-        <p:nvPicPr>
-          <p:cNvPr id="4" name="Picture 3"/>
-          <p:cNvPicPr>
-            <a:picLocks noChangeAspect="1"/>
-          </p:cNvPicPr>
-          <p:nvPr/>
-        </p:nvPicPr>
-        <p:blipFill>
-          <a:blip r:embed="rId2"/>
-          <a:stretch>
-            <a:fillRect/>
-          </a:stretch>
-        </p:blipFill>
-        <p:spPr>
-          <a:xfrm>
-            <a:off x="329784" y="1165856"/>
-            <a:ext cx="3259809" cy="3020672"/>
-          </a:xfrm>
-          <a:prstGeom prst="rect">
-            <a:avLst/>
-          </a:prstGeom>
-        </p:spPr>
-      </p:pic>
-      <p:sp>
-        <p:nvSpPr>
-          <p:cNvPr id="7" name="Right Arrow 6"/>
-          <p:cNvSpPr/>
-          <p:nvPr/>
-        </p:nvSpPr>
-        <p:spPr>
-          <a:xfrm>
-            <a:off x="3696829" y="2552648"/>
-            <a:ext cx="1670050" cy="247088"/>
-          </a:xfrm>
-          <a:prstGeom prst="rightArrow">
-            <a:avLst/>
-          </a:prstGeom>
-        </p:spPr>
-        <p:style>
-          <a:lnRef idx="2">
-            <a:schemeClr val="accent1">
-              <a:shade val="50000"/>
-            </a:schemeClr>
-          </a:lnRef>
-          <a:fillRef idx="1">
-            <a:schemeClr val="accent1"/>
-          </a:fillRef>
-          <a:effectRef idx="0">
-            <a:schemeClr val="accent1"/>
-          </a:effectRef>
-          <a:fontRef idx="minor">
-            <a:schemeClr val="lt1"/>
-          </a:fontRef>
-        </p:style>
-        <p:txBody>
-          <a:bodyPr rtlCol="0" anchor="ctr"/>
+      <p:sp>
+        <p:nvSpPr>
+          <p:cNvPr id="3" name="Content Placeholder 2"/>
+          <p:cNvSpPr>
+            <a:spLocks noGrp="1"/>
+          </p:cNvSpPr>
+          <p:nvPr>
+            <p:ph idx="1"/>
+          </p:nvPr>
+        </p:nvSpPr>
+        <p:spPr/>
+        <p:txBody>
+          <a:bodyPr/>
           <a:lstStyle/>
           <a:p>
-            <a:pPr algn="ctr"/>
-            <a:endParaRPr lang="en-US"/>
-          </a:p>
-        </p:txBody>
-      </p:sp>
-      <p:pic>
-        <p:nvPicPr>
-          <p:cNvPr id="8" name="Picture 7"/>
-          <p:cNvPicPr>
-            <a:picLocks noChangeAspect="1"/>
-          </p:cNvPicPr>
-          <p:nvPr/>
-        </p:nvPicPr>
-        <p:blipFill rotWithShape="1">
-          <a:blip r:embed="rId3"/>
-          <a:srcRect l="2661" t="4219" r="5829" b="1896"/>
-          <a:stretch/>
-        </p:blipFill>
-        <p:spPr>
-          <a:xfrm>
-            <a:off x="5474116" y="1101748"/>
-            <a:ext cx="3489961" cy="3317852"/>
-          </a:xfrm>
-          <a:prstGeom prst="rect">
-            <a:avLst/>
-          </a:prstGeom>
-        </p:spPr>
-      </p:pic>
-      <p:sp>
-        <p:nvSpPr>
-          <p:cNvPr id="9" name="TextBox 8"/>
-          <p:cNvSpPr txBox="1"/>
-          <p:nvPr/>
-        </p:nvSpPr>
-        <p:spPr>
-          <a:xfrm>
-            <a:off x="640080" y="4419600"/>
-            <a:ext cx="5455920" cy="300082"/>
-          </a:xfrm>
-          <a:prstGeom prst="rect">
-            <a:avLst/>
-          </a:prstGeom>
-          <a:noFill/>
-        </p:spPr>
-        <p:txBody>
-          <a:bodyPr wrap="square" rtlCol="0">
-            <a:spAutoFit/>
-          </a:bodyPr>
-          <a:lstStyle/>
-          <a:p>
-            <a:r>
-              <a:rPr lang="en-US" i="1" dirty="0">
-                <a:hlinkClick r:id="rId4"/>
-              </a:rPr>
-              <a:t>http://www.sthda.com/english/wiki/wiki.php?id_contents=7940</a:t>
-            </a:r>
-            <a:endParaRPr lang="en-US" i="1" dirty="0"/>
+            <a:r>
+              <a:rPr lang="en-US" dirty="0" smtClean="0"/>
+              <a:t>More advanced than K-Means or hierarchical clustering</a:t>
+            </a:r>
+          </a:p>
+          <a:p>
+            <a:r>
+              <a:rPr lang="en-US" dirty="0" smtClean="0"/>
+              <a:t>Useful in outlier detection and is flexible with respect to cluster shape</a:t>
+            </a:r>
+          </a:p>
+          <a:p>
+            <a:r>
+              <a:rPr lang="en-US" dirty="0"/>
+              <a:t>DBSCAN is “region-based”, trying to identify neighborhoods of densely packed data </a:t>
+            </a:r>
+            <a:r>
+              <a:rPr lang="en-US" dirty="0" smtClean="0"/>
+              <a:t>points</a:t>
+            </a:r>
+          </a:p>
+          <a:p>
+            <a:r>
+              <a:rPr lang="en-US" dirty="0" smtClean="0"/>
+              <a:t>Don’t specify number of clusters, but need to specify </a:t>
+            </a:r>
+            <a:r>
+              <a:rPr lang="en-US" b="1" dirty="0" smtClean="0"/>
+              <a:t>epsilon (radius) </a:t>
+            </a:r>
+            <a:r>
+              <a:rPr lang="en-US" dirty="0" smtClean="0"/>
+              <a:t>and </a:t>
+            </a:r>
+            <a:r>
+              <a:rPr lang="en-US" b="1" dirty="0" smtClean="0"/>
+              <a:t>minimum points (number of neighbors to be a core point</a:t>
+            </a:r>
+            <a:r>
+              <a:rPr lang="en-US" b="1" dirty="0" smtClean="0"/>
+              <a:t>)</a:t>
+            </a:r>
+          </a:p>
+          <a:p>
+            <a:r>
+              <a:rPr lang="en-US" dirty="0" smtClean="0"/>
+              <a:t>Implementations in R and Python</a:t>
+            </a:r>
+            <a:endParaRPr lang="en-US" dirty="0" smtClean="0"/>
           </a:p>
         </p:txBody>
       </p:sp>
     </p:spTree>
     <p:extLst>
       <p:ext uri="{BB962C8B-B14F-4D97-AF65-F5344CB8AC3E}">
-        <p14:creationId xmlns:p14="http://schemas.microsoft.com/office/powerpoint/2010/main" val="885589397"/>
+        <p14:creationId xmlns:p14="http://schemas.microsoft.com/office/powerpoint/2010/main" val="1783629603"/>
       </p:ext>
     </p:extLst>
   </p:cSld>
@@ -3080,86 +3426,135 @@
           <a:p>
             <a:r>
               <a:rPr lang="en-US" dirty="0" smtClean="0"/>
-              <a:t>Bonus: Dimensionality Reduction</a:t>
+              <a:t>DBSCAN Example</a:t>
             </a:r>
             <a:endParaRPr lang="en-US" dirty="0"/>
           </a:p>
         </p:txBody>
       </p:sp>
-      <p:sp>
-        <p:nvSpPr>
-          <p:cNvPr id="3" name="Content Placeholder 2"/>
-          <p:cNvSpPr>
-            <a:spLocks noGrp="1"/>
-          </p:cNvSpPr>
-          <p:nvPr>
-            <p:ph idx="1"/>
-          </p:nvPr>
-        </p:nvSpPr>
-        <p:spPr/>
-        <p:txBody>
-          <a:bodyPr/>
+      <p:pic>
+        <p:nvPicPr>
+          <p:cNvPr id="4" name="Picture 3"/>
+          <p:cNvPicPr>
+            <a:picLocks noChangeAspect="1"/>
+          </p:cNvPicPr>
+          <p:nvPr/>
+        </p:nvPicPr>
+        <p:blipFill>
+          <a:blip r:embed="rId2"/>
+          <a:stretch>
+            <a:fillRect/>
+          </a:stretch>
+        </p:blipFill>
+        <p:spPr>
+          <a:xfrm>
+            <a:off x="329784" y="1165856"/>
+            <a:ext cx="3259809" cy="3020672"/>
+          </a:xfrm>
+          <a:prstGeom prst="rect">
+            <a:avLst/>
+          </a:prstGeom>
+        </p:spPr>
+      </p:pic>
+      <p:sp>
+        <p:nvSpPr>
+          <p:cNvPr id="7" name="Right Arrow 6"/>
+          <p:cNvSpPr/>
+          <p:nvPr/>
+        </p:nvSpPr>
+        <p:spPr>
+          <a:xfrm>
+            <a:off x="3696829" y="2552648"/>
+            <a:ext cx="1670050" cy="247088"/>
+          </a:xfrm>
+          <a:prstGeom prst="rightArrow">
+            <a:avLst/>
+          </a:prstGeom>
+        </p:spPr>
+        <p:style>
+          <a:lnRef idx="2">
+            <a:schemeClr val="accent1">
+              <a:shade val="50000"/>
+            </a:schemeClr>
+          </a:lnRef>
+          <a:fillRef idx="1">
+            <a:schemeClr val="accent1"/>
+          </a:fillRef>
+          <a:effectRef idx="0">
+            <a:schemeClr val="accent1"/>
+          </a:effectRef>
+          <a:fontRef idx="minor">
+            <a:schemeClr val="lt1"/>
+          </a:fontRef>
+        </p:style>
+        <p:txBody>
+          <a:bodyPr rtlCol="0" anchor="ctr"/>
           <a:lstStyle/>
           <a:p>
-            <a:r>
-              <a:rPr lang="en-US" dirty="0" smtClean="0"/>
-              <a:t>Large number of data features (columns) makes standard data exploration hard</a:t>
-            </a:r>
-          </a:p>
-          <a:p>
-            <a:r>
-              <a:rPr lang="en-US" dirty="0" smtClean="0"/>
-              <a:t>Redundancy or correlation between variables will affect machine learning algorithms</a:t>
-            </a:r>
-          </a:p>
-          <a:p>
-            <a:r>
-              <a:rPr lang="en-US" dirty="0" smtClean="0"/>
-              <a:t>I’ve found it especially helpful for unstructured data</a:t>
-            </a:r>
-            <a:endParaRPr lang="en-US" dirty="0"/>
-          </a:p>
-          <a:p>
-            <a:r>
-              <a:rPr lang="en-US" dirty="0" smtClean="0"/>
-              <a:t>Techniques</a:t>
-            </a:r>
-          </a:p>
-          <a:p>
-            <a:pPr lvl="1"/>
-            <a:r>
-              <a:rPr lang="en-US" dirty="0" smtClean="0"/>
-              <a:t>Principal component analysis (“hello, world” of dimensionality reduction)</a:t>
-            </a:r>
-          </a:p>
-          <a:p>
-            <a:pPr lvl="1"/>
-            <a:r>
-              <a:rPr lang="en-US" dirty="0" smtClean="0"/>
-              <a:t>t-SNE (more advanced algorithm, lots of cool examples on the web)</a:t>
-            </a:r>
-          </a:p>
-          <a:p>
-            <a:pPr lvl="1"/>
-            <a:r>
-              <a:rPr lang="en-US" dirty="0" smtClean="0"/>
-              <a:t>LASSO (for regression tasks)</a:t>
-            </a:r>
-          </a:p>
-          <a:p>
-            <a:pPr lvl="1"/>
-            <a:r>
-              <a:rPr lang="en-US" dirty="0" smtClean="0"/>
-              <a:t>By document word2vec summaries</a:t>
-            </a:r>
-            <a:endParaRPr lang="en-US" dirty="0" smtClean="0"/>
+            <a:pPr algn="ctr"/>
+            <a:endParaRPr lang="en-US"/>
+          </a:p>
+        </p:txBody>
+      </p:sp>
+      <p:pic>
+        <p:nvPicPr>
+          <p:cNvPr id="8" name="Picture 7"/>
+          <p:cNvPicPr>
+            <a:picLocks noChangeAspect="1"/>
+          </p:cNvPicPr>
+          <p:nvPr/>
+        </p:nvPicPr>
+        <p:blipFill rotWithShape="1">
+          <a:blip r:embed="rId3"/>
+          <a:srcRect l="2661" t="4219" r="5829" b="1896"/>
+          <a:stretch/>
+        </p:blipFill>
+        <p:spPr>
+          <a:xfrm>
+            <a:off x="5474116" y="1101748"/>
+            <a:ext cx="3489961" cy="3317852"/>
+          </a:xfrm>
+          <a:prstGeom prst="rect">
+            <a:avLst/>
+          </a:prstGeom>
+        </p:spPr>
+      </p:pic>
+      <p:sp>
+        <p:nvSpPr>
+          <p:cNvPr id="9" name="TextBox 8"/>
+          <p:cNvSpPr txBox="1"/>
+          <p:nvPr/>
+        </p:nvSpPr>
+        <p:spPr>
+          <a:xfrm>
+            <a:off x="640080" y="4419600"/>
+            <a:ext cx="5455920" cy="300082"/>
+          </a:xfrm>
+          <a:prstGeom prst="rect">
+            <a:avLst/>
+          </a:prstGeom>
+          <a:noFill/>
+        </p:spPr>
+        <p:txBody>
+          <a:bodyPr wrap="square" rtlCol="0">
+            <a:spAutoFit/>
+          </a:bodyPr>
+          <a:lstStyle/>
+          <a:p>
+            <a:r>
+              <a:rPr lang="en-US" i="1" dirty="0">
+                <a:hlinkClick r:id="rId4"/>
+              </a:rPr>
+              <a:t>http://www.sthda.com/english/wiki/wiki.php?id_contents=7940</a:t>
+            </a:r>
+            <a:endParaRPr lang="en-US" i="1" dirty="0"/>
           </a:p>
         </p:txBody>
       </p:sp>
     </p:spTree>
     <p:extLst>
       <p:ext uri="{BB962C8B-B14F-4D97-AF65-F5344CB8AC3E}">
-        <p14:creationId xmlns:p14="http://schemas.microsoft.com/office/powerpoint/2010/main" val="3530676003"/>
+        <p14:creationId xmlns:p14="http://schemas.microsoft.com/office/powerpoint/2010/main" val="885589397"/>
       </p:ext>
     </p:extLst>
   </p:cSld>
@@ -3203,7 +3598,7 @@
           <a:p>
             <a:r>
               <a:rPr lang="en-US" dirty="0" smtClean="0"/>
-              <a:t>Example from WFAA – Setup</a:t>
+              <a:t>Bonus: Dimensionality Reduction</a:t>
             </a:r>
             <a:endParaRPr lang="en-US" dirty="0"/>
           </a:p>
@@ -3224,14 +3619,64 @@
           <a:bodyPr/>
           <a:lstStyle/>
           <a:p>
+            <a:r>
+              <a:rPr lang="en-US" dirty="0" smtClean="0"/>
+              <a:t>Large number of data features (columns) makes standard data exploration hard</a:t>
+            </a:r>
+          </a:p>
+          <a:p>
+            <a:r>
+              <a:rPr lang="en-US" dirty="0" smtClean="0"/>
+              <a:t>Redundancy or correlation between variables will affect machine learning algorithms</a:t>
+            </a:r>
+          </a:p>
+          <a:p>
+            <a:r>
+              <a:rPr lang="en-US" dirty="0" smtClean="0"/>
+              <a:t>I’ve found it especially helpful for unstructured data</a:t>
+            </a:r>
             <a:endParaRPr lang="en-US" dirty="0"/>
+          </a:p>
+          <a:p>
+            <a:r>
+              <a:rPr lang="en-US" dirty="0" smtClean="0"/>
+              <a:t>Techniques</a:t>
+            </a:r>
+          </a:p>
+          <a:p>
+            <a:pPr lvl="1"/>
+            <a:r>
+              <a:rPr lang="en-US" dirty="0" smtClean="0"/>
+              <a:t>Principal component analysis (“hello, world” of dimensionality reduction)</a:t>
+            </a:r>
+          </a:p>
+          <a:p>
+            <a:pPr lvl="1"/>
+            <a:r>
+              <a:rPr lang="en-US" dirty="0" smtClean="0"/>
+              <a:t>t-SNE (more advanced algorithm, lots of cool examples on the web)</a:t>
+            </a:r>
+          </a:p>
+          <a:p>
+            <a:pPr lvl="1"/>
+            <a:r>
+              <a:rPr lang="en-US" dirty="0" smtClean="0"/>
+              <a:t>LASSO (for regression tasks)</a:t>
+            </a:r>
+          </a:p>
+          <a:p>
+            <a:pPr lvl="1"/>
+            <a:r>
+              <a:rPr lang="en-US" dirty="0" smtClean="0"/>
+              <a:t>By document word2vec summaries</a:t>
+            </a:r>
           </a:p>
         </p:txBody>
       </p:sp>
     </p:spTree>
     <p:extLst>
       <p:ext uri="{BB962C8B-B14F-4D97-AF65-F5344CB8AC3E}">
-        <p14:creationId xmlns:p14="http://schemas.microsoft.com/office/powerpoint/2010/main" val="3684728735"/>
+        <p14:creationId xmlns:p14="http://schemas.microsoft.com/office/powerpoint/2010/main" val="3530676003"/>
       </p:ext>
     </p:extLst>
   </p:cSld>
@@ -3275,7 +3720,7 @@
           <a:p>
             <a:r>
               <a:rPr lang="en-US" dirty="0" smtClean="0"/>
-              <a:t>Example from WFAA – Data/Methods</a:t>
+              <a:t>Example from WFAA – Setup</a:t>
             </a:r>
             <a:endParaRPr lang="en-US" dirty="0"/>
           </a:p>
@@ -3296,14 +3741,45 @@
           <a:bodyPr/>
           <a:lstStyle/>
           <a:p>
-            <a:endParaRPr lang="en-US"/>
+            <a:r>
+              <a:rPr lang="en-US" dirty="0" smtClean="0"/>
+              <a:t>Analytics FAQ</a:t>
+            </a:r>
+          </a:p>
+          <a:p>
+            <a:pPr lvl="1"/>
+            <a:r>
+              <a:rPr lang="en-US" dirty="0" smtClean="0"/>
+              <a:t>What other donors looks like X? Pathways?</a:t>
+            </a:r>
+          </a:p>
+          <a:p>
+            <a:r>
+              <a:rPr lang="en-US" dirty="0" smtClean="0"/>
+              <a:t>Exploratory analysis on trajectories for large donor society</a:t>
+            </a:r>
+          </a:p>
+          <a:p>
+            <a:r>
+              <a:rPr lang="en-US" dirty="0" smtClean="0"/>
+              <a:t>What else can we learn about these donors?</a:t>
+            </a:r>
+          </a:p>
+          <a:p>
+            <a:r>
+              <a:rPr lang="en-US" dirty="0" smtClean="0"/>
+              <a:t>Nothing to predict, what can we do?</a:t>
+            </a:r>
+          </a:p>
+          <a:p>
+            <a:endParaRPr lang="en-US" dirty="0"/>
           </a:p>
         </p:txBody>
       </p:sp>
     </p:spTree>
     <p:extLst>
       <p:ext uri="{BB962C8B-B14F-4D97-AF65-F5344CB8AC3E}">
-        <p14:creationId xmlns:p14="http://schemas.microsoft.com/office/powerpoint/2010/main" val="2105481535"/>
+        <p14:creationId xmlns:p14="http://schemas.microsoft.com/office/powerpoint/2010/main" val="3684728735"/>
       </p:ext>
     </p:extLst>
   </p:cSld>
@@ -3347,7 +3823,7 @@
           <a:p>
             <a:r>
               <a:rPr lang="en-US" dirty="0" smtClean="0"/>
-              <a:t>Example from WFAA – Results</a:t>
+              <a:t>Example from WFAA – Data/Methods</a:t>
             </a:r>
             <a:endParaRPr lang="en-US" dirty="0"/>
           </a:p>
@@ -3355,27 +3831,186 @@
       </p:sp>
       <p:sp>
         <p:nvSpPr>
-          <p:cNvPr id="3" name="Content Placeholder 2"/>
+          <p:cNvPr id="4" name="Content Placeholder 3"/>
           <p:cNvSpPr>
             <a:spLocks noGrp="1"/>
           </p:cNvSpPr>
           <p:nvPr>
-            <p:ph idx="1"/>
+            <p:ph sz="half" idx="1"/>
           </p:nvPr>
         </p:nvSpPr>
         <p:spPr/>
         <p:txBody>
-          <a:bodyPr/>
+          <a:bodyPr>
+            <a:noAutofit/>
+          </a:bodyPr>
           <a:lstStyle/>
           <a:p>
-            <a:endParaRPr lang="en-US"/>
+            <a:r>
+              <a:rPr lang="en-US" sz="1600" dirty="0"/>
+              <a:t>1,150 Households with at least $250K in new gifts and new </a:t>
+            </a:r>
+            <a:r>
+              <a:rPr lang="en-US" sz="1600" dirty="0" smtClean="0"/>
+              <a:t>pledges</a:t>
+            </a:r>
+          </a:p>
+          <a:p>
+            <a:pPr lvl="1"/>
+            <a:r>
+              <a:rPr lang="en-US" sz="1400" dirty="0" smtClean="0"/>
+              <a:t>Giving </a:t>
+            </a:r>
+            <a:r>
+              <a:rPr lang="en-US" sz="1400" dirty="0"/>
+              <a:t>is adjusted for inflation (2016 </a:t>
+            </a:r>
+            <a:r>
+              <a:rPr lang="en-US" sz="1400" dirty="0" smtClean="0"/>
+              <a:t>$)</a:t>
+            </a:r>
+            <a:endParaRPr lang="en-US" sz="1400" dirty="0"/>
+          </a:p>
+          <a:p>
+            <a:r>
+              <a:rPr lang="en-US" sz="1600" dirty="0"/>
+              <a:t>Giving data based on monthly sum of recognition for new gifts and new </a:t>
+            </a:r>
+            <a:r>
+              <a:rPr lang="en-US" sz="1600" dirty="0" smtClean="0"/>
+              <a:t>pledges</a:t>
+            </a:r>
+            <a:endParaRPr lang="en-US" sz="1600" dirty="0"/>
+          </a:p>
+          <a:p>
+            <a:r>
+              <a:rPr lang="en-US" sz="1600" dirty="0"/>
+              <a:t>At least one member of household must have valid birth </a:t>
+            </a:r>
+            <a:r>
+              <a:rPr lang="en-US" sz="1600" dirty="0" smtClean="0"/>
+              <a:t>year</a:t>
+            </a:r>
+            <a:endParaRPr lang="en-US" sz="1600" dirty="0"/>
+          </a:p>
+          <a:p>
+            <a:r>
+              <a:rPr lang="en-US" sz="1600" dirty="0"/>
+              <a:t>At least one member of household must be living, or if all members are deceased, at least one member must have valid death </a:t>
+            </a:r>
+            <a:r>
+              <a:rPr lang="en-US" sz="1600" dirty="0" smtClean="0"/>
+              <a:t>year</a:t>
+            </a:r>
+            <a:endParaRPr lang="en-US" sz="1600" dirty="0"/>
+          </a:p>
+        </p:txBody>
+      </p:sp>
+      <p:sp>
+        <p:nvSpPr>
+          <p:cNvPr id="5" name="Content Placeholder 4"/>
+          <p:cNvSpPr>
+            <a:spLocks noGrp="1"/>
+          </p:cNvSpPr>
+          <p:nvPr>
+            <p:ph sz="half" idx="2"/>
+          </p:nvPr>
+        </p:nvSpPr>
+        <p:spPr/>
+        <p:txBody>
+          <a:bodyPr>
+            <a:noAutofit/>
+          </a:bodyPr>
+          <a:lstStyle/>
+          <a:p>
+            <a:r>
+              <a:rPr lang="en-US" sz="1200" dirty="0"/>
+              <a:t>Lifetime giving</a:t>
+            </a:r>
+          </a:p>
+          <a:p>
+            <a:r>
+              <a:rPr lang="en-US" sz="1200" dirty="0"/>
+              <a:t>First gift amount</a:t>
+            </a:r>
+          </a:p>
+          <a:p>
+            <a:r>
+              <a:rPr lang="en-US" sz="1200" dirty="0"/>
+              <a:t>Most recent gift amount</a:t>
+            </a:r>
+          </a:p>
+          <a:p>
+            <a:r>
+              <a:rPr lang="en-US" sz="1200" dirty="0"/>
+              <a:t>Giving in first five years of giving career</a:t>
+            </a:r>
+          </a:p>
+          <a:p>
+            <a:r>
+              <a:rPr lang="en-US" sz="1200" dirty="0"/>
+              <a:t>Giving in last five years of giving career</a:t>
+            </a:r>
+          </a:p>
+          <a:p>
+            <a:r>
+              <a:rPr lang="en-US" sz="1200" dirty="0"/>
+              <a:t>Count </a:t>
+            </a:r>
+            <a:r>
+              <a:rPr lang="en-US" sz="1200" dirty="0" smtClean="0"/>
+              <a:t>gifts</a:t>
+            </a:r>
+          </a:p>
+          <a:p>
+            <a:r>
+              <a:rPr lang="en-US" sz="1200" dirty="0" smtClean="0"/>
+              <a:t>Largest </a:t>
+            </a:r>
+            <a:r>
+              <a:rPr lang="en-US" sz="1200" dirty="0"/>
+              <a:t>gift</a:t>
+            </a:r>
+          </a:p>
+          <a:p>
+            <a:r>
+              <a:rPr lang="en-US" sz="1200" dirty="0"/>
+              <a:t>Age at first gift</a:t>
+            </a:r>
+          </a:p>
+          <a:p>
+            <a:r>
+              <a:rPr lang="en-US" sz="1200" dirty="0"/>
+              <a:t>Age at most recent gift</a:t>
+            </a:r>
+          </a:p>
+          <a:p>
+            <a:r>
+              <a:rPr lang="en-US" sz="1200" dirty="0"/>
+              <a:t>Age at largest gift</a:t>
+            </a:r>
+          </a:p>
+          <a:p>
+            <a:r>
+              <a:rPr lang="en-US" sz="1200" dirty="0"/>
+              <a:t>Age at passing $250K threshold</a:t>
+            </a:r>
+          </a:p>
+          <a:p>
+            <a:r>
+              <a:rPr lang="en-US" sz="1200" dirty="0"/>
+              <a:t>Days between first gift and passing $250K threshold</a:t>
+            </a:r>
+          </a:p>
+          <a:p>
+            <a:endParaRPr lang="en-US" sz="1200" dirty="0"/>
           </a:p>
         </p:txBody>
       </p:sp>
     </p:spTree>
     <p:extLst>
       <p:ext uri="{BB962C8B-B14F-4D97-AF65-F5344CB8AC3E}">
-        <p14:creationId xmlns:p14="http://schemas.microsoft.com/office/powerpoint/2010/main" val="1263122911"/>
+        <p14:creationId xmlns:p14="http://schemas.microsoft.com/office/powerpoint/2010/main" val="2105481535"/>
       </p:ext>
     </p:extLst>
   </p:cSld>
@@ -3412,14 +4047,19 @@
             <p:ph type="title"/>
           </p:nvPr>
         </p:nvSpPr>
-        <p:spPr/>
+        <p:spPr>
+          <a:xfrm>
+            <a:off x="329784" y="0"/>
+            <a:ext cx="8484432" cy="994172"/>
+          </a:xfrm>
+        </p:spPr>
         <p:txBody>
           <a:bodyPr/>
           <a:lstStyle/>
           <a:p>
             <a:r>
               <a:rPr lang="en-US" dirty="0" smtClean="0"/>
-              <a:t>Example from WFAA – Implementation</a:t>
+              <a:t>Example from WFAA – Results</a:t>
             </a:r>
             <a:endParaRPr lang="en-US" dirty="0"/>
           </a:p>
@@ -3432,22 +4072,139 @@
             <a:spLocks noGrp="1"/>
           </p:cNvSpPr>
           <p:nvPr>
-            <p:ph idx="1"/>
-          </p:nvPr>
-        </p:nvSpPr>
-        <p:spPr/>
-        <p:txBody>
-          <a:bodyPr/>
+            <p:ph sz="half" idx="1"/>
+          </p:nvPr>
+        </p:nvSpPr>
+        <p:spPr>
+          <a:xfrm>
+            <a:off x="6604283" y="994172"/>
+            <a:ext cx="2443852" cy="3946090"/>
+          </a:xfrm>
+        </p:spPr>
+        <p:txBody>
+          <a:bodyPr>
+            <a:normAutofit fontScale="77500" lnSpcReduction="20000"/>
+          </a:bodyPr>
           <a:lstStyle/>
           <a:p>
-            <a:endParaRPr lang="en-US"/>
-          </a:p>
-        </p:txBody>
-      </p:sp>
+            <a:r>
+              <a:rPr lang="en-US" dirty="0" smtClean="0"/>
+              <a:t>Used </a:t>
+            </a:r>
+            <a:r>
+              <a:rPr lang="en-US" dirty="0" smtClean="0"/>
+              <a:t>K-Means </a:t>
+            </a:r>
+            <a:r>
+              <a:rPr lang="en-US" dirty="0" smtClean="0"/>
+              <a:t>on scaled data (log almost everything!)</a:t>
+            </a:r>
+          </a:p>
+          <a:p>
+            <a:r>
+              <a:rPr lang="en-US" dirty="0" smtClean="0"/>
+              <a:t>Found four distinct and interpretable clusters</a:t>
+            </a:r>
+          </a:p>
+          <a:p>
+            <a:pPr marL="0" indent="0">
+              <a:buNone/>
+            </a:pPr>
+            <a:endParaRPr lang="en-US" dirty="0" smtClean="0"/>
+          </a:p>
+          <a:p>
+            <a:pPr marL="0" indent="0">
+              <a:buNone/>
+            </a:pPr>
+            <a:r>
+              <a:rPr lang="en-US" sz="2400" dirty="0" smtClean="0">
+                <a:solidFill>
+                  <a:srgbClr val="7030A0"/>
+                </a:solidFill>
+              </a:rPr>
+              <a:t>Cluster </a:t>
+            </a:r>
+            <a:r>
+              <a:rPr lang="en-US" sz="2400" dirty="0">
+                <a:solidFill>
+                  <a:srgbClr val="7030A0"/>
+                </a:solidFill>
+              </a:rPr>
+              <a:t>4: Young Whippersnappers (327)</a:t>
+            </a:r>
+          </a:p>
+          <a:p>
+            <a:pPr marL="0" indent="0">
+              <a:buNone/>
+            </a:pPr>
+            <a:r>
+              <a:rPr lang="en-US" sz="2400" dirty="0">
+                <a:solidFill>
+                  <a:srgbClr val="00B050"/>
+                </a:solidFill>
+              </a:rPr>
+              <a:t>Cluster 3: Take the Money and Run (or Walk) (127)</a:t>
+            </a:r>
+          </a:p>
+          <a:p>
+            <a:pPr marL="0" indent="0">
+              <a:buNone/>
+            </a:pPr>
+            <a:r>
+              <a:rPr lang="en-US" sz="2400" dirty="0">
+                <a:solidFill>
+                  <a:srgbClr val="0070C0"/>
+                </a:solidFill>
+              </a:rPr>
+              <a:t>Cluster 2: Big Kahuna (217)</a:t>
+            </a:r>
+          </a:p>
+          <a:p>
+            <a:pPr marL="0" indent="0">
+              <a:buNone/>
+            </a:pPr>
+            <a:r>
+              <a:rPr lang="en-US" sz="2400" dirty="0">
+                <a:solidFill>
+                  <a:srgbClr val="FF5D5D"/>
+                </a:solidFill>
+              </a:rPr>
+              <a:t>Cluster 1: Oldie but a Goodie (478)</a:t>
+            </a:r>
+          </a:p>
+          <a:p>
+            <a:endParaRPr lang="en-US" dirty="0" smtClean="0"/>
+          </a:p>
+        </p:txBody>
+      </p:sp>
+      <p:pic>
+        <p:nvPicPr>
+          <p:cNvPr id="5" name="Picture 4"/>
+          <p:cNvPicPr>
+            <a:picLocks noChangeAspect="1"/>
+          </p:cNvPicPr>
+          <p:nvPr/>
+        </p:nvPicPr>
+        <p:blipFill>
+          <a:blip r:embed="rId3"/>
+          <a:stretch>
+            <a:fillRect/>
+          </a:stretch>
+        </p:blipFill>
+        <p:spPr>
+          <a:xfrm>
+            <a:off x="329784" y="837298"/>
+            <a:ext cx="5901439" cy="4102964"/>
+          </a:xfrm>
+          <a:prstGeom prst="rect">
+            <a:avLst/>
+          </a:prstGeom>
+        </p:spPr>
+      </p:pic>
     </p:spTree>
     <p:extLst>
       <p:ext uri="{BB962C8B-B14F-4D97-AF65-F5344CB8AC3E}">
-        <p14:creationId xmlns:p14="http://schemas.microsoft.com/office/powerpoint/2010/main" val="1621333358"/>
+        <p14:creationId xmlns:p14="http://schemas.microsoft.com/office/powerpoint/2010/main" val="1263122911"/>
       </p:ext>
     </p:extLst>
   </p:cSld>
@@ -3484,46 +4241,164 @@
             <p:ph type="title"/>
           </p:nvPr>
         </p:nvSpPr>
-        <p:spPr/>
+        <p:spPr>
+          <a:xfrm>
+            <a:off x="329784" y="0"/>
+            <a:ext cx="8484432" cy="994172"/>
+          </a:xfrm>
+        </p:spPr>
         <p:txBody>
           <a:bodyPr/>
           <a:lstStyle/>
           <a:p>
             <a:r>
               <a:rPr lang="en-US" dirty="0" smtClean="0"/>
-              <a:t>Large Donor </a:t>
-            </a:r>
+              <a:t>Example from WFAA – Results</a:t>
+            </a:r>
+            <a:endParaRPr lang="en-US" dirty="0"/>
+          </a:p>
+        </p:txBody>
+      </p:sp>
+      <p:sp>
+        <p:nvSpPr>
+          <p:cNvPr id="3" name="Content Placeholder 2"/>
+          <p:cNvSpPr>
+            <a:spLocks noGrp="1"/>
+          </p:cNvSpPr>
+          <p:nvPr>
+            <p:ph sz="half" idx="1"/>
+          </p:nvPr>
+        </p:nvSpPr>
+        <p:spPr>
+          <a:xfrm>
+            <a:off x="6604283" y="994172"/>
+            <a:ext cx="2443852" cy="3946090"/>
+          </a:xfrm>
+        </p:spPr>
+        <p:txBody>
+          <a:bodyPr>
+            <a:normAutofit fontScale="77500" lnSpcReduction="20000"/>
+          </a:bodyPr>
+          <a:lstStyle/>
+          <a:p>
             <a:r>
               <a:rPr lang="en-US" dirty="0" smtClean="0"/>
-              <a:t>Disruption – Headwinds </a:t>
-            </a:r>
-            <a:endParaRPr lang="en-US" dirty="0"/>
-          </a:p>
-        </p:txBody>
-      </p:sp>
-      <p:sp>
-        <p:nvSpPr>
-          <p:cNvPr id="3" name="Content Placeholder 2"/>
-          <p:cNvSpPr>
-            <a:spLocks noGrp="1"/>
-          </p:cNvSpPr>
-          <p:nvPr>
-            <p:ph idx="1"/>
-          </p:nvPr>
-        </p:nvSpPr>
-        <p:spPr/>
-        <p:txBody>
-          <a:bodyPr/>
-          <a:lstStyle/>
-          <a:p>
-            <a:endParaRPr lang="en-US"/>
-          </a:p>
-        </p:txBody>
-      </p:sp>
+              <a:t>Used </a:t>
+            </a:r>
+            <a:r>
+              <a:rPr lang="en-US" dirty="0" smtClean="0"/>
+              <a:t>K-Means </a:t>
+            </a:r>
+            <a:r>
+              <a:rPr lang="en-US" dirty="0" smtClean="0"/>
+              <a:t>on scaled data (log almost everything!)</a:t>
+            </a:r>
+          </a:p>
+          <a:p>
+            <a:r>
+              <a:rPr lang="en-US" dirty="0" smtClean="0"/>
+              <a:t>Found four distinct and interpretable clusters</a:t>
+            </a:r>
+          </a:p>
+          <a:p>
+            <a:pPr marL="0" indent="0">
+              <a:buNone/>
+            </a:pPr>
+            <a:endParaRPr lang="en-US" dirty="0" smtClean="0"/>
+          </a:p>
+          <a:p>
+            <a:pPr marL="0" indent="0">
+              <a:buNone/>
+            </a:pPr>
+            <a:r>
+              <a:rPr lang="en-US" sz="2400" dirty="0" smtClean="0">
+                <a:solidFill>
+                  <a:srgbClr val="7030A0"/>
+                </a:solidFill>
+              </a:rPr>
+              <a:t>Cluster </a:t>
+            </a:r>
+            <a:r>
+              <a:rPr lang="en-US" sz="2400" dirty="0">
+                <a:solidFill>
+                  <a:srgbClr val="7030A0"/>
+                </a:solidFill>
+              </a:rPr>
+              <a:t>4: Young Whippersnappers (327)</a:t>
+            </a:r>
+          </a:p>
+          <a:p>
+            <a:pPr marL="0" indent="0">
+              <a:buNone/>
+            </a:pPr>
+            <a:r>
+              <a:rPr lang="en-US" sz="2400" dirty="0">
+                <a:solidFill>
+                  <a:srgbClr val="00B050"/>
+                </a:solidFill>
+              </a:rPr>
+              <a:t>Cluster 3: Take the Money and Run (or Walk) (127)</a:t>
+            </a:r>
+          </a:p>
+          <a:p>
+            <a:pPr marL="0" indent="0">
+              <a:buNone/>
+            </a:pPr>
+            <a:r>
+              <a:rPr lang="en-US" sz="2400" dirty="0">
+                <a:solidFill>
+                  <a:srgbClr val="0070C0"/>
+                </a:solidFill>
+              </a:rPr>
+              <a:t>Cluster 2: Big Kahuna (217)</a:t>
+            </a:r>
+          </a:p>
+          <a:p>
+            <a:pPr marL="0" indent="0">
+              <a:buNone/>
+            </a:pPr>
+            <a:r>
+              <a:rPr lang="en-US" sz="2400" dirty="0">
+                <a:solidFill>
+                  <a:srgbClr val="FF5D5D"/>
+                </a:solidFill>
+              </a:rPr>
+              <a:t>Cluster 1: Oldie but a Goodie (478)</a:t>
+            </a:r>
+          </a:p>
+          <a:p>
+            <a:endParaRPr lang="en-US" dirty="0" smtClean="0"/>
+          </a:p>
+        </p:txBody>
+      </p:sp>
+      <p:pic>
+        <p:nvPicPr>
+          <p:cNvPr id="4" name="Picture 3"/>
+          <p:cNvPicPr>
+            <a:picLocks noChangeAspect="1"/>
+          </p:cNvPicPr>
+          <p:nvPr/>
+        </p:nvPicPr>
+        <p:blipFill>
+          <a:blip r:embed="rId3"/>
+          <a:stretch>
+            <a:fillRect/>
+          </a:stretch>
+        </p:blipFill>
+        <p:spPr>
+          <a:xfrm>
+            <a:off x="329784" y="837298"/>
+            <a:ext cx="5901439" cy="4102964"/>
+          </a:xfrm>
+          <a:prstGeom prst="rect">
+            <a:avLst/>
+          </a:prstGeom>
+        </p:spPr>
+      </p:pic>
     </p:spTree>
     <p:extLst>
       <p:ext uri="{BB962C8B-B14F-4D97-AF65-F5344CB8AC3E}">
-        <p14:creationId xmlns:p14="http://schemas.microsoft.com/office/powerpoint/2010/main" val="1449896529"/>
+        <p14:creationId xmlns:p14="http://schemas.microsoft.com/office/powerpoint/2010/main" val="635025063"/>
       </p:ext>
     </p:extLst>
   </p:cSld>
@@ -3567,11 +4442,7 @@
           <a:p>
             <a:r>
               <a:rPr lang="en-US" dirty="0" smtClean="0"/>
-              <a:t>Large Donor </a:t>
-            </a:r>
-            <a:r>
-              <a:rPr lang="en-US" dirty="0" smtClean="0"/>
-              <a:t>Disruption – Data</a:t>
+              <a:t>Example from WFAA – Implementation</a:t>
             </a:r>
             <a:endParaRPr lang="en-US" dirty="0"/>
           </a:p>
@@ -3599,7 +4470,7 @@
     </p:spTree>
     <p:extLst>
       <p:ext uri="{BB962C8B-B14F-4D97-AF65-F5344CB8AC3E}">
-        <p14:creationId xmlns:p14="http://schemas.microsoft.com/office/powerpoint/2010/main" val="3268452489"/>
+        <p14:creationId xmlns:p14="http://schemas.microsoft.com/office/powerpoint/2010/main" val="1621333358"/>
       </p:ext>
     </p:extLst>
   </p:cSld>
@@ -3668,7 +4539,6 @@
               <a:rPr lang="en-US" dirty="0" smtClean="0"/>
               <a:t>Background</a:t>
             </a:r>
-            <a:endParaRPr lang="en-US" dirty="0" smtClean="0"/>
           </a:p>
           <a:p>
             <a:r>
@@ -3679,34 +4549,20 @@
           <a:p>
             <a:r>
               <a:rPr lang="en-US" dirty="0" smtClean="0"/>
-              <a:t>Three Clustering </a:t>
-            </a:r>
+              <a:t>Three Clustering Algorithms</a:t>
+            </a:r>
+          </a:p>
+          <a:p>
             <a:r>
               <a:rPr lang="en-US" dirty="0" smtClean="0"/>
-              <a:t>Algorithms</a:t>
-            </a:r>
-            <a:endParaRPr lang="en-US" dirty="0" smtClean="0"/>
+              <a:t>An Example from WFAA</a:t>
+            </a:r>
           </a:p>
           <a:p>
             <a:r>
               <a:rPr lang="en-US" dirty="0" smtClean="0"/>
-              <a:t>An </a:t>
-            </a:r>
-            <a:r>
-              <a:rPr lang="en-US" dirty="0" smtClean="0"/>
-              <a:t>Example from WFAA</a:t>
-            </a:r>
-          </a:p>
-          <a:p>
-            <a:r>
-              <a:rPr lang="en-US" dirty="0" smtClean="0"/>
-              <a:t>Bonus: Large Donor </a:t>
-            </a:r>
-            <a:r>
-              <a:rPr lang="en-US" dirty="0" smtClean="0"/>
-              <a:t>Disruption</a:t>
-            </a:r>
-            <a:endParaRPr lang="en-US" dirty="0" smtClean="0"/>
+              <a:t>Bonus: Large Donor Disruption</a:t>
+            </a:r>
           </a:p>
           <a:p>
             <a:r>
@@ -3719,7 +4575,7 @@
       </p:sp>
       <p:pic>
         <p:nvPicPr>
-          <p:cNvPr id="12" name="Content Placeholder 11"/>
+          <p:cNvPr id="3" name="Content Placeholder 2"/>
           <p:cNvPicPr>
             <a:picLocks noGrp="1" noChangeAspect="1"/>
           </p:cNvPicPr>
@@ -3735,8 +4591,8 @@
         </p:blipFill>
         <p:spPr>
           <a:xfrm>
-            <a:off x="4580312" y="956760"/>
-            <a:ext cx="4511713" cy="3675565"/>
+            <a:off x="4590566" y="1069258"/>
+            <a:ext cx="4213395" cy="3563067"/>
           </a:xfrm>
           <a:prstGeom prst="rect">
             <a:avLst/>
@@ -3797,11 +4653,7 @@
           <a:p>
             <a:r>
               <a:rPr lang="en-US" dirty="0" smtClean="0"/>
-              <a:t>Large Donor </a:t>
-            </a:r>
-            <a:r>
-              <a:rPr lang="en-US" dirty="0" smtClean="0"/>
-              <a:t>Disruption – Opinions</a:t>
+              <a:t>Large Donor Disruption – Headwinds </a:t>
             </a:r>
             <a:endParaRPr lang="en-US" dirty="0"/>
           </a:p>
@@ -3829,7 +4681,7 @@
     </p:spTree>
     <p:extLst>
       <p:ext uri="{BB962C8B-B14F-4D97-AF65-F5344CB8AC3E}">
-        <p14:creationId xmlns:p14="http://schemas.microsoft.com/office/powerpoint/2010/main" val="3479376838"/>
+        <p14:creationId xmlns:p14="http://schemas.microsoft.com/office/powerpoint/2010/main" val="1449896529"/>
       </p:ext>
     </p:extLst>
   </p:cSld>
@@ -3873,7 +4725,7 @@
           <a:p>
             <a:r>
               <a:rPr lang="en-US" dirty="0" smtClean="0"/>
-              <a:t>Wrapping Up</a:t>
+              <a:t>Large Donor Disruption – Data</a:t>
             </a:r>
             <a:endParaRPr lang="en-US" dirty="0"/>
           </a:p>
@@ -3901,7 +4753,7 @@
     </p:spTree>
     <p:extLst>
       <p:ext uri="{BB962C8B-B14F-4D97-AF65-F5344CB8AC3E}">
-        <p14:creationId xmlns:p14="http://schemas.microsoft.com/office/powerpoint/2010/main" val="2994578432"/>
+        <p14:creationId xmlns:p14="http://schemas.microsoft.com/office/powerpoint/2010/main" val="3268452489"/>
       </p:ext>
     </p:extLst>
   </p:cSld>
@@ -3945,7 +4797,7 @@
           <a:p>
             <a:r>
               <a:rPr lang="en-US" dirty="0" smtClean="0"/>
-              <a:t>Wrapping Up</a:t>
+              <a:t>Large Donor Disruption – Opinions</a:t>
             </a:r>
             <a:endParaRPr lang="en-US" dirty="0"/>
           </a:p>
@@ -3973,7 +4825,7 @@
     </p:spTree>
     <p:extLst>
       <p:ext uri="{BB962C8B-B14F-4D97-AF65-F5344CB8AC3E}">
-        <p14:creationId xmlns:p14="http://schemas.microsoft.com/office/powerpoint/2010/main" val="1749157500"/>
+        <p14:creationId xmlns:p14="http://schemas.microsoft.com/office/powerpoint/2010/main" val="3479376838"/>
       </p:ext>
     </p:extLst>
   </p:cSld>
@@ -4045,6 +4897,150 @@
     </p:spTree>
     <p:extLst>
       <p:ext uri="{BB962C8B-B14F-4D97-AF65-F5344CB8AC3E}">
+        <p14:creationId xmlns:p14="http://schemas.microsoft.com/office/powerpoint/2010/main" val="2994578432"/>
+      </p:ext>
+    </p:extLst>
+  </p:cSld>
+  <p:clrMapOvr>
+    <a:masterClrMapping/>
+  </p:clrMapOvr>
+</p:sld>
+</file>
+
+<file path=ppt/slides/slide24.xml><?xml version="1.0" encoding="utf-8"?>
+<p:sld xmlns:a="http://schemas.openxmlformats.org/drawingml/2006/main" xmlns:r="http://schemas.openxmlformats.org/officeDocument/2006/relationships" xmlns:p="http://schemas.openxmlformats.org/presentationml/2006/main">
+  <p:cSld>
+    <p:spTree>
+      <p:nvGrpSpPr>
+        <p:cNvPr id="1" name=""/>
+        <p:cNvGrpSpPr/>
+        <p:nvPr/>
+      </p:nvGrpSpPr>
+      <p:grpSpPr>
+        <a:xfrm>
+          <a:off x="0" y="0"/>
+          <a:ext cx="0" cy="0"/>
+          <a:chOff x="0" y="0"/>
+          <a:chExt cx="0" cy="0"/>
+        </a:xfrm>
+      </p:grpSpPr>
+      <p:sp>
+        <p:nvSpPr>
+          <p:cNvPr id="2" name="Title 1"/>
+          <p:cNvSpPr>
+            <a:spLocks noGrp="1"/>
+          </p:cNvSpPr>
+          <p:nvPr>
+            <p:ph type="title"/>
+          </p:nvPr>
+        </p:nvSpPr>
+        <p:spPr/>
+        <p:txBody>
+          <a:bodyPr/>
+          <a:lstStyle/>
+          <a:p>
+            <a:r>
+              <a:rPr lang="en-US" dirty="0" smtClean="0"/>
+              <a:t>Wrapping Up</a:t>
+            </a:r>
+            <a:endParaRPr lang="en-US" dirty="0"/>
+          </a:p>
+        </p:txBody>
+      </p:sp>
+      <p:sp>
+        <p:nvSpPr>
+          <p:cNvPr id="3" name="Content Placeholder 2"/>
+          <p:cNvSpPr>
+            <a:spLocks noGrp="1"/>
+          </p:cNvSpPr>
+          <p:nvPr>
+            <p:ph idx="1"/>
+          </p:nvPr>
+        </p:nvSpPr>
+        <p:spPr/>
+        <p:txBody>
+          <a:bodyPr/>
+          <a:lstStyle/>
+          <a:p>
+            <a:endParaRPr lang="en-US"/>
+          </a:p>
+        </p:txBody>
+      </p:sp>
+    </p:spTree>
+    <p:extLst>
+      <p:ext uri="{BB962C8B-B14F-4D97-AF65-F5344CB8AC3E}">
+        <p14:creationId xmlns:p14="http://schemas.microsoft.com/office/powerpoint/2010/main" val="1749157500"/>
+      </p:ext>
+    </p:extLst>
+  </p:cSld>
+  <p:clrMapOvr>
+    <a:masterClrMapping/>
+  </p:clrMapOvr>
+</p:sld>
+</file>
+
+<file path=ppt/slides/slide25.xml><?xml version="1.0" encoding="utf-8"?>
+<p:sld xmlns:a="http://schemas.openxmlformats.org/drawingml/2006/main" xmlns:r="http://schemas.openxmlformats.org/officeDocument/2006/relationships" xmlns:p="http://schemas.openxmlformats.org/presentationml/2006/main">
+  <p:cSld>
+    <p:spTree>
+      <p:nvGrpSpPr>
+        <p:cNvPr id="1" name=""/>
+        <p:cNvGrpSpPr/>
+        <p:nvPr/>
+      </p:nvGrpSpPr>
+      <p:grpSpPr>
+        <a:xfrm>
+          <a:off x="0" y="0"/>
+          <a:ext cx="0" cy="0"/>
+          <a:chOff x="0" y="0"/>
+          <a:chExt cx="0" cy="0"/>
+        </a:xfrm>
+      </p:grpSpPr>
+      <p:sp>
+        <p:nvSpPr>
+          <p:cNvPr id="2" name="Title 1"/>
+          <p:cNvSpPr>
+            <a:spLocks noGrp="1"/>
+          </p:cNvSpPr>
+          <p:nvPr>
+            <p:ph type="title"/>
+          </p:nvPr>
+        </p:nvSpPr>
+        <p:spPr/>
+        <p:txBody>
+          <a:bodyPr/>
+          <a:lstStyle/>
+          <a:p>
+            <a:r>
+              <a:rPr lang="en-US" dirty="0" smtClean="0"/>
+              <a:t>Wrapping Up</a:t>
+            </a:r>
+            <a:endParaRPr lang="en-US" dirty="0"/>
+          </a:p>
+        </p:txBody>
+      </p:sp>
+      <p:sp>
+        <p:nvSpPr>
+          <p:cNvPr id="3" name="Content Placeholder 2"/>
+          <p:cNvSpPr>
+            <a:spLocks noGrp="1"/>
+          </p:cNvSpPr>
+          <p:nvPr>
+            <p:ph idx="1"/>
+          </p:nvPr>
+        </p:nvSpPr>
+        <p:spPr/>
+        <p:txBody>
+          <a:bodyPr/>
+          <a:lstStyle/>
+          <a:p>
+            <a:endParaRPr lang="en-US"/>
+          </a:p>
+        </p:txBody>
+      </p:sp>
+    </p:spTree>
+    <p:extLst>
+      <p:ext uri="{BB962C8B-B14F-4D97-AF65-F5344CB8AC3E}">
         <p14:creationId xmlns:p14="http://schemas.microsoft.com/office/powerpoint/2010/main" val="557220253"/>
       </p:ext>
     </p:extLst>
@@ -4055,7 +5051,7 @@
 </p:sld>
 </file>
 
-<file path=ppt/slides/slide24.xml><?xml version="1.0" encoding="utf-8"?>
+<file path=ppt/slides/slide26.xml><?xml version="1.0" encoding="utf-8"?>
 <p:sld xmlns:a="http://schemas.openxmlformats.org/drawingml/2006/main" xmlns:r="http://schemas.openxmlformats.org/officeDocument/2006/relationships" xmlns:p="http://schemas.openxmlformats.org/presentationml/2006/main">
   <p:cSld>
     <p:spTree>
@@ -4211,7 +5207,7 @@
 </p:sld>
 </file>
 
-<file path=ppt/slides/slide25.xml><?xml version="1.0" encoding="utf-8"?>
+<file path=ppt/slides/slide27.xml><?xml version="1.0" encoding="utf-8"?>
 <p:sld xmlns:a="http://schemas.openxmlformats.org/drawingml/2006/main" xmlns:r="http://schemas.openxmlformats.org/officeDocument/2006/relationships" xmlns:p="http://schemas.openxmlformats.org/presentationml/2006/main">
   <p:cSld>
     <p:spTree>
@@ -4387,7 +5383,6 @@
               <a:rPr lang="en-US" dirty="0" smtClean="0"/>
               <a:t>Main tools are R, SQL, and Tableau</a:t>
             </a:r>
-            <a:endParaRPr lang="en-US" dirty="0" smtClean="0"/>
           </a:p>
           <a:p>
             <a:r>
@@ -6819,10 +7814,17 @@
           <a:p>
             <a:r>
               <a:rPr lang="en-US" sz="1600" dirty="0" smtClean="0">
+                <a:latin typeface="Segoe UI Semibold" panose="020B0702040204020203" pitchFamily="34" charset="0"/>
+                <a:cs typeface="Segoe UI Semibold" panose="020B0702040204020203" pitchFamily="34" charset="0"/>
+              </a:rPr>
+              <a:t>Supervised</a:t>
+            </a:r>
+            <a:r>
+              <a:rPr lang="en-US" sz="1600" dirty="0" smtClean="0">
                 <a:latin typeface="Segoe UI" panose="020B0502040204020203" pitchFamily="34" charset="0"/>
                 <a:cs typeface="Segoe UI" panose="020B0502040204020203" pitchFamily="34" charset="0"/>
               </a:rPr>
-              <a:t>Supervised learning (iris): </a:t>
+              <a:t> learning (iris): </a:t>
             </a:r>
           </a:p>
           <a:p>
@@ -8094,10 +9096,17 @@
             <a:pPr algn="r"/>
             <a:r>
               <a:rPr lang="en-US" sz="1600" dirty="0" smtClean="0">
+                <a:latin typeface="Segoe UI Semibold" panose="020B0702040204020203" pitchFamily="34" charset="0"/>
+                <a:cs typeface="Segoe UI Semibold" panose="020B0702040204020203" pitchFamily="34" charset="0"/>
+              </a:rPr>
+              <a:t>Unsupervised</a:t>
+            </a:r>
+            <a:r>
+              <a:rPr lang="en-US" sz="1600" dirty="0" smtClean="0">
                 <a:latin typeface="Segoe UI" panose="020B0502040204020203" pitchFamily="34" charset="0"/>
                 <a:cs typeface="Segoe UI" panose="020B0502040204020203" pitchFamily="34" charset="0"/>
               </a:rPr>
-              <a:t>Unsupervised learning (trees): </a:t>
+              <a:t> learning (trees): </a:t>
             </a:r>
           </a:p>
           <a:p>
@@ -8276,7 +9285,6 @@
               <a:rPr lang="en-US" dirty="0" smtClean="0"/>
               <a:t>K-Means</a:t>
             </a:r>
-            <a:endParaRPr lang="en-US" dirty="0" smtClean="0"/>
           </a:p>
           <a:p>
             <a:r>
@@ -8389,6 +9397,7 @@
               <a:rPr lang="en-US" dirty="0" smtClean="0"/>
               <a:t>effective</a:t>
             </a:r>
+            <a:endParaRPr lang="en-US" dirty="0" smtClean="0"/>
           </a:p>
           <a:p>
             <a:r>
@@ -8399,9 +9408,12 @@
           <a:p>
             <a:r>
               <a:rPr lang="en-US" dirty="0" smtClean="0"/>
-              <a:t>Scale your data!</a:t>
-            </a:r>
-            <a:endParaRPr lang="en-US" dirty="0" smtClean="0"/>
+              <a:t>Scale your data</a:t>
+            </a:r>
+            <a:r>
+              <a:rPr lang="en-US" dirty="0" smtClean="0"/>
+              <a:t>!</a:t>
+            </a:r>
           </a:p>
         </p:txBody>
       </p:sp>

</xml_diff>

<commit_message>
a few more bullets
</commit_message>
<xml_diff>
--- a/Generating Insights from Clustering Large Donors - BStieber APRA DAS19.pptx
+++ b/Generating Insights from Clustering Large Donors - BStieber APRA DAS19.pptx
@@ -4463,7 +4463,30 @@
           <a:bodyPr/>
           <a:lstStyle/>
           <a:p>
-            <a:endParaRPr lang="en-US"/>
+            <a:r>
+              <a:rPr lang="en-US" dirty="0" smtClean="0"/>
+              <a:t>More targeted questions about each of the clusters</a:t>
+            </a:r>
+          </a:p>
+          <a:p>
+            <a:r>
+              <a:rPr lang="en-US" dirty="0" smtClean="0"/>
+              <a:t>Make development officers more efficient</a:t>
+            </a:r>
+          </a:p>
+          <a:p>
+            <a:r>
+              <a:rPr lang="en-US" dirty="0" smtClean="0"/>
+              <a:t>Can we generalize </a:t>
+            </a:r>
+            <a:r>
+              <a:rPr lang="en-US" smtClean="0"/>
+              <a:t>to the whole?</a:t>
+            </a:r>
+            <a:endParaRPr lang="en-US" dirty="0" smtClean="0"/>
+          </a:p>
+          <a:p>
+            <a:endParaRPr lang="en-US" dirty="0"/>
           </a:p>
         </p:txBody>
       </p:sp>
@@ -4674,7 +4697,23 @@
           <a:bodyPr/>
           <a:lstStyle/>
           <a:p>
-            <a:endParaRPr lang="en-US"/>
+            <a:r>
+              <a:rPr lang="en-US" dirty="0" smtClean="0"/>
+              <a:t>Growing wealth inequality</a:t>
+            </a:r>
+          </a:p>
+          <a:p>
+            <a:r>
+              <a:rPr lang="en-US" dirty="0" smtClean="0"/>
+              <a:t>Uber-wealthy trends</a:t>
+            </a:r>
+          </a:p>
+          <a:p>
+            <a:r>
+              <a:rPr lang="en-US" dirty="0" smtClean="0"/>
+              <a:t>Large gifts in the news</a:t>
+            </a:r>
+            <a:endParaRPr lang="en-US" dirty="0"/>
           </a:p>
         </p:txBody>
       </p:sp>

</xml_diff>

<commit_message>
more talk vis tweaks
</commit_message>
<xml_diff>
--- a/Generating Insights from Clustering Large Donors - BStieber APRA DAS19.pptx
+++ b/Generating Insights from Clustering Large Donors - BStieber APRA DAS19.pptx
@@ -4574,7 +4574,7 @@
       </p:sp>
       <p:pic>
         <p:nvPicPr>
-          <p:cNvPr id="10" name="Content Placeholder 9"/>
+          <p:cNvPr id="12" name="Content Placeholder 11"/>
           <p:cNvPicPr>
             <a:picLocks noGrp="1" noChangeAspect="1"/>
           </p:cNvPicPr>
@@ -4590,8 +4590,8 @@
         </p:blipFill>
         <p:spPr>
           <a:xfrm>
-            <a:off x="4580311" y="1120878"/>
-            <a:ext cx="4500303" cy="3815474"/>
+            <a:off x="4509807" y="1039761"/>
+            <a:ext cx="4504975" cy="3819435"/>
           </a:xfrm>
           <a:prstGeom prst="rect">
             <a:avLst/>

</xml_diff>

<commit_message>
tweaks, working on hclust
</commit_message>
<xml_diff>
--- a/Generating Insights from Clustering Large Donors - BStieber APRA DAS19.pptx
+++ b/Generating Insights from Clustering Large Donors - BStieber APRA DAS19.pptx
@@ -5,7 +5,7 @@
     <p:sldMasterId id="2147483660" r:id="rId1"/>
   </p:sldMasterIdLst>
   <p:notesMasterIdLst>
-    <p:notesMasterId r:id="rId29"/>
+    <p:notesMasterId r:id="rId30"/>
   </p:notesMasterIdLst>
   <p:sldIdLst>
     <p:sldId id="258" r:id="rId2"/>
@@ -14,27 +14,28 @@
     <p:sldId id="262" r:id="rId5"/>
     <p:sldId id="274" r:id="rId6"/>
     <p:sldId id="275" r:id="rId7"/>
-    <p:sldId id="276" r:id="rId8"/>
-    <p:sldId id="264" r:id="rId9"/>
-    <p:sldId id="265" r:id="rId10"/>
-    <p:sldId id="266" r:id="rId11"/>
-    <p:sldId id="267" r:id="rId12"/>
-    <p:sldId id="284" r:id="rId13"/>
-    <p:sldId id="280" r:id="rId14"/>
-    <p:sldId id="285" r:id="rId15"/>
-    <p:sldId id="268" r:id="rId16"/>
-    <p:sldId id="283" r:id="rId17"/>
-    <p:sldId id="281" r:id="rId18"/>
-    <p:sldId id="271" r:id="rId19"/>
-    <p:sldId id="273" r:id="rId20"/>
-    <p:sldId id="272" r:id="rId21"/>
-    <p:sldId id="286" r:id="rId22"/>
-    <p:sldId id="270" r:id="rId23"/>
-    <p:sldId id="277" r:id="rId24"/>
-    <p:sldId id="278" r:id="rId25"/>
-    <p:sldId id="279" r:id="rId26"/>
-    <p:sldId id="282" r:id="rId27"/>
-    <p:sldId id="259" r:id="rId28"/>
+    <p:sldId id="288" r:id="rId8"/>
+    <p:sldId id="276" r:id="rId9"/>
+    <p:sldId id="264" r:id="rId10"/>
+    <p:sldId id="265" r:id="rId11"/>
+    <p:sldId id="266" r:id="rId12"/>
+    <p:sldId id="267" r:id="rId13"/>
+    <p:sldId id="284" r:id="rId14"/>
+    <p:sldId id="280" r:id="rId15"/>
+    <p:sldId id="285" r:id="rId16"/>
+    <p:sldId id="268" r:id="rId17"/>
+    <p:sldId id="283" r:id="rId18"/>
+    <p:sldId id="281" r:id="rId19"/>
+    <p:sldId id="271" r:id="rId20"/>
+    <p:sldId id="273" r:id="rId21"/>
+    <p:sldId id="272" r:id="rId22"/>
+    <p:sldId id="286" r:id="rId23"/>
+    <p:sldId id="270" r:id="rId24"/>
+    <p:sldId id="277" r:id="rId25"/>
+    <p:sldId id="278" r:id="rId26"/>
+    <p:sldId id="279" r:id="rId27"/>
+    <p:sldId id="282" r:id="rId28"/>
+    <p:sldId id="259" r:id="rId29"/>
   </p:sldIdLst>
   <p:sldSz cx="9144000" cy="5143500" type="screen16x9"/>
   <p:notesSz cx="6858000" cy="9144000"/>
@@ -234,7 +235,7 @@
           <a:p>
             <a:fld id="{1DEEC2B6-86D3-4D9F-A8F6-E4F5C06381F6}" type="datetimeFigureOut">
               <a:rPr lang="en-US" smtClean="0"/>
-              <a:t>5/10/2019</a:t>
+              <a:t>5/14/2019</a:t>
             </a:fld>
             <a:endParaRPr lang="en-US"/>
           </a:p>
@@ -679,7 +680,7 @@
           <a:p>
             <a:fld id="{340F17E4-2B4D-4428-9E25-E07F235B5058}" type="slidenum">
               <a:rPr lang="en-US" smtClean="0"/>
-              <a:t>15</a:t>
+              <a:t>16</a:t>
             </a:fld>
             <a:endParaRPr lang="en-US"/>
           </a:p>
@@ -779,7 +780,7 @@
           <a:p>
             <a:fld id="{340F17E4-2B4D-4428-9E25-E07F235B5058}" type="slidenum">
               <a:rPr lang="en-US" smtClean="0"/>
-              <a:t>19</a:t>
+              <a:t>20</a:t>
             </a:fld>
             <a:endParaRPr lang="en-US"/>
           </a:p>
@@ -863,7 +864,7 @@
           <a:p>
             <a:fld id="{340F17E4-2B4D-4428-9E25-E07F235B5058}" type="slidenum">
               <a:rPr lang="en-US" smtClean="0"/>
-              <a:t>20</a:t>
+              <a:t>21</a:t>
             </a:fld>
             <a:endParaRPr lang="en-US"/>
           </a:p>
@@ -947,7 +948,7 @@
           <a:p>
             <a:fld id="{340F17E4-2B4D-4428-9E25-E07F235B5058}" type="slidenum">
               <a:rPr lang="en-US" smtClean="0"/>
-              <a:t>21</a:t>
+              <a:t>22</a:t>
             </a:fld>
             <a:endParaRPr lang="en-US"/>
           </a:p>
@@ -1031,7 +1032,7 @@
           <a:p>
             <a:fld id="{340F17E4-2B4D-4428-9E25-E07F235B5058}" type="slidenum">
               <a:rPr lang="en-US" smtClean="0"/>
-              <a:t>26</a:t>
+              <a:t>27</a:t>
             </a:fld>
             <a:endParaRPr lang="en-US"/>
           </a:p>
@@ -1467,7 +1468,7 @@
           <a:p>
             <a:fld id="{340F17E4-2B4D-4428-9E25-E07F235B5058}" type="slidenum">
               <a:rPr lang="en-US" smtClean="0"/>
-              <a:t>8</a:t>
+              <a:t>9</a:t>
             </a:fld>
             <a:endParaRPr lang="en-US"/>
           </a:p>
@@ -1559,7 +1560,7 @@
           <a:p>
             <a:fld id="{340F17E4-2B4D-4428-9E25-E07F235B5058}" type="slidenum">
               <a:rPr lang="en-US" smtClean="0"/>
-              <a:t>10</a:t>
+              <a:t>11</a:t>
             </a:fld>
             <a:endParaRPr lang="en-US"/>
           </a:p>
@@ -1643,7 +1644,7 @@
           <a:p>
             <a:fld id="{340F17E4-2B4D-4428-9E25-E07F235B5058}" type="slidenum">
               <a:rPr lang="en-US" smtClean="0"/>
-              <a:t>11</a:t>
+              <a:t>12</a:t>
             </a:fld>
             <a:endParaRPr lang="en-US"/>
           </a:p>
@@ -1739,7 +1740,7 @@
           <a:p>
             <a:fld id="{340F17E4-2B4D-4428-9E25-E07F235B5058}" type="slidenum">
               <a:rPr lang="en-US" smtClean="0"/>
-              <a:t>13</a:t>
+              <a:t>14</a:t>
             </a:fld>
             <a:endParaRPr lang="en-US"/>
           </a:p>
@@ -3175,14 +3176,12 @@
         </p:nvSpPr>
         <p:spPr/>
         <p:txBody>
-          <a:bodyPr>
-            <a:normAutofit fontScale="90000"/>
-          </a:bodyPr>
+          <a:bodyPr/>
           <a:lstStyle/>
           <a:p>
             <a:r>
               <a:rPr lang="en-US" dirty="0" smtClean="0"/>
-              <a:t>Three Clustering Algorithms You Should Know	</a:t>
+              <a:t>Using UL: Right and Wrong Times</a:t>
             </a:r>
             <a:endParaRPr lang="en-US" dirty="0"/>
           </a:p>
@@ -3203,39 +3202,14 @@
           <a:bodyPr/>
           <a:lstStyle/>
           <a:p>
-            <a:r>
-              <a:rPr lang="en-US" dirty="0" smtClean="0"/>
-              <a:t>K-Means</a:t>
-            </a:r>
-          </a:p>
-          <a:p>
-            <a:r>
-              <a:rPr lang="en-US" dirty="0" smtClean="0"/>
-              <a:t>Hierarchical Clustering</a:t>
-            </a:r>
-          </a:p>
-          <a:p>
-            <a:r>
-              <a:rPr lang="en-US" dirty="0" smtClean="0"/>
-              <a:t>DBSCAN</a:t>
-            </a:r>
-          </a:p>
-          <a:p>
-            <a:endParaRPr lang="en-US" dirty="0"/>
-          </a:p>
-          <a:p>
-            <a:r>
-              <a:rPr lang="en-US" dirty="0" smtClean="0"/>
-              <a:t>Bonus: Dimensionality Reduction</a:t>
-            </a:r>
-            <a:endParaRPr lang="en-US" dirty="0"/>
+            <a:endParaRPr lang="en-US"/>
           </a:p>
         </p:txBody>
       </p:sp>
     </p:spTree>
     <p:extLst>
       <p:ext uri="{BB962C8B-B14F-4D97-AF65-F5344CB8AC3E}">
-        <p14:creationId xmlns:p14="http://schemas.microsoft.com/office/powerpoint/2010/main" val="1925213278"/>
+        <p14:creationId xmlns:p14="http://schemas.microsoft.com/office/powerpoint/2010/main" val="3051305169"/>
       </p:ext>
     </p:extLst>
   </p:cSld>
@@ -3279,6 +3253,120 @@
             <p:ph type="title"/>
           </p:nvPr>
         </p:nvSpPr>
+        <p:spPr/>
+        <p:txBody>
+          <a:bodyPr>
+            <a:normAutofit fontScale="90000"/>
+          </a:bodyPr>
+          <a:lstStyle/>
+          <a:p>
+            <a:r>
+              <a:rPr lang="en-US" dirty="0" smtClean="0"/>
+              <a:t>Three Clustering </a:t>
+            </a:r>
+            <a:r>
+              <a:rPr lang="en-US" dirty="0" smtClean="0"/>
+              <a:t>Techniques </a:t>
+            </a:r>
+            <a:r>
+              <a:rPr lang="en-US" dirty="0" smtClean="0"/>
+              <a:t>You Should Know	</a:t>
+            </a:r>
+            <a:endParaRPr lang="en-US" dirty="0"/>
+          </a:p>
+        </p:txBody>
+      </p:sp>
+      <p:sp>
+        <p:nvSpPr>
+          <p:cNvPr id="3" name="Content Placeholder 2"/>
+          <p:cNvSpPr>
+            <a:spLocks noGrp="1"/>
+          </p:cNvSpPr>
+          <p:nvPr>
+            <p:ph idx="1"/>
+          </p:nvPr>
+        </p:nvSpPr>
+        <p:spPr/>
+        <p:txBody>
+          <a:bodyPr/>
+          <a:lstStyle/>
+          <a:p>
+            <a:r>
+              <a:rPr lang="en-US" dirty="0" smtClean="0"/>
+              <a:t>K-Means</a:t>
+            </a:r>
+          </a:p>
+          <a:p>
+            <a:r>
+              <a:rPr lang="en-US" dirty="0" smtClean="0"/>
+              <a:t>Hierarchical Clustering</a:t>
+            </a:r>
+          </a:p>
+          <a:p>
+            <a:r>
+              <a:rPr lang="en-US" dirty="0" smtClean="0"/>
+              <a:t>DBSCAN</a:t>
+            </a:r>
+          </a:p>
+          <a:p>
+            <a:endParaRPr lang="en-US" dirty="0"/>
+          </a:p>
+          <a:p>
+            <a:r>
+              <a:rPr lang="en-US" dirty="0" smtClean="0"/>
+              <a:t>Bonus: Dimensionality Reduction</a:t>
+            </a:r>
+            <a:endParaRPr lang="en-US" dirty="0"/>
+          </a:p>
+        </p:txBody>
+      </p:sp>
+    </p:spTree>
+    <p:extLst>
+      <p:ext uri="{BB962C8B-B14F-4D97-AF65-F5344CB8AC3E}">
+        <p14:creationId xmlns:p14="http://schemas.microsoft.com/office/powerpoint/2010/main" val="1925213278"/>
+      </p:ext>
+    </p:extLst>
+  </p:cSld>
+  <p:clrMapOvr>
+    <a:masterClrMapping/>
+  </p:clrMapOvr>
+  <p:timing>
+    <p:tnLst>
+      <p:par>
+        <p:cTn id="1" dur="indefinite" restart="never" nodeType="tmRoot"/>
+      </p:par>
+    </p:tnLst>
+  </p:timing>
+</p:sld>
+</file>
+
+<file path=ppt/slides/slide12.xml><?xml version="1.0" encoding="utf-8"?>
+<p:sld xmlns:a="http://schemas.openxmlformats.org/drawingml/2006/main" xmlns:r="http://schemas.openxmlformats.org/officeDocument/2006/relationships" xmlns:p="http://schemas.openxmlformats.org/presentationml/2006/main">
+  <p:cSld>
+    <p:spTree>
+      <p:nvGrpSpPr>
+        <p:cNvPr id="1" name=""/>
+        <p:cNvGrpSpPr/>
+        <p:nvPr/>
+      </p:nvGrpSpPr>
+      <p:grpSpPr>
+        <a:xfrm>
+          <a:off x="0" y="0"/>
+          <a:ext cx="0" cy="0"/>
+          <a:chOff x="0" y="0"/>
+          <a:chExt cx="0" cy="0"/>
+        </a:xfrm>
+      </p:grpSpPr>
+      <p:sp>
+        <p:nvSpPr>
+          <p:cNvPr id="2" name="Title 1"/>
+          <p:cNvSpPr>
+            <a:spLocks noGrp="1"/>
+          </p:cNvSpPr>
+          <p:nvPr>
+            <p:ph type="title"/>
+          </p:nvPr>
+        </p:nvSpPr>
         <p:spPr>
           <a:xfrm>
             <a:off x="329784" y="258128"/>
@@ -3332,8 +3420,19 @@
           <a:p>
             <a:r>
               <a:rPr lang="en-US" dirty="0" smtClean="0"/>
-              <a:t>Scale your data!</a:t>
-            </a:r>
+              <a:t>Scale your data</a:t>
+            </a:r>
+            <a:r>
+              <a:rPr lang="en-US" dirty="0" smtClean="0"/>
+              <a:t>!</a:t>
+            </a:r>
+          </a:p>
+          <a:p>
+            <a:r>
+              <a:rPr lang="en-US" dirty="0" smtClean="0"/>
+              <a:t>Be prepared to interpret the results</a:t>
+            </a:r>
+            <a:endParaRPr lang="en-US" dirty="0" smtClean="0"/>
           </a:p>
         </p:txBody>
       </p:sp>
@@ -3357,7 +3456,7 @@
 </p:sld>
 </file>
 
-<file path=ppt/slides/slide12.xml><?xml version="1.0" encoding="utf-8"?>
+<file path=ppt/slides/slide13.xml><?xml version="1.0" encoding="utf-8"?>
 <p:sld xmlns:a="http://schemas.openxmlformats.org/drawingml/2006/main" xmlns:r="http://schemas.openxmlformats.org/officeDocument/2006/relationships" xmlns:p="http://schemas.openxmlformats.org/presentationml/2006/main">
   <p:cSld>
     <p:spTree>
@@ -3465,7 +3564,7 @@
 </p:sld>
 </file>
 
-<file path=ppt/slides/slide13.xml><?xml version="1.0" encoding="utf-8"?>
+<file path=ppt/slides/slide14.xml><?xml version="1.0" encoding="utf-8"?>
 <p:sld xmlns:a="http://schemas.openxmlformats.org/drawingml/2006/main" xmlns:r="http://schemas.openxmlformats.org/officeDocument/2006/relationships" xmlns:p="http://schemas.openxmlformats.org/presentationml/2006/main">
   <p:cSld>
     <p:spTree>
@@ -3522,13 +3621,29 @@
           <a:p>
             <a:r>
               <a:rPr lang="en-US" dirty="0" smtClean="0"/>
-              <a:t>Control of how high or low you go on the hierarchy</a:t>
-            </a:r>
-          </a:p>
-          <a:p>
-            <a:r>
-              <a:rPr lang="en-US" dirty="0" smtClean="0"/>
-              <a:t>Learn to interpret a </a:t>
+              <a:t>Control of how high or low you go on </a:t>
+            </a:r>
+            <a:r>
+              <a:rPr lang="en-US" dirty="0"/>
+              <a:t>a</a:t>
+            </a:r>
+            <a:r>
+              <a:rPr lang="en-US" dirty="0" smtClean="0"/>
+              <a:t> </a:t>
+            </a:r>
+            <a:r>
+              <a:rPr lang="en-US" dirty="0" smtClean="0"/>
+              <a:t>hierarchy</a:t>
+            </a:r>
+          </a:p>
+          <a:p>
+            <a:r>
+              <a:rPr lang="en-US" dirty="0" smtClean="0"/>
+              <a:t>Learn to interpret </a:t>
+            </a:r>
+            <a:r>
+              <a:rPr lang="en-US" dirty="0" smtClean="0"/>
+              <a:t>and explore a </a:t>
             </a:r>
             <a:r>
               <a:rPr lang="en-US" dirty="0" err="1" smtClean="0"/>
@@ -3605,85 +3720,6 @@
     <p:extLst>
       <p:ext uri="{BB962C8B-B14F-4D97-AF65-F5344CB8AC3E}">
         <p14:creationId xmlns:p14="http://schemas.microsoft.com/office/powerpoint/2010/main" val="1108066659"/>
-      </p:ext>
-    </p:extLst>
-  </p:cSld>
-  <p:clrMapOvr>
-    <a:masterClrMapping/>
-  </p:clrMapOvr>
-  <p:timing>
-    <p:tnLst>
-      <p:par>
-        <p:cTn id="1" dur="indefinite" restart="never" nodeType="tmRoot"/>
-      </p:par>
-    </p:tnLst>
-  </p:timing>
-</p:sld>
-</file>
-
-<file path=ppt/slides/slide14.xml><?xml version="1.0" encoding="utf-8"?>
-<p:sld xmlns:a="http://schemas.openxmlformats.org/drawingml/2006/main" xmlns:r="http://schemas.openxmlformats.org/officeDocument/2006/relationships" xmlns:p="http://schemas.openxmlformats.org/presentationml/2006/main">
-  <p:cSld>
-    <p:spTree>
-      <p:nvGrpSpPr>
-        <p:cNvPr id="1" name=""/>
-        <p:cNvGrpSpPr/>
-        <p:nvPr/>
-      </p:nvGrpSpPr>
-      <p:grpSpPr>
-        <a:xfrm>
-          <a:off x="0" y="0"/>
-          <a:ext cx="0" cy="0"/>
-          <a:chOff x="0" y="0"/>
-          <a:chExt cx="0" cy="0"/>
-        </a:xfrm>
-      </p:grpSpPr>
-      <p:sp>
-        <p:nvSpPr>
-          <p:cNvPr id="2" name="Title 1"/>
-          <p:cNvSpPr>
-            <a:spLocks noGrp="1"/>
-          </p:cNvSpPr>
-          <p:nvPr>
-            <p:ph type="title"/>
-          </p:nvPr>
-        </p:nvSpPr>
-        <p:spPr/>
-        <p:txBody>
-          <a:bodyPr/>
-          <a:lstStyle/>
-          <a:p>
-            <a:r>
-              <a:rPr lang="en-US" dirty="0" smtClean="0"/>
-              <a:t>Hierarchical Clustering Example</a:t>
-            </a:r>
-            <a:endParaRPr lang="en-US" dirty="0"/>
-          </a:p>
-        </p:txBody>
-      </p:sp>
-      <p:sp>
-        <p:nvSpPr>
-          <p:cNvPr id="3" name="Content Placeholder 2"/>
-          <p:cNvSpPr>
-            <a:spLocks noGrp="1"/>
-          </p:cNvSpPr>
-          <p:nvPr>
-            <p:ph idx="1"/>
-          </p:nvPr>
-        </p:nvSpPr>
-        <p:spPr/>
-        <p:txBody>
-          <a:bodyPr/>
-          <a:lstStyle/>
-          <a:p>
-            <a:endParaRPr lang="en-US"/>
-          </a:p>
-        </p:txBody>
-      </p:sp>
-    </p:spTree>
-    <p:extLst>
-      <p:ext uri="{BB962C8B-B14F-4D97-AF65-F5344CB8AC3E}">
-        <p14:creationId xmlns:p14="http://schemas.microsoft.com/office/powerpoint/2010/main" val="4286423339"/>
       </p:ext>
     </p:extLst>
   </p:cSld>
@@ -3734,7 +3770,7 @@
           <a:p>
             <a:r>
               <a:rPr lang="en-US" dirty="0" smtClean="0"/>
-              <a:t>DBSCAN</a:t>
+              <a:t>Hierarchical Clustering Example</a:t>
             </a:r>
             <a:endParaRPr lang="en-US" dirty="0"/>
           </a:p>
@@ -3755,57 +3791,14 @@
           <a:bodyPr/>
           <a:lstStyle/>
           <a:p>
-            <a:r>
-              <a:rPr lang="en-US" dirty="0" smtClean="0"/>
-              <a:t>More advanced than K-Means or hierarchical clustering</a:t>
-            </a:r>
-          </a:p>
-          <a:p>
-            <a:r>
-              <a:rPr lang="en-US" dirty="0" smtClean="0"/>
-              <a:t>Useful in outlier detection and is flexible with respect to cluster shape</a:t>
-            </a:r>
-          </a:p>
-          <a:p>
-            <a:r>
-              <a:rPr lang="en-US" dirty="0"/>
-              <a:t>DBSCAN is “region-based”, trying to identify neighborhoods of densely packed data </a:t>
-            </a:r>
-            <a:r>
-              <a:rPr lang="en-US" dirty="0" smtClean="0"/>
-              <a:t>points</a:t>
-            </a:r>
-          </a:p>
-          <a:p>
-            <a:r>
-              <a:rPr lang="en-US" dirty="0" smtClean="0"/>
-              <a:t>Don’t specify number of clusters, but need to specify </a:t>
-            </a:r>
-            <a:r>
-              <a:rPr lang="en-US" b="1" dirty="0" smtClean="0"/>
-              <a:t>epsilon (radius) </a:t>
-            </a:r>
-            <a:r>
-              <a:rPr lang="en-US" dirty="0" smtClean="0"/>
-              <a:t>and </a:t>
-            </a:r>
-            <a:r>
-              <a:rPr lang="en-US" b="1" dirty="0" smtClean="0"/>
-              <a:t>minimum points (number of neighbors to be a core point)</a:t>
-            </a:r>
-          </a:p>
-          <a:p>
-            <a:r>
-              <a:rPr lang="en-US" dirty="0" smtClean="0"/>
-              <a:t>Implementations in R and Python</a:t>
-            </a:r>
+            <a:endParaRPr lang="en-US"/>
           </a:p>
         </p:txBody>
       </p:sp>
     </p:spTree>
     <p:extLst>
       <p:ext uri="{BB962C8B-B14F-4D97-AF65-F5344CB8AC3E}">
-        <p14:creationId xmlns:p14="http://schemas.microsoft.com/office/powerpoint/2010/main" val="1783629603"/>
+        <p14:creationId xmlns:p14="http://schemas.microsoft.com/office/powerpoint/2010/main" val="4286423339"/>
       </p:ext>
     </p:extLst>
   </p:cSld>
@@ -3856,135 +3849,78 @@
           <a:p>
             <a:r>
               <a:rPr lang="en-US" dirty="0" smtClean="0"/>
-              <a:t>DBSCAN Example</a:t>
+              <a:t>DBSCAN</a:t>
             </a:r>
             <a:endParaRPr lang="en-US" dirty="0"/>
           </a:p>
         </p:txBody>
       </p:sp>
-      <p:pic>
-        <p:nvPicPr>
-          <p:cNvPr id="4" name="Picture 3"/>
-          <p:cNvPicPr>
-            <a:picLocks noChangeAspect="1"/>
-          </p:cNvPicPr>
-          <p:nvPr/>
-        </p:nvPicPr>
-        <p:blipFill>
-          <a:blip r:embed="rId2"/>
-          <a:stretch>
-            <a:fillRect/>
-          </a:stretch>
-        </p:blipFill>
-        <p:spPr>
-          <a:xfrm>
-            <a:off x="329784" y="1165856"/>
-            <a:ext cx="3259809" cy="3020672"/>
-          </a:xfrm>
-          <a:prstGeom prst="rect">
-            <a:avLst/>
-          </a:prstGeom>
-        </p:spPr>
-      </p:pic>
-      <p:sp>
-        <p:nvSpPr>
-          <p:cNvPr id="7" name="Right Arrow 6"/>
-          <p:cNvSpPr/>
-          <p:nvPr/>
-        </p:nvSpPr>
-        <p:spPr>
-          <a:xfrm>
-            <a:off x="3696829" y="2552648"/>
-            <a:ext cx="1670050" cy="247088"/>
-          </a:xfrm>
-          <a:prstGeom prst="rightArrow">
-            <a:avLst/>
-          </a:prstGeom>
-        </p:spPr>
-        <p:style>
-          <a:lnRef idx="2">
-            <a:schemeClr val="accent1">
-              <a:shade val="50000"/>
-            </a:schemeClr>
-          </a:lnRef>
-          <a:fillRef idx="1">
-            <a:schemeClr val="accent1"/>
-          </a:fillRef>
-          <a:effectRef idx="0">
-            <a:schemeClr val="accent1"/>
-          </a:effectRef>
-          <a:fontRef idx="minor">
-            <a:schemeClr val="lt1"/>
-          </a:fontRef>
-        </p:style>
+      <p:sp>
+        <p:nvSpPr>
+          <p:cNvPr id="3" name="Content Placeholder 2"/>
+          <p:cNvSpPr>
+            <a:spLocks noGrp="1"/>
+          </p:cNvSpPr>
+          <p:nvPr>
+            <p:ph idx="1"/>
+          </p:nvPr>
+        </p:nvSpPr>
+        <p:spPr/>
         <p:txBody>
-          <a:bodyPr rtlCol="0" anchor="ctr"/>
+          <a:bodyPr/>
           <a:lstStyle/>
           <a:p>
-            <a:pPr algn="ctr"/>
-            <a:endParaRPr lang="en-US"/>
-          </a:p>
-        </p:txBody>
-      </p:sp>
-      <p:pic>
-        <p:nvPicPr>
-          <p:cNvPr id="8" name="Picture 7"/>
-          <p:cNvPicPr>
-            <a:picLocks noChangeAspect="1"/>
-          </p:cNvPicPr>
-          <p:nvPr/>
-        </p:nvPicPr>
-        <p:blipFill rotWithShape="1">
-          <a:blip r:embed="rId3"/>
-          <a:srcRect l="2661" t="4219" r="5829" b="1896"/>
-          <a:stretch/>
-        </p:blipFill>
-        <p:spPr>
-          <a:xfrm>
-            <a:off x="5474116" y="1101748"/>
-            <a:ext cx="3489961" cy="3317852"/>
-          </a:xfrm>
-          <a:prstGeom prst="rect">
-            <a:avLst/>
-          </a:prstGeom>
-        </p:spPr>
-      </p:pic>
-      <p:sp>
-        <p:nvSpPr>
-          <p:cNvPr id="9" name="TextBox 8"/>
-          <p:cNvSpPr txBox="1"/>
-          <p:nvPr/>
-        </p:nvSpPr>
-        <p:spPr>
-          <a:xfrm>
-            <a:off x="640080" y="4419600"/>
-            <a:ext cx="5455920" cy="300082"/>
-          </a:xfrm>
-          <a:prstGeom prst="rect">
-            <a:avLst/>
-          </a:prstGeom>
-          <a:noFill/>
-        </p:spPr>
-        <p:txBody>
-          <a:bodyPr wrap="square" rtlCol="0">
-            <a:spAutoFit/>
-          </a:bodyPr>
-          <a:lstStyle/>
-          <a:p>
-            <a:r>
-              <a:rPr lang="en-US" i="1" dirty="0">
-                <a:hlinkClick r:id="rId4"/>
-              </a:rPr>
-              <a:t>http://www.sthda.com/english/wiki/wiki.php?id_contents=7940</a:t>
-            </a:r>
-            <a:endParaRPr lang="en-US" i="1" dirty="0"/>
+            <a:r>
+              <a:rPr lang="en-US" dirty="0" smtClean="0"/>
+              <a:t>More advanced than K-Means or hierarchical clustering</a:t>
+            </a:r>
+          </a:p>
+          <a:p>
+            <a:r>
+              <a:rPr lang="en-US" dirty="0" smtClean="0"/>
+              <a:t>Useful in outlier detection and is flexible with respect to cluster shape</a:t>
+            </a:r>
+          </a:p>
+          <a:p>
+            <a:r>
+              <a:rPr lang="en-US" dirty="0"/>
+              <a:t>DBSCAN is “region-based”, trying to identify neighborhoods of densely packed data </a:t>
+            </a:r>
+            <a:r>
+              <a:rPr lang="en-US" dirty="0" smtClean="0"/>
+              <a:t>points</a:t>
+            </a:r>
+          </a:p>
+          <a:p>
+            <a:r>
+              <a:rPr lang="en-US" dirty="0" smtClean="0"/>
+              <a:t>Don’t specify number of clusters, but need to specify </a:t>
+            </a:r>
+            <a:r>
+              <a:rPr lang="en-US" b="1" dirty="0" smtClean="0"/>
+              <a:t>epsilon (radius) </a:t>
+            </a:r>
+            <a:r>
+              <a:rPr lang="en-US" dirty="0" smtClean="0"/>
+              <a:t>and </a:t>
+            </a:r>
+            <a:r>
+              <a:rPr lang="en-US" b="1" dirty="0" smtClean="0"/>
+              <a:t>minimum points (number of neighbors to be a core point)</a:t>
+            </a:r>
+          </a:p>
+          <a:p>
+            <a:r>
+              <a:rPr lang="en-US" dirty="0" smtClean="0"/>
+              <a:t>Implementations in R and Python</a:t>
+            </a:r>
           </a:p>
         </p:txBody>
       </p:sp>
     </p:spTree>
     <p:extLst>
       <p:ext uri="{BB962C8B-B14F-4D97-AF65-F5344CB8AC3E}">
-        <p14:creationId xmlns:p14="http://schemas.microsoft.com/office/powerpoint/2010/main" val="885589397"/>
+        <p14:creationId xmlns:p14="http://schemas.microsoft.com/office/powerpoint/2010/main" val="1783629603"/>
       </p:ext>
     </p:extLst>
   </p:cSld>
@@ -4035,85 +3971,135 @@
           <a:p>
             <a:r>
               <a:rPr lang="en-US" dirty="0" smtClean="0"/>
-              <a:t>Bonus: Dimensionality Reduction</a:t>
+              <a:t>DBSCAN Example</a:t>
             </a:r>
             <a:endParaRPr lang="en-US" dirty="0"/>
           </a:p>
         </p:txBody>
       </p:sp>
-      <p:sp>
-        <p:nvSpPr>
-          <p:cNvPr id="3" name="Content Placeholder 2"/>
-          <p:cNvSpPr>
-            <a:spLocks noGrp="1"/>
-          </p:cNvSpPr>
-          <p:nvPr>
-            <p:ph idx="1"/>
-          </p:nvPr>
-        </p:nvSpPr>
-        <p:spPr/>
+      <p:pic>
+        <p:nvPicPr>
+          <p:cNvPr id="4" name="Picture 3"/>
+          <p:cNvPicPr>
+            <a:picLocks noChangeAspect="1"/>
+          </p:cNvPicPr>
+          <p:nvPr/>
+        </p:nvPicPr>
+        <p:blipFill>
+          <a:blip r:embed="rId2"/>
+          <a:stretch>
+            <a:fillRect/>
+          </a:stretch>
+        </p:blipFill>
+        <p:spPr>
+          <a:xfrm>
+            <a:off x="329784" y="1165856"/>
+            <a:ext cx="3259809" cy="3020672"/>
+          </a:xfrm>
+          <a:prstGeom prst="rect">
+            <a:avLst/>
+          </a:prstGeom>
+        </p:spPr>
+      </p:pic>
+      <p:sp>
+        <p:nvSpPr>
+          <p:cNvPr id="7" name="Right Arrow 6"/>
+          <p:cNvSpPr/>
+          <p:nvPr/>
+        </p:nvSpPr>
+        <p:spPr>
+          <a:xfrm>
+            <a:off x="3696829" y="2552648"/>
+            <a:ext cx="1670050" cy="247088"/>
+          </a:xfrm>
+          <a:prstGeom prst="rightArrow">
+            <a:avLst/>
+          </a:prstGeom>
+        </p:spPr>
+        <p:style>
+          <a:lnRef idx="2">
+            <a:schemeClr val="accent1">
+              <a:shade val="50000"/>
+            </a:schemeClr>
+          </a:lnRef>
+          <a:fillRef idx="1">
+            <a:schemeClr val="accent1"/>
+          </a:fillRef>
+          <a:effectRef idx="0">
+            <a:schemeClr val="accent1"/>
+          </a:effectRef>
+          <a:fontRef idx="minor">
+            <a:schemeClr val="lt1"/>
+          </a:fontRef>
+        </p:style>
         <p:txBody>
-          <a:bodyPr/>
+          <a:bodyPr rtlCol="0" anchor="ctr"/>
           <a:lstStyle/>
           <a:p>
-            <a:r>
-              <a:rPr lang="en-US" dirty="0" smtClean="0"/>
-              <a:t>Large number of data features (columns) makes standard data exploration hard</a:t>
-            </a:r>
-          </a:p>
-          <a:p>
-            <a:r>
-              <a:rPr lang="en-US" dirty="0" smtClean="0"/>
-              <a:t>Redundancy or correlation between variables will affect machine learning algorithms</a:t>
-            </a:r>
-          </a:p>
-          <a:p>
-            <a:r>
-              <a:rPr lang="en-US" dirty="0" smtClean="0"/>
-              <a:t>I’ve found it especially helpful for unstructured data</a:t>
-            </a:r>
-            <a:endParaRPr lang="en-US" dirty="0"/>
-          </a:p>
-          <a:p>
-            <a:r>
-              <a:rPr lang="en-US" dirty="0" smtClean="0"/>
-              <a:t>Techniques</a:t>
-            </a:r>
-          </a:p>
-          <a:p>
-            <a:pPr lvl="1"/>
-            <a:r>
-              <a:rPr lang="en-US" dirty="0" smtClean="0"/>
-              <a:t>Principal component analysis (“hello, world” of dimensionality reduction)</a:t>
-            </a:r>
-          </a:p>
-          <a:p>
-            <a:pPr lvl="1"/>
-            <a:r>
-              <a:rPr lang="en-US" dirty="0" smtClean="0"/>
-              <a:t>t-SNE (more advanced algorithm, lots of cool examples on the web)</a:t>
-            </a:r>
-          </a:p>
-          <a:p>
-            <a:pPr lvl="1"/>
-            <a:r>
-              <a:rPr lang="en-US" dirty="0" smtClean="0"/>
-              <a:t>LASSO (for regression tasks)</a:t>
-            </a:r>
-          </a:p>
-          <a:p>
-            <a:pPr lvl="1"/>
-            <a:r>
-              <a:rPr lang="en-US" dirty="0" smtClean="0"/>
-              <a:t>By document word2vec summaries</a:t>
-            </a:r>
+            <a:pPr algn="ctr"/>
+            <a:endParaRPr lang="en-US"/>
+          </a:p>
+        </p:txBody>
+      </p:sp>
+      <p:pic>
+        <p:nvPicPr>
+          <p:cNvPr id="8" name="Picture 7"/>
+          <p:cNvPicPr>
+            <a:picLocks noChangeAspect="1"/>
+          </p:cNvPicPr>
+          <p:nvPr/>
+        </p:nvPicPr>
+        <p:blipFill rotWithShape="1">
+          <a:blip r:embed="rId3"/>
+          <a:srcRect l="2661" t="4219" r="5829" b="1896"/>
+          <a:stretch/>
+        </p:blipFill>
+        <p:spPr>
+          <a:xfrm>
+            <a:off x="5474116" y="1101748"/>
+            <a:ext cx="3489961" cy="3317852"/>
+          </a:xfrm>
+          <a:prstGeom prst="rect">
+            <a:avLst/>
+          </a:prstGeom>
+        </p:spPr>
+      </p:pic>
+      <p:sp>
+        <p:nvSpPr>
+          <p:cNvPr id="9" name="TextBox 8"/>
+          <p:cNvSpPr txBox="1"/>
+          <p:nvPr/>
+        </p:nvSpPr>
+        <p:spPr>
+          <a:xfrm>
+            <a:off x="640080" y="4419600"/>
+            <a:ext cx="5455920" cy="300082"/>
+          </a:xfrm>
+          <a:prstGeom prst="rect">
+            <a:avLst/>
+          </a:prstGeom>
+          <a:noFill/>
+        </p:spPr>
+        <p:txBody>
+          <a:bodyPr wrap="square" rtlCol="0">
+            <a:spAutoFit/>
+          </a:bodyPr>
+          <a:lstStyle/>
+          <a:p>
+            <a:r>
+              <a:rPr lang="en-US" i="1" dirty="0">
+                <a:hlinkClick r:id="rId4"/>
+              </a:rPr>
+              <a:t>http://www.sthda.com/english/wiki/wiki.php?id_contents=7940</a:t>
+            </a:r>
+            <a:endParaRPr lang="en-US" i="1" dirty="0"/>
           </a:p>
         </p:txBody>
       </p:sp>
     </p:spTree>
     <p:extLst>
       <p:ext uri="{BB962C8B-B14F-4D97-AF65-F5344CB8AC3E}">
-        <p14:creationId xmlns:p14="http://schemas.microsoft.com/office/powerpoint/2010/main" val="3530676003"/>
+        <p14:creationId xmlns:p14="http://schemas.microsoft.com/office/powerpoint/2010/main" val="885589397"/>
       </p:ext>
     </p:extLst>
   </p:cSld>
@@ -4164,7 +4150,7 @@
           <a:p>
             <a:r>
               <a:rPr lang="en-US" dirty="0" smtClean="0"/>
-              <a:t>Example from WFAA – Setup</a:t>
+              <a:t>Bonus: Dimensionality Reduction</a:t>
             </a:r>
             <a:endParaRPr lang="en-US" dirty="0"/>
           </a:p>
@@ -4187,43 +4173,62 @@
           <a:p>
             <a:r>
               <a:rPr lang="en-US" dirty="0" smtClean="0"/>
-              <a:t>Analytics FAQ</a:t>
+              <a:t>Large number of data features (columns) makes standard data exploration hard</a:t>
+            </a:r>
+          </a:p>
+          <a:p>
+            <a:r>
+              <a:rPr lang="en-US" dirty="0" smtClean="0"/>
+              <a:t>Redundancy or correlation between variables will affect machine learning algorithms</a:t>
+            </a:r>
+          </a:p>
+          <a:p>
+            <a:r>
+              <a:rPr lang="en-US" dirty="0" smtClean="0"/>
+              <a:t>I’ve found it especially helpful for unstructured data</a:t>
+            </a:r>
+            <a:endParaRPr lang="en-US" dirty="0"/>
+          </a:p>
+          <a:p>
+            <a:r>
+              <a:rPr lang="en-US" dirty="0" smtClean="0"/>
+              <a:t>Techniques</a:t>
             </a:r>
           </a:p>
           <a:p>
             <a:pPr lvl="1"/>
             <a:r>
               <a:rPr lang="en-US" dirty="0" smtClean="0"/>
-              <a:t>What other donors looks like X? Pathways?</a:t>
-            </a:r>
-          </a:p>
-          <a:p>
-            <a:r>
-              <a:rPr lang="en-US" dirty="0" smtClean="0"/>
-              <a:t>Exploratory analysis on trajectories for large donor society</a:t>
-            </a:r>
-          </a:p>
-          <a:p>
-            <a:r>
-              <a:rPr lang="en-US" dirty="0" smtClean="0"/>
-              <a:t>What else can we learn about these donors?</a:t>
-            </a:r>
-          </a:p>
-          <a:p>
-            <a:r>
-              <a:rPr lang="en-US" dirty="0" smtClean="0"/>
-              <a:t>Nothing to predict, what can we do?</a:t>
-            </a:r>
-          </a:p>
-          <a:p>
-            <a:endParaRPr lang="en-US" dirty="0"/>
+              <a:t>Principal component analysis (“hello, world” of dimensionality reduction)</a:t>
+            </a:r>
+          </a:p>
+          <a:p>
+            <a:pPr lvl="1"/>
+            <a:r>
+              <a:rPr lang="en-US" dirty="0" smtClean="0"/>
+              <a:t>t-SNE (more advanced algorithm, lots of cool examples on the web)</a:t>
+            </a:r>
+          </a:p>
+          <a:p>
+            <a:pPr lvl="1"/>
+            <a:r>
+              <a:rPr lang="en-US" dirty="0" smtClean="0"/>
+              <a:t>LASSO (for regression tasks)</a:t>
+            </a:r>
+          </a:p>
+          <a:p>
+            <a:pPr lvl="1"/>
+            <a:r>
+              <a:rPr lang="en-US" dirty="0" smtClean="0"/>
+              <a:t>By document word2vec summaries</a:t>
+            </a:r>
           </a:p>
         </p:txBody>
       </p:sp>
     </p:spTree>
     <p:extLst>
       <p:ext uri="{BB962C8B-B14F-4D97-AF65-F5344CB8AC3E}">
-        <p14:creationId xmlns:p14="http://schemas.microsoft.com/office/powerpoint/2010/main" val="3684728735"/>
+        <p14:creationId xmlns:p14="http://schemas.microsoft.com/office/powerpoint/2010/main" val="3530676003"/>
       </p:ext>
     </p:extLst>
   </p:cSld>
@@ -4274,7 +4279,7 @@
           <a:p>
             <a:r>
               <a:rPr lang="en-US" dirty="0" smtClean="0"/>
-              <a:t>Example from WFAA – Data/Methods</a:t>
+              <a:t>Example from WFAA – Setup</a:t>
             </a:r>
             <a:endParaRPr lang="en-US" dirty="0"/>
           </a:p>
@@ -4282,186 +4287,58 @@
       </p:sp>
       <p:sp>
         <p:nvSpPr>
-          <p:cNvPr id="4" name="Content Placeholder 3"/>
+          <p:cNvPr id="3" name="Content Placeholder 2"/>
           <p:cNvSpPr>
             <a:spLocks noGrp="1"/>
           </p:cNvSpPr>
           <p:nvPr>
-            <p:ph sz="half" idx="1"/>
+            <p:ph idx="1"/>
           </p:nvPr>
         </p:nvSpPr>
         <p:spPr/>
         <p:txBody>
-          <a:bodyPr>
-            <a:noAutofit/>
-          </a:bodyPr>
+          <a:bodyPr/>
           <a:lstStyle/>
           <a:p>
             <a:r>
-              <a:rPr lang="en-US" sz="1600" dirty="0"/>
-              <a:t>1,150 Households with at least $250K in new gifts and new </a:t>
-            </a:r>
-            <a:r>
-              <a:rPr lang="en-US" sz="1600" dirty="0" smtClean="0"/>
-              <a:t>pledges</a:t>
+              <a:rPr lang="en-US" dirty="0" smtClean="0"/>
+              <a:t>Analytics FAQ</a:t>
             </a:r>
           </a:p>
           <a:p>
             <a:pPr lvl="1"/>
             <a:r>
-              <a:rPr lang="en-US" sz="1400" dirty="0" smtClean="0"/>
-              <a:t>Giving </a:t>
-            </a:r>
-            <a:r>
-              <a:rPr lang="en-US" sz="1400" dirty="0"/>
-              <a:t>is adjusted for inflation (2016 </a:t>
-            </a:r>
-            <a:r>
-              <a:rPr lang="en-US" sz="1400" dirty="0" smtClean="0"/>
-              <a:t>$)</a:t>
-            </a:r>
-            <a:endParaRPr lang="en-US" sz="1400" dirty="0"/>
-          </a:p>
-          <a:p>
-            <a:r>
-              <a:rPr lang="en-US" sz="1600" dirty="0"/>
-              <a:t>Giving data based on monthly sum of recognition for new gifts and new </a:t>
-            </a:r>
-            <a:r>
-              <a:rPr lang="en-US" sz="1600" dirty="0" smtClean="0"/>
-              <a:t>pledges</a:t>
-            </a:r>
-            <a:endParaRPr lang="en-US" sz="1600" dirty="0"/>
-          </a:p>
-          <a:p>
-            <a:r>
-              <a:rPr lang="en-US" sz="1600" dirty="0"/>
-              <a:t>At least one member of household must have valid birth </a:t>
-            </a:r>
-            <a:r>
-              <a:rPr lang="en-US" sz="1600" dirty="0" smtClean="0"/>
-              <a:t>year</a:t>
-            </a:r>
-            <a:endParaRPr lang="en-US" sz="1600" dirty="0"/>
-          </a:p>
-          <a:p>
-            <a:r>
-              <a:rPr lang="en-US" sz="1600" dirty="0"/>
-              <a:t>At least one member of household must be living, or if all members are deceased, at least one member must have valid death </a:t>
-            </a:r>
-            <a:r>
-              <a:rPr lang="en-US" sz="1600" dirty="0" smtClean="0"/>
-              <a:t>year</a:t>
-            </a:r>
-            <a:endParaRPr lang="en-US" sz="1600" dirty="0"/>
-          </a:p>
-        </p:txBody>
-      </p:sp>
-      <p:sp>
-        <p:nvSpPr>
-          <p:cNvPr id="5" name="Content Placeholder 4"/>
-          <p:cNvSpPr>
-            <a:spLocks noGrp="1"/>
-          </p:cNvSpPr>
-          <p:nvPr>
-            <p:ph sz="half" idx="2"/>
-          </p:nvPr>
-        </p:nvSpPr>
-        <p:spPr/>
-        <p:txBody>
-          <a:bodyPr>
-            <a:noAutofit/>
-          </a:bodyPr>
-          <a:lstStyle/>
-          <a:p>
-            <a:r>
-              <a:rPr lang="en-US" sz="1200" dirty="0"/>
-              <a:t>Lifetime giving</a:t>
-            </a:r>
-          </a:p>
-          <a:p>
-            <a:r>
-              <a:rPr lang="en-US" sz="1200" dirty="0"/>
-              <a:t>First gift amount</a:t>
-            </a:r>
-          </a:p>
-          <a:p>
-            <a:r>
-              <a:rPr lang="en-US" sz="1200" dirty="0"/>
-              <a:t>Most recent gift amount</a:t>
-            </a:r>
-          </a:p>
-          <a:p>
-            <a:r>
-              <a:rPr lang="en-US" sz="1200" dirty="0"/>
-              <a:t>Giving in first five years of giving career</a:t>
-            </a:r>
-          </a:p>
-          <a:p>
-            <a:r>
-              <a:rPr lang="en-US" sz="1200" dirty="0"/>
-              <a:t>Giving in last five years of giving career</a:t>
-            </a:r>
-          </a:p>
-          <a:p>
-            <a:r>
-              <a:rPr lang="en-US" sz="1200" dirty="0"/>
-              <a:t>Count </a:t>
-            </a:r>
-            <a:r>
-              <a:rPr lang="en-US" sz="1200" dirty="0" smtClean="0"/>
-              <a:t>gifts</a:t>
-            </a:r>
-          </a:p>
-          <a:p>
-            <a:r>
-              <a:rPr lang="en-US" sz="1200" dirty="0" smtClean="0"/>
-              <a:t>Largest </a:t>
-            </a:r>
-            <a:r>
-              <a:rPr lang="en-US" sz="1200" dirty="0"/>
-              <a:t>gift</a:t>
-            </a:r>
-          </a:p>
-          <a:p>
-            <a:r>
-              <a:rPr lang="en-US" sz="1200" dirty="0"/>
-              <a:t>Age at first gift</a:t>
-            </a:r>
-          </a:p>
-          <a:p>
-            <a:r>
-              <a:rPr lang="en-US" sz="1200" dirty="0"/>
-              <a:t>Age at most recent gift</a:t>
-            </a:r>
-          </a:p>
-          <a:p>
-            <a:r>
-              <a:rPr lang="en-US" sz="1200" dirty="0"/>
-              <a:t>Age at largest gift</a:t>
-            </a:r>
-          </a:p>
-          <a:p>
-            <a:r>
-              <a:rPr lang="en-US" sz="1200" dirty="0"/>
-              <a:t>Age at passing $250K threshold</a:t>
-            </a:r>
-          </a:p>
-          <a:p>
-            <a:r>
-              <a:rPr lang="en-US" sz="1200" dirty="0"/>
-              <a:t>Days between first gift and passing $250K threshold</a:t>
-            </a:r>
-          </a:p>
-          <a:p>
-            <a:endParaRPr lang="en-US" sz="1200" dirty="0"/>
+              <a:rPr lang="en-US" dirty="0" smtClean="0"/>
+              <a:t>What other donors looks like X? Pathways?</a:t>
+            </a:r>
+          </a:p>
+          <a:p>
+            <a:r>
+              <a:rPr lang="en-US" dirty="0" smtClean="0"/>
+              <a:t>Exploratory analysis on trajectories for large donor society</a:t>
+            </a:r>
+          </a:p>
+          <a:p>
+            <a:r>
+              <a:rPr lang="en-US" dirty="0" smtClean="0"/>
+              <a:t>What else can we learn about these donors?</a:t>
+            </a:r>
+          </a:p>
+          <a:p>
+            <a:r>
+              <a:rPr lang="en-US" dirty="0" smtClean="0"/>
+              <a:t>Nothing to predict, what can we do?</a:t>
+            </a:r>
+          </a:p>
+          <a:p>
+            <a:endParaRPr lang="en-US" dirty="0"/>
           </a:p>
         </p:txBody>
       </p:sp>
     </p:spTree>
     <p:extLst>
       <p:ext uri="{BB962C8B-B14F-4D97-AF65-F5344CB8AC3E}">
-        <p14:creationId xmlns:p14="http://schemas.microsoft.com/office/powerpoint/2010/main" val="2105481535"/>
+        <p14:creationId xmlns:p14="http://schemas.microsoft.com/office/powerpoint/2010/main" val="3684728735"/>
       </p:ext>
     </p:extLst>
   </p:cSld>
@@ -4644,6 +4521,354 @@
             <p:ph type="title"/>
           </p:nvPr>
         </p:nvSpPr>
+        <p:spPr/>
+        <p:txBody>
+          <a:bodyPr/>
+          <a:lstStyle/>
+          <a:p>
+            <a:r>
+              <a:rPr lang="en-US" dirty="0" smtClean="0"/>
+              <a:t>Example from WFAA – Data/Methods</a:t>
+            </a:r>
+            <a:endParaRPr lang="en-US" dirty="0"/>
+          </a:p>
+        </p:txBody>
+      </p:sp>
+      <p:sp>
+        <p:nvSpPr>
+          <p:cNvPr id="4" name="Content Placeholder 3"/>
+          <p:cNvSpPr>
+            <a:spLocks noGrp="1"/>
+          </p:cNvSpPr>
+          <p:nvPr>
+            <p:ph sz="half" idx="1"/>
+          </p:nvPr>
+        </p:nvSpPr>
+        <p:spPr/>
+        <p:txBody>
+          <a:bodyPr>
+            <a:noAutofit/>
+          </a:bodyPr>
+          <a:lstStyle/>
+          <a:p>
+            <a:r>
+              <a:rPr lang="en-US" sz="1800" dirty="0"/>
+              <a:t>1,150 Households with at least $250K in new gifts and new </a:t>
+            </a:r>
+            <a:r>
+              <a:rPr lang="en-US" sz="1800" dirty="0" smtClean="0"/>
+              <a:t>pledges</a:t>
+            </a:r>
+          </a:p>
+          <a:p>
+            <a:pPr lvl="1"/>
+            <a:r>
+              <a:rPr lang="en-US" sz="1600" dirty="0" smtClean="0"/>
+              <a:t>Giving </a:t>
+            </a:r>
+            <a:r>
+              <a:rPr lang="en-US" sz="1600" dirty="0"/>
+              <a:t>is adjusted for inflation (2016 </a:t>
+            </a:r>
+            <a:r>
+              <a:rPr lang="en-US" sz="1600" dirty="0" smtClean="0"/>
+              <a:t>$)</a:t>
+            </a:r>
+            <a:endParaRPr lang="en-US" sz="1600" dirty="0"/>
+          </a:p>
+          <a:p>
+            <a:r>
+              <a:rPr lang="en-US" sz="1800" dirty="0" smtClean="0"/>
+              <a:t>At </a:t>
+            </a:r>
+            <a:r>
+              <a:rPr lang="en-US" sz="1800" dirty="0"/>
+              <a:t>least one member of household must have valid birth </a:t>
+            </a:r>
+            <a:r>
+              <a:rPr lang="en-US" sz="1800" dirty="0" smtClean="0"/>
+              <a:t>year</a:t>
+            </a:r>
+            <a:endParaRPr lang="en-US" sz="1800" dirty="0"/>
+          </a:p>
+          <a:p>
+            <a:r>
+              <a:rPr lang="en-US" sz="1800" dirty="0"/>
+              <a:t>At least one member of household must be living, or if all members are deceased, at least one member must have valid death </a:t>
+            </a:r>
+            <a:r>
+              <a:rPr lang="en-US" sz="1800" dirty="0" smtClean="0"/>
+              <a:t>year</a:t>
+            </a:r>
+            <a:endParaRPr lang="en-US" sz="1800" dirty="0"/>
+          </a:p>
+        </p:txBody>
+      </p:sp>
+      <p:sp>
+        <p:nvSpPr>
+          <p:cNvPr id="5" name="Content Placeholder 4"/>
+          <p:cNvSpPr>
+            <a:spLocks noGrp="1"/>
+          </p:cNvSpPr>
+          <p:nvPr>
+            <p:ph sz="half" idx="2"/>
+          </p:nvPr>
+        </p:nvSpPr>
+        <p:spPr/>
+        <p:txBody>
+          <a:bodyPr>
+            <a:noAutofit/>
+          </a:bodyPr>
+          <a:lstStyle/>
+          <a:p>
+            <a:r>
+              <a:rPr lang="en-US" sz="1200" dirty="0"/>
+              <a:t>Lifetime giving</a:t>
+            </a:r>
+          </a:p>
+          <a:p>
+            <a:r>
+              <a:rPr lang="en-US" sz="1200" dirty="0"/>
+              <a:t>First gift amount</a:t>
+            </a:r>
+          </a:p>
+          <a:p>
+            <a:r>
+              <a:rPr lang="en-US" sz="1200" dirty="0"/>
+              <a:t>Most recent gift amount</a:t>
+            </a:r>
+          </a:p>
+          <a:p>
+            <a:r>
+              <a:rPr lang="en-US" sz="1200" dirty="0"/>
+              <a:t>Giving in first five years of giving career</a:t>
+            </a:r>
+          </a:p>
+          <a:p>
+            <a:r>
+              <a:rPr lang="en-US" sz="1200" dirty="0"/>
+              <a:t>Giving in last five years of giving career</a:t>
+            </a:r>
+          </a:p>
+          <a:p>
+            <a:r>
+              <a:rPr lang="en-US" sz="1200" dirty="0"/>
+              <a:t>Count </a:t>
+            </a:r>
+            <a:r>
+              <a:rPr lang="en-US" sz="1200" dirty="0" smtClean="0"/>
+              <a:t>gifts</a:t>
+            </a:r>
+          </a:p>
+          <a:p>
+            <a:r>
+              <a:rPr lang="en-US" sz="1200" dirty="0" smtClean="0"/>
+              <a:t>Largest </a:t>
+            </a:r>
+            <a:r>
+              <a:rPr lang="en-US" sz="1200" dirty="0"/>
+              <a:t>gift</a:t>
+            </a:r>
+          </a:p>
+          <a:p>
+            <a:r>
+              <a:rPr lang="en-US" sz="1200" dirty="0"/>
+              <a:t>Age at first gift</a:t>
+            </a:r>
+          </a:p>
+          <a:p>
+            <a:r>
+              <a:rPr lang="en-US" sz="1200" dirty="0"/>
+              <a:t>Age at most recent gift</a:t>
+            </a:r>
+          </a:p>
+          <a:p>
+            <a:r>
+              <a:rPr lang="en-US" sz="1200" dirty="0"/>
+              <a:t>Age at largest gift</a:t>
+            </a:r>
+          </a:p>
+          <a:p>
+            <a:r>
+              <a:rPr lang="en-US" sz="1200" dirty="0"/>
+              <a:t>Age at passing $250K threshold</a:t>
+            </a:r>
+          </a:p>
+          <a:p>
+            <a:r>
+              <a:rPr lang="en-US" sz="1200" dirty="0"/>
+              <a:t>Days between first gift and passing $250K threshold</a:t>
+            </a:r>
+          </a:p>
+          <a:p>
+            <a:endParaRPr lang="en-US" sz="1200" dirty="0"/>
+          </a:p>
+        </p:txBody>
+      </p:sp>
+    </p:spTree>
+    <p:extLst>
+      <p:ext uri="{BB962C8B-B14F-4D97-AF65-F5344CB8AC3E}">
+        <p14:creationId xmlns:p14="http://schemas.microsoft.com/office/powerpoint/2010/main" val="2105481535"/>
+      </p:ext>
+    </p:extLst>
+  </p:cSld>
+  <p:clrMapOvr>
+    <a:masterClrMapping/>
+  </p:clrMapOvr>
+  <p:timing>
+    <p:tnLst>
+      <p:par>
+        <p:cTn id="1" dur="indefinite" restart="never" nodeType="tmRoot">
+          <p:childTnLst>
+            <p:seq concurrent="1" nextAc="seek">
+              <p:cTn id="2" dur="indefinite" nodeType="mainSeq">
+                <p:childTnLst>
+                  <p:par>
+                    <p:cTn id="3" fill="hold">
+                      <p:stCondLst>
+                        <p:cond delay="indefinite"/>
+                      </p:stCondLst>
+                      <p:childTnLst>
+                        <p:par>
+                          <p:cTn id="4" fill="hold">
+                            <p:stCondLst>
+                              <p:cond delay="0"/>
+                            </p:stCondLst>
+                            <p:childTnLst>
+                              <p:par>
+                                <p:cTn id="5" presetID="1" presetClass="entr" presetSubtype="0" fill="hold" grpId="0" nodeType="clickEffect">
+                                  <p:stCondLst>
+                                    <p:cond delay="0"/>
+                                  </p:stCondLst>
+                                  <p:childTnLst>
+                                    <p:set>
+                                      <p:cBhvr>
+                                        <p:cTn id="6" dur="1" fill="hold">
+                                          <p:stCondLst>
+                                            <p:cond delay="0"/>
+                                          </p:stCondLst>
+                                        </p:cTn>
+                                        <p:tgtEl>
+                                          <p:spTgt spid="4"/>
+                                        </p:tgtEl>
+                                        <p:attrNameLst>
+                                          <p:attrName>style.visibility</p:attrName>
+                                        </p:attrNameLst>
+                                      </p:cBhvr>
+                                      <p:to>
+                                        <p:strVal val="visible"/>
+                                      </p:to>
+                                    </p:set>
+                                  </p:childTnLst>
+                                </p:cTn>
+                              </p:par>
+                            </p:childTnLst>
+                          </p:cTn>
+                        </p:par>
+                      </p:childTnLst>
+                    </p:cTn>
+                  </p:par>
+                  <p:par>
+                    <p:cTn id="7" fill="hold">
+                      <p:stCondLst>
+                        <p:cond delay="indefinite"/>
+                      </p:stCondLst>
+                      <p:childTnLst>
+                        <p:par>
+                          <p:cTn id="8" fill="hold">
+                            <p:stCondLst>
+                              <p:cond delay="0"/>
+                            </p:stCondLst>
+                            <p:childTnLst>
+                              <p:par>
+                                <p:cTn id="9" presetID="1" presetClass="entr" presetSubtype="0" fill="hold" grpId="0" nodeType="clickEffect">
+                                  <p:stCondLst>
+                                    <p:cond delay="0"/>
+                                  </p:stCondLst>
+                                  <p:childTnLst>
+                                    <p:set>
+                                      <p:cBhvr>
+                                        <p:cTn id="10" dur="1" fill="hold">
+                                          <p:stCondLst>
+                                            <p:cond delay="0"/>
+                                          </p:stCondLst>
+                                        </p:cTn>
+                                        <p:tgtEl>
+                                          <p:spTgt spid="5"/>
+                                        </p:tgtEl>
+                                        <p:attrNameLst>
+                                          <p:attrName>style.visibility</p:attrName>
+                                        </p:attrNameLst>
+                                      </p:cBhvr>
+                                      <p:to>
+                                        <p:strVal val="visible"/>
+                                      </p:to>
+                                    </p:set>
+                                  </p:childTnLst>
+                                </p:cTn>
+                              </p:par>
+                            </p:childTnLst>
+                          </p:cTn>
+                        </p:par>
+                      </p:childTnLst>
+                    </p:cTn>
+                  </p:par>
+                </p:childTnLst>
+              </p:cTn>
+              <p:prevCondLst>
+                <p:cond evt="onPrev" delay="0">
+                  <p:tgtEl>
+                    <p:sldTgt/>
+                  </p:tgtEl>
+                </p:cond>
+              </p:prevCondLst>
+              <p:nextCondLst>
+                <p:cond evt="onNext" delay="0">
+                  <p:tgtEl>
+                    <p:sldTgt/>
+                  </p:tgtEl>
+                </p:cond>
+              </p:nextCondLst>
+            </p:seq>
+          </p:childTnLst>
+        </p:cTn>
+      </p:par>
+    </p:tnLst>
+    <p:bldLst>
+      <p:bldP spid="4" grpId="0"/>
+      <p:bldP spid="5" grpId="0"/>
+    </p:bldLst>
+  </p:timing>
+</p:sld>
+</file>
+
+<file path=ppt/slides/slide21.xml><?xml version="1.0" encoding="utf-8"?>
+<p:sld xmlns:a="http://schemas.openxmlformats.org/drawingml/2006/main" xmlns:r="http://schemas.openxmlformats.org/officeDocument/2006/relationships" xmlns:p="http://schemas.openxmlformats.org/presentationml/2006/main">
+  <p:cSld>
+    <p:spTree>
+      <p:nvGrpSpPr>
+        <p:cNvPr id="1" name=""/>
+        <p:cNvGrpSpPr/>
+        <p:nvPr/>
+      </p:nvGrpSpPr>
+      <p:grpSpPr>
+        <a:xfrm>
+          <a:off x="0" y="0"/>
+          <a:ext cx="0" cy="0"/>
+          <a:chOff x="0" y="0"/>
+          <a:chExt cx="0" cy="0"/>
+        </a:xfrm>
+      </p:grpSpPr>
+      <p:sp>
+        <p:nvSpPr>
+          <p:cNvPr id="2" name="Title 1"/>
+          <p:cNvSpPr>
+            <a:spLocks noGrp="1"/>
+          </p:cNvSpPr>
+          <p:nvPr>
+            <p:ph type="title"/>
+          </p:nvPr>
+        </p:nvSpPr>
         <p:spPr>
           <a:xfrm>
             <a:off x="329784" y="0"/>
@@ -4822,7 +5047,7 @@
 </p:sld>
 </file>
 
-<file path=ppt/slides/slide21.xml><?xml version="1.0" encoding="utf-8"?>
+<file path=ppt/slides/slide22.xml><?xml version="1.0" encoding="utf-8"?>
 <p:sld xmlns:a="http://schemas.openxmlformats.org/drawingml/2006/main" xmlns:r="http://schemas.openxmlformats.org/officeDocument/2006/relationships" xmlns:p="http://schemas.openxmlformats.org/presentationml/2006/main">
   <p:cSld>
     <p:spTree>
@@ -5027,112 +5252,6 @@
 </p:sld>
 </file>
 
-<file path=ppt/slides/slide22.xml><?xml version="1.0" encoding="utf-8"?>
-<p:sld xmlns:a="http://schemas.openxmlformats.org/drawingml/2006/main" xmlns:r="http://schemas.openxmlformats.org/officeDocument/2006/relationships" xmlns:p="http://schemas.openxmlformats.org/presentationml/2006/main">
-  <p:cSld>
-    <p:spTree>
-      <p:nvGrpSpPr>
-        <p:cNvPr id="1" name=""/>
-        <p:cNvGrpSpPr/>
-        <p:nvPr/>
-      </p:nvGrpSpPr>
-      <p:grpSpPr>
-        <a:xfrm>
-          <a:off x="0" y="0"/>
-          <a:ext cx="0" cy="0"/>
-          <a:chOff x="0" y="0"/>
-          <a:chExt cx="0" cy="0"/>
-        </a:xfrm>
-      </p:grpSpPr>
-      <p:sp>
-        <p:nvSpPr>
-          <p:cNvPr id="2" name="Title 1"/>
-          <p:cNvSpPr>
-            <a:spLocks noGrp="1"/>
-          </p:cNvSpPr>
-          <p:nvPr>
-            <p:ph type="title"/>
-          </p:nvPr>
-        </p:nvSpPr>
-        <p:spPr/>
-        <p:txBody>
-          <a:bodyPr/>
-          <a:lstStyle/>
-          <a:p>
-            <a:r>
-              <a:rPr lang="en-US" dirty="0" smtClean="0"/>
-              <a:t>Example from WFAA – Implementation</a:t>
-            </a:r>
-            <a:endParaRPr lang="en-US" dirty="0"/>
-          </a:p>
-        </p:txBody>
-      </p:sp>
-      <p:sp>
-        <p:nvSpPr>
-          <p:cNvPr id="3" name="Content Placeholder 2"/>
-          <p:cNvSpPr>
-            <a:spLocks noGrp="1"/>
-          </p:cNvSpPr>
-          <p:nvPr>
-            <p:ph idx="1"/>
-          </p:nvPr>
-        </p:nvSpPr>
-        <p:spPr/>
-        <p:txBody>
-          <a:bodyPr/>
-          <a:lstStyle/>
-          <a:p>
-            <a:r>
-              <a:rPr lang="en-US" dirty="0" smtClean="0"/>
-              <a:t>More targeted questions about each of the clusters</a:t>
-            </a:r>
-          </a:p>
-          <a:p>
-            <a:r>
-              <a:rPr lang="en-US" dirty="0" smtClean="0"/>
-              <a:t>Used output from </a:t>
-            </a:r>
-            <a:r>
-              <a:rPr lang="en-US" dirty="0" err="1" smtClean="0">
-                <a:latin typeface="Consolas" panose="020B0609020204030204" pitchFamily="49" charset="0"/>
-              </a:rPr>
-              <a:t>kmeans</a:t>
-            </a:r>
-            <a:r>
-              <a:rPr lang="en-US" dirty="0" smtClean="0"/>
-              <a:t> in R to generate paragraph summaries of each cluster</a:t>
-            </a:r>
-          </a:p>
-          <a:p>
-            <a:r>
-              <a:rPr lang="en-US" dirty="0" smtClean="0"/>
-              <a:t>Make development officers more efficient</a:t>
-            </a:r>
-          </a:p>
-          <a:p>
-            <a:r>
-              <a:rPr lang="en-US" dirty="0" smtClean="0"/>
-              <a:t>Can we generalize to the whole?</a:t>
-            </a:r>
-          </a:p>
-          <a:p>
-            <a:endParaRPr lang="en-US" dirty="0"/>
-          </a:p>
-        </p:txBody>
-      </p:sp>
-    </p:spTree>
-    <p:extLst>
-      <p:ext uri="{BB962C8B-B14F-4D97-AF65-F5344CB8AC3E}">
-        <p14:creationId xmlns:p14="http://schemas.microsoft.com/office/powerpoint/2010/main" val="1621333358"/>
-      </p:ext>
-    </p:extLst>
-  </p:cSld>
-  <p:clrMapOvr>
-    <a:masterClrMapping/>
-  </p:clrMapOvr>
-</p:sld>
-</file>
-
 <file path=ppt/slides/slide23.xml><?xml version="1.0" encoding="utf-8"?>
 <p:sld xmlns:a="http://schemas.openxmlformats.org/drawingml/2006/main" xmlns:r="http://schemas.openxmlformats.org/officeDocument/2006/relationships" xmlns:p="http://schemas.openxmlformats.org/presentationml/2006/main">
   <p:cSld>
@@ -5167,7 +5286,7 @@
           <a:p>
             <a:r>
               <a:rPr lang="en-US" dirty="0" smtClean="0"/>
-              <a:t>Wrapping Up</a:t>
+              <a:t>Example from WFAA – Implementation</a:t>
             </a:r>
             <a:endParaRPr lang="en-US" dirty="0"/>
           </a:p>
@@ -5188,20 +5307,61 @@
           <a:bodyPr/>
           <a:lstStyle/>
           <a:p>
-            <a:endParaRPr lang="en-US"/>
+            <a:r>
+              <a:rPr lang="en-US" dirty="0" smtClean="0"/>
+              <a:t>More targeted questions about each of the clusters</a:t>
+            </a:r>
+          </a:p>
+          <a:p>
+            <a:r>
+              <a:rPr lang="en-US" dirty="0" smtClean="0"/>
+              <a:t>Used output from </a:t>
+            </a:r>
+            <a:r>
+              <a:rPr lang="en-US" dirty="0" err="1" smtClean="0">
+                <a:latin typeface="Consolas" panose="020B0609020204030204" pitchFamily="49" charset="0"/>
+              </a:rPr>
+              <a:t>kmeans</a:t>
+            </a:r>
+            <a:r>
+              <a:rPr lang="en-US" dirty="0" smtClean="0"/>
+              <a:t> in R to generate paragraph summaries of each cluster</a:t>
+            </a:r>
+          </a:p>
+          <a:p>
+            <a:r>
+              <a:rPr lang="en-US" dirty="0" smtClean="0"/>
+              <a:t>Make development officers more efficient</a:t>
+            </a:r>
+          </a:p>
+          <a:p>
+            <a:r>
+              <a:rPr lang="en-US" dirty="0" smtClean="0"/>
+              <a:t>Can we generalize to the whole?</a:t>
+            </a:r>
+          </a:p>
+          <a:p>
+            <a:endParaRPr lang="en-US" dirty="0"/>
           </a:p>
         </p:txBody>
       </p:sp>
     </p:spTree>
     <p:extLst>
       <p:ext uri="{BB962C8B-B14F-4D97-AF65-F5344CB8AC3E}">
-        <p14:creationId xmlns:p14="http://schemas.microsoft.com/office/powerpoint/2010/main" val="2994578432"/>
+        <p14:creationId xmlns:p14="http://schemas.microsoft.com/office/powerpoint/2010/main" val="1621333358"/>
       </p:ext>
     </p:extLst>
   </p:cSld>
   <p:clrMapOvr>
     <a:masterClrMapping/>
   </p:clrMapOvr>
+  <p:timing>
+    <p:tnLst>
+      <p:par>
+        <p:cTn id="1" dur="indefinite" restart="never" nodeType="tmRoot"/>
+      </p:par>
+    </p:tnLst>
+  </p:timing>
 </p:sld>
 </file>
 
@@ -5260,20 +5420,31 @@
           <a:bodyPr/>
           <a:lstStyle/>
           <a:p>
-            <a:endParaRPr lang="en-US"/>
+            <a:r>
+              <a:rPr lang="en-US" dirty="0" smtClean="0"/>
+              <a:t>Large donors</a:t>
+            </a:r>
+            <a:endParaRPr lang="en-US" dirty="0"/>
           </a:p>
         </p:txBody>
       </p:sp>
     </p:spTree>
     <p:extLst>
       <p:ext uri="{BB962C8B-B14F-4D97-AF65-F5344CB8AC3E}">
-        <p14:creationId xmlns:p14="http://schemas.microsoft.com/office/powerpoint/2010/main" val="1749157500"/>
+        <p14:creationId xmlns:p14="http://schemas.microsoft.com/office/powerpoint/2010/main" val="2994578432"/>
       </p:ext>
     </p:extLst>
   </p:cSld>
   <p:clrMapOvr>
     <a:masterClrMapping/>
   </p:clrMapOvr>
+  <p:timing>
+    <p:tnLst>
+      <p:par>
+        <p:cTn id="1" dur="indefinite" restart="never" nodeType="tmRoot"/>
+      </p:par>
+    </p:tnLst>
+  </p:timing>
 </p:sld>
 </file>
 
@@ -5332,7 +5503,94 @@
           <a:bodyPr/>
           <a:lstStyle/>
           <a:p>
-            <a:endParaRPr lang="en-US"/>
+            <a:r>
+              <a:rPr lang="en-US" dirty="0" smtClean="0"/>
+              <a:t>Unsupervised learning</a:t>
+            </a:r>
+            <a:endParaRPr lang="en-US" dirty="0"/>
+          </a:p>
+        </p:txBody>
+      </p:sp>
+    </p:spTree>
+    <p:extLst>
+      <p:ext uri="{BB962C8B-B14F-4D97-AF65-F5344CB8AC3E}">
+        <p14:creationId xmlns:p14="http://schemas.microsoft.com/office/powerpoint/2010/main" val="1749157500"/>
+      </p:ext>
+    </p:extLst>
+  </p:cSld>
+  <p:clrMapOvr>
+    <a:masterClrMapping/>
+  </p:clrMapOvr>
+  <p:timing>
+    <p:tnLst>
+      <p:par>
+        <p:cTn id="1" dur="indefinite" restart="never" nodeType="tmRoot"/>
+      </p:par>
+    </p:tnLst>
+  </p:timing>
+</p:sld>
+</file>
+
+<file path=ppt/slides/slide26.xml><?xml version="1.0" encoding="utf-8"?>
+<p:sld xmlns:a="http://schemas.openxmlformats.org/drawingml/2006/main" xmlns:r="http://schemas.openxmlformats.org/officeDocument/2006/relationships" xmlns:p="http://schemas.openxmlformats.org/presentationml/2006/main">
+  <p:cSld>
+    <p:spTree>
+      <p:nvGrpSpPr>
+        <p:cNvPr id="1" name=""/>
+        <p:cNvGrpSpPr/>
+        <p:nvPr/>
+      </p:nvGrpSpPr>
+      <p:grpSpPr>
+        <a:xfrm>
+          <a:off x="0" y="0"/>
+          <a:ext cx="0" cy="0"/>
+          <a:chOff x="0" y="0"/>
+          <a:chExt cx="0" cy="0"/>
+        </a:xfrm>
+      </p:grpSpPr>
+      <p:sp>
+        <p:nvSpPr>
+          <p:cNvPr id="2" name="Title 1"/>
+          <p:cNvSpPr>
+            <a:spLocks noGrp="1"/>
+          </p:cNvSpPr>
+          <p:nvPr>
+            <p:ph type="title"/>
+          </p:nvPr>
+        </p:nvSpPr>
+        <p:spPr/>
+        <p:txBody>
+          <a:bodyPr/>
+          <a:lstStyle/>
+          <a:p>
+            <a:r>
+              <a:rPr lang="en-US" dirty="0" smtClean="0"/>
+              <a:t>Wrapping Up</a:t>
+            </a:r>
+            <a:endParaRPr lang="en-US" dirty="0"/>
+          </a:p>
+        </p:txBody>
+      </p:sp>
+      <p:sp>
+        <p:nvSpPr>
+          <p:cNvPr id="3" name="Content Placeholder 2"/>
+          <p:cNvSpPr>
+            <a:spLocks noGrp="1"/>
+          </p:cNvSpPr>
+          <p:nvPr>
+            <p:ph idx="1"/>
+          </p:nvPr>
+        </p:nvSpPr>
+        <p:spPr/>
+        <p:txBody>
+          <a:bodyPr/>
+          <a:lstStyle/>
+          <a:p>
+            <a:r>
+              <a:rPr lang="en-US" dirty="0" smtClean="0"/>
+              <a:t>WFAA learnings</a:t>
+            </a:r>
+            <a:endParaRPr lang="en-US" dirty="0"/>
           </a:p>
         </p:txBody>
       </p:sp>
@@ -5346,10 +5604,17 @@
   <p:clrMapOvr>
     <a:masterClrMapping/>
   </p:clrMapOvr>
+  <p:timing>
+    <p:tnLst>
+      <p:par>
+        <p:cTn id="1" dur="indefinite" restart="never" nodeType="tmRoot"/>
+      </p:par>
+    </p:tnLst>
+  </p:timing>
 </p:sld>
 </file>
 
-<file path=ppt/slides/slide26.xml><?xml version="1.0" encoding="utf-8"?>
+<file path=ppt/slides/slide27.xml><?xml version="1.0" encoding="utf-8"?>
 <p:sld xmlns:a="http://schemas.openxmlformats.org/drawingml/2006/main" xmlns:r="http://schemas.openxmlformats.org/officeDocument/2006/relationships" xmlns:p="http://schemas.openxmlformats.org/presentationml/2006/main">
   <p:cSld>
     <p:spTree>
@@ -5502,10 +5767,17 @@
   <p:clrMapOvr>
     <a:masterClrMapping/>
   </p:clrMapOvr>
+  <p:timing>
+    <p:tnLst>
+      <p:par>
+        <p:cTn id="1" dur="indefinite" restart="never" nodeType="tmRoot"/>
+      </p:par>
+    </p:tnLst>
+  </p:timing>
 </p:sld>
 </file>
 
-<file path=ppt/slides/slide27.xml><?xml version="1.0" encoding="utf-8"?>
+<file path=ppt/slides/slide28.xml><?xml version="1.0" encoding="utf-8"?>
 <p:sld xmlns:a="http://schemas.openxmlformats.org/drawingml/2006/main" xmlns:r="http://schemas.openxmlformats.org/officeDocument/2006/relationships" xmlns:p="http://schemas.openxmlformats.org/presentationml/2006/main">
   <p:cSld>
     <p:spTree>
@@ -5602,6 +5874,13 @@
   <p:clrMapOvr>
     <a:masterClrMapping/>
   </p:clrMapOvr>
+  <p:timing>
+    <p:tnLst>
+      <p:par>
+        <p:cTn id="1" dur="indefinite" restart="never" nodeType="tmRoot"/>
+      </p:par>
+    </p:tnLst>
+  </p:timing>
 </p:sld>
 </file>
 
@@ -6460,6 +6739,415 @@
   <p:clrMapOvr>
     <a:masterClrMapping/>
   </p:clrMapOvr>
+  <p:timing>
+    <p:tnLst>
+      <p:par>
+        <p:cTn id="1" dur="indefinite" restart="never" nodeType="tmRoot">
+          <p:childTnLst>
+            <p:seq concurrent="1" nextAc="seek">
+              <p:cTn id="2" dur="indefinite" nodeType="mainSeq">
+                <p:childTnLst>
+                  <p:par>
+                    <p:cTn id="3" fill="hold">
+                      <p:stCondLst>
+                        <p:cond delay="indefinite"/>
+                      </p:stCondLst>
+                      <p:childTnLst>
+                        <p:par>
+                          <p:cTn id="4" fill="hold">
+                            <p:stCondLst>
+                              <p:cond delay="0"/>
+                            </p:stCondLst>
+                            <p:childTnLst>
+                              <p:par>
+                                <p:cTn id="5" presetID="1" presetClass="entr" presetSubtype="0" fill="hold" grpId="0" nodeType="clickEffect">
+                                  <p:stCondLst>
+                                    <p:cond delay="0"/>
+                                  </p:stCondLst>
+                                  <p:childTnLst>
+                                    <p:set>
+                                      <p:cBhvr>
+                                        <p:cTn id="6" dur="1" fill="hold">
+                                          <p:stCondLst>
+                                            <p:cond delay="0"/>
+                                          </p:stCondLst>
+                                        </p:cTn>
+                                        <p:tgtEl>
+                                          <p:spTgt spid="3">
+                                            <p:txEl>
+                                              <p:pRg st="0" end="0"/>
+                                            </p:txEl>
+                                          </p:spTgt>
+                                        </p:tgtEl>
+                                        <p:attrNameLst>
+                                          <p:attrName>style.visibility</p:attrName>
+                                        </p:attrNameLst>
+                                      </p:cBhvr>
+                                      <p:to>
+                                        <p:strVal val="visible"/>
+                                      </p:to>
+                                    </p:set>
+                                  </p:childTnLst>
+                                </p:cTn>
+                              </p:par>
+                            </p:childTnLst>
+                          </p:cTn>
+                        </p:par>
+                      </p:childTnLst>
+                    </p:cTn>
+                  </p:par>
+                  <p:par>
+                    <p:cTn id="7" fill="hold">
+                      <p:stCondLst>
+                        <p:cond delay="indefinite"/>
+                      </p:stCondLst>
+                      <p:childTnLst>
+                        <p:par>
+                          <p:cTn id="8" fill="hold">
+                            <p:stCondLst>
+                              <p:cond delay="0"/>
+                            </p:stCondLst>
+                            <p:childTnLst>
+                              <p:par>
+                                <p:cTn id="9" presetID="1" presetClass="entr" presetSubtype="0" fill="hold" grpId="0" nodeType="clickEffect">
+                                  <p:stCondLst>
+                                    <p:cond delay="0"/>
+                                  </p:stCondLst>
+                                  <p:childTnLst>
+                                    <p:set>
+                                      <p:cBhvr>
+                                        <p:cTn id="10" dur="1" fill="hold">
+                                          <p:stCondLst>
+                                            <p:cond delay="0"/>
+                                          </p:stCondLst>
+                                        </p:cTn>
+                                        <p:tgtEl>
+                                          <p:spTgt spid="3">
+                                            <p:txEl>
+                                              <p:pRg st="1" end="1"/>
+                                            </p:txEl>
+                                          </p:spTgt>
+                                        </p:tgtEl>
+                                        <p:attrNameLst>
+                                          <p:attrName>style.visibility</p:attrName>
+                                        </p:attrNameLst>
+                                      </p:cBhvr>
+                                      <p:to>
+                                        <p:strVal val="visible"/>
+                                      </p:to>
+                                    </p:set>
+                                  </p:childTnLst>
+                                </p:cTn>
+                              </p:par>
+                              <p:par>
+                                <p:cTn id="11" presetID="1" presetClass="entr" presetSubtype="0" fill="hold" nodeType="withEffect">
+                                  <p:stCondLst>
+                                    <p:cond delay="0"/>
+                                  </p:stCondLst>
+                                  <p:childTnLst>
+                                    <p:set>
+                                      <p:cBhvr>
+                                        <p:cTn id="12" dur="1" fill="hold">
+                                          <p:stCondLst>
+                                            <p:cond delay="0"/>
+                                          </p:stCondLst>
+                                        </p:cTn>
+                                        <p:tgtEl>
+                                          <p:spTgt spid="5"/>
+                                        </p:tgtEl>
+                                        <p:attrNameLst>
+                                          <p:attrName>style.visibility</p:attrName>
+                                        </p:attrNameLst>
+                                      </p:cBhvr>
+                                      <p:to>
+                                        <p:strVal val="visible"/>
+                                      </p:to>
+                                    </p:set>
+                                  </p:childTnLst>
+                                </p:cTn>
+                              </p:par>
+                              <p:par>
+                                <p:cTn id="13" presetID="1" presetClass="entr" presetSubtype="0" fill="hold" nodeType="withEffect">
+                                  <p:stCondLst>
+                                    <p:cond delay="0"/>
+                                  </p:stCondLst>
+                                  <p:childTnLst>
+                                    <p:set>
+                                      <p:cBhvr>
+                                        <p:cTn id="14" dur="1" fill="hold">
+                                          <p:stCondLst>
+                                            <p:cond delay="0"/>
+                                          </p:stCondLst>
+                                        </p:cTn>
+                                        <p:tgtEl>
+                                          <p:spTgt spid="8"/>
+                                        </p:tgtEl>
+                                        <p:attrNameLst>
+                                          <p:attrName>style.visibility</p:attrName>
+                                        </p:attrNameLst>
+                                      </p:cBhvr>
+                                      <p:to>
+                                        <p:strVal val="visible"/>
+                                      </p:to>
+                                    </p:set>
+                                  </p:childTnLst>
+                                </p:cTn>
+                              </p:par>
+                              <p:par>
+                                <p:cTn id="15" presetID="1" presetClass="entr" presetSubtype="0" fill="hold" nodeType="withEffect">
+                                  <p:stCondLst>
+                                    <p:cond delay="0"/>
+                                  </p:stCondLst>
+                                  <p:childTnLst>
+                                    <p:set>
+                                      <p:cBhvr>
+                                        <p:cTn id="16" dur="1" fill="hold">
+                                          <p:stCondLst>
+                                            <p:cond delay="0"/>
+                                          </p:stCondLst>
+                                        </p:cTn>
+                                        <p:tgtEl>
+                                          <p:spTgt spid="6"/>
+                                        </p:tgtEl>
+                                        <p:attrNameLst>
+                                          <p:attrName>style.visibility</p:attrName>
+                                        </p:attrNameLst>
+                                      </p:cBhvr>
+                                      <p:to>
+                                        <p:strVal val="visible"/>
+                                      </p:to>
+                                    </p:set>
+                                  </p:childTnLst>
+                                </p:cTn>
+                              </p:par>
+                            </p:childTnLst>
+                          </p:cTn>
+                        </p:par>
+                      </p:childTnLst>
+                    </p:cTn>
+                  </p:par>
+                  <p:par>
+                    <p:cTn id="17" fill="hold">
+                      <p:stCondLst>
+                        <p:cond delay="indefinite"/>
+                      </p:stCondLst>
+                      <p:childTnLst>
+                        <p:par>
+                          <p:cTn id="18" fill="hold">
+                            <p:stCondLst>
+                              <p:cond delay="0"/>
+                            </p:stCondLst>
+                            <p:childTnLst>
+                              <p:par>
+                                <p:cTn id="19" presetID="1" presetClass="entr" presetSubtype="0" fill="hold" grpId="0" nodeType="clickEffect">
+                                  <p:stCondLst>
+                                    <p:cond delay="0"/>
+                                  </p:stCondLst>
+                                  <p:childTnLst>
+                                    <p:set>
+                                      <p:cBhvr>
+                                        <p:cTn id="20" dur="1" fill="hold">
+                                          <p:stCondLst>
+                                            <p:cond delay="0"/>
+                                          </p:stCondLst>
+                                        </p:cTn>
+                                        <p:tgtEl>
+                                          <p:spTgt spid="4">
+                                            <p:txEl>
+                                              <p:pRg st="0" end="0"/>
+                                            </p:txEl>
+                                          </p:spTgt>
+                                        </p:tgtEl>
+                                        <p:attrNameLst>
+                                          <p:attrName>style.visibility</p:attrName>
+                                        </p:attrNameLst>
+                                      </p:cBhvr>
+                                      <p:to>
+                                        <p:strVal val="visible"/>
+                                      </p:to>
+                                    </p:set>
+                                  </p:childTnLst>
+                                </p:cTn>
+                              </p:par>
+                            </p:childTnLst>
+                          </p:cTn>
+                        </p:par>
+                      </p:childTnLst>
+                    </p:cTn>
+                  </p:par>
+                  <p:par>
+                    <p:cTn id="21" fill="hold">
+                      <p:stCondLst>
+                        <p:cond delay="indefinite"/>
+                      </p:stCondLst>
+                      <p:childTnLst>
+                        <p:par>
+                          <p:cTn id="22" fill="hold">
+                            <p:stCondLst>
+                              <p:cond delay="0"/>
+                            </p:stCondLst>
+                            <p:childTnLst>
+                              <p:par>
+                                <p:cTn id="23" presetID="1" presetClass="entr" presetSubtype="0" fill="hold" grpId="0" nodeType="clickEffect">
+                                  <p:stCondLst>
+                                    <p:cond delay="0"/>
+                                  </p:stCondLst>
+                                  <p:childTnLst>
+                                    <p:set>
+                                      <p:cBhvr>
+                                        <p:cTn id="24" dur="1" fill="hold">
+                                          <p:stCondLst>
+                                            <p:cond delay="0"/>
+                                          </p:stCondLst>
+                                        </p:cTn>
+                                        <p:tgtEl>
+                                          <p:spTgt spid="4">
+                                            <p:txEl>
+                                              <p:pRg st="1" end="1"/>
+                                            </p:txEl>
+                                          </p:spTgt>
+                                        </p:tgtEl>
+                                        <p:attrNameLst>
+                                          <p:attrName>style.visibility</p:attrName>
+                                        </p:attrNameLst>
+                                      </p:cBhvr>
+                                      <p:to>
+                                        <p:strVal val="visible"/>
+                                      </p:to>
+                                    </p:set>
+                                  </p:childTnLst>
+                                </p:cTn>
+                              </p:par>
+                            </p:childTnLst>
+                          </p:cTn>
+                        </p:par>
+                      </p:childTnLst>
+                    </p:cTn>
+                  </p:par>
+                  <p:par>
+                    <p:cTn id="25" fill="hold">
+                      <p:stCondLst>
+                        <p:cond delay="indefinite"/>
+                      </p:stCondLst>
+                      <p:childTnLst>
+                        <p:par>
+                          <p:cTn id="26" fill="hold">
+                            <p:stCondLst>
+                              <p:cond delay="0"/>
+                            </p:stCondLst>
+                            <p:childTnLst>
+                              <p:par>
+                                <p:cTn id="27" presetID="1" presetClass="entr" presetSubtype="0" fill="hold" grpId="0" nodeType="clickEffect">
+                                  <p:stCondLst>
+                                    <p:cond delay="0"/>
+                                  </p:stCondLst>
+                                  <p:childTnLst>
+                                    <p:set>
+                                      <p:cBhvr>
+                                        <p:cTn id="28" dur="1" fill="hold">
+                                          <p:stCondLst>
+                                            <p:cond delay="0"/>
+                                          </p:stCondLst>
+                                        </p:cTn>
+                                        <p:tgtEl>
+                                          <p:spTgt spid="4">
+                                            <p:txEl>
+                                              <p:pRg st="2" end="2"/>
+                                            </p:txEl>
+                                          </p:spTgt>
+                                        </p:tgtEl>
+                                        <p:attrNameLst>
+                                          <p:attrName>style.visibility</p:attrName>
+                                        </p:attrNameLst>
+                                      </p:cBhvr>
+                                      <p:to>
+                                        <p:strVal val="visible"/>
+                                      </p:to>
+                                    </p:set>
+                                  </p:childTnLst>
+                                </p:cTn>
+                              </p:par>
+                            </p:childTnLst>
+                          </p:cTn>
+                        </p:par>
+                      </p:childTnLst>
+                    </p:cTn>
+                  </p:par>
+                  <p:par>
+                    <p:cTn id="29" fill="hold">
+                      <p:stCondLst>
+                        <p:cond delay="indefinite"/>
+                      </p:stCondLst>
+                      <p:childTnLst>
+                        <p:par>
+                          <p:cTn id="30" fill="hold">
+                            <p:stCondLst>
+                              <p:cond delay="0"/>
+                            </p:stCondLst>
+                            <p:childTnLst>
+                              <p:par>
+                                <p:cTn id="31" presetID="1" presetClass="entr" presetSubtype="0" fill="hold" grpId="0" nodeType="clickEffect">
+                                  <p:stCondLst>
+                                    <p:cond delay="0"/>
+                                  </p:stCondLst>
+                                  <p:childTnLst>
+                                    <p:set>
+                                      <p:cBhvr>
+                                        <p:cTn id="32" dur="1" fill="hold">
+                                          <p:stCondLst>
+                                            <p:cond delay="0"/>
+                                          </p:stCondLst>
+                                        </p:cTn>
+                                        <p:tgtEl>
+                                          <p:spTgt spid="4">
+                                            <p:txEl>
+                                              <p:pRg st="3" end="3"/>
+                                            </p:txEl>
+                                          </p:spTgt>
+                                        </p:tgtEl>
+                                        <p:attrNameLst>
+                                          <p:attrName>style.visibility</p:attrName>
+                                        </p:attrNameLst>
+                                      </p:cBhvr>
+                                      <p:to>
+                                        <p:strVal val="visible"/>
+                                      </p:to>
+                                    </p:set>
+                                  </p:childTnLst>
+                                </p:cTn>
+                              </p:par>
+                            </p:childTnLst>
+                          </p:cTn>
+                        </p:par>
+                      </p:childTnLst>
+                    </p:cTn>
+                  </p:par>
+                </p:childTnLst>
+              </p:cTn>
+              <p:prevCondLst>
+                <p:cond evt="onPrev" delay="0">
+                  <p:tgtEl>
+                    <p:sldTgt/>
+                  </p:tgtEl>
+                </p:cond>
+              </p:prevCondLst>
+              <p:nextCondLst>
+                <p:cond evt="onNext" delay="0">
+                  <p:tgtEl>
+                    <p:sldTgt/>
+                  </p:tgtEl>
+                </p:cond>
+              </p:nextCondLst>
+            </p:seq>
+          </p:childTnLst>
+        </p:cTn>
+      </p:par>
+    </p:tnLst>
+    <p:bldLst>
+      <p:bldP spid="3" grpId="0" uiExpand="1" build="p"/>
+      <p:bldP spid="4" grpId="0" uiExpand="1" build="p"/>
+    </p:bldLst>
+  </p:timing>
 </p:sld>
 </file>
 
@@ -6497,7 +7185,11 @@
           <a:p>
             <a:r>
               <a:rPr lang="en-US" dirty="0" smtClean="0"/>
-              <a:t>Large Donor Disruption – Data</a:t>
+              <a:t>Large Donor Disruption – </a:t>
+            </a:r>
+            <a:r>
+              <a:rPr lang="en-US" dirty="0" smtClean="0"/>
+              <a:t>IRS Data</a:t>
             </a:r>
             <a:endParaRPr lang="en-US" dirty="0"/>
           </a:p>
@@ -6532,6 +7224,13 @@
   <p:clrMapOvr>
     <a:masterClrMapping/>
   </p:clrMapOvr>
+  <p:timing>
+    <p:tnLst>
+      <p:par>
+        <p:cTn id="1" dur="indefinite" restart="never" nodeType="tmRoot"/>
+      </p:par>
+    </p:tnLst>
+  </p:timing>
 </p:sld>
 </file>
 
@@ -6569,7 +7268,11 @@
           <a:p>
             <a:r>
               <a:rPr lang="en-US" dirty="0" smtClean="0"/>
-              <a:t>Large Donor Disruption – Opinions</a:t>
+              <a:t>Large Donor Disruption – </a:t>
+            </a:r>
+            <a:r>
+              <a:rPr lang="en-US" dirty="0" smtClean="0"/>
+              <a:t>WFAA Data</a:t>
             </a:r>
             <a:endParaRPr lang="en-US" dirty="0"/>
           </a:p>
@@ -6590,24 +7293,131 @@
           <a:bodyPr/>
           <a:lstStyle/>
           <a:p>
-            <a:r>
-              <a:rPr lang="en-US" dirty="0" smtClean="0"/>
-              <a:t>Large donors have always been important, but their importance is increasing</a:t>
-            </a:r>
-          </a:p>
-          <a:p>
-            <a:r>
-              <a:rPr lang="en-US" dirty="0" smtClean="0"/>
-              <a:t>Most organizations will have good data on these individuals, but might lack ways of analyzing it</a:t>
-            </a:r>
-          </a:p>
-          <a:p>
-            <a:r>
-              <a:rPr lang="en-US" dirty="0" smtClean="0"/>
-              <a:t>What you learn about large donors today, might help </a:t>
-            </a:r>
-            <a:r>
-              <a:rPr lang="en-US" smtClean="0"/>
+            <a:endParaRPr lang="en-US"/>
+          </a:p>
+        </p:txBody>
+      </p:sp>
+    </p:spTree>
+    <p:extLst>
+      <p:ext uri="{BB962C8B-B14F-4D97-AF65-F5344CB8AC3E}">
+        <p14:creationId xmlns:p14="http://schemas.microsoft.com/office/powerpoint/2010/main" val="1738280309"/>
+      </p:ext>
+    </p:extLst>
+  </p:cSld>
+  <p:clrMapOvr>
+    <a:masterClrMapping/>
+  </p:clrMapOvr>
+  <p:timing>
+    <p:tnLst>
+      <p:par>
+        <p:cTn id="1" dur="indefinite" restart="never" nodeType="tmRoot"/>
+      </p:par>
+    </p:tnLst>
+  </p:timing>
+</p:sld>
+</file>
+
+<file path=ppt/slides/slide8.xml><?xml version="1.0" encoding="utf-8"?>
+<p:sld xmlns:a="http://schemas.openxmlformats.org/drawingml/2006/main" xmlns:r="http://schemas.openxmlformats.org/officeDocument/2006/relationships" xmlns:p="http://schemas.openxmlformats.org/presentationml/2006/main">
+  <p:cSld>
+    <p:spTree>
+      <p:nvGrpSpPr>
+        <p:cNvPr id="1" name=""/>
+        <p:cNvGrpSpPr/>
+        <p:nvPr/>
+      </p:nvGrpSpPr>
+      <p:grpSpPr>
+        <a:xfrm>
+          <a:off x="0" y="0"/>
+          <a:ext cx="0" cy="0"/>
+          <a:chOff x="0" y="0"/>
+          <a:chExt cx="0" cy="0"/>
+        </a:xfrm>
+      </p:grpSpPr>
+      <p:sp>
+        <p:nvSpPr>
+          <p:cNvPr id="2" name="Title 1"/>
+          <p:cNvSpPr>
+            <a:spLocks noGrp="1"/>
+          </p:cNvSpPr>
+          <p:nvPr>
+            <p:ph type="title"/>
+          </p:nvPr>
+        </p:nvSpPr>
+        <p:spPr/>
+        <p:txBody>
+          <a:bodyPr/>
+          <a:lstStyle/>
+          <a:p>
+            <a:r>
+              <a:rPr lang="en-US" dirty="0" smtClean="0"/>
+              <a:t>Large Donor Disruption – Opinions</a:t>
+            </a:r>
+            <a:endParaRPr lang="en-US" dirty="0"/>
+          </a:p>
+        </p:txBody>
+      </p:sp>
+      <p:sp>
+        <p:nvSpPr>
+          <p:cNvPr id="3" name="Content Placeholder 2"/>
+          <p:cNvSpPr>
+            <a:spLocks noGrp="1"/>
+          </p:cNvSpPr>
+          <p:nvPr>
+            <p:ph idx="1"/>
+          </p:nvPr>
+        </p:nvSpPr>
+        <p:spPr/>
+        <p:txBody>
+          <a:bodyPr/>
+          <a:lstStyle/>
+          <a:p>
+            <a:r>
+              <a:rPr lang="en-US" dirty="0" smtClean="0"/>
+              <a:t>Large donors have always been important, but their importance is </a:t>
+            </a:r>
+            <a:r>
+              <a:rPr lang="en-US" dirty="0" smtClean="0"/>
+              <a:t>increasing</a:t>
+            </a:r>
+          </a:p>
+          <a:p>
+            <a:pPr lvl="1"/>
+            <a:r>
+              <a:rPr lang="en-US" dirty="0" smtClean="0"/>
+              <a:t>Also evident in HRC 2016 campaign contributions</a:t>
+            </a:r>
+            <a:endParaRPr lang="en-US" dirty="0" smtClean="0"/>
+          </a:p>
+          <a:p>
+            <a:r>
+              <a:rPr lang="en-US" dirty="0" smtClean="0"/>
+              <a:t>Most organizations will have good data on these individuals, but might lack ways of analyzing </a:t>
+            </a:r>
+            <a:r>
+              <a:rPr lang="en-US" dirty="0" smtClean="0"/>
+              <a:t>it</a:t>
+            </a:r>
+          </a:p>
+          <a:p>
+            <a:pPr lvl="1"/>
+            <a:r>
+              <a:rPr lang="en-US" dirty="0" smtClean="0"/>
+              <a:t>What’s the dependent variable?</a:t>
+            </a:r>
+            <a:endParaRPr lang="en-US" dirty="0" smtClean="0"/>
+          </a:p>
+          <a:p>
+            <a:r>
+              <a:rPr lang="en-US" dirty="0" smtClean="0"/>
+              <a:t>What you learn about large donors </a:t>
+            </a:r>
+            <a:r>
+              <a:rPr lang="en-US" dirty="0" smtClean="0"/>
+              <a:t>today will help </a:t>
+            </a:r>
+            <a:r>
+              <a:rPr lang="en-US" dirty="0" smtClean="0"/>
               <a:t>you tomorrow</a:t>
             </a:r>
             <a:endParaRPr lang="en-US" dirty="0"/>
@@ -6624,10 +7434,17 @@
   <p:clrMapOvr>
     <a:masterClrMapping/>
   </p:clrMapOvr>
+  <p:timing>
+    <p:tnLst>
+      <p:par>
+        <p:cTn id="1" dur="indefinite" restart="never" nodeType="tmRoot"/>
+      </p:par>
+    </p:tnLst>
+  </p:timing>
 </p:sld>
 </file>
 
-<file path=ppt/slides/slide8.xml><?xml version="1.0" encoding="utf-8"?>
+<file path=ppt/slides/slide9.xml><?xml version="1.0" encoding="utf-8"?>
 <p:sld xmlns:a="http://schemas.openxmlformats.org/drawingml/2006/main" xmlns:r="http://schemas.openxmlformats.org/officeDocument/2006/relationships" xmlns:p="http://schemas.openxmlformats.org/presentationml/2006/main">
   <p:cSld>
     <p:spTree>
@@ -9933,85 +10750,6 @@
     <p:extLst>
       <p:ext uri="{BB962C8B-B14F-4D97-AF65-F5344CB8AC3E}">
         <p14:creationId xmlns:p14="http://schemas.microsoft.com/office/powerpoint/2010/main" val="1485711153"/>
-      </p:ext>
-    </p:extLst>
-  </p:cSld>
-  <p:clrMapOvr>
-    <a:masterClrMapping/>
-  </p:clrMapOvr>
-  <p:timing>
-    <p:tnLst>
-      <p:par>
-        <p:cTn id="1" dur="indefinite" restart="never" nodeType="tmRoot"/>
-      </p:par>
-    </p:tnLst>
-  </p:timing>
-</p:sld>
-</file>
-
-<file path=ppt/slides/slide9.xml><?xml version="1.0" encoding="utf-8"?>
-<p:sld xmlns:a="http://schemas.openxmlformats.org/drawingml/2006/main" xmlns:r="http://schemas.openxmlformats.org/officeDocument/2006/relationships" xmlns:p="http://schemas.openxmlformats.org/presentationml/2006/main">
-  <p:cSld>
-    <p:spTree>
-      <p:nvGrpSpPr>
-        <p:cNvPr id="1" name=""/>
-        <p:cNvGrpSpPr/>
-        <p:nvPr/>
-      </p:nvGrpSpPr>
-      <p:grpSpPr>
-        <a:xfrm>
-          <a:off x="0" y="0"/>
-          <a:ext cx="0" cy="0"/>
-          <a:chOff x="0" y="0"/>
-          <a:chExt cx="0" cy="0"/>
-        </a:xfrm>
-      </p:grpSpPr>
-      <p:sp>
-        <p:nvSpPr>
-          <p:cNvPr id="2" name="Title 1"/>
-          <p:cNvSpPr>
-            <a:spLocks noGrp="1"/>
-          </p:cNvSpPr>
-          <p:nvPr>
-            <p:ph type="title"/>
-          </p:nvPr>
-        </p:nvSpPr>
-        <p:spPr/>
-        <p:txBody>
-          <a:bodyPr/>
-          <a:lstStyle/>
-          <a:p>
-            <a:r>
-              <a:rPr lang="en-US" dirty="0" smtClean="0"/>
-              <a:t>Using UL: Right and Wrong Times</a:t>
-            </a:r>
-            <a:endParaRPr lang="en-US" dirty="0"/>
-          </a:p>
-        </p:txBody>
-      </p:sp>
-      <p:sp>
-        <p:nvSpPr>
-          <p:cNvPr id="3" name="Content Placeholder 2"/>
-          <p:cNvSpPr>
-            <a:spLocks noGrp="1"/>
-          </p:cNvSpPr>
-          <p:nvPr>
-            <p:ph idx="1"/>
-          </p:nvPr>
-        </p:nvSpPr>
-        <p:spPr/>
-        <p:txBody>
-          <a:bodyPr/>
-          <a:lstStyle/>
-          <a:p>
-            <a:endParaRPr lang="en-US"/>
-          </a:p>
-        </p:txBody>
-      </p:sp>
-    </p:spTree>
-    <p:extLst>
-      <p:ext uri="{BB962C8B-B14F-4D97-AF65-F5344CB8AC3E}">
-        <p14:creationId xmlns:p14="http://schemas.microsoft.com/office/powerpoint/2010/main" val="3051305169"/>
       </p:ext>
     </p:extLst>
   </p:cSld>

</xml_diff>

<commit_message>
irs image, tweaks to pres
</commit_message>
<xml_diff>
--- a/Generating Insights from Clustering Large Donors - BStieber APRA DAS19.pptx
+++ b/Generating Insights from Clustering Large Donors - BStieber APRA DAS19.pptx
@@ -3629,12 +3629,16 @@
             </a:r>
             <a:r>
               <a:rPr lang="en-US" dirty="0" smtClean="0"/>
-              <a:t> </a:t>
-            </a:r>
-            <a:r>
-              <a:rPr lang="en-US" dirty="0" smtClean="0"/>
-              <a:t>hierarchy</a:t>
-            </a:r>
+              <a:t> hierarchy</a:t>
+            </a:r>
+          </a:p>
+          <a:p>
+            <a:pPr lvl="1"/>
+            <a:r>
+              <a:rPr lang="en-US" dirty="0" smtClean="0"/>
+              <a:t>Does your data have a latent hierarchical structure?</a:t>
+            </a:r>
+            <a:endParaRPr lang="en-US" dirty="0" smtClean="0"/>
           </a:p>
           <a:p>
             <a:r>
@@ -4185,7 +4189,19 @@
           <a:p>
             <a:r>
               <a:rPr lang="en-US" dirty="0" smtClean="0"/>
-              <a:t>I’ve found it especially helpful for unstructured data</a:t>
+              <a:t>Helpful </a:t>
+            </a:r>
+            <a:r>
+              <a:rPr lang="en-US" dirty="0" smtClean="0"/>
+              <a:t>for unstructured </a:t>
+            </a:r>
+            <a:r>
+              <a:rPr lang="en-US" dirty="0" smtClean="0"/>
+              <a:t>data (i.e. </a:t>
+            </a:r>
+            <a:r>
+              <a:rPr lang="en-US" smtClean="0"/>
+              <a:t>sparse feature space)</a:t>
             </a:r>
             <a:endParaRPr lang="en-US" dirty="0"/>
           </a:p>
@@ -6471,8 +6487,19 @@
           <a:p>
             <a:r>
               <a:rPr lang="en-US" dirty="0" smtClean="0"/>
-              <a:t>Growing wealth inequality</a:t>
-            </a:r>
+              <a:t>Growing wealth </a:t>
+            </a:r>
+            <a:r>
+              <a:rPr lang="en-US" dirty="0" smtClean="0"/>
+              <a:t>inequality</a:t>
+            </a:r>
+          </a:p>
+          <a:p>
+            <a:r>
+              <a:rPr lang="en-US" dirty="0" smtClean="0"/>
+              <a:t>Deviation from 80/20</a:t>
+            </a:r>
+            <a:endParaRPr lang="en-US" dirty="0" smtClean="0"/>
           </a:p>
           <a:p>
             <a:r>
@@ -6658,8 +6685,8 @@
         </p:blipFill>
         <p:spPr>
           <a:xfrm>
-            <a:off x="1003680" y="2288588"/>
-            <a:ext cx="2672042" cy="1146890"/>
+            <a:off x="2339753" y="2987055"/>
+            <a:ext cx="2507175" cy="1076126"/>
           </a:xfrm>
           <a:prstGeom prst="rect">
             <a:avLst/>
@@ -6687,7 +6714,7 @@
         </p:blipFill>
         <p:spPr>
           <a:xfrm>
-            <a:off x="56771" y="3570167"/>
+            <a:off x="90539" y="3419297"/>
             <a:ext cx="2156465" cy="1213424"/>
           </a:xfrm>
           <a:prstGeom prst="rect">
@@ -6716,7 +6743,7 @@
         </p:blipFill>
         <p:spPr>
           <a:xfrm>
-            <a:off x="2339701" y="3567664"/>
+            <a:off x="2339701" y="4191759"/>
             <a:ext cx="2507227" cy="760328"/>
           </a:xfrm>
           <a:prstGeom prst="rect">
@@ -6839,35 +6866,26 @@
                                   </p:childTnLst>
                                 </p:cTn>
                               </p:par>
+                            </p:childTnLst>
+                          </p:cTn>
+                        </p:par>
+                      </p:childTnLst>
+                    </p:cTn>
+                  </p:par>
+                  <p:par>
+                    <p:cTn id="11" fill="hold">
+                      <p:stCondLst>
+                        <p:cond delay="indefinite"/>
+                      </p:stCondLst>
+                      <p:childTnLst>
+                        <p:par>
+                          <p:cTn id="12" fill="hold">
+                            <p:stCondLst>
+                              <p:cond delay="0"/>
+                            </p:stCondLst>
+                            <p:childTnLst>
                               <p:par>
-                                <p:cTn id="11" presetID="1" presetClass="entr" presetSubtype="0" fill="hold" nodeType="withEffect">
-                                  <p:stCondLst>
-                                    <p:cond delay="0"/>
-                                  </p:stCondLst>
-                                  <p:childTnLst>
-                                    <p:set>
-                                      <p:cBhvr>
-                                        <p:cTn id="12" dur="1" fill="hold">
-                                          <p:stCondLst>
-                                            <p:cond delay="0"/>
-                                          </p:stCondLst>
-                                        </p:cTn>
-                                        <p:tgtEl>
-                                          <p:spTgt spid="5"/>
-                                        </p:tgtEl>
-                                        <p:attrNameLst>
-                                          <p:attrName>style.visibility</p:attrName>
-                                        </p:attrNameLst>
-                                      </p:cBhvr>
-                                      <p:to>
-                                        <p:strVal val="visible"/>
-                                      </p:to>
-                                    </p:set>
-                                  </p:childTnLst>
-                                </p:cTn>
-                              </p:par>
-                              <p:par>
-                                <p:cTn id="13" presetID="1" presetClass="entr" presetSubtype="0" fill="hold" nodeType="withEffect">
+                                <p:cTn id="13" presetID="1" presetClass="entr" presetSubtype="0" fill="hold" grpId="0" nodeType="clickEffect">
                                   <p:stCondLst>
                                     <p:cond delay="0"/>
                                   </p:stCondLst>
@@ -6880,7 +6898,11 @@
                                           </p:stCondLst>
                                         </p:cTn>
                                         <p:tgtEl>
-                                          <p:spTgt spid="8"/>
+                                          <p:spTgt spid="3">
+                                            <p:txEl>
+                                              <p:pRg st="2" end="2"/>
+                                            </p:txEl>
+                                          </p:spTgt>
                                         </p:tgtEl>
                                         <p:attrNameLst>
                                           <p:attrName>style.visibility</p:attrName>
@@ -6907,7 +6929,7 @@
                                           </p:stCondLst>
                                         </p:cTn>
                                         <p:tgtEl>
-                                          <p:spTgt spid="6"/>
+                                          <p:spTgt spid="5"/>
                                         </p:tgtEl>
                                         <p:attrNameLst>
                                           <p:attrName>style.visibility</p:attrName>
@@ -6920,26 +6942,35 @@
                                   </p:childTnLst>
                                 </p:cTn>
                               </p:par>
-                            </p:childTnLst>
-                          </p:cTn>
-                        </p:par>
-                      </p:childTnLst>
-                    </p:cTn>
-                  </p:par>
-                  <p:par>
-                    <p:cTn id="17" fill="hold">
-                      <p:stCondLst>
-                        <p:cond delay="indefinite"/>
-                      </p:stCondLst>
-                      <p:childTnLst>
-                        <p:par>
-                          <p:cTn id="18" fill="hold">
-                            <p:stCondLst>
-                              <p:cond delay="0"/>
-                            </p:stCondLst>
-                            <p:childTnLst>
                               <p:par>
-                                <p:cTn id="19" presetID="1" presetClass="entr" presetSubtype="0" fill="hold" grpId="0" nodeType="clickEffect">
+                                <p:cTn id="17" presetID="1" presetClass="entr" presetSubtype="0" fill="hold" nodeType="withEffect">
+                                  <p:stCondLst>
+                                    <p:cond delay="0"/>
+                                  </p:stCondLst>
+                                  <p:childTnLst>
+                                    <p:set>
+                                      <p:cBhvr>
+                                        <p:cTn id="18" dur="1" fill="hold">
+                                          <p:stCondLst>
+                                            <p:cond delay="0"/>
+                                          </p:stCondLst>
+                                        </p:cTn>
+                                        <p:tgtEl>
+                                          <p:spTgt spid="8"/>
+                                        </p:tgtEl>
+                                        <p:attrNameLst>
+                                          <p:attrName>style.visibility</p:attrName>
+                                        </p:attrNameLst>
+                                      </p:cBhvr>
+                                      <p:to>
+                                        <p:strVal val="visible"/>
+                                      </p:to>
+                                    </p:set>
+                                  </p:childTnLst>
+                                </p:cTn>
+                              </p:par>
+                              <p:par>
+                                <p:cTn id="19" presetID="1" presetClass="entr" presetSubtype="0" fill="hold" nodeType="withEffect">
                                   <p:stCondLst>
                                     <p:cond delay="0"/>
                                   </p:stCondLst>
@@ -6952,11 +6983,7 @@
                                           </p:stCondLst>
                                         </p:cTn>
                                         <p:tgtEl>
-                                          <p:spTgt spid="4">
-                                            <p:txEl>
-                                              <p:pRg st="0" end="0"/>
-                                            </p:txEl>
-                                          </p:spTgt>
+                                          <p:spTgt spid="6"/>
                                         </p:tgtEl>
                                         <p:attrNameLst>
                                           <p:attrName>style.visibility</p:attrName>
@@ -7003,7 +7030,7 @@
                                         <p:tgtEl>
                                           <p:spTgt spid="4">
                                             <p:txEl>
-                                              <p:pRg st="1" end="1"/>
+                                              <p:pRg st="0" end="0"/>
                                             </p:txEl>
                                           </p:spTgt>
                                         </p:tgtEl>
@@ -7052,7 +7079,7 @@
                                         <p:tgtEl>
                                           <p:spTgt spid="4">
                                             <p:txEl>
-                                              <p:pRg st="2" end="2"/>
+                                              <p:pRg st="1" end="1"/>
                                             </p:txEl>
                                           </p:spTgt>
                                         </p:tgtEl>
@@ -7094,6 +7121,55 @@
                                     <p:set>
                                       <p:cBhvr>
                                         <p:cTn id="32" dur="1" fill="hold">
+                                          <p:stCondLst>
+                                            <p:cond delay="0"/>
+                                          </p:stCondLst>
+                                        </p:cTn>
+                                        <p:tgtEl>
+                                          <p:spTgt spid="4">
+                                            <p:txEl>
+                                              <p:pRg st="2" end="2"/>
+                                            </p:txEl>
+                                          </p:spTgt>
+                                        </p:tgtEl>
+                                        <p:attrNameLst>
+                                          <p:attrName>style.visibility</p:attrName>
+                                        </p:attrNameLst>
+                                      </p:cBhvr>
+                                      <p:to>
+                                        <p:strVal val="visible"/>
+                                      </p:to>
+                                    </p:set>
+                                  </p:childTnLst>
+                                </p:cTn>
+                              </p:par>
+                            </p:childTnLst>
+                          </p:cTn>
+                        </p:par>
+                      </p:childTnLst>
+                    </p:cTn>
+                  </p:par>
+                  <p:par>
+                    <p:cTn id="33" fill="hold">
+                      <p:stCondLst>
+                        <p:cond delay="indefinite"/>
+                      </p:stCondLst>
+                      <p:childTnLst>
+                        <p:par>
+                          <p:cTn id="34" fill="hold">
+                            <p:stCondLst>
+                              <p:cond delay="0"/>
+                            </p:stCondLst>
+                            <p:childTnLst>
+                              <p:par>
+                                <p:cTn id="35" presetID="1" presetClass="entr" presetSubtype="0" fill="hold" grpId="0" nodeType="clickEffect">
+                                  <p:stCondLst>
+                                    <p:cond delay="0"/>
+                                  </p:stCondLst>
+                                  <p:childTnLst>
+                                    <p:set>
+                                      <p:cBhvr>
+                                        <p:cTn id="36" dur="1" fill="hold">
                                           <p:stCondLst>
                                             <p:cond delay="0"/>
                                           </p:stCondLst>
@@ -7197,23 +7273,70 @@
       </p:sp>
       <p:sp>
         <p:nvSpPr>
-          <p:cNvPr id="3" name="Content Placeholder 2"/>
+          <p:cNvPr id="4" name="Content Placeholder 3"/>
           <p:cNvSpPr>
             <a:spLocks noGrp="1"/>
           </p:cNvSpPr>
           <p:nvPr>
-            <p:ph idx="1"/>
-          </p:nvPr>
-        </p:nvSpPr>
-        <p:spPr/>
+            <p:ph sz="half" idx="1"/>
+          </p:nvPr>
+        </p:nvSpPr>
+        <p:spPr>
+          <a:xfrm>
+            <a:off x="329784" y="1268016"/>
+            <a:ext cx="3423682" cy="3364707"/>
+          </a:xfrm>
+        </p:spPr>
         <p:txBody>
           <a:bodyPr/>
           <a:lstStyle/>
           <a:p>
-            <a:endParaRPr lang="en-US"/>
+            <a:r>
+              <a:rPr lang="en-US" dirty="0" smtClean="0"/>
+              <a:t>Tax return data is available by ZIP</a:t>
+            </a:r>
+          </a:p>
+          <a:p>
+            <a:r>
+              <a:rPr lang="en-US" dirty="0" smtClean="0"/>
+              <a:t>How does the 80/20 “rule” hold up using charitable contributions on tax returns?</a:t>
+            </a:r>
+          </a:p>
+          <a:p>
+            <a:r>
+              <a:rPr lang="en-US" dirty="0" smtClean="0"/>
+              <a:t>What does this tell us about large donors?</a:t>
+            </a:r>
+            <a:endParaRPr lang="en-US" dirty="0"/>
           </a:p>
         </p:txBody>
       </p:sp>
+      <p:pic>
+        <p:nvPicPr>
+          <p:cNvPr id="6" name="Content Placeholder 5"/>
+          <p:cNvPicPr>
+            <a:picLocks noGrp="1" noChangeAspect="1"/>
+          </p:cNvPicPr>
+          <p:nvPr>
+            <p:ph sz="half" idx="2"/>
+          </p:nvPr>
+        </p:nvPicPr>
+        <p:blipFill>
+          <a:blip r:embed="rId2"/>
+          <a:stretch>
+            <a:fillRect/>
+          </a:stretch>
+        </p:blipFill>
+        <p:spPr>
+          <a:xfrm>
+            <a:off x="4480991" y="1268016"/>
+            <a:ext cx="4583906" cy="3437929"/>
+          </a:xfrm>
+          <a:prstGeom prst="rect">
+            <a:avLst/>
+          </a:prstGeom>
+        </p:spPr>
+      </p:pic>
     </p:spTree>
     <p:extLst>
       <p:ext uri="{BB962C8B-B14F-4D97-AF65-F5344CB8AC3E}">

</xml_diff>